<commit_message>
Corrections to slide deck 1
</commit_message>
<xml_diff>
--- a/Slides/1_Introduction.pptx
+++ b/Slides/1_Introduction.pptx
@@ -238,7 +238,7 @@
           <a:p>
             <a:fld id="{75A03C7D-3751-4F45-A7C4-5947DC6E787B}" type="datetimeFigureOut">
               <a:rPr lang="en-US" smtClean="0"/>
-              <a:t>10/30/2021</a:t>
+              <a:t>1/16/2022</a:t>
             </a:fld>
             <a:endParaRPr lang="en-US"/>
           </a:p>
@@ -2308,7 +2308,7 @@
           <a:p>
             <a:fld id="{61FA4C16-8A72-4D45-80AF-E8D5756146B3}" type="datetimeFigureOut">
               <a:rPr lang="en-US" smtClean="0"/>
-              <a:t>10/30/2021</a:t>
+              <a:t>1/16/2022</a:t>
             </a:fld>
             <a:endParaRPr lang="en-US"/>
           </a:p>
@@ -2506,7 +2506,7 @@
           <a:p>
             <a:fld id="{61FA4C16-8A72-4D45-80AF-E8D5756146B3}" type="datetimeFigureOut">
               <a:rPr lang="en-US" smtClean="0"/>
-              <a:t>10/30/2021</a:t>
+              <a:t>1/16/2022</a:t>
             </a:fld>
             <a:endParaRPr lang="en-US"/>
           </a:p>
@@ -2714,7 +2714,7 @@
           <a:p>
             <a:fld id="{61FA4C16-8A72-4D45-80AF-E8D5756146B3}" type="datetimeFigureOut">
               <a:rPr lang="en-US" smtClean="0"/>
-              <a:t>10/30/2021</a:t>
+              <a:t>1/16/2022</a:t>
             </a:fld>
             <a:endParaRPr lang="en-US"/>
           </a:p>
@@ -3690,7 +3690,7 @@
           <a:p>
             <a:fld id="{61FA4C16-8A72-4D45-80AF-E8D5756146B3}" type="datetimeFigureOut">
               <a:rPr lang="en-US" smtClean="0"/>
-              <a:t>10/30/2021</a:t>
+              <a:t>1/16/2022</a:t>
             </a:fld>
             <a:endParaRPr lang="en-US"/>
           </a:p>
@@ -3965,7 +3965,7 @@
           <a:p>
             <a:fld id="{61FA4C16-8A72-4D45-80AF-E8D5756146B3}" type="datetimeFigureOut">
               <a:rPr lang="en-US" smtClean="0"/>
-              <a:t>10/30/2021</a:t>
+              <a:t>1/16/2022</a:t>
             </a:fld>
             <a:endParaRPr lang="en-US"/>
           </a:p>
@@ -4230,7 +4230,7 @@
           <a:p>
             <a:fld id="{61FA4C16-8A72-4D45-80AF-E8D5756146B3}" type="datetimeFigureOut">
               <a:rPr lang="en-US" smtClean="0"/>
-              <a:t>10/30/2021</a:t>
+              <a:t>1/16/2022</a:t>
             </a:fld>
             <a:endParaRPr lang="en-US"/>
           </a:p>
@@ -4642,7 +4642,7 @@
           <a:p>
             <a:fld id="{61FA4C16-8A72-4D45-80AF-E8D5756146B3}" type="datetimeFigureOut">
               <a:rPr lang="en-US" smtClean="0"/>
-              <a:t>10/30/2021</a:t>
+              <a:t>1/16/2022</a:t>
             </a:fld>
             <a:endParaRPr lang="en-US"/>
           </a:p>
@@ -4783,7 +4783,7 @@
           <a:p>
             <a:fld id="{61FA4C16-8A72-4D45-80AF-E8D5756146B3}" type="datetimeFigureOut">
               <a:rPr lang="en-US" smtClean="0"/>
-              <a:t>10/30/2021</a:t>
+              <a:t>1/16/2022</a:t>
             </a:fld>
             <a:endParaRPr lang="en-US"/>
           </a:p>
@@ -4896,7 +4896,7 @@
           <a:p>
             <a:fld id="{61FA4C16-8A72-4D45-80AF-E8D5756146B3}" type="datetimeFigureOut">
               <a:rPr lang="en-US" smtClean="0"/>
-              <a:t>10/30/2021</a:t>
+              <a:t>1/16/2022</a:t>
             </a:fld>
             <a:endParaRPr lang="en-US"/>
           </a:p>
@@ -5207,7 +5207,7 @@
           <a:p>
             <a:fld id="{61FA4C16-8A72-4D45-80AF-E8D5756146B3}" type="datetimeFigureOut">
               <a:rPr lang="en-US" smtClean="0"/>
-              <a:t>10/30/2021</a:t>
+              <a:t>1/16/2022</a:t>
             </a:fld>
             <a:endParaRPr lang="en-US"/>
           </a:p>
@@ -5495,7 +5495,7 @@
           <a:p>
             <a:fld id="{61FA4C16-8A72-4D45-80AF-E8D5756146B3}" type="datetimeFigureOut">
               <a:rPr lang="en-US" smtClean="0"/>
-              <a:t>10/30/2021</a:t>
+              <a:t>1/16/2022</a:t>
             </a:fld>
             <a:endParaRPr lang="en-US"/>
           </a:p>
@@ -5736,7 +5736,7 @@
           <a:p>
             <a:fld id="{61FA4C16-8A72-4D45-80AF-E8D5756146B3}" type="datetimeFigureOut">
               <a:rPr lang="en-US" smtClean="0"/>
-              <a:t>10/30/2021</a:t>
+              <a:t>1/16/2022</a:t>
             </a:fld>
             <a:endParaRPr lang="en-US"/>
           </a:p>
@@ -6643,7 +6643,7 @@
           <a:p>
             <a:r>
               <a:rPr lang="en-US" dirty="0"/>
-              <a:t>Goal is for you to gain enough understanding of theory that you can understand the algorithms you apply </a:t>
+              <a:t>Goal is for you to gain enough understanding of theory to understand the algorithms you apply </a:t>
             </a:r>
           </a:p>
         </p:txBody>
@@ -20803,6 +20803,33 @@
                 <a:ea typeface="Segoe UI" panose="020B0502040204020203" pitchFamily="34" charset="0"/>
                 <a:cs typeface="Segoe UI" panose="020B0502040204020203" pitchFamily="34" charset="0"/>
               </a:rPr>
+              <a:t>Or, 3</a:t>
+            </a:r>
+            <a:r>
+              <a:rPr lang="en-GB" baseline="30000" dirty="0">
+                <a:ea typeface="Segoe UI" panose="020B0502040204020203" pitchFamily="34" charset="0"/>
+                <a:cs typeface="Segoe UI" panose="020B0502040204020203" pitchFamily="34" charset="0"/>
+              </a:rPr>
+              <a:t>rd</a:t>
+            </a:r>
+            <a:r>
+              <a:rPr lang="en-GB" dirty="0">
+                <a:ea typeface="Segoe UI" panose="020B0502040204020203" pitchFamily="34" charset="0"/>
+                <a:cs typeface="Segoe UI" panose="020B0502040204020203" pitchFamily="34" charset="0"/>
+              </a:rPr>
+              <a:t> dimension can be depth; e.g. medical images</a:t>
+            </a:r>
+          </a:p>
+          <a:p>
+            <a:pPr>
+              <a:buFont typeface="Wingdings" panose="05000000000000000000" pitchFamily="2" charset="2"/>
+              <a:buChar char="§"/>
+            </a:pPr>
+            <a:r>
+              <a:rPr lang="en-GB" dirty="0">
+                <a:ea typeface="Segoe UI" panose="020B0502040204020203" pitchFamily="34" charset="0"/>
+                <a:cs typeface="Segoe UI" panose="020B0502040204020203" pitchFamily="34" charset="0"/>
+              </a:rPr>
               <a:t>4</a:t>
             </a:r>
             <a:r>
@@ -21080,6 +21107,55 @@
                       </p:childTnLst>
                     </p:cTn>
                   </p:par>
+                  <p:par>
+                    <p:cTn id="19" fill="hold">
+                      <p:stCondLst>
+                        <p:cond delay="indefinite"/>
+                      </p:stCondLst>
+                      <p:childTnLst>
+                        <p:par>
+                          <p:cTn id="20" fill="hold">
+                            <p:stCondLst>
+                              <p:cond delay="0"/>
+                            </p:stCondLst>
+                            <p:childTnLst>
+                              <p:par>
+                                <p:cTn id="21" presetID="1" presetClass="entr" presetSubtype="0" fill="hold" grpId="0" nodeType="clickEffect">
+                                  <p:stCondLst>
+                                    <p:cond delay="0"/>
+                                  </p:stCondLst>
+                                  <p:childTnLst>
+                                    <p:set>
+                                      <p:cBhvr>
+                                        <p:cTn id="22" dur="1" fill="hold">
+                                          <p:stCondLst>
+                                            <p:cond delay="0"/>
+                                          </p:stCondLst>
+                                        </p:cTn>
+                                        <p:tgtEl>
+                                          <p:spTgt spid="7">
+                                            <p:txEl>
+                                              <p:pRg st="4" end="4"/>
+                                            </p:txEl>
+                                          </p:spTgt>
+                                        </p:tgtEl>
+                                        <p:attrNameLst>
+                                          <p:attrName>style.visibility</p:attrName>
+                                        </p:attrNameLst>
+                                      </p:cBhvr>
+                                      <p:to>
+                                        <p:strVal val="visible"/>
+                                      </p:to>
+                                    </p:set>
+                                  </p:childTnLst>
+                                </p:cTn>
+                              </p:par>
+                            </p:childTnLst>
+                          </p:cTn>
+                        </p:par>
+                      </p:childTnLst>
+                    </p:cTn>
+                  </p:par>
                 </p:childTnLst>
               </p:cTn>
               <p:prevCondLst>
@@ -21138,12 +21214,12 @@
         <p:spPr>
           <a:xfrm>
             <a:off x="378595" y="1230642"/>
-            <a:ext cx="9379180" cy="629473"/>
+            <a:ext cx="9379180" cy="1001890"/>
           </a:xfrm>
         </p:spPr>
         <p:txBody>
           <a:bodyPr>
-            <a:normAutofit fontScale="92500"/>
+            <a:normAutofit/>
           </a:bodyPr>
           <a:lstStyle/>
           <a:p>
@@ -21156,7 +21232,23 @@
                 <a:ea typeface="Segoe UI" panose="020B0502040204020203" pitchFamily="34" charset="0"/>
                 <a:cs typeface="Segoe UI" panose="020B0502040204020203" pitchFamily="34" charset="0"/>
               </a:rPr>
-              <a:t>Machine learning algorithms use one data sample at a time</a:t>
+              <a:t>Machine learning algorithms use one data sample, as </a:t>
+            </a:r>
+            <a:r>
+              <a:rPr lang="en-GB" b="1" dirty="0">
+                <a:latin typeface="Segoe UI" panose="020B0502040204020203" pitchFamily="34" charset="0"/>
+                <a:ea typeface="Segoe UI" panose="020B0502040204020203" pitchFamily="34" charset="0"/>
+                <a:cs typeface="Segoe UI" panose="020B0502040204020203" pitchFamily="34" charset="0"/>
+              </a:rPr>
+              <a:t>feature vector</a:t>
+            </a:r>
+            <a:r>
+              <a:rPr lang="en-GB" dirty="0">
+                <a:latin typeface="Segoe UI" panose="020B0502040204020203" pitchFamily="34" charset="0"/>
+                <a:ea typeface="Segoe UI" panose="020B0502040204020203" pitchFamily="34" charset="0"/>
+                <a:cs typeface="Segoe UI" panose="020B0502040204020203" pitchFamily="34" charset="0"/>
+              </a:rPr>
+              <a:t>, at a time</a:t>
             </a:r>
           </a:p>
           <a:p>
@@ -21223,7 +21315,7 @@
         <p:spPr>
           <a:xfrm>
             <a:off x="378595" y="2894988"/>
-            <a:ext cx="3974200" cy="1069500"/>
+            <a:ext cx="3974200" cy="1591601"/>
           </a:xfrm>
           <a:prstGeom prst="rect">
             <a:avLst/>
@@ -21231,7 +21323,7 @@
         </p:spPr>
         <p:txBody>
           <a:bodyPr>
-            <a:normAutofit fontScale="85000" lnSpcReduction="10000"/>
+            <a:normAutofit fontScale="92500"/>
           </a:bodyPr>
           <a:lstStyle>
             <a:lvl1pPr marL="342783" indent="-342783" algn="l" defTabSz="914088" rtl="0" eaLnBrk="1" latinLnBrk="0" hangingPunct="1">
@@ -21382,7 +21474,7 @@
               <a:buNone/>
             </a:pPr>
             <a:r>
-              <a:rPr lang="en-GB" dirty="0">
+              <a:rPr lang="en-GB" sz="3000" dirty="0">
                 <a:latin typeface="Segoe UI" panose="020B0502040204020203" pitchFamily="34" charset="0"/>
                 <a:ea typeface="Segoe UI" panose="020B0502040204020203" pitchFamily="34" charset="0"/>
                 <a:cs typeface="Segoe UI" panose="020B0502040204020203" pitchFamily="34" charset="0"/>
@@ -21390,7 +21482,7 @@
               <a:t>For image data, we must </a:t>
             </a:r>
             <a:r>
-              <a:rPr lang="en-GB" b="1" dirty="0">
+              <a:rPr lang="en-GB" sz="3000" b="1" dirty="0">
                 <a:latin typeface="Segoe UI" panose="020B0502040204020203" pitchFamily="34" charset="0"/>
                 <a:ea typeface="Segoe UI" panose="020B0502040204020203" pitchFamily="34" charset="0"/>
                 <a:cs typeface="Segoe UI" panose="020B0502040204020203" pitchFamily="34" charset="0"/>
@@ -21398,12 +21490,12 @@
               <a:t>flatten</a:t>
             </a:r>
             <a:r>
-              <a:rPr lang="en-GB" dirty="0">
+              <a:rPr lang="en-GB" sz="3000" dirty="0">
                 <a:latin typeface="Segoe UI" panose="020B0502040204020203" pitchFamily="34" charset="0"/>
                 <a:ea typeface="Segoe UI" panose="020B0502040204020203" pitchFamily="34" charset="0"/>
                 <a:cs typeface="Segoe UI" panose="020B0502040204020203" pitchFamily="34" charset="0"/>
               </a:rPr>
-              <a:t> the image:</a:t>
+              <a:t> the image to create features:</a:t>
             </a:r>
           </a:p>
           <a:p>
@@ -26728,6 +26820,15 @@
             </a:r>
           </a:p>
           <a:p>
+            <a:r>
+              <a:rPr lang="en-GB" dirty="0">
+                <a:ea typeface="Segoe UI" panose="020B0502040204020203" pitchFamily="34" charset="0"/>
+                <a:cs typeface="Segoe UI" panose="020B0502040204020203" pitchFamily="34" charset="0"/>
+              </a:rPr>
+              <a:t>We investigate filter-based methods next week</a:t>
+            </a:r>
+          </a:p>
+          <a:p>
             <a:pPr marL="0" indent="0">
               <a:buNone/>
             </a:pPr>
@@ -27036,6 +27137,55 @@
                       </p:childTnLst>
                     </p:cTn>
                   </p:par>
+                  <p:par>
+                    <p:cTn id="23" fill="hold">
+                      <p:stCondLst>
+                        <p:cond delay="indefinite"/>
+                      </p:stCondLst>
+                      <p:childTnLst>
+                        <p:par>
+                          <p:cTn id="24" fill="hold">
+                            <p:stCondLst>
+                              <p:cond delay="0"/>
+                            </p:stCondLst>
+                            <p:childTnLst>
+                              <p:par>
+                                <p:cTn id="25" presetID="1" presetClass="entr" presetSubtype="0" fill="hold" grpId="0" nodeType="clickEffect">
+                                  <p:stCondLst>
+                                    <p:cond delay="0"/>
+                                  </p:stCondLst>
+                                  <p:childTnLst>
+                                    <p:set>
+                                      <p:cBhvr>
+                                        <p:cTn id="26" dur="1" fill="hold">
+                                          <p:stCondLst>
+                                            <p:cond delay="0"/>
+                                          </p:stCondLst>
+                                        </p:cTn>
+                                        <p:tgtEl>
+                                          <p:spTgt spid="7">
+                                            <p:txEl>
+                                              <p:pRg st="5" end="5"/>
+                                            </p:txEl>
+                                          </p:spTgt>
+                                        </p:tgtEl>
+                                        <p:attrNameLst>
+                                          <p:attrName>style.visibility</p:attrName>
+                                        </p:attrNameLst>
+                                      </p:cBhvr>
+                                      <p:to>
+                                        <p:strVal val="visible"/>
+                                      </p:to>
+                                    </p:set>
+                                  </p:childTnLst>
+                                </p:cTn>
+                              </p:par>
+                            </p:childTnLst>
+                          </p:cTn>
+                        </p:par>
+                      </p:childTnLst>
+                    </p:cTn>
+                  </p:par>
                 </p:childTnLst>
               </p:cTn>
               <p:prevCondLst>
@@ -27120,7 +27270,7 @@
                 <a:ea typeface="Segoe UI" panose="020B0502040204020203" pitchFamily="34" charset="0"/>
                 <a:cs typeface="Segoe UI" panose="020B0502040204020203" pitchFamily="34" charset="0"/>
               </a:rPr>
-              <a:t>For even factor of 2 resizing use mean interpolations </a:t>
+              <a:t>For even factors of 2 resizing use mean interpolations </a:t>
             </a:r>
           </a:p>
           <a:p>
@@ -27139,7 +27289,7 @@
                 <a:ea typeface="Segoe UI" panose="020B0502040204020203" pitchFamily="34" charset="0"/>
                 <a:cs typeface="Segoe UI" panose="020B0502040204020203" pitchFamily="34" charset="0"/>
               </a:rPr>
-              <a:t>Arbitrary resizing typically use spline interpolation</a:t>
+              <a:t>Arbitrary resizing can use spline interpolation</a:t>
             </a:r>
           </a:p>
           <a:p>
@@ -27149,7 +27299,7 @@
                 <a:ea typeface="Segoe UI" panose="020B0502040204020203" pitchFamily="34" charset="0"/>
                 <a:cs typeface="Segoe UI" panose="020B0502040204020203" pitchFamily="34" charset="0"/>
               </a:rPr>
-              <a:t>Interpolate from original image pixel centre values to the irregularly spaced resized image pixel values </a:t>
+              <a:t>Interpolate from original image pixel centre values to resized image pixel values </a:t>
             </a:r>
           </a:p>
           <a:p>
@@ -27168,7 +27318,7 @@
                 <a:ea typeface="Segoe UI" panose="020B0502040204020203" pitchFamily="34" charset="0"/>
                 <a:cs typeface="Segoe UI" panose="020B0502040204020203" pitchFamily="34" charset="0"/>
               </a:rPr>
-              <a:t>PCA/SVD algorithms</a:t>
+              <a:t>PCA/SVD and other generative models</a:t>
             </a:r>
           </a:p>
           <a:p>
@@ -28169,7 +28319,7 @@
                 <a:ea typeface="Segoe UI" panose="020B0502040204020203" pitchFamily="34" charset="0"/>
                 <a:cs typeface="Segoe UI" panose="020B0502040204020203" pitchFamily="34" charset="0"/>
               </a:rPr>
-              <a:t>Features are often poorly defined in low contrast image  </a:t>
+              <a:t>Features often poorly defined in low contrast image  </a:t>
             </a:r>
           </a:p>
           <a:p>
@@ -29125,13 +29275,8 @@
           <a:p>
             <a:r>
               <a:rPr lang="en-US" dirty="0"/>
-              <a:t>Scientific analysis – e.g. remote sensing, astrophysics, </a:t>
-            </a:r>
-            <a:r>
-              <a:rPr lang="en-US" dirty="0" err="1"/>
-              <a:t>etc</a:t>
-            </a:r>
-            <a:endParaRPr lang="en-US" dirty="0"/>
+              <a:t>Scientific analysis – e.g. remote sensing, astrophysics, etc.</a:t>
+            </a:r>
           </a:p>
           <a:p>
             <a:r>
@@ -31331,7 +31476,7 @@
             </a:pPr>
             <a:r>
               <a:rPr lang="en-US" dirty="0"/>
-              <a:t>Focus on concepts rather than the very latest applications </a:t>
+              <a:t>Focus on fundamental concepts rather than the very latest applications </a:t>
             </a:r>
           </a:p>
           <a:p>

</xml_diff>

<commit_message>
Updated, reorganized and corrected slides
</commit_message>
<xml_diff>
--- a/Slides/1_Introduction.pptx
+++ b/Slides/1_Introduction.pptx
@@ -5,7 +5,7 @@
     <p:sldMasterId id="2147483648" r:id="rId1"/>
   </p:sldMasterIdLst>
   <p:notesMasterIdLst>
-    <p:notesMasterId r:id="rId46"/>
+    <p:notesMasterId r:id="rId51"/>
   </p:notesMasterIdLst>
   <p:sldIdLst>
     <p:sldId id="257" r:id="rId2"/>
@@ -47,11 +47,16 @@
     <p:sldId id="382" r:id="rId38"/>
     <p:sldId id="399" r:id="rId39"/>
     <p:sldId id="398" r:id="rId40"/>
-    <p:sldId id="383" r:id="rId41"/>
-    <p:sldId id="386" r:id="rId42"/>
-    <p:sldId id="387" r:id="rId43"/>
-    <p:sldId id="397" r:id="rId44"/>
-    <p:sldId id="407" r:id="rId45"/>
+    <p:sldId id="444" r:id="rId41"/>
+    <p:sldId id="383" r:id="rId42"/>
+    <p:sldId id="386" r:id="rId43"/>
+    <p:sldId id="445" r:id="rId44"/>
+    <p:sldId id="387" r:id="rId45"/>
+    <p:sldId id="397" r:id="rId46"/>
+    <p:sldId id="446" r:id="rId47"/>
+    <p:sldId id="447" r:id="rId48"/>
+    <p:sldId id="448" r:id="rId49"/>
+    <p:sldId id="407" r:id="rId50"/>
   </p:sldIdLst>
   <p:sldSz cx="12192000" cy="6858000"/>
   <p:notesSz cx="6858000" cy="9144000"/>
@@ -240,7 +245,7 @@
           <a:p>
             <a:fld id="{75A03C7D-3751-4F45-A7C4-5947DC6E787B}" type="datetimeFigureOut">
               <a:rPr lang="en-US" smtClean="0"/>
-              <a:t>1/27/2022</a:t>
+              <a:t>12/26/2022</a:t>
             </a:fld>
             <a:endParaRPr lang="en-US"/>
           </a:p>
@@ -1162,7 +1167,10 @@
           </a:bodyPr>
           <a:lstStyle/>
           <a:p>
-            <a:endParaRPr lang="en-US" dirty="0"/>
+            <a:r>
+              <a:rPr lang="en-US" dirty="0"/>
+              <a:t> </a:t>
+            </a:r>
           </a:p>
         </p:txBody>
       </p:sp>
@@ -1193,7 +1201,7 @@
     </p:spTree>
     <p:extLst>
       <p:ext uri="{BB962C8B-B14F-4D97-AF65-F5344CB8AC3E}">
-        <p14:creationId xmlns:p14="http://schemas.microsoft.com/office/powerpoint/2010/main" val="1153836066"/>
+        <p14:creationId xmlns:p14="http://schemas.microsoft.com/office/powerpoint/2010/main" val="521179570"/>
       </p:ext>
     </p:extLst>
   </p:cSld>
@@ -1280,7 +1288,7 @@
     </p:spTree>
     <p:extLst>
       <p:ext uri="{BB962C8B-B14F-4D97-AF65-F5344CB8AC3E}">
-        <p14:creationId xmlns:p14="http://schemas.microsoft.com/office/powerpoint/2010/main" val="3203989860"/>
+        <p14:creationId xmlns:p14="http://schemas.microsoft.com/office/powerpoint/2010/main" val="1153836066"/>
       </p:ext>
     </p:extLst>
   </p:cSld>
@@ -1367,7 +1375,7 @@
     </p:spTree>
     <p:extLst>
       <p:ext uri="{BB962C8B-B14F-4D97-AF65-F5344CB8AC3E}">
-        <p14:creationId xmlns:p14="http://schemas.microsoft.com/office/powerpoint/2010/main" val="4271347907"/>
+        <p14:creationId xmlns:p14="http://schemas.microsoft.com/office/powerpoint/2010/main" val="3203989860"/>
       </p:ext>
     </p:extLst>
   </p:cSld>
@@ -1425,7 +1433,7 @@
           <a:p>
             <a:r>
               <a:rPr lang="en-US" dirty="0"/>
-              <a:t> </a:t>
+              <a:t>ill </a:t>
             </a:r>
           </a:p>
         </p:txBody>
@@ -1457,7 +1465,7 @@
     </p:spTree>
     <p:extLst>
       <p:ext uri="{BB962C8B-B14F-4D97-AF65-F5344CB8AC3E}">
-        <p14:creationId xmlns:p14="http://schemas.microsoft.com/office/powerpoint/2010/main" val="3723583166"/>
+        <p14:creationId xmlns:p14="http://schemas.microsoft.com/office/powerpoint/2010/main" val="2354853426"/>
       </p:ext>
     </p:extLst>
   </p:cSld>
@@ -1545,6 +1553,453 @@
     <p:extLst>
       <p:ext uri="{BB962C8B-B14F-4D97-AF65-F5344CB8AC3E}">
         <p14:creationId xmlns:p14="http://schemas.microsoft.com/office/powerpoint/2010/main" val="3719903448"/>
+      </p:ext>
+    </p:extLst>
+  </p:cSld>
+  <p:clrMapOvr>
+    <a:masterClrMapping/>
+  </p:clrMapOvr>
+</p:notes>
+</file>
+
+<file path=ppt/notesSlides/notesSlide20.xml><?xml version="1.0" encoding="utf-8"?>
+<p:notes xmlns:a="http://schemas.openxmlformats.org/drawingml/2006/main" xmlns:r="http://schemas.openxmlformats.org/officeDocument/2006/relationships" xmlns:p="http://schemas.openxmlformats.org/presentationml/2006/main">
+  <p:cSld>
+    <p:spTree>
+      <p:nvGrpSpPr>
+        <p:cNvPr id="1" name=""/>
+        <p:cNvGrpSpPr/>
+        <p:nvPr/>
+      </p:nvGrpSpPr>
+      <p:grpSpPr>
+        <a:xfrm>
+          <a:off x="0" y="0"/>
+          <a:ext cx="0" cy="0"/>
+          <a:chOff x="0" y="0"/>
+          <a:chExt cx="0" cy="0"/>
+        </a:xfrm>
+      </p:grpSpPr>
+      <p:sp>
+        <p:nvSpPr>
+          <p:cNvPr id="2" name="Slide Image Placeholder 1"/>
+          <p:cNvSpPr>
+            <a:spLocks noGrp="1" noRot="1" noChangeAspect="1"/>
+          </p:cNvSpPr>
+          <p:nvPr>
+            <p:ph type="sldImg"/>
+          </p:nvPr>
+        </p:nvSpPr>
+        <p:spPr/>
+      </p:sp>
+      <p:sp>
+        <p:nvSpPr>
+          <p:cNvPr id="3" name="Notes Placeholder 2"/>
+          <p:cNvSpPr>
+            <a:spLocks noGrp="1"/>
+          </p:cNvSpPr>
+          <p:nvPr>
+            <p:ph type="body" idx="1"/>
+          </p:nvPr>
+        </p:nvSpPr>
+        <p:spPr/>
+        <p:txBody>
+          <a:bodyPr>
+            <a:noAutofit/>
+          </a:bodyPr>
+          <a:lstStyle/>
+          <a:p>
+            <a:endParaRPr lang="en-US" dirty="0"/>
+          </a:p>
+        </p:txBody>
+      </p:sp>
+      <p:sp>
+        <p:nvSpPr>
+          <p:cNvPr id="4" name="Slide Number Placeholder 3"/>
+          <p:cNvSpPr>
+            <a:spLocks noGrp="1"/>
+          </p:cNvSpPr>
+          <p:nvPr>
+            <p:ph type="sldNum" sz="quarter" idx="10"/>
+          </p:nvPr>
+        </p:nvSpPr>
+        <p:spPr/>
+        <p:txBody>
+          <a:bodyPr/>
+          <a:lstStyle/>
+          <a:p>
+            <a:fld id="{13F0F35F-DD44-4607-AEC1-49D7A4BC4066}" type="slidenum">
+              <a:rPr lang="en-US" smtClean="0"/>
+              <a:pPr/>
+              <a:t>44</a:t>
+            </a:fld>
+            <a:endParaRPr lang="en-US" dirty="0"/>
+          </a:p>
+        </p:txBody>
+      </p:sp>
+    </p:spTree>
+    <p:extLst>
+      <p:ext uri="{BB962C8B-B14F-4D97-AF65-F5344CB8AC3E}">
+        <p14:creationId xmlns:p14="http://schemas.microsoft.com/office/powerpoint/2010/main" val="4271347907"/>
+      </p:ext>
+    </p:extLst>
+  </p:cSld>
+  <p:clrMapOvr>
+    <a:masterClrMapping/>
+  </p:clrMapOvr>
+</p:notes>
+</file>
+
+<file path=ppt/notesSlides/notesSlide21.xml><?xml version="1.0" encoding="utf-8"?>
+<p:notes xmlns:a="http://schemas.openxmlformats.org/drawingml/2006/main" xmlns:r="http://schemas.openxmlformats.org/officeDocument/2006/relationships" xmlns:p="http://schemas.openxmlformats.org/presentationml/2006/main">
+  <p:cSld>
+    <p:spTree>
+      <p:nvGrpSpPr>
+        <p:cNvPr id="1" name=""/>
+        <p:cNvGrpSpPr/>
+        <p:nvPr/>
+      </p:nvGrpSpPr>
+      <p:grpSpPr>
+        <a:xfrm>
+          <a:off x="0" y="0"/>
+          <a:ext cx="0" cy="0"/>
+          <a:chOff x="0" y="0"/>
+          <a:chExt cx="0" cy="0"/>
+        </a:xfrm>
+      </p:grpSpPr>
+      <p:sp>
+        <p:nvSpPr>
+          <p:cNvPr id="2" name="Slide Image Placeholder 1"/>
+          <p:cNvSpPr>
+            <a:spLocks noGrp="1" noRot="1" noChangeAspect="1"/>
+          </p:cNvSpPr>
+          <p:nvPr>
+            <p:ph type="sldImg"/>
+          </p:nvPr>
+        </p:nvSpPr>
+        <p:spPr/>
+      </p:sp>
+      <p:sp>
+        <p:nvSpPr>
+          <p:cNvPr id="3" name="Notes Placeholder 2"/>
+          <p:cNvSpPr>
+            <a:spLocks noGrp="1"/>
+          </p:cNvSpPr>
+          <p:nvPr>
+            <p:ph type="body" idx="1"/>
+          </p:nvPr>
+        </p:nvSpPr>
+        <p:spPr/>
+        <p:txBody>
+          <a:bodyPr>
+            <a:noAutofit/>
+          </a:bodyPr>
+          <a:lstStyle/>
+          <a:p>
+            <a:r>
+              <a:rPr lang="en-US" dirty="0"/>
+              <a:t> </a:t>
+            </a:r>
+          </a:p>
+        </p:txBody>
+      </p:sp>
+      <p:sp>
+        <p:nvSpPr>
+          <p:cNvPr id="4" name="Slide Number Placeholder 3"/>
+          <p:cNvSpPr>
+            <a:spLocks noGrp="1"/>
+          </p:cNvSpPr>
+          <p:nvPr>
+            <p:ph type="sldNum" sz="quarter" idx="10"/>
+          </p:nvPr>
+        </p:nvSpPr>
+        <p:spPr/>
+        <p:txBody>
+          <a:bodyPr/>
+          <a:lstStyle/>
+          <a:p>
+            <a:fld id="{13F0F35F-DD44-4607-AEC1-49D7A4BC4066}" type="slidenum">
+              <a:rPr lang="en-US" smtClean="0"/>
+              <a:pPr/>
+              <a:t>45</a:t>
+            </a:fld>
+            <a:endParaRPr lang="en-US" dirty="0"/>
+          </a:p>
+        </p:txBody>
+      </p:sp>
+    </p:spTree>
+    <p:extLst>
+      <p:ext uri="{BB962C8B-B14F-4D97-AF65-F5344CB8AC3E}">
+        <p14:creationId xmlns:p14="http://schemas.microsoft.com/office/powerpoint/2010/main" val="3723583166"/>
+      </p:ext>
+    </p:extLst>
+  </p:cSld>
+  <p:clrMapOvr>
+    <a:masterClrMapping/>
+  </p:clrMapOvr>
+</p:notes>
+</file>
+
+<file path=ppt/notesSlides/notesSlide22.xml><?xml version="1.0" encoding="utf-8"?>
+<p:notes xmlns:a="http://schemas.openxmlformats.org/drawingml/2006/main" xmlns:r="http://schemas.openxmlformats.org/officeDocument/2006/relationships" xmlns:p="http://schemas.openxmlformats.org/presentationml/2006/main">
+  <p:cSld>
+    <p:spTree>
+      <p:nvGrpSpPr>
+        <p:cNvPr id="1" name=""/>
+        <p:cNvGrpSpPr/>
+        <p:nvPr/>
+      </p:nvGrpSpPr>
+      <p:grpSpPr>
+        <a:xfrm>
+          <a:off x="0" y="0"/>
+          <a:ext cx="0" cy="0"/>
+          <a:chOff x="0" y="0"/>
+          <a:chExt cx="0" cy="0"/>
+        </a:xfrm>
+      </p:grpSpPr>
+      <p:sp>
+        <p:nvSpPr>
+          <p:cNvPr id="2" name="Slide Image Placeholder 1"/>
+          <p:cNvSpPr>
+            <a:spLocks noGrp="1" noRot="1" noChangeAspect="1"/>
+          </p:cNvSpPr>
+          <p:nvPr>
+            <p:ph type="sldImg"/>
+          </p:nvPr>
+        </p:nvSpPr>
+        <p:spPr/>
+      </p:sp>
+      <p:sp>
+        <p:nvSpPr>
+          <p:cNvPr id="3" name="Notes Placeholder 2"/>
+          <p:cNvSpPr>
+            <a:spLocks noGrp="1"/>
+          </p:cNvSpPr>
+          <p:nvPr>
+            <p:ph type="body" idx="1"/>
+          </p:nvPr>
+        </p:nvSpPr>
+        <p:spPr/>
+        <p:txBody>
+          <a:bodyPr>
+            <a:noAutofit/>
+          </a:bodyPr>
+          <a:lstStyle/>
+          <a:p>
+            <a:r>
+              <a:rPr lang="en-US" dirty="0"/>
+              <a:t>ill </a:t>
+            </a:r>
+          </a:p>
+        </p:txBody>
+      </p:sp>
+      <p:sp>
+        <p:nvSpPr>
+          <p:cNvPr id="4" name="Slide Number Placeholder 3"/>
+          <p:cNvSpPr>
+            <a:spLocks noGrp="1"/>
+          </p:cNvSpPr>
+          <p:nvPr>
+            <p:ph type="sldNum" sz="quarter" idx="10"/>
+          </p:nvPr>
+        </p:nvSpPr>
+        <p:spPr/>
+        <p:txBody>
+          <a:bodyPr/>
+          <a:lstStyle/>
+          <a:p>
+            <a:fld id="{13F0F35F-DD44-4607-AEC1-49D7A4BC4066}" type="slidenum">
+              <a:rPr lang="en-US" smtClean="0"/>
+              <a:pPr/>
+              <a:t>46</a:t>
+            </a:fld>
+            <a:endParaRPr lang="en-US" dirty="0"/>
+          </a:p>
+        </p:txBody>
+      </p:sp>
+    </p:spTree>
+    <p:extLst>
+      <p:ext uri="{BB962C8B-B14F-4D97-AF65-F5344CB8AC3E}">
+        <p14:creationId xmlns:p14="http://schemas.microsoft.com/office/powerpoint/2010/main" val="1907478101"/>
+      </p:ext>
+    </p:extLst>
+  </p:cSld>
+  <p:clrMapOvr>
+    <a:masterClrMapping/>
+  </p:clrMapOvr>
+</p:notes>
+</file>
+
+<file path=ppt/notesSlides/notesSlide23.xml><?xml version="1.0" encoding="utf-8"?>
+<p:notes xmlns:a="http://schemas.openxmlformats.org/drawingml/2006/main" xmlns:r="http://schemas.openxmlformats.org/officeDocument/2006/relationships" xmlns:p="http://schemas.openxmlformats.org/presentationml/2006/main">
+  <p:cSld>
+    <p:spTree>
+      <p:nvGrpSpPr>
+        <p:cNvPr id="1" name=""/>
+        <p:cNvGrpSpPr/>
+        <p:nvPr/>
+      </p:nvGrpSpPr>
+      <p:grpSpPr>
+        <a:xfrm>
+          <a:off x="0" y="0"/>
+          <a:ext cx="0" cy="0"/>
+          <a:chOff x="0" y="0"/>
+          <a:chExt cx="0" cy="0"/>
+        </a:xfrm>
+      </p:grpSpPr>
+      <p:sp>
+        <p:nvSpPr>
+          <p:cNvPr id="2" name="Slide Image Placeholder 1"/>
+          <p:cNvSpPr>
+            <a:spLocks noGrp="1" noRot="1" noChangeAspect="1"/>
+          </p:cNvSpPr>
+          <p:nvPr>
+            <p:ph type="sldImg"/>
+          </p:nvPr>
+        </p:nvSpPr>
+        <p:spPr/>
+      </p:sp>
+      <p:sp>
+        <p:nvSpPr>
+          <p:cNvPr id="3" name="Notes Placeholder 2"/>
+          <p:cNvSpPr>
+            <a:spLocks noGrp="1"/>
+          </p:cNvSpPr>
+          <p:nvPr>
+            <p:ph type="body" idx="1"/>
+          </p:nvPr>
+        </p:nvSpPr>
+        <p:spPr/>
+        <p:txBody>
+          <a:bodyPr>
+            <a:noAutofit/>
+          </a:bodyPr>
+          <a:lstStyle/>
+          <a:p>
+            <a:r>
+              <a:rPr lang="en-US" dirty="0"/>
+              <a:t>ill </a:t>
+            </a:r>
+          </a:p>
+        </p:txBody>
+      </p:sp>
+      <p:sp>
+        <p:nvSpPr>
+          <p:cNvPr id="4" name="Slide Number Placeholder 3"/>
+          <p:cNvSpPr>
+            <a:spLocks noGrp="1"/>
+          </p:cNvSpPr>
+          <p:nvPr>
+            <p:ph type="sldNum" sz="quarter" idx="10"/>
+          </p:nvPr>
+        </p:nvSpPr>
+        <p:spPr/>
+        <p:txBody>
+          <a:bodyPr/>
+          <a:lstStyle/>
+          <a:p>
+            <a:fld id="{13F0F35F-DD44-4607-AEC1-49D7A4BC4066}" type="slidenum">
+              <a:rPr lang="en-US" smtClean="0"/>
+              <a:pPr/>
+              <a:t>47</a:t>
+            </a:fld>
+            <a:endParaRPr lang="en-US" dirty="0"/>
+          </a:p>
+        </p:txBody>
+      </p:sp>
+    </p:spTree>
+    <p:extLst>
+      <p:ext uri="{BB962C8B-B14F-4D97-AF65-F5344CB8AC3E}">
+        <p14:creationId xmlns:p14="http://schemas.microsoft.com/office/powerpoint/2010/main" val="2107642263"/>
+      </p:ext>
+    </p:extLst>
+  </p:cSld>
+  <p:clrMapOvr>
+    <a:masterClrMapping/>
+  </p:clrMapOvr>
+</p:notes>
+</file>
+
+<file path=ppt/notesSlides/notesSlide24.xml><?xml version="1.0" encoding="utf-8"?>
+<p:notes xmlns:a="http://schemas.openxmlformats.org/drawingml/2006/main" xmlns:r="http://schemas.openxmlformats.org/officeDocument/2006/relationships" xmlns:p="http://schemas.openxmlformats.org/presentationml/2006/main">
+  <p:cSld>
+    <p:spTree>
+      <p:nvGrpSpPr>
+        <p:cNvPr id="1" name=""/>
+        <p:cNvGrpSpPr/>
+        <p:nvPr/>
+      </p:nvGrpSpPr>
+      <p:grpSpPr>
+        <a:xfrm>
+          <a:off x="0" y="0"/>
+          <a:ext cx="0" cy="0"/>
+          <a:chOff x="0" y="0"/>
+          <a:chExt cx="0" cy="0"/>
+        </a:xfrm>
+      </p:grpSpPr>
+      <p:sp>
+        <p:nvSpPr>
+          <p:cNvPr id="2" name="Slide Image Placeholder 1"/>
+          <p:cNvSpPr>
+            <a:spLocks noGrp="1" noRot="1" noChangeAspect="1"/>
+          </p:cNvSpPr>
+          <p:nvPr>
+            <p:ph type="sldImg"/>
+          </p:nvPr>
+        </p:nvSpPr>
+        <p:spPr/>
+      </p:sp>
+      <p:sp>
+        <p:nvSpPr>
+          <p:cNvPr id="3" name="Notes Placeholder 2"/>
+          <p:cNvSpPr>
+            <a:spLocks noGrp="1"/>
+          </p:cNvSpPr>
+          <p:nvPr>
+            <p:ph type="body" idx="1"/>
+          </p:nvPr>
+        </p:nvSpPr>
+        <p:spPr/>
+        <p:txBody>
+          <a:bodyPr>
+            <a:noAutofit/>
+          </a:bodyPr>
+          <a:lstStyle/>
+          <a:p>
+            <a:r>
+              <a:rPr lang="en-US" dirty="0"/>
+              <a:t>ill </a:t>
+            </a:r>
+          </a:p>
+        </p:txBody>
+      </p:sp>
+      <p:sp>
+        <p:nvSpPr>
+          <p:cNvPr id="4" name="Slide Number Placeholder 3"/>
+          <p:cNvSpPr>
+            <a:spLocks noGrp="1"/>
+          </p:cNvSpPr>
+          <p:nvPr>
+            <p:ph type="sldNum" sz="quarter" idx="10"/>
+          </p:nvPr>
+        </p:nvSpPr>
+        <p:spPr/>
+        <p:txBody>
+          <a:bodyPr/>
+          <a:lstStyle/>
+          <a:p>
+            <a:fld id="{13F0F35F-DD44-4607-AEC1-49D7A4BC4066}" type="slidenum">
+              <a:rPr lang="en-US" smtClean="0"/>
+              <a:pPr/>
+              <a:t>48</a:t>
+            </a:fld>
+            <a:endParaRPr lang="en-US" dirty="0"/>
+          </a:p>
+        </p:txBody>
+      </p:sp>
+    </p:spTree>
+    <p:extLst>
+      <p:ext uri="{BB962C8B-B14F-4D97-AF65-F5344CB8AC3E}">
+        <p14:creationId xmlns:p14="http://schemas.microsoft.com/office/powerpoint/2010/main" val="4221200354"/>
       </p:ext>
     </p:extLst>
   </p:cSld>
@@ -2310,7 +2765,7 @@
           <a:p>
             <a:fld id="{61FA4C16-8A72-4D45-80AF-E8D5756146B3}" type="datetimeFigureOut">
               <a:rPr lang="en-US" smtClean="0"/>
-              <a:t>1/27/2022</a:t>
+              <a:t>12/26/2022</a:t>
             </a:fld>
             <a:endParaRPr lang="en-US"/>
           </a:p>
@@ -2508,7 +2963,7 @@
           <a:p>
             <a:fld id="{61FA4C16-8A72-4D45-80AF-E8D5756146B3}" type="datetimeFigureOut">
               <a:rPr lang="en-US" smtClean="0"/>
-              <a:t>1/27/2022</a:t>
+              <a:t>12/26/2022</a:t>
             </a:fld>
             <a:endParaRPr lang="en-US"/>
           </a:p>
@@ -2716,7 +3171,7 @@
           <a:p>
             <a:fld id="{61FA4C16-8A72-4D45-80AF-E8D5756146B3}" type="datetimeFigureOut">
               <a:rPr lang="en-US" smtClean="0"/>
-              <a:t>1/27/2022</a:t>
+              <a:t>12/26/2022</a:t>
             </a:fld>
             <a:endParaRPr lang="en-US"/>
           </a:p>
@@ -3692,7 +4147,7 @@
           <a:p>
             <a:fld id="{61FA4C16-8A72-4D45-80AF-E8D5756146B3}" type="datetimeFigureOut">
               <a:rPr lang="en-US" smtClean="0"/>
-              <a:t>1/27/2022</a:t>
+              <a:t>12/26/2022</a:t>
             </a:fld>
             <a:endParaRPr lang="en-US"/>
           </a:p>
@@ -3967,7 +4422,7 @@
           <a:p>
             <a:fld id="{61FA4C16-8A72-4D45-80AF-E8D5756146B3}" type="datetimeFigureOut">
               <a:rPr lang="en-US" smtClean="0"/>
-              <a:t>1/27/2022</a:t>
+              <a:t>12/26/2022</a:t>
             </a:fld>
             <a:endParaRPr lang="en-US"/>
           </a:p>
@@ -4232,7 +4687,7 @@
           <a:p>
             <a:fld id="{61FA4C16-8A72-4D45-80AF-E8D5756146B3}" type="datetimeFigureOut">
               <a:rPr lang="en-US" smtClean="0"/>
-              <a:t>1/27/2022</a:t>
+              <a:t>12/26/2022</a:t>
             </a:fld>
             <a:endParaRPr lang="en-US"/>
           </a:p>
@@ -4644,7 +5099,7 @@
           <a:p>
             <a:fld id="{61FA4C16-8A72-4D45-80AF-E8D5756146B3}" type="datetimeFigureOut">
               <a:rPr lang="en-US" smtClean="0"/>
-              <a:t>1/27/2022</a:t>
+              <a:t>12/26/2022</a:t>
             </a:fld>
             <a:endParaRPr lang="en-US"/>
           </a:p>
@@ -4785,7 +5240,7 @@
           <a:p>
             <a:fld id="{61FA4C16-8A72-4D45-80AF-E8D5756146B3}" type="datetimeFigureOut">
               <a:rPr lang="en-US" smtClean="0"/>
-              <a:t>1/27/2022</a:t>
+              <a:t>12/26/2022</a:t>
             </a:fld>
             <a:endParaRPr lang="en-US"/>
           </a:p>
@@ -4898,7 +5353,7 @@
           <a:p>
             <a:fld id="{61FA4C16-8A72-4D45-80AF-E8D5756146B3}" type="datetimeFigureOut">
               <a:rPr lang="en-US" smtClean="0"/>
-              <a:t>1/27/2022</a:t>
+              <a:t>12/26/2022</a:t>
             </a:fld>
             <a:endParaRPr lang="en-US"/>
           </a:p>
@@ -5209,7 +5664,7 @@
           <a:p>
             <a:fld id="{61FA4C16-8A72-4D45-80AF-E8D5756146B3}" type="datetimeFigureOut">
               <a:rPr lang="en-US" smtClean="0"/>
-              <a:t>1/27/2022</a:t>
+              <a:t>12/26/2022</a:t>
             </a:fld>
             <a:endParaRPr lang="en-US"/>
           </a:p>
@@ -5497,7 +5952,7 @@
           <a:p>
             <a:fld id="{61FA4C16-8A72-4D45-80AF-E8D5756146B3}" type="datetimeFigureOut">
               <a:rPr lang="en-US" smtClean="0"/>
-              <a:t>1/27/2022</a:t>
+              <a:t>12/26/2022</a:t>
             </a:fld>
             <a:endParaRPr lang="en-US"/>
           </a:p>
@@ -5738,7 +6193,7 @@
           <a:p>
             <a:fld id="{61FA4C16-8A72-4D45-80AF-E8D5756146B3}" type="datetimeFigureOut">
               <a:rPr lang="en-US" smtClean="0"/>
-              <a:t>1/27/2022</a:t>
+              <a:t>12/26/2022</a:t>
             </a:fld>
             <a:endParaRPr lang="en-US"/>
           </a:p>
@@ -22424,7 +22879,7 @@
         </p:blipFill>
         <p:spPr>
           <a:xfrm>
-            <a:off x="7294054" y="966555"/>
+            <a:off x="7250044" y="1013050"/>
             <a:ext cx="4566123" cy="4924890"/>
           </a:xfrm>
           <a:prstGeom prst="rect">
@@ -23066,7 +23521,7 @@
         </p:blipFill>
         <p:spPr bwMode="auto">
           <a:xfrm>
-            <a:off x="673998" y="3533362"/>
+            <a:off x="570676" y="3533362"/>
             <a:ext cx="7991475" cy="3209925"/>
           </a:xfrm>
           <a:prstGeom prst="rect">
@@ -31946,6 +32401,615 @@
           <a:chExt cx="0" cy="0"/>
         </a:xfrm>
       </p:grpSpPr>
+      <mc:AlternateContent xmlns:mc="http://schemas.openxmlformats.org/markup-compatibility/2006">
+        <mc:Choice xmlns:a14="http://schemas.microsoft.com/office/drawing/2010/main" Requires="a14">
+          <p:sp>
+            <p:nvSpPr>
+              <p:cNvPr id="7" name="Content Placeholder 6"/>
+              <p:cNvSpPr>
+                <a:spLocks noGrp="1"/>
+              </p:cNvSpPr>
+              <p:nvPr>
+                <p:ph sz="quarter" idx="10"/>
+              </p:nvPr>
+            </p:nvSpPr>
+            <p:spPr>
+              <a:xfrm>
+                <a:off x="378594" y="1399631"/>
+                <a:ext cx="11525250" cy="4972369"/>
+              </a:xfrm>
+            </p:spPr>
+            <p:txBody>
+              <a:bodyPr>
+                <a:normAutofit/>
+              </a:bodyPr>
+              <a:lstStyle/>
+              <a:p>
+                <a:pPr marL="0" indent="0">
+                  <a:buNone/>
+                </a:pPr>
+                <a:r>
+                  <a:rPr lang="en-GB" dirty="0">
+                    <a:ea typeface="Segoe UI" panose="020B0502040204020203" pitchFamily="34" charset="0"/>
+                    <a:cs typeface="Segoe UI" panose="020B0502040204020203" pitchFamily="34" charset="0"/>
+                  </a:rPr>
+                  <a:t>Contrast can determine what is visible in an image   </a:t>
+                </a:r>
+              </a:p>
+              <a:p>
+                <a:r>
+                  <a:rPr lang="en-US" dirty="0">
+                    <a:ea typeface="Segoe UI" panose="020B0502040204020203" pitchFamily="34" charset="0"/>
+                    <a:cs typeface="Segoe UI" panose="020B0502040204020203" pitchFamily="34" charset="0"/>
+                  </a:rPr>
+                  <a:t>Contrast in an image with pixel values </a:t>
+                </a:r>
+                <a14:m>
+                  <m:oMath xmlns:m="http://schemas.openxmlformats.org/officeDocument/2006/math">
+                    <m:sSub>
+                      <m:sSubPr>
+                        <m:ctrlPr>
+                          <a:rPr lang="en-US" i="1" smtClean="0">
+                            <a:latin typeface="Cambria Math" panose="02040503050406030204" pitchFamily="18" charset="0"/>
+                            <a:cs typeface="Segoe UI" panose="020B0502040204020203" pitchFamily="34" charset="0"/>
+                          </a:rPr>
+                        </m:ctrlPr>
+                      </m:sSubPr>
+                      <m:e>
+                        <m:r>
+                          <a:rPr lang="en-US" b="0" i="1" smtClean="0">
+                            <a:latin typeface="Cambria Math" panose="02040503050406030204" pitchFamily="18" charset="0"/>
+                            <a:cs typeface="Segoe UI" panose="020B0502040204020203" pitchFamily="34" charset="0"/>
+                          </a:rPr>
+                          <m:t>𝑥</m:t>
+                        </m:r>
+                      </m:e>
+                      <m:sub>
+                        <m:r>
+                          <a:rPr lang="en-US" b="0" i="1" smtClean="0">
+                            <a:latin typeface="Cambria Math" panose="02040503050406030204" pitchFamily="18" charset="0"/>
+                            <a:cs typeface="Segoe UI" panose="020B0502040204020203" pitchFamily="34" charset="0"/>
+                          </a:rPr>
+                          <m:t>𝑖</m:t>
+                        </m:r>
+                      </m:sub>
+                    </m:sSub>
+                  </m:oMath>
+                </a14:m>
+                <a:r>
+                  <a:rPr lang="en-US" dirty="0">
+                    <a:ea typeface="Segoe UI" panose="020B0502040204020203" pitchFamily="34" charset="0"/>
+                    <a:cs typeface="Segoe UI" panose="020B0502040204020203" pitchFamily="34" charset="0"/>
+                  </a:rPr>
+                  <a:t>:    </a:t>
+                </a:r>
+              </a:p>
+              <a:p>
+                <a:pPr marL="0" indent="0">
+                  <a:buNone/>
+                </a:pPr>
+                <a14:m>
+                  <m:oMathPara xmlns:m="http://schemas.openxmlformats.org/officeDocument/2006/math">
+                    <m:oMathParaPr>
+                      <m:jc m:val="centerGroup"/>
+                    </m:oMathParaPr>
+                    <m:oMath xmlns:m="http://schemas.openxmlformats.org/officeDocument/2006/math">
+                      <m:r>
+                        <a:rPr lang="en-US" b="0" i="1" smtClean="0">
+                          <a:latin typeface="Cambria Math" panose="02040503050406030204" pitchFamily="18" charset="0"/>
+                          <a:ea typeface="Segoe UI" panose="020B0502040204020203" pitchFamily="34" charset="0"/>
+                          <a:cs typeface="Segoe UI" panose="020B0502040204020203" pitchFamily="34" charset="0"/>
+                        </a:rPr>
+                        <m:t>𝐶𝑁</m:t>
+                      </m:r>
+                      <m:r>
+                        <a:rPr lang="en-US" b="0" i="1" smtClean="0">
+                          <a:latin typeface="Cambria Math" panose="02040503050406030204" pitchFamily="18" charset="0"/>
+                          <a:ea typeface="Segoe UI" panose="020B0502040204020203" pitchFamily="34" charset="0"/>
+                          <a:cs typeface="Segoe UI" panose="020B0502040204020203" pitchFamily="34" charset="0"/>
+                        </a:rPr>
+                        <m:t>=</m:t>
+                      </m:r>
+                      <m:func>
+                        <m:funcPr>
+                          <m:ctrlPr>
+                            <a:rPr lang="en-US" b="0" i="1" smtClean="0">
+                              <a:latin typeface="Cambria Math" panose="02040503050406030204" pitchFamily="18" charset="0"/>
+                              <a:ea typeface="Segoe UI" panose="020B0502040204020203" pitchFamily="34" charset="0"/>
+                              <a:cs typeface="Segoe UI" panose="020B0502040204020203" pitchFamily="34" charset="0"/>
+                            </a:rPr>
+                          </m:ctrlPr>
+                        </m:funcPr>
+                        <m:fName>
+                          <m:limLow>
+                            <m:limLowPr>
+                              <m:ctrlPr>
+                                <a:rPr lang="en-US" b="0" i="1" smtClean="0">
+                                  <a:latin typeface="Cambria Math" panose="02040503050406030204" pitchFamily="18" charset="0"/>
+                                  <a:ea typeface="Segoe UI" panose="020B0502040204020203" pitchFamily="34" charset="0"/>
+                                  <a:cs typeface="Segoe UI" panose="020B0502040204020203" pitchFamily="34" charset="0"/>
+                                </a:rPr>
+                              </m:ctrlPr>
+                            </m:limLowPr>
+                            <m:e>
+                              <m:r>
+                                <m:rPr>
+                                  <m:sty m:val="p"/>
+                                </m:rPr>
+                                <a:rPr lang="en-US" b="0" i="0" smtClean="0">
+                                  <a:latin typeface="Cambria Math" panose="02040503050406030204" pitchFamily="18" charset="0"/>
+                                  <a:ea typeface="Segoe UI" panose="020B0502040204020203" pitchFamily="34" charset="0"/>
+                                  <a:cs typeface="Segoe UI" panose="020B0502040204020203" pitchFamily="34" charset="0"/>
+                                </a:rPr>
+                                <m:t>max</m:t>
+                              </m:r>
+                            </m:e>
+                            <m:lim>
+                              <m:r>
+                                <a:rPr lang="en-US" b="0" i="1" smtClean="0">
+                                  <a:latin typeface="Cambria Math" panose="02040503050406030204" pitchFamily="18" charset="0"/>
+                                  <a:ea typeface="Segoe UI" panose="020B0502040204020203" pitchFamily="34" charset="0"/>
+                                  <a:cs typeface="Segoe UI" panose="020B0502040204020203" pitchFamily="34" charset="0"/>
+                                </a:rPr>
+                                <m:t>𝑖</m:t>
+                              </m:r>
+                            </m:lim>
+                          </m:limLow>
+                        </m:fName>
+                        <m:e>
+                          <m:sSub>
+                            <m:sSubPr>
+                              <m:ctrlPr>
+                                <a:rPr lang="en-US" b="0" i="1" smtClean="0">
+                                  <a:latin typeface="Cambria Math" panose="02040503050406030204" pitchFamily="18" charset="0"/>
+                                  <a:cs typeface="Segoe UI" panose="020B0502040204020203" pitchFamily="34" charset="0"/>
+                                </a:rPr>
+                              </m:ctrlPr>
+                            </m:sSubPr>
+                            <m:e>
+                              <m:r>
+                                <a:rPr lang="en-US" b="0" i="1" smtClean="0">
+                                  <a:latin typeface="Cambria Math" panose="02040503050406030204" pitchFamily="18" charset="0"/>
+                                  <a:cs typeface="Segoe UI" panose="020B0502040204020203" pitchFamily="34" charset="0"/>
+                                </a:rPr>
+                                <m:t>𝑥</m:t>
+                              </m:r>
+                            </m:e>
+                            <m:sub>
+                              <m:r>
+                                <a:rPr lang="en-US" b="0" i="1" smtClean="0">
+                                  <a:latin typeface="Cambria Math" panose="02040503050406030204" pitchFamily="18" charset="0"/>
+                                  <a:cs typeface="Segoe UI" panose="020B0502040204020203" pitchFamily="34" charset="0"/>
+                                </a:rPr>
+                                <m:t>𝑖</m:t>
+                              </m:r>
+                            </m:sub>
+                          </m:sSub>
+                          <m:r>
+                            <a:rPr lang="en-US" b="0" i="1" smtClean="0">
+                              <a:latin typeface="Cambria Math" panose="02040503050406030204" pitchFamily="18" charset="0"/>
+                              <a:cs typeface="Segoe UI" panose="020B0502040204020203" pitchFamily="34" charset="0"/>
+                            </a:rPr>
+                            <m:t>−</m:t>
+                          </m:r>
+                          <m:func>
+                            <m:funcPr>
+                              <m:ctrlPr>
+                                <a:rPr lang="en-US" b="0" i="1" smtClean="0">
+                                  <a:latin typeface="Cambria Math" panose="02040503050406030204" pitchFamily="18" charset="0"/>
+                                  <a:cs typeface="Segoe UI" panose="020B0502040204020203" pitchFamily="34" charset="0"/>
+                                </a:rPr>
+                              </m:ctrlPr>
+                            </m:funcPr>
+                            <m:fName>
+                              <m:limLow>
+                                <m:limLowPr>
+                                  <m:ctrlPr>
+                                    <a:rPr lang="en-US" b="0" i="1" smtClean="0">
+                                      <a:latin typeface="Cambria Math" panose="02040503050406030204" pitchFamily="18" charset="0"/>
+                                      <a:cs typeface="Segoe UI" panose="020B0502040204020203" pitchFamily="34" charset="0"/>
+                                    </a:rPr>
+                                  </m:ctrlPr>
+                                </m:limLowPr>
+                                <m:e>
+                                  <m:r>
+                                    <m:rPr>
+                                      <m:sty m:val="p"/>
+                                    </m:rPr>
+                                    <a:rPr lang="en-US" b="0" i="0" smtClean="0">
+                                      <a:latin typeface="Cambria Math" panose="02040503050406030204" pitchFamily="18" charset="0"/>
+                                      <a:cs typeface="Segoe UI" panose="020B0502040204020203" pitchFamily="34" charset="0"/>
+                                    </a:rPr>
+                                    <m:t>min</m:t>
+                                  </m:r>
+                                </m:e>
+                                <m:lim>
+                                  <m:r>
+                                    <a:rPr lang="en-US" b="0" i="1" smtClean="0">
+                                      <a:latin typeface="Cambria Math" panose="02040503050406030204" pitchFamily="18" charset="0"/>
+                                      <a:cs typeface="Segoe UI" panose="020B0502040204020203" pitchFamily="34" charset="0"/>
+                                    </a:rPr>
+                                    <m:t>𝑖</m:t>
+                                  </m:r>
+                                </m:lim>
+                              </m:limLow>
+                            </m:fName>
+                            <m:e>
+                              <m:sSub>
+                                <m:sSubPr>
+                                  <m:ctrlPr>
+                                    <a:rPr lang="en-US" b="0" i="1" smtClean="0">
+                                      <a:latin typeface="Cambria Math" panose="02040503050406030204" pitchFamily="18" charset="0"/>
+                                      <a:cs typeface="Segoe UI" panose="020B0502040204020203" pitchFamily="34" charset="0"/>
+                                    </a:rPr>
+                                  </m:ctrlPr>
+                                </m:sSubPr>
+                                <m:e>
+                                  <m:r>
+                                    <a:rPr lang="en-US" b="0" i="1" smtClean="0">
+                                      <a:latin typeface="Cambria Math" panose="02040503050406030204" pitchFamily="18" charset="0"/>
+                                      <a:cs typeface="Segoe UI" panose="020B0502040204020203" pitchFamily="34" charset="0"/>
+                                    </a:rPr>
+                                    <m:t>𝑥</m:t>
+                                  </m:r>
+                                </m:e>
+                                <m:sub>
+                                  <m:r>
+                                    <a:rPr lang="en-US" b="0" i="1" smtClean="0">
+                                      <a:latin typeface="Cambria Math" panose="02040503050406030204" pitchFamily="18" charset="0"/>
+                                      <a:cs typeface="Segoe UI" panose="020B0502040204020203" pitchFamily="34" charset="0"/>
+                                    </a:rPr>
+                                    <m:t>𝑖</m:t>
+                                  </m:r>
+                                </m:sub>
+                              </m:sSub>
+                            </m:e>
+                          </m:func>
+                        </m:e>
+                      </m:func>
+                    </m:oMath>
+                  </m:oMathPara>
+                </a14:m>
+                <a:endParaRPr lang="en-US" dirty="0">
+                  <a:ea typeface="Segoe UI" panose="020B0502040204020203" pitchFamily="34" charset="0"/>
+                  <a:cs typeface="Segoe UI" panose="020B0502040204020203" pitchFamily="34" charset="0"/>
+                </a:endParaRPr>
+              </a:p>
+              <a:p>
+                <a:r>
+                  <a:rPr lang="en-US" dirty="0">
+                    <a:ea typeface="Segoe UI" panose="020B0502040204020203" pitchFamily="34" charset="0"/>
+                    <a:cs typeface="Segoe UI" panose="020B0502040204020203" pitchFamily="34" charset="0"/>
+                  </a:rPr>
+                  <a:t>Example: consider a low contrast image with </a:t>
+                </a:r>
+                <a14:m>
+                  <m:oMath xmlns:m="http://schemas.openxmlformats.org/officeDocument/2006/math">
+                    <m:r>
+                      <a:rPr lang="en-US" b="0" i="1" smtClean="0">
+                        <a:latin typeface="Cambria Math" panose="02040503050406030204" pitchFamily="18" charset="0"/>
+                        <a:ea typeface="Segoe UI" panose="020B0502040204020203" pitchFamily="34" charset="0"/>
+                        <a:cs typeface="Segoe UI" panose="020B0502040204020203" pitchFamily="34" charset="0"/>
+                      </a:rPr>
+                      <m:t>𝐶𝑁</m:t>
+                    </m:r>
+                    <m:r>
+                      <a:rPr lang="en-US" b="0" i="1" smtClean="0">
+                        <a:latin typeface="Cambria Math" panose="02040503050406030204" pitchFamily="18" charset="0"/>
+                        <a:ea typeface="Segoe UI" panose="020B0502040204020203" pitchFamily="34" charset="0"/>
+                        <a:cs typeface="Segoe UI" panose="020B0502040204020203" pitchFamily="34" charset="0"/>
+                      </a:rPr>
+                      <m:t>=2</m:t>
+                    </m:r>
+                  </m:oMath>
+                </a14:m>
+                <a:r>
+                  <a:rPr lang="en-US" dirty="0">
+                    <a:ea typeface="Segoe UI" panose="020B0502040204020203" pitchFamily="34" charset="0"/>
+                    <a:cs typeface="Segoe UI" panose="020B0502040204020203" pitchFamily="34" charset="0"/>
+                  </a:rPr>
+                  <a:t> on range </a:t>
+                </a:r>
+                <a14:m>
+                  <m:oMath xmlns:m="http://schemas.openxmlformats.org/officeDocument/2006/math">
+                    <m:r>
+                      <a:rPr lang="en-US" b="0" i="1" smtClean="0">
+                        <a:latin typeface="Cambria Math" panose="02040503050406030204" pitchFamily="18" charset="0"/>
+                        <a:ea typeface="Segoe UI" panose="020B0502040204020203" pitchFamily="34" charset="0"/>
+                        <a:cs typeface="Segoe UI" panose="020B0502040204020203" pitchFamily="34" charset="0"/>
+                      </a:rPr>
+                      <m:t>0−255</m:t>
+                    </m:r>
+                  </m:oMath>
+                </a14:m>
+                <a:endParaRPr lang="en-US" dirty="0">
+                  <a:ea typeface="Segoe UI" panose="020B0502040204020203" pitchFamily="34" charset="0"/>
+                  <a:cs typeface="Segoe UI" panose="020B0502040204020203" pitchFamily="34" charset="0"/>
+                </a:endParaRPr>
+              </a:p>
+              <a:p>
+                <a:pPr lvl="1"/>
+                <a:r>
+                  <a:rPr lang="en-US" dirty="0">
+                    <a:ea typeface="Segoe UI" panose="020B0502040204020203" pitchFamily="34" charset="0"/>
+                    <a:cs typeface="Segoe UI" panose="020B0502040204020203" pitchFamily="34" charset="0"/>
+                  </a:rPr>
+                  <a:t>Maximum relative change in value at edge is </a:t>
+                </a:r>
+                <a14:m>
+                  <m:oMath xmlns:m="http://schemas.openxmlformats.org/officeDocument/2006/math">
+                    <m:f>
+                      <m:fPr>
+                        <m:ctrlPr>
+                          <a:rPr lang="en-US" i="1" smtClean="0">
+                            <a:latin typeface="Cambria Math" panose="02040503050406030204" pitchFamily="18" charset="0"/>
+                            <a:cs typeface="Segoe UI" panose="020B0502040204020203" pitchFamily="34" charset="0"/>
+                          </a:rPr>
+                        </m:ctrlPr>
+                      </m:fPr>
+                      <m:num>
+                        <m:r>
+                          <a:rPr lang="en-US" b="0" i="1" smtClean="0">
+                            <a:latin typeface="Cambria Math" panose="02040503050406030204" pitchFamily="18" charset="0"/>
+                            <a:cs typeface="Segoe UI" panose="020B0502040204020203" pitchFamily="34" charset="0"/>
+                          </a:rPr>
+                          <m:t>2</m:t>
+                        </m:r>
+                      </m:num>
+                      <m:den>
+                        <m:r>
+                          <a:rPr lang="en-US" b="0" i="1" smtClean="0">
+                            <a:latin typeface="Cambria Math" panose="02040503050406030204" pitchFamily="18" charset="0"/>
+                            <a:cs typeface="Segoe UI" panose="020B0502040204020203" pitchFamily="34" charset="0"/>
+                          </a:rPr>
+                          <m:t>255</m:t>
+                        </m:r>
+                      </m:den>
+                    </m:f>
+                  </m:oMath>
+                </a14:m>
+                <a:endParaRPr lang="en-US" dirty="0">
+                  <a:ea typeface="Segoe UI" panose="020B0502040204020203" pitchFamily="34" charset="0"/>
+                  <a:cs typeface="Segoe UI" panose="020B0502040204020203" pitchFamily="34" charset="0"/>
+                </a:endParaRPr>
+              </a:p>
+              <a:p>
+                <a:pPr lvl="1"/>
+                <a:r>
+                  <a:rPr lang="en-US" dirty="0">
+                    <a:ea typeface="Segoe UI" panose="020B0502040204020203" pitchFamily="34" charset="0"/>
+                    <a:cs typeface="Segoe UI" panose="020B0502040204020203" pitchFamily="34" charset="0"/>
+                  </a:rPr>
+                  <a:t>Hard to detect edges, line, objects, etc.    </a:t>
+                </a:r>
+              </a:p>
+              <a:p>
+                <a:r>
+                  <a:rPr lang="en-US" dirty="0">
+                    <a:ea typeface="Segoe UI" panose="020B0502040204020203" pitchFamily="34" charset="0"/>
+                    <a:cs typeface="Segoe UI" panose="020B0502040204020203" pitchFamily="34" charset="0"/>
+                  </a:rPr>
+                  <a:t>Example: consider a high contrast image with </a:t>
+                </a:r>
+                <a14:m>
+                  <m:oMath xmlns:m="http://schemas.openxmlformats.org/officeDocument/2006/math">
+                    <m:r>
+                      <a:rPr lang="en-US" i="1">
+                        <a:latin typeface="Cambria Math" panose="02040503050406030204" pitchFamily="18" charset="0"/>
+                        <a:ea typeface="Segoe UI" panose="020B0502040204020203" pitchFamily="34" charset="0"/>
+                        <a:cs typeface="Segoe UI" panose="020B0502040204020203" pitchFamily="34" charset="0"/>
+                      </a:rPr>
+                      <m:t>𝐶𝑁</m:t>
+                    </m:r>
+                    <m:r>
+                      <a:rPr lang="en-US" i="1">
+                        <a:latin typeface="Cambria Math" panose="02040503050406030204" pitchFamily="18" charset="0"/>
+                        <a:ea typeface="Segoe UI" panose="020B0502040204020203" pitchFamily="34" charset="0"/>
+                        <a:cs typeface="Segoe UI" panose="020B0502040204020203" pitchFamily="34" charset="0"/>
+                      </a:rPr>
+                      <m:t>=2</m:t>
+                    </m:r>
+                  </m:oMath>
+                </a14:m>
+                <a:r>
+                  <a:rPr lang="en-US" dirty="0">
+                    <a:ea typeface="Segoe UI" panose="020B0502040204020203" pitchFamily="34" charset="0"/>
+                    <a:cs typeface="Segoe UI" panose="020B0502040204020203" pitchFamily="34" charset="0"/>
+                  </a:rPr>
+                  <a:t>20 on range </a:t>
+                </a:r>
+                <a14:m>
+                  <m:oMath xmlns:m="http://schemas.openxmlformats.org/officeDocument/2006/math">
+                    <m:r>
+                      <a:rPr lang="en-US" i="1">
+                        <a:latin typeface="Cambria Math" panose="02040503050406030204" pitchFamily="18" charset="0"/>
+                        <a:ea typeface="Segoe UI" panose="020B0502040204020203" pitchFamily="34" charset="0"/>
+                        <a:cs typeface="Segoe UI" panose="020B0502040204020203" pitchFamily="34" charset="0"/>
+                      </a:rPr>
+                      <m:t>0−255</m:t>
+                    </m:r>
+                  </m:oMath>
+                </a14:m>
+                <a:endParaRPr lang="en-US" dirty="0">
+                  <a:ea typeface="Segoe UI" panose="020B0502040204020203" pitchFamily="34" charset="0"/>
+                  <a:cs typeface="Segoe UI" panose="020B0502040204020203" pitchFamily="34" charset="0"/>
+                </a:endParaRPr>
+              </a:p>
+              <a:p>
+                <a:pPr lvl="1"/>
+                <a:r>
+                  <a:rPr lang="en-US" dirty="0">
+                    <a:ea typeface="Segoe UI" panose="020B0502040204020203" pitchFamily="34" charset="0"/>
+                    <a:cs typeface="Segoe UI" panose="020B0502040204020203" pitchFamily="34" charset="0"/>
+                  </a:rPr>
+                  <a:t>Maximum relative change in value at edge is </a:t>
+                </a:r>
+                <a14:m>
+                  <m:oMath xmlns:m="http://schemas.openxmlformats.org/officeDocument/2006/math">
+                    <m:f>
+                      <m:fPr>
+                        <m:ctrlPr>
+                          <a:rPr lang="en-US" i="1">
+                            <a:latin typeface="Cambria Math" panose="02040503050406030204" pitchFamily="18" charset="0"/>
+                            <a:cs typeface="Segoe UI" panose="020B0502040204020203" pitchFamily="34" charset="0"/>
+                          </a:rPr>
+                        </m:ctrlPr>
+                      </m:fPr>
+                      <m:num>
+                        <m:r>
+                          <a:rPr lang="en-US" i="1">
+                            <a:latin typeface="Cambria Math" panose="02040503050406030204" pitchFamily="18" charset="0"/>
+                            <a:cs typeface="Segoe UI" panose="020B0502040204020203" pitchFamily="34" charset="0"/>
+                          </a:rPr>
+                          <m:t>2</m:t>
+                        </m:r>
+                        <m:r>
+                          <a:rPr lang="en-US" b="0" i="1" smtClean="0">
+                            <a:latin typeface="Cambria Math" panose="02040503050406030204" pitchFamily="18" charset="0"/>
+                            <a:cs typeface="Segoe UI" panose="020B0502040204020203" pitchFamily="34" charset="0"/>
+                          </a:rPr>
+                          <m:t>20</m:t>
+                        </m:r>
+                      </m:num>
+                      <m:den>
+                        <m:r>
+                          <a:rPr lang="en-US" i="1">
+                            <a:latin typeface="Cambria Math" panose="02040503050406030204" pitchFamily="18" charset="0"/>
+                            <a:cs typeface="Segoe UI" panose="020B0502040204020203" pitchFamily="34" charset="0"/>
+                          </a:rPr>
+                          <m:t>255</m:t>
+                        </m:r>
+                      </m:den>
+                    </m:f>
+                  </m:oMath>
+                </a14:m>
+                <a:endParaRPr lang="en-US" dirty="0">
+                  <a:ea typeface="Segoe UI" panose="020B0502040204020203" pitchFamily="34" charset="0"/>
+                  <a:cs typeface="Segoe UI" panose="020B0502040204020203" pitchFamily="34" charset="0"/>
+                </a:endParaRPr>
+              </a:p>
+              <a:p>
+                <a:pPr lvl="1"/>
+                <a:r>
+                  <a:rPr lang="en-US" dirty="0">
+                    <a:ea typeface="Segoe UI" panose="020B0502040204020203" pitchFamily="34" charset="0"/>
+                    <a:cs typeface="Segoe UI" panose="020B0502040204020203" pitchFamily="34" charset="0"/>
+                  </a:rPr>
+                  <a:t>High probability of well defined edges, line, objects, etc.    </a:t>
+                </a:r>
+              </a:p>
+              <a:p>
+                <a:endParaRPr lang="en-US" dirty="0">
+                  <a:ea typeface="Segoe UI" panose="020B0502040204020203" pitchFamily="34" charset="0"/>
+                  <a:cs typeface="Segoe UI" panose="020B0502040204020203" pitchFamily="34" charset="0"/>
+                </a:endParaRPr>
+              </a:p>
+            </p:txBody>
+          </p:sp>
+        </mc:Choice>
+        <mc:Fallback>
+          <p:sp>
+            <p:nvSpPr>
+              <p:cNvPr id="7" name="Content Placeholder 6"/>
+              <p:cNvSpPr>
+                <a:spLocks noGrp="1" noRot="1" noChangeAspect="1" noMove="1" noResize="1" noEditPoints="1" noAdjustHandles="1" noChangeArrowheads="1" noChangeShapeType="1" noTextEdit="1"/>
+              </p:cNvSpPr>
+              <p:nvPr>
+                <p:ph sz="quarter" idx="10"/>
+              </p:nvPr>
+            </p:nvSpPr>
+            <p:spPr>
+              <a:xfrm>
+                <a:off x="378594" y="1399631"/>
+                <a:ext cx="11525250" cy="4972369"/>
+              </a:xfrm>
+              <a:blipFill>
+                <a:blip r:embed="rId3"/>
+                <a:stretch>
+                  <a:fillRect l="-1058" t="-2086"/>
+                </a:stretch>
+              </a:blipFill>
+            </p:spPr>
+            <p:txBody>
+              <a:bodyPr/>
+              <a:lstStyle/>
+              <a:p>
+                <a:r>
+                  <a:rPr lang="en-US">
+                    <a:noFill/>
+                  </a:rPr>
+                  <a:t> </a:t>
+                </a:r>
+              </a:p>
+            </p:txBody>
+          </p:sp>
+        </mc:Fallback>
+      </mc:AlternateContent>
+      <p:sp>
+        <p:nvSpPr>
+          <p:cNvPr id="2" name="Title 1"/>
+          <p:cNvSpPr>
+            <a:spLocks noGrp="1"/>
+          </p:cNvSpPr>
+          <p:nvPr>
+            <p:ph type="title"/>
+          </p:nvPr>
+        </p:nvSpPr>
+        <p:spPr>
+          <a:xfrm>
+            <a:off x="378594" y="298282"/>
+            <a:ext cx="11714548" cy="709026"/>
+          </a:xfrm>
+        </p:spPr>
+        <p:txBody>
+          <a:bodyPr>
+            <a:normAutofit/>
+          </a:bodyPr>
+          <a:lstStyle/>
+          <a:p>
+            <a:r>
+              <a:rPr lang="en-US" sz="4000" dirty="0">
+                <a:latin typeface="+mn-lt"/>
+                <a:cs typeface="Segoe UI" panose="020B0502040204020203" pitchFamily="34" charset="0"/>
+              </a:rPr>
+              <a:t>Contrast and Illumination</a:t>
+            </a:r>
+            <a:endParaRPr lang="en-US" sz="4000" dirty="0">
+              <a:latin typeface="+mn-lt"/>
+            </a:endParaRPr>
+          </a:p>
+        </p:txBody>
+      </p:sp>
+    </p:spTree>
+    <p:extLst>
+      <p:ext uri="{BB962C8B-B14F-4D97-AF65-F5344CB8AC3E}">
+        <p14:creationId xmlns:p14="http://schemas.microsoft.com/office/powerpoint/2010/main" val="1493159974"/>
+      </p:ext>
+    </p:extLst>
+  </p:cSld>
+  <p:clrMapOvr>
+    <a:masterClrMapping/>
+  </p:clrMapOvr>
+</p:sld>
+</file>
+
+<file path=ppt/slides/slide41.xml><?xml version="1.0" encoding="utf-8"?>
+<p:sld xmlns:a="http://schemas.openxmlformats.org/drawingml/2006/main" xmlns:r="http://schemas.openxmlformats.org/officeDocument/2006/relationships" xmlns:p="http://schemas.openxmlformats.org/presentationml/2006/main">
+  <p:cSld>
+    <p:spTree>
+      <p:nvGrpSpPr>
+        <p:cNvPr id="1" name=""/>
+        <p:cNvGrpSpPr/>
+        <p:nvPr/>
+      </p:nvGrpSpPr>
+      <p:grpSpPr>
+        <a:xfrm>
+          <a:off x="0" y="0"/>
+          <a:ext cx="0" cy="0"/>
+          <a:chOff x="0" y="0"/>
+          <a:chExt cx="0" cy="0"/>
+        </a:xfrm>
+      </p:grpSpPr>
       <p:sp>
         <p:nvSpPr>
           <p:cNvPr id="7" name="Content Placeholder 6"/>
@@ -31977,34 +33041,6 @@
                 <a:cs typeface="Segoe UI" panose="020B0502040204020203" pitchFamily="34" charset="0"/>
               </a:rPr>
               <a:t>Contrast is the difference between the lightest and darkest components of a patch of an image  </a:t>
-            </a:r>
-          </a:p>
-          <a:p>
-            <a:r>
-              <a:rPr lang="en-GB" dirty="0">
-                <a:ea typeface="Segoe UI" panose="020B0502040204020203" pitchFamily="34" charset="0"/>
-                <a:cs typeface="Segoe UI" panose="020B0502040204020203" pitchFamily="34" charset="0"/>
-              </a:rPr>
-              <a:t>Features often poorly defined in low contrast image  </a:t>
-            </a:r>
-          </a:p>
-          <a:p>
-            <a:r>
-              <a:rPr lang="en-GB" dirty="0">
-                <a:ea typeface="Segoe UI" panose="020B0502040204020203" pitchFamily="34" charset="0"/>
-                <a:cs typeface="Segoe UI" panose="020B0502040204020203" pitchFamily="34" charset="0"/>
-              </a:rPr>
-              <a:t>A low contrast image has only small range of illumination values    </a:t>
-            </a:r>
-          </a:p>
-          <a:p>
-            <a:pPr lvl="1"/>
-            <a:r>
-              <a:rPr lang="en-GB" dirty="0">
-                <a:ea typeface="Segoe UI" panose="020B0502040204020203" pitchFamily="34" charset="0"/>
-                <a:cs typeface="Segoe UI" panose="020B0502040204020203" pitchFamily="34" charset="0"/>
-              </a:rPr>
-              <a:t>Pixel values are in a limited range   </a:t>
             </a:r>
           </a:p>
           <a:p>
@@ -32101,6 +33137,660 @@
     <p:extLst>
       <p:ext uri="{BB962C8B-B14F-4D97-AF65-F5344CB8AC3E}">
         <p14:creationId xmlns:p14="http://schemas.microsoft.com/office/powerpoint/2010/main" val="2849936943"/>
+      </p:ext>
+    </p:extLst>
+  </p:cSld>
+  <p:clrMapOvr>
+    <a:masterClrMapping/>
+  </p:clrMapOvr>
+  <p:timing>
+    <p:tnLst>
+      <p:par>
+        <p:cTn id="1" dur="indefinite" restart="never" nodeType="tmRoot">
+          <p:childTnLst>
+            <p:seq concurrent="1" nextAc="seek">
+              <p:cTn id="2" dur="indefinite" nodeType="mainSeq">
+                <p:childTnLst>
+                  <p:par>
+                    <p:cTn id="3" fill="hold">
+                      <p:stCondLst>
+                        <p:cond delay="indefinite"/>
+                      </p:stCondLst>
+                      <p:childTnLst>
+                        <p:par>
+                          <p:cTn id="4" fill="hold">
+                            <p:stCondLst>
+                              <p:cond delay="0"/>
+                            </p:stCondLst>
+                            <p:childTnLst>
+                              <p:par>
+                                <p:cTn id="5" presetID="1" presetClass="entr" presetSubtype="0" fill="hold" grpId="0" nodeType="clickEffect">
+                                  <p:stCondLst>
+                                    <p:cond delay="0"/>
+                                  </p:stCondLst>
+                                  <p:childTnLst>
+                                    <p:set>
+                                      <p:cBhvr>
+                                        <p:cTn id="6" dur="1" fill="hold">
+                                          <p:stCondLst>
+                                            <p:cond delay="0"/>
+                                          </p:stCondLst>
+                                        </p:cTn>
+                                        <p:tgtEl>
+                                          <p:spTgt spid="7">
+                                            <p:txEl>
+                                              <p:pRg st="1" end="1"/>
+                                            </p:txEl>
+                                          </p:spTgt>
+                                        </p:tgtEl>
+                                        <p:attrNameLst>
+                                          <p:attrName>style.visibility</p:attrName>
+                                        </p:attrNameLst>
+                                      </p:cBhvr>
+                                      <p:to>
+                                        <p:strVal val="visible"/>
+                                      </p:to>
+                                    </p:set>
+                                  </p:childTnLst>
+                                </p:cTn>
+                              </p:par>
+                              <p:par>
+                                <p:cTn id="7" presetID="1" presetClass="entr" presetSubtype="0" fill="hold" grpId="0" nodeType="withEffect">
+                                  <p:stCondLst>
+                                    <p:cond delay="0"/>
+                                  </p:stCondLst>
+                                  <p:childTnLst>
+                                    <p:set>
+                                      <p:cBhvr>
+                                        <p:cTn id="8" dur="1" fill="hold">
+                                          <p:stCondLst>
+                                            <p:cond delay="0"/>
+                                          </p:stCondLst>
+                                        </p:cTn>
+                                        <p:tgtEl>
+                                          <p:spTgt spid="7">
+                                            <p:txEl>
+                                              <p:pRg st="2" end="2"/>
+                                            </p:txEl>
+                                          </p:spTgt>
+                                        </p:tgtEl>
+                                        <p:attrNameLst>
+                                          <p:attrName>style.visibility</p:attrName>
+                                        </p:attrNameLst>
+                                      </p:cBhvr>
+                                      <p:to>
+                                        <p:strVal val="visible"/>
+                                      </p:to>
+                                    </p:set>
+                                  </p:childTnLst>
+                                </p:cTn>
+                              </p:par>
+                            </p:childTnLst>
+                          </p:cTn>
+                        </p:par>
+                      </p:childTnLst>
+                    </p:cTn>
+                  </p:par>
+                  <p:par>
+                    <p:cTn id="9" fill="hold">
+                      <p:stCondLst>
+                        <p:cond delay="indefinite"/>
+                      </p:stCondLst>
+                      <p:childTnLst>
+                        <p:par>
+                          <p:cTn id="10" fill="hold">
+                            <p:stCondLst>
+                              <p:cond delay="0"/>
+                            </p:stCondLst>
+                            <p:childTnLst>
+                              <p:par>
+                                <p:cTn id="11" presetID="1" presetClass="entr" presetSubtype="0" fill="hold" grpId="0" nodeType="clickEffect">
+                                  <p:stCondLst>
+                                    <p:cond delay="0"/>
+                                  </p:stCondLst>
+                                  <p:childTnLst>
+                                    <p:set>
+                                      <p:cBhvr>
+                                        <p:cTn id="12" dur="1" fill="hold">
+                                          <p:stCondLst>
+                                            <p:cond delay="0"/>
+                                          </p:stCondLst>
+                                        </p:cTn>
+                                        <p:tgtEl>
+                                          <p:spTgt spid="7">
+                                            <p:txEl>
+                                              <p:pRg st="3" end="3"/>
+                                            </p:txEl>
+                                          </p:spTgt>
+                                        </p:tgtEl>
+                                        <p:attrNameLst>
+                                          <p:attrName>style.visibility</p:attrName>
+                                        </p:attrNameLst>
+                                      </p:cBhvr>
+                                      <p:to>
+                                        <p:strVal val="visible"/>
+                                      </p:to>
+                                    </p:set>
+                                  </p:childTnLst>
+                                </p:cTn>
+                              </p:par>
+                              <p:par>
+                                <p:cTn id="13" presetID="1" presetClass="entr" presetSubtype="0" fill="hold" grpId="0" nodeType="withEffect">
+                                  <p:stCondLst>
+                                    <p:cond delay="0"/>
+                                  </p:stCondLst>
+                                  <p:childTnLst>
+                                    <p:set>
+                                      <p:cBhvr>
+                                        <p:cTn id="14" dur="1" fill="hold">
+                                          <p:stCondLst>
+                                            <p:cond delay="0"/>
+                                          </p:stCondLst>
+                                        </p:cTn>
+                                        <p:tgtEl>
+                                          <p:spTgt spid="7">
+                                            <p:txEl>
+                                              <p:pRg st="4" end="4"/>
+                                            </p:txEl>
+                                          </p:spTgt>
+                                        </p:tgtEl>
+                                        <p:attrNameLst>
+                                          <p:attrName>style.visibility</p:attrName>
+                                        </p:attrNameLst>
+                                      </p:cBhvr>
+                                      <p:to>
+                                        <p:strVal val="visible"/>
+                                      </p:to>
+                                    </p:set>
+                                  </p:childTnLst>
+                                </p:cTn>
+                              </p:par>
+                            </p:childTnLst>
+                          </p:cTn>
+                        </p:par>
+                      </p:childTnLst>
+                    </p:cTn>
+                  </p:par>
+                </p:childTnLst>
+              </p:cTn>
+              <p:prevCondLst>
+                <p:cond evt="onPrev" delay="0">
+                  <p:tgtEl>
+                    <p:sldTgt/>
+                  </p:tgtEl>
+                </p:cond>
+              </p:prevCondLst>
+              <p:nextCondLst>
+                <p:cond evt="onNext" delay="0">
+                  <p:tgtEl>
+                    <p:sldTgt/>
+                  </p:tgtEl>
+                </p:cond>
+              </p:nextCondLst>
+            </p:seq>
+          </p:childTnLst>
+        </p:cTn>
+      </p:par>
+    </p:tnLst>
+    <p:bldLst>
+      <p:bldP spid="7" grpId="0" uiExpand="1" build="p"/>
+    </p:bldLst>
+  </p:timing>
+</p:sld>
+</file>
+
+<file path=ppt/slides/slide42.xml><?xml version="1.0" encoding="utf-8"?>
+<p:sld xmlns:a="http://schemas.openxmlformats.org/drawingml/2006/main" xmlns:r="http://schemas.openxmlformats.org/officeDocument/2006/relationships" xmlns:p="http://schemas.openxmlformats.org/presentationml/2006/main">
+  <p:cSld>
+    <p:spTree>
+      <p:nvGrpSpPr>
+        <p:cNvPr id="1" name=""/>
+        <p:cNvGrpSpPr/>
+        <p:nvPr/>
+      </p:nvGrpSpPr>
+      <p:grpSpPr>
+        <a:xfrm>
+          <a:off x="0" y="0"/>
+          <a:ext cx="0" cy="0"/>
+          <a:chOff x="0" y="0"/>
+          <a:chExt cx="0" cy="0"/>
+        </a:xfrm>
+      </p:grpSpPr>
+      <p:sp>
+        <p:nvSpPr>
+          <p:cNvPr id="7" name="Content Placeholder 6"/>
+          <p:cNvSpPr>
+            <a:spLocks noGrp="1"/>
+          </p:cNvSpPr>
+          <p:nvPr>
+            <p:ph sz="quarter" idx="10"/>
+          </p:nvPr>
+        </p:nvSpPr>
+        <p:spPr>
+          <a:xfrm>
+            <a:off x="425415" y="985821"/>
+            <a:ext cx="11302395" cy="658991"/>
+          </a:xfrm>
+        </p:spPr>
+        <p:txBody>
+          <a:bodyPr>
+            <a:noAutofit/>
+          </a:bodyPr>
+          <a:lstStyle/>
+          <a:p>
+            <a:pPr marL="0" indent="0">
+              <a:buNone/>
+            </a:pPr>
+            <a:r>
+              <a:rPr lang="en-GB" dirty="0">
+                <a:ea typeface="Segoe UI" panose="020B0502040204020203" pitchFamily="34" charset="0"/>
+                <a:cs typeface="Segoe UI" panose="020B0502040204020203" pitchFamily="34" charset="0"/>
+              </a:rPr>
+              <a:t>Want a transformation to redistribute pixel values </a:t>
+            </a:r>
+          </a:p>
+        </p:txBody>
+      </p:sp>
+      <p:sp>
+        <p:nvSpPr>
+          <p:cNvPr id="2" name="Title 1"/>
+          <p:cNvSpPr>
+            <a:spLocks noGrp="1"/>
+          </p:cNvSpPr>
+          <p:nvPr>
+            <p:ph type="title"/>
+          </p:nvPr>
+        </p:nvSpPr>
+        <p:spPr>
+          <a:xfrm>
+            <a:off x="523213" y="157254"/>
+            <a:ext cx="11380632" cy="699246"/>
+          </a:xfrm>
+        </p:spPr>
+        <p:txBody>
+          <a:bodyPr>
+            <a:normAutofit/>
+          </a:bodyPr>
+          <a:lstStyle/>
+          <a:p>
+            <a:r>
+              <a:rPr lang="en-US" sz="4000" dirty="0">
+                <a:latin typeface="+mn-lt"/>
+                <a:cs typeface="Segoe UI" panose="020B0502040204020203" pitchFamily="34" charset="0"/>
+              </a:rPr>
+              <a:t>Contrast Improvement</a:t>
+            </a:r>
+            <a:endParaRPr lang="en-US" sz="4000" dirty="0">
+              <a:latin typeface="+mn-lt"/>
+            </a:endParaRPr>
+          </a:p>
+        </p:txBody>
+      </p:sp>
+      <p:pic>
+        <p:nvPicPr>
+          <p:cNvPr id="4" name="Picture 3">
+            <a:extLst>
+              <a:ext uri="{FF2B5EF4-FFF2-40B4-BE49-F238E27FC236}">
+                <a16:creationId xmlns:a16="http://schemas.microsoft.com/office/drawing/2014/main" id="{97D5C104-6F12-4A14-951D-B15D6EDE18D9}"/>
+              </a:ext>
+            </a:extLst>
+          </p:cNvPr>
+          <p:cNvPicPr>
+            <a:picLocks noChangeAspect="1"/>
+          </p:cNvPicPr>
+          <p:nvPr/>
+        </p:nvPicPr>
+        <p:blipFill>
+          <a:blip r:embed="rId3"/>
+          <a:stretch>
+            <a:fillRect/>
+          </a:stretch>
+        </p:blipFill>
+        <p:spPr>
+          <a:xfrm>
+            <a:off x="679688" y="1426425"/>
+            <a:ext cx="2848526" cy="2632142"/>
+          </a:xfrm>
+          <a:prstGeom prst="rect">
+            <a:avLst/>
+          </a:prstGeom>
+        </p:spPr>
+      </p:pic>
+      <p:pic>
+        <p:nvPicPr>
+          <p:cNvPr id="6" name="Picture 5">
+            <a:extLst>
+              <a:ext uri="{FF2B5EF4-FFF2-40B4-BE49-F238E27FC236}">
+                <a16:creationId xmlns:a16="http://schemas.microsoft.com/office/drawing/2014/main" id="{4951C3C0-594B-4E83-8724-CD647762DB35}"/>
+              </a:ext>
+            </a:extLst>
+          </p:cNvPr>
+          <p:cNvPicPr>
+            <a:picLocks noChangeAspect="1"/>
+          </p:cNvPicPr>
+          <p:nvPr/>
+        </p:nvPicPr>
+        <p:blipFill>
+          <a:blip r:embed="rId4"/>
+          <a:stretch>
+            <a:fillRect/>
+          </a:stretch>
+        </p:blipFill>
+        <p:spPr>
+          <a:xfrm>
+            <a:off x="679688" y="4138749"/>
+            <a:ext cx="2783802" cy="2540772"/>
+          </a:xfrm>
+          <a:prstGeom prst="rect">
+            <a:avLst/>
+          </a:prstGeom>
+        </p:spPr>
+      </p:pic>
+      <p:pic>
+        <p:nvPicPr>
+          <p:cNvPr id="9" name="Picture 8">
+            <a:extLst>
+              <a:ext uri="{FF2B5EF4-FFF2-40B4-BE49-F238E27FC236}">
+                <a16:creationId xmlns:a16="http://schemas.microsoft.com/office/drawing/2014/main" id="{591DCEDA-53C6-466B-98D0-6317D81A7856}"/>
+              </a:ext>
+            </a:extLst>
+          </p:cNvPr>
+          <p:cNvPicPr>
+            <a:picLocks noChangeAspect="1"/>
+          </p:cNvPicPr>
+          <p:nvPr/>
+        </p:nvPicPr>
+        <p:blipFill>
+          <a:blip r:embed="rId5"/>
+          <a:stretch>
+            <a:fillRect/>
+          </a:stretch>
+        </p:blipFill>
+        <p:spPr>
+          <a:xfrm>
+            <a:off x="7769691" y="1278255"/>
+            <a:ext cx="3186851" cy="2780312"/>
+          </a:xfrm>
+          <a:prstGeom prst="rect">
+            <a:avLst/>
+          </a:prstGeom>
+        </p:spPr>
+      </p:pic>
+      <p:pic>
+        <p:nvPicPr>
+          <p:cNvPr id="11" name="Picture 10">
+            <a:extLst>
+              <a:ext uri="{FF2B5EF4-FFF2-40B4-BE49-F238E27FC236}">
+                <a16:creationId xmlns:a16="http://schemas.microsoft.com/office/drawing/2014/main" id="{C78FEF3B-EA1F-4C32-AF5E-680BB21F62F0}"/>
+              </a:ext>
+            </a:extLst>
+          </p:cNvPr>
+          <p:cNvPicPr>
+            <a:picLocks noChangeAspect="1"/>
+          </p:cNvPicPr>
+          <p:nvPr/>
+        </p:nvPicPr>
+        <p:blipFill>
+          <a:blip r:embed="rId6"/>
+          <a:stretch>
+            <a:fillRect/>
+          </a:stretch>
+        </p:blipFill>
+        <p:spPr>
+          <a:xfrm>
+            <a:off x="7867487" y="4034565"/>
+            <a:ext cx="2917212" cy="2743250"/>
+          </a:xfrm>
+          <a:prstGeom prst="rect">
+            <a:avLst/>
+          </a:prstGeom>
+        </p:spPr>
+      </p:pic>
+      <p:sp>
+        <p:nvSpPr>
+          <p:cNvPr id="12" name="Arrow: Right 11">
+            <a:extLst>
+              <a:ext uri="{FF2B5EF4-FFF2-40B4-BE49-F238E27FC236}">
+                <a16:creationId xmlns:a16="http://schemas.microsoft.com/office/drawing/2014/main" id="{5BB18077-D147-4B7D-A698-7EEC31BACEFB}"/>
+              </a:ext>
+            </a:extLst>
+          </p:cNvPr>
+          <p:cNvSpPr/>
+          <p:nvPr/>
+        </p:nvSpPr>
+        <p:spPr>
+          <a:xfrm>
+            <a:off x="3666065" y="2752980"/>
+            <a:ext cx="4201422" cy="2540772"/>
+          </a:xfrm>
+          <a:prstGeom prst="rightArrow">
+            <a:avLst/>
+          </a:prstGeom>
+          <a:noFill/>
+          <a:ln w="28575"/>
+        </p:spPr>
+        <p:style>
+          <a:lnRef idx="2">
+            <a:schemeClr val="accent1">
+              <a:shade val="50000"/>
+            </a:schemeClr>
+          </a:lnRef>
+          <a:fillRef idx="1">
+            <a:schemeClr val="accent1"/>
+          </a:fillRef>
+          <a:effectRef idx="0">
+            <a:schemeClr val="accent1"/>
+          </a:effectRef>
+          <a:fontRef idx="minor">
+            <a:schemeClr val="lt1"/>
+          </a:fontRef>
+        </p:style>
+        <p:txBody>
+          <a:bodyPr rtlCol="0" anchor="ctr"/>
+          <a:lstStyle/>
+          <a:p>
+            <a:pPr algn="ctr"/>
+            <a:r>
+              <a:rPr lang="en-US" sz="2400" dirty="0">
+                <a:solidFill>
+                  <a:schemeClr val="tx1"/>
+                </a:solidFill>
+              </a:rPr>
+              <a:t>Transform pixel values to uniform distribution</a:t>
+            </a:r>
+          </a:p>
+        </p:txBody>
+      </p:sp>
+    </p:spTree>
+    <p:extLst>
+      <p:ext uri="{BB962C8B-B14F-4D97-AF65-F5344CB8AC3E}">
+        <p14:creationId xmlns:p14="http://schemas.microsoft.com/office/powerpoint/2010/main" val="2767317349"/>
+      </p:ext>
+    </p:extLst>
+  </p:cSld>
+  <p:clrMapOvr>
+    <a:masterClrMapping/>
+  </p:clrMapOvr>
+</p:sld>
+</file>
+
+<file path=ppt/slides/slide43.xml><?xml version="1.0" encoding="utf-8"?>
+<p:sld xmlns:a="http://schemas.openxmlformats.org/drawingml/2006/main" xmlns:r="http://schemas.openxmlformats.org/officeDocument/2006/relationships" xmlns:p="http://schemas.openxmlformats.org/presentationml/2006/main">
+  <p:cSld>
+    <p:spTree>
+      <p:nvGrpSpPr>
+        <p:cNvPr id="1" name=""/>
+        <p:cNvGrpSpPr/>
+        <p:nvPr/>
+      </p:nvGrpSpPr>
+      <p:grpSpPr>
+        <a:xfrm>
+          <a:off x="0" y="0"/>
+          <a:ext cx="0" cy="0"/>
+          <a:chOff x="0" y="0"/>
+          <a:chExt cx="0" cy="0"/>
+        </a:xfrm>
+      </p:grpSpPr>
+      <p:sp>
+        <p:nvSpPr>
+          <p:cNvPr id="7" name="Content Placeholder 6"/>
+          <p:cNvSpPr>
+            <a:spLocks noGrp="1"/>
+          </p:cNvSpPr>
+          <p:nvPr>
+            <p:ph sz="quarter" idx="10"/>
+          </p:nvPr>
+        </p:nvSpPr>
+        <p:spPr>
+          <a:xfrm>
+            <a:off x="378594" y="1399631"/>
+            <a:ext cx="11525250" cy="4972369"/>
+          </a:xfrm>
+        </p:spPr>
+        <p:txBody>
+          <a:bodyPr>
+            <a:normAutofit/>
+          </a:bodyPr>
+          <a:lstStyle/>
+          <a:p>
+            <a:pPr marL="0" indent="0">
+              <a:buNone/>
+            </a:pPr>
+            <a:r>
+              <a:rPr lang="en-GB" dirty="0">
+                <a:ea typeface="Segoe UI" panose="020B0502040204020203" pitchFamily="34" charset="0"/>
+                <a:cs typeface="Segoe UI" panose="020B0502040204020203" pitchFamily="34" charset="0"/>
+              </a:rPr>
+              <a:t>Contrast improvement transformations</a:t>
+            </a:r>
+          </a:p>
+          <a:p>
+            <a:r>
+              <a:rPr lang="en-US" dirty="0">
+                <a:ea typeface="Segoe UI" panose="020B0502040204020203" pitchFamily="34" charset="0"/>
+                <a:cs typeface="Segoe UI" panose="020B0502040204020203" pitchFamily="34" charset="0"/>
+              </a:rPr>
+              <a:t>Many algorithms and methods for improving image contrast </a:t>
+            </a:r>
+          </a:p>
+          <a:p>
+            <a:r>
+              <a:rPr lang="en-US" dirty="0">
+                <a:ea typeface="Segoe UI" panose="020B0502040204020203" pitchFamily="34" charset="0"/>
+                <a:cs typeface="Segoe UI" panose="020B0502040204020203" pitchFamily="34" charset="0"/>
+              </a:rPr>
+              <a:t>Illumination control   </a:t>
+            </a:r>
+          </a:p>
+          <a:p>
+            <a:pPr lvl="1"/>
+            <a:r>
+              <a:rPr lang="en-US" dirty="0">
+                <a:ea typeface="Segoe UI" panose="020B0502040204020203" pitchFamily="34" charset="0"/>
+                <a:cs typeface="Segoe UI" panose="020B0502040204020203" pitchFamily="34" charset="0"/>
+              </a:rPr>
+              <a:t>Practical and widely used in industrial solutions    </a:t>
+            </a:r>
+          </a:p>
+          <a:p>
+            <a:r>
+              <a:rPr lang="en-US" dirty="0">
+                <a:ea typeface="Segoe UI" panose="020B0502040204020203" pitchFamily="34" charset="0"/>
+                <a:cs typeface="Segoe UI" panose="020B0502040204020203" pitchFamily="34" charset="0"/>
+              </a:rPr>
+              <a:t>Commonly used algorithms include:    </a:t>
+            </a:r>
+          </a:p>
+          <a:p>
+            <a:pPr lvl="1"/>
+            <a:r>
+              <a:rPr lang="en-US" dirty="0">
+                <a:ea typeface="Segoe UI" panose="020B0502040204020203" pitchFamily="34" charset="0"/>
+                <a:cs typeface="Segoe UI" panose="020B0502040204020203" pitchFamily="34" charset="0"/>
+              </a:rPr>
+              <a:t>Histogram equalization, global and local   </a:t>
+            </a:r>
+          </a:p>
+          <a:p>
+            <a:pPr lvl="1"/>
+            <a:r>
+              <a:rPr lang="en-US" dirty="0">
+                <a:ea typeface="Segoe UI" panose="020B0502040204020203" pitchFamily="34" charset="0"/>
+                <a:cs typeface="Segoe UI" panose="020B0502040204020203" pitchFamily="34" charset="0"/>
+              </a:rPr>
+              <a:t>Gamma correction, pixel-wise    </a:t>
+            </a:r>
+          </a:p>
+          <a:p>
+            <a:pPr lvl="1"/>
+            <a:r>
+              <a:rPr lang="en-US" dirty="0">
+                <a:ea typeface="Segoe UI" panose="020B0502040204020203" pitchFamily="34" charset="0"/>
+                <a:cs typeface="Segoe UI" panose="020B0502040204020203" pitchFamily="34" charset="0"/>
+              </a:rPr>
+              <a:t>Logarithmic adjustment , pixel-wise   </a:t>
+            </a:r>
+          </a:p>
+          <a:p>
+            <a:pPr lvl="1"/>
+            <a:r>
+              <a:rPr lang="en-US" dirty="0">
+                <a:ea typeface="Segoe UI" panose="020B0502040204020203" pitchFamily="34" charset="0"/>
+                <a:cs typeface="Segoe UI" panose="020B0502040204020203" pitchFamily="34" charset="0"/>
+              </a:rPr>
+              <a:t> Sigmoidal adjustment , pixel-wise   </a:t>
+            </a:r>
+          </a:p>
+          <a:p>
+            <a:r>
+              <a:rPr lang="en-US" dirty="0">
+                <a:ea typeface="Segoe UI" panose="020B0502040204020203" pitchFamily="34" charset="0"/>
+                <a:cs typeface="Segoe UI" panose="020B0502040204020203" pitchFamily="34" charset="0"/>
+              </a:rPr>
+              <a:t>Selection of methods dependent on situation   </a:t>
+            </a:r>
+          </a:p>
+        </p:txBody>
+      </p:sp>
+      <p:sp>
+        <p:nvSpPr>
+          <p:cNvPr id="2" name="Title 1"/>
+          <p:cNvSpPr>
+            <a:spLocks noGrp="1"/>
+          </p:cNvSpPr>
+          <p:nvPr>
+            <p:ph type="title"/>
+          </p:nvPr>
+        </p:nvSpPr>
+        <p:spPr>
+          <a:xfrm>
+            <a:off x="378594" y="298282"/>
+            <a:ext cx="11714548" cy="709026"/>
+          </a:xfrm>
+        </p:spPr>
+        <p:txBody>
+          <a:bodyPr>
+            <a:normAutofit/>
+          </a:bodyPr>
+          <a:lstStyle/>
+          <a:p>
+            <a:r>
+              <a:rPr lang="en-US" sz="4000" dirty="0">
+                <a:latin typeface="+mn-lt"/>
+                <a:cs typeface="Segoe UI" panose="020B0502040204020203" pitchFamily="34" charset="0"/>
+              </a:rPr>
+              <a:t>Contrast Improvement</a:t>
+            </a:r>
+            <a:endParaRPr lang="en-US" sz="4000" dirty="0">
+              <a:latin typeface="+mn-lt"/>
+            </a:endParaRPr>
+          </a:p>
+        </p:txBody>
+      </p:sp>
+    </p:spTree>
+    <p:extLst>
+      <p:ext uri="{BB962C8B-B14F-4D97-AF65-F5344CB8AC3E}">
+        <p14:creationId xmlns:p14="http://schemas.microsoft.com/office/powerpoint/2010/main" val="1336595775"/>
       </p:ext>
     </p:extLst>
   </p:cSld>
@@ -32318,26 +34008,39 @@
                                   </p:childTnLst>
                                 </p:cTn>
                               </p:par>
-                            </p:childTnLst>
-                          </p:cTn>
-                        </p:par>
-                      </p:childTnLst>
-                    </p:cTn>
-                  </p:par>
-                  <p:par>
-                    <p:cTn id="19" fill="hold">
-                      <p:stCondLst>
-                        <p:cond delay="indefinite"/>
-                      </p:stCondLst>
-                      <p:childTnLst>
-                        <p:par>
-                          <p:cTn id="20" fill="hold">
-                            <p:stCondLst>
-                              <p:cond delay="0"/>
-                            </p:stCondLst>
-                            <p:childTnLst>
                               <p:par>
-                                <p:cTn id="21" presetID="1" presetClass="entr" presetSubtype="0" fill="hold" grpId="0" nodeType="clickEffect">
+                                <p:cTn id="19" presetID="1" presetClass="entr" presetSubtype="0" fill="hold" grpId="0" nodeType="withEffect">
+                                  <p:stCondLst>
+                                    <p:cond delay="0"/>
+                                  </p:stCondLst>
+                                  <p:childTnLst>
+                                    <p:set>
+                                      <p:cBhvr>
+                                        <p:cTn id="20" dur="1" fill="hold">
+                                          <p:stCondLst>
+                                            <p:cond delay="0"/>
+                                          </p:stCondLst>
+                                        </p:cTn>
+                                        <p:tgtEl>
+                                          <p:spTgt spid="7">
+                                            <p:txEl>
+                                              <p:pRg st="6" end="6"/>
+                                            </p:txEl>
+                                          </p:spTgt>
+                                        </p:tgtEl>
+                                        <p:attrNameLst>
+                                          <p:attrName>style.visibility</p:attrName>
+                                        </p:attrNameLst>
+                                      </p:cBhvr>
+                                      <p:to>
+                                        <p:strVal val="visible"/>
+                                      </p:to>
+                                    </p:set>
+                                  </p:childTnLst>
+                                </p:cTn>
+                              </p:par>
+                              <p:par>
+                                <p:cTn id="21" presetID="1" presetClass="entr" presetSubtype="0" fill="hold" grpId="0" nodeType="withEffect">
                                   <p:stCondLst>
                                     <p:cond delay="0"/>
                                   </p:stCondLst>
@@ -32352,7 +34055,7 @@
                                         <p:tgtEl>
                                           <p:spTgt spid="7">
                                             <p:txEl>
-                                              <p:pRg st="6" end="6"/>
+                                              <p:pRg st="7" end="7"/>
                                             </p:txEl>
                                           </p:spTgt>
                                         </p:tgtEl>
@@ -32383,7 +34086,56 @@
                                         <p:tgtEl>
                                           <p:spTgt spid="7">
                                             <p:txEl>
-                                              <p:pRg st="7" end="7"/>
+                                              <p:pRg st="8" end="8"/>
+                                            </p:txEl>
+                                          </p:spTgt>
+                                        </p:tgtEl>
+                                        <p:attrNameLst>
+                                          <p:attrName>style.visibility</p:attrName>
+                                        </p:attrNameLst>
+                                      </p:cBhvr>
+                                      <p:to>
+                                        <p:strVal val="visible"/>
+                                      </p:to>
+                                    </p:set>
+                                  </p:childTnLst>
+                                </p:cTn>
+                              </p:par>
+                            </p:childTnLst>
+                          </p:cTn>
+                        </p:par>
+                      </p:childTnLst>
+                    </p:cTn>
+                  </p:par>
+                  <p:par>
+                    <p:cTn id="25" fill="hold">
+                      <p:stCondLst>
+                        <p:cond delay="indefinite"/>
+                      </p:stCondLst>
+                      <p:childTnLst>
+                        <p:par>
+                          <p:cTn id="26" fill="hold">
+                            <p:stCondLst>
+                              <p:cond delay="0"/>
+                            </p:stCondLst>
+                            <p:childTnLst>
+                              <p:par>
+                                <p:cTn id="27" presetID="1" presetClass="entr" presetSubtype="0" fill="hold" grpId="0" nodeType="clickEffect">
+                                  <p:stCondLst>
+                                    <p:cond delay="0"/>
+                                  </p:stCondLst>
+                                  <p:childTnLst>
+                                    <p:set>
+                                      <p:cBhvr>
+                                        <p:cTn id="28" dur="1" fill="hold">
+                                          <p:stCondLst>
+                                            <p:cond delay="0"/>
+                                          </p:stCondLst>
+                                        </p:cTn>
+                                        <p:tgtEl>
+                                          <p:spTgt spid="7">
+                                            <p:txEl>
+                                              <p:pRg st="9" end="9"/>
                                             </p:txEl>
                                           </p:spTgt>
                                         </p:tgtEl>
@@ -32432,7 +34184,7 @@
 </p:sld>
 </file>
 
-<file path=ppt/slides/slide41.xml><?xml version="1.0" encoding="utf-8"?>
+<file path=ppt/slides/slide44.xml><?xml version="1.0" encoding="utf-8"?>
 <p:sld xmlns:a="http://schemas.openxmlformats.org/drawingml/2006/main" xmlns:r="http://schemas.openxmlformats.org/officeDocument/2006/relationships" xmlns:p="http://schemas.openxmlformats.org/presentationml/2006/main">
   <p:cSld>
     <p:spTree>
@@ -32449,283 +34201,8 @@
           <a:chExt cx="0" cy="0"/>
         </a:xfrm>
       </p:grpSpPr>
-      <p:sp>
-        <p:nvSpPr>
-          <p:cNvPr id="7" name="Content Placeholder 6"/>
-          <p:cNvSpPr>
-            <a:spLocks noGrp="1"/>
-          </p:cNvSpPr>
-          <p:nvPr>
-            <p:ph sz="quarter" idx="10"/>
-          </p:nvPr>
-        </p:nvSpPr>
-        <p:spPr>
-          <a:xfrm>
-            <a:off x="425415" y="985821"/>
-            <a:ext cx="11302395" cy="658991"/>
-          </a:xfrm>
-        </p:spPr>
-        <p:txBody>
-          <a:bodyPr>
-            <a:noAutofit/>
-          </a:bodyPr>
-          <a:lstStyle/>
-          <a:p>
-            <a:pPr marL="0" indent="0">
-              <a:buNone/>
-            </a:pPr>
-            <a:r>
-              <a:rPr lang="en-GB" dirty="0">
-                <a:ea typeface="Segoe UI" panose="020B0502040204020203" pitchFamily="34" charset="0"/>
-                <a:cs typeface="Segoe UI" panose="020B0502040204020203" pitchFamily="34" charset="0"/>
-              </a:rPr>
-              <a:t>Want a transformation to redistribute pixel values </a:t>
-            </a:r>
-          </a:p>
-        </p:txBody>
-      </p:sp>
-      <p:sp>
-        <p:nvSpPr>
-          <p:cNvPr id="2" name="Title 1"/>
-          <p:cNvSpPr>
-            <a:spLocks noGrp="1"/>
-          </p:cNvSpPr>
-          <p:nvPr>
-            <p:ph type="title"/>
-          </p:nvPr>
-        </p:nvSpPr>
-        <p:spPr>
-          <a:xfrm>
-            <a:off x="523213" y="157254"/>
-            <a:ext cx="11380632" cy="699246"/>
-          </a:xfrm>
-        </p:spPr>
-        <p:txBody>
-          <a:bodyPr>
-            <a:normAutofit/>
-          </a:bodyPr>
-          <a:lstStyle/>
-          <a:p>
-            <a:r>
-              <a:rPr lang="en-US" sz="4000" dirty="0">
-                <a:latin typeface="+mn-lt"/>
-                <a:cs typeface="Segoe UI" panose="020B0502040204020203" pitchFamily="34" charset="0"/>
-              </a:rPr>
-              <a:t>Contrast Improvement</a:t>
-            </a:r>
-            <a:endParaRPr lang="en-US" sz="4000" dirty="0">
-              <a:latin typeface="+mn-lt"/>
-            </a:endParaRPr>
-          </a:p>
-        </p:txBody>
-      </p:sp>
-      <p:pic>
-        <p:nvPicPr>
-          <p:cNvPr id="4" name="Picture 3">
-            <a:extLst>
-              <a:ext uri="{FF2B5EF4-FFF2-40B4-BE49-F238E27FC236}">
-                <a16:creationId xmlns:a16="http://schemas.microsoft.com/office/drawing/2014/main" id="{97D5C104-6F12-4A14-951D-B15D6EDE18D9}"/>
-              </a:ext>
-            </a:extLst>
-          </p:cNvPr>
-          <p:cNvPicPr>
-            <a:picLocks noChangeAspect="1"/>
-          </p:cNvPicPr>
-          <p:nvPr/>
-        </p:nvPicPr>
-        <p:blipFill>
-          <a:blip r:embed="rId3"/>
-          <a:stretch>
-            <a:fillRect/>
-          </a:stretch>
-        </p:blipFill>
-        <p:spPr>
-          <a:xfrm>
-            <a:off x="679688" y="1426425"/>
-            <a:ext cx="2848526" cy="2632142"/>
-          </a:xfrm>
-          <a:prstGeom prst="rect">
-            <a:avLst/>
-          </a:prstGeom>
-        </p:spPr>
-      </p:pic>
-      <p:pic>
-        <p:nvPicPr>
-          <p:cNvPr id="6" name="Picture 5">
-            <a:extLst>
-              <a:ext uri="{FF2B5EF4-FFF2-40B4-BE49-F238E27FC236}">
-                <a16:creationId xmlns:a16="http://schemas.microsoft.com/office/drawing/2014/main" id="{4951C3C0-594B-4E83-8724-CD647762DB35}"/>
-              </a:ext>
-            </a:extLst>
-          </p:cNvPr>
-          <p:cNvPicPr>
-            <a:picLocks noChangeAspect="1"/>
-          </p:cNvPicPr>
-          <p:nvPr/>
-        </p:nvPicPr>
-        <p:blipFill>
-          <a:blip r:embed="rId4"/>
-          <a:stretch>
-            <a:fillRect/>
-          </a:stretch>
-        </p:blipFill>
-        <p:spPr>
-          <a:xfrm>
-            <a:off x="679688" y="4138749"/>
-            <a:ext cx="2783802" cy="2540772"/>
-          </a:xfrm>
-          <a:prstGeom prst="rect">
-            <a:avLst/>
-          </a:prstGeom>
-        </p:spPr>
-      </p:pic>
-      <p:pic>
-        <p:nvPicPr>
-          <p:cNvPr id="9" name="Picture 8">
-            <a:extLst>
-              <a:ext uri="{FF2B5EF4-FFF2-40B4-BE49-F238E27FC236}">
-                <a16:creationId xmlns:a16="http://schemas.microsoft.com/office/drawing/2014/main" id="{591DCEDA-53C6-466B-98D0-6317D81A7856}"/>
-              </a:ext>
-            </a:extLst>
-          </p:cNvPr>
-          <p:cNvPicPr>
-            <a:picLocks noChangeAspect="1"/>
-          </p:cNvPicPr>
-          <p:nvPr/>
-        </p:nvPicPr>
-        <p:blipFill>
-          <a:blip r:embed="rId5"/>
-          <a:stretch>
-            <a:fillRect/>
-          </a:stretch>
-        </p:blipFill>
-        <p:spPr>
-          <a:xfrm>
-            <a:off x="7769691" y="1278255"/>
-            <a:ext cx="3186851" cy="2780312"/>
-          </a:xfrm>
-          <a:prstGeom prst="rect">
-            <a:avLst/>
-          </a:prstGeom>
-        </p:spPr>
-      </p:pic>
-      <p:pic>
-        <p:nvPicPr>
-          <p:cNvPr id="11" name="Picture 10">
-            <a:extLst>
-              <a:ext uri="{FF2B5EF4-FFF2-40B4-BE49-F238E27FC236}">
-                <a16:creationId xmlns:a16="http://schemas.microsoft.com/office/drawing/2014/main" id="{C78FEF3B-EA1F-4C32-AF5E-680BB21F62F0}"/>
-              </a:ext>
-            </a:extLst>
-          </p:cNvPr>
-          <p:cNvPicPr>
-            <a:picLocks noChangeAspect="1"/>
-          </p:cNvPicPr>
-          <p:nvPr/>
-        </p:nvPicPr>
-        <p:blipFill>
-          <a:blip r:embed="rId6"/>
-          <a:stretch>
-            <a:fillRect/>
-          </a:stretch>
-        </p:blipFill>
-        <p:spPr>
-          <a:xfrm>
-            <a:off x="7867487" y="4034565"/>
-            <a:ext cx="2917212" cy="2743250"/>
-          </a:xfrm>
-          <a:prstGeom prst="rect">
-            <a:avLst/>
-          </a:prstGeom>
-        </p:spPr>
-      </p:pic>
-      <p:sp>
-        <p:nvSpPr>
-          <p:cNvPr id="12" name="Arrow: Right 11">
-            <a:extLst>
-              <a:ext uri="{FF2B5EF4-FFF2-40B4-BE49-F238E27FC236}">
-                <a16:creationId xmlns:a16="http://schemas.microsoft.com/office/drawing/2014/main" id="{5BB18077-D147-4B7D-A698-7EEC31BACEFB}"/>
-              </a:ext>
-            </a:extLst>
-          </p:cNvPr>
-          <p:cNvSpPr/>
-          <p:nvPr/>
-        </p:nvSpPr>
-        <p:spPr>
-          <a:xfrm>
-            <a:off x="3666065" y="2752980"/>
-            <a:ext cx="4201422" cy="2540772"/>
-          </a:xfrm>
-          <a:prstGeom prst="rightArrow">
-            <a:avLst/>
-          </a:prstGeom>
-          <a:noFill/>
-          <a:ln w="28575"/>
-        </p:spPr>
-        <p:style>
-          <a:lnRef idx="2">
-            <a:schemeClr val="accent1">
-              <a:shade val="50000"/>
-            </a:schemeClr>
-          </a:lnRef>
-          <a:fillRef idx="1">
-            <a:schemeClr val="accent1"/>
-          </a:fillRef>
-          <a:effectRef idx="0">
-            <a:schemeClr val="accent1"/>
-          </a:effectRef>
-          <a:fontRef idx="minor">
-            <a:schemeClr val="lt1"/>
-          </a:fontRef>
-        </p:style>
-        <p:txBody>
-          <a:bodyPr rtlCol="0" anchor="ctr"/>
-          <a:lstStyle/>
-          <a:p>
-            <a:pPr algn="ctr"/>
-            <a:r>
-              <a:rPr lang="en-US" sz="2400" dirty="0">
-                <a:solidFill>
-                  <a:schemeClr val="tx1"/>
-                </a:solidFill>
-              </a:rPr>
-              <a:t>Transform pixel values to uniform distribution</a:t>
-            </a:r>
-          </a:p>
-        </p:txBody>
-      </p:sp>
-    </p:spTree>
-    <p:extLst>
-      <p:ext uri="{BB962C8B-B14F-4D97-AF65-F5344CB8AC3E}">
-        <p14:creationId xmlns:p14="http://schemas.microsoft.com/office/powerpoint/2010/main" val="2767317349"/>
-      </p:ext>
-    </p:extLst>
-  </p:cSld>
-  <p:clrMapOvr>
-    <a:masterClrMapping/>
-  </p:clrMapOvr>
-</p:sld>
-</file>
-
-<file path=ppt/slides/slide42.xml><?xml version="1.0" encoding="utf-8"?>
-<p:sld xmlns:a="http://schemas.openxmlformats.org/drawingml/2006/main" xmlns:r="http://schemas.openxmlformats.org/officeDocument/2006/relationships" xmlns:p="http://schemas.openxmlformats.org/presentationml/2006/main">
-  <p:cSld>
-    <p:spTree>
-      <p:nvGrpSpPr>
-        <p:cNvPr id="1" name=""/>
-        <p:cNvGrpSpPr/>
-        <p:nvPr/>
-      </p:nvGrpSpPr>
-      <p:grpSpPr>
-        <a:xfrm>
-          <a:off x="0" y="0"/>
-          <a:ext cx="0" cy="0"/>
-          <a:chOff x="0" y="0"/>
-          <a:chExt cx="0" cy="0"/>
-        </a:xfrm>
-      </p:grpSpPr>
-      <mc:AlternateContent xmlns:mc="http://schemas.openxmlformats.org/markup-compatibility/2006" xmlns:a14="http://schemas.microsoft.com/office/drawing/2010/main">
-        <mc:Choice Requires="a14">
+      <mc:AlternateContent xmlns:mc="http://schemas.openxmlformats.org/markup-compatibility/2006">
+        <mc:Choice xmlns:a14="http://schemas.microsoft.com/office/drawing/2010/main" Requires="a14">
           <p:sp>
             <p:nvSpPr>
               <p:cNvPr id="7" name="Content Placeholder 6"/>
@@ -32756,7 +34233,7 @@
                     <a:ea typeface="Segoe UI" panose="020B0502040204020203" pitchFamily="34" charset="0"/>
                     <a:cs typeface="Segoe UI" panose="020B0502040204020203" pitchFamily="34" charset="0"/>
                   </a:rPr>
-                  <a:t>Contrast improvement transformations</a:t>
+                  <a:t>Histogram equalization algorithm:    </a:t>
                 </a:r>
               </a:p>
               <a:p>
@@ -32765,26 +34242,7 @@
                     <a:ea typeface="Segoe UI" panose="020B0502040204020203" pitchFamily="34" charset="0"/>
                     <a:cs typeface="Segoe UI" panose="020B0502040204020203" pitchFamily="34" charset="0"/>
                   </a:rPr>
-                  <a:t>Many choices of algorithms</a:t>
-                </a:r>
-              </a:p>
-              <a:p>
-                <a:r>
-                  <a:rPr lang="en-GB" dirty="0">
-                    <a:ea typeface="Segoe UI" panose="020B0502040204020203" pitchFamily="34" charset="0"/>
-                    <a:cs typeface="Segoe UI" panose="020B0502040204020203" pitchFamily="34" charset="0"/>
-                  </a:rPr>
-                  <a:t>Histogram equalization algorithm:    </a:t>
-                </a:r>
-              </a:p>
-              <a:p>
-                <a:pPr lvl="1"/>
-                <a:r>
-                  <a:rPr lang="en-GB" dirty="0">
-                    <a:ea typeface="Segoe UI" panose="020B0502040204020203" pitchFamily="34" charset="0"/>
-                    <a:cs typeface="Segoe UI" panose="020B0502040204020203" pitchFamily="34" charset="0"/>
-                  </a:rPr>
-                  <a:t>For an </a:t>
+                  <a:t>For </a:t>
                 </a:r>
                 <a14:m>
                   <m:oMath xmlns:m="http://schemas.openxmlformats.org/officeDocument/2006/math">
@@ -32803,7 +34261,7 @@
                     <a:ea typeface="Segoe UI" panose="020B0502040204020203" pitchFamily="34" charset="0"/>
                     <a:cs typeface="Segoe UI" panose="020B0502040204020203" pitchFamily="34" charset="0"/>
                   </a:rPr>
-                  <a:t> bin histogram of a uniform distribution the probability the probability of the  pixel value being in bin </a:t>
+                  <a:t> possible pixel values with a uniform distribution the probability of the pixel value being in bin </a:t>
                 </a:r>
                 <a14:m>
                   <m:oMath xmlns:m="http://schemas.openxmlformats.org/officeDocument/2006/math">
@@ -32909,13 +34367,51 @@
                 </a:endParaRPr>
               </a:p>
               <a:p>
-                <a:pPr lvl="1"/>
                 <a:r>
                   <a:rPr lang="en-GB" dirty="0">
                     <a:ea typeface="Segoe UI" panose="020B0502040204020203" pitchFamily="34" charset="0"/>
                     <a:cs typeface="Segoe UI" panose="020B0502040204020203" pitchFamily="34" charset="0"/>
                   </a:rPr>
-                  <a:t> And the cumulative distribution function is:   </a:t>
+                  <a:t> The cumulative distribution function of the value ,</a:t>
+                </a:r>
+                <a14:m>
+                  <m:oMath xmlns:m="http://schemas.openxmlformats.org/officeDocument/2006/math">
+                    <m:sSub>
+                      <m:sSubPr>
+                        <m:ctrlPr>
+                          <a:rPr lang="en-GB" i="1" smtClean="0">
+                            <a:latin typeface="Cambria Math" panose="02040503050406030204" pitchFamily="18" charset="0"/>
+                            <a:cs typeface="Segoe UI" panose="020B0502040204020203" pitchFamily="34" charset="0"/>
+                          </a:rPr>
+                        </m:ctrlPr>
+                      </m:sSubPr>
+                      <m:e>
+                        <m:r>
+                          <a:rPr lang="en-US" b="0" i="1" smtClean="0">
+                            <a:latin typeface="Cambria Math" panose="02040503050406030204" pitchFamily="18" charset="0"/>
+                            <a:cs typeface="Segoe UI" panose="020B0502040204020203" pitchFamily="34" charset="0"/>
+                          </a:rPr>
+                          <m:t>𝑥</m:t>
+                        </m:r>
+                      </m:e>
+                      <m:sub>
+                        <m:r>
+                          <a:rPr lang="en-US" b="0" i="1" smtClean="0">
+                            <a:latin typeface="Cambria Math" panose="02040503050406030204" pitchFamily="18" charset="0"/>
+                            <a:cs typeface="Segoe UI" panose="020B0502040204020203" pitchFamily="34" charset="0"/>
+                          </a:rPr>
+                          <m:t>𝑖</m:t>
+                        </m:r>
+                      </m:sub>
+                    </m:sSub>
+                  </m:oMath>
+                </a14:m>
+                <a:r>
+                  <a:rPr lang="en-GB" dirty="0">
+                    <a:ea typeface="Segoe UI" panose="020B0502040204020203" pitchFamily="34" charset="0"/>
+                    <a:cs typeface="Segoe UI" panose="020B0502040204020203" pitchFamily="34" charset="0"/>
+                  </a:rPr>
+                  <a:t>:   </a:t>
                 </a:r>
               </a:p>
               <a:p>
@@ -32977,14 +34473,18 @@
                         </m:naryPr>
                         <m:sub>
                           <m:r>
-                            <m:rPr>
-                              <m:brk m:alnAt="23"/>
-                            </m:rPr>
                             <a:rPr lang="en-US" b="0" i="1" smtClean="0">
                               <a:latin typeface="Cambria Math" panose="02040503050406030204" pitchFamily="18" charset="0"/>
                               <a:cs typeface="Segoe UI" panose="020B0502040204020203" pitchFamily="34" charset="0"/>
                             </a:rPr>
-                            <m:t>0</m:t>
+                            <m:t>𝑖</m:t>
+                          </m:r>
+                          <m:r>
+                            <a:rPr lang="en-US" b="0" i="1" smtClean="0">
+                              <a:latin typeface="Cambria Math" panose="02040503050406030204" pitchFamily="18" charset="0"/>
+                              <a:cs typeface="Segoe UI" panose="020B0502040204020203" pitchFamily="34" charset="0"/>
+                            </a:rPr>
+                            <m:t>=0</m:t>
                           </m:r>
                         </m:sub>
                         <m:sup>
@@ -32993,7 +34493,14 @@
                               <a:latin typeface="Cambria Math" panose="02040503050406030204" pitchFamily="18" charset="0"/>
                               <a:cs typeface="Segoe UI" panose="020B0502040204020203" pitchFamily="34" charset="0"/>
                             </a:rPr>
-                            <m:t>𝑖</m:t>
+                            <m:t>𝑛</m:t>
+                          </m:r>
+                          <m:r>
+                            <a:rPr lang="en-US" b="0" i="1" smtClean="0">
+                              <a:latin typeface="Cambria Math" panose="02040503050406030204" pitchFamily="18" charset="0"/>
+                              <a:cs typeface="Segoe UI" panose="020B0502040204020203" pitchFamily="34" charset="0"/>
+                            </a:rPr>
+                            <m:t>−1</m:t>
                           </m:r>
                         </m:sup>
                         <m:e>
@@ -33016,13 +34523,34 @@
                               </m:r>
                             </m:num>
                             <m:den>
-                              <m:r>
-                                <a:rPr lang="en-US" b="0" i="1" smtClean="0">
-                                  <a:latin typeface="Cambria Math" panose="02040503050406030204" pitchFamily="18" charset="0"/>
-                                  <a:cs typeface="Segoe UI" panose="020B0502040204020203" pitchFamily="34" charset="0"/>
-                                </a:rPr>
-                                <m:t>𝑛</m:t>
-                              </m:r>
+                              <m:sSub>
+                                <m:sSubPr>
+                                  <m:ctrlPr>
+                                    <a:rPr lang="en-US" b="0" i="1" smtClean="0">
+                                      <a:latin typeface="Cambria Math" panose="02040503050406030204" pitchFamily="18" charset="0"/>
+                                      <a:cs typeface="Segoe UI" panose="020B0502040204020203" pitchFamily="34" charset="0"/>
+                                    </a:rPr>
+                                  </m:ctrlPr>
+                                </m:sSubPr>
+                                <m:e>
+                                  <m:r>
+                                    <a:rPr lang="en-US" b="0" i="1" smtClean="0">
+                                      <a:latin typeface="Cambria Math" panose="02040503050406030204" pitchFamily="18" charset="0"/>
+                                      <a:cs typeface="Segoe UI" panose="020B0502040204020203" pitchFamily="34" charset="0"/>
+                                    </a:rPr>
+                                    <m:t>𝑥</m:t>
+                                  </m:r>
+                                </m:e>
+                                <m:sub>
+                                  <m:r>
+                                    <a:rPr lang="en-US" b="0" i="1" smtClean="0">
+                                      <a:latin typeface="Cambria Math" panose="02040503050406030204" pitchFamily="18" charset="0"/>
+                                      <a:cs typeface="Segoe UI" panose="020B0502040204020203" pitchFamily="34" charset="0"/>
+                                    </a:rPr>
+                                    <m:t>𝑖</m:t>
+                                  </m:r>
+                                </m:sub>
+                              </m:sSub>
                             </m:den>
                           </m:f>
                         </m:e>
@@ -33036,7 +34564,6 @@
                 </a:endParaRPr>
               </a:p>
               <a:p>
-                <a:pPr lvl="1"/>
                 <a:r>
                   <a:rPr lang="en-GB" dirty="0">
                     <a:ea typeface="Segoe UI" panose="020B0502040204020203" pitchFamily="34" charset="0"/>
@@ -33048,7 +34575,7 @@
             </p:txBody>
           </p:sp>
         </mc:Choice>
-        <mc:Fallback xmlns="">
+        <mc:Fallback>
           <p:sp>
             <p:nvSpPr>
               <p:cNvPr id="7" name="Content Placeholder 6"/>
@@ -33067,7 +34594,7 @@
               <a:blipFill>
                 <a:blip r:embed="rId3"/>
                 <a:stretch>
-                  <a:fillRect l="-1058" t="-2086" r="-423"/>
+                  <a:fillRect l="-1058" t="-2086"/>
                 </a:stretch>
               </a:blipFill>
             </p:spPr>
@@ -33131,350 +34658,10 @@
   <p:clrMapOvr>
     <a:masterClrMapping/>
   </p:clrMapOvr>
-  <p:timing>
-    <p:tnLst>
-      <p:par>
-        <p:cTn id="1" dur="indefinite" restart="never" nodeType="tmRoot">
-          <p:childTnLst>
-            <p:seq concurrent="1" nextAc="seek">
-              <p:cTn id="2" dur="indefinite" nodeType="mainSeq">
-                <p:childTnLst>
-                  <p:par>
-                    <p:cTn id="3" fill="hold">
-                      <p:stCondLst>
-                        <p:cond delay="indefinite"/>
-                      </p:stCondLst>
-                      <p:childTnLst>
-                        <p:par>
-                          <p:cTn id="4" fill="hold">
-                            <p:stCondLst>
-                              <p:cond delay="0"/>
-                            </p:stCondLst>
-                            <p:childTnLst>
-                              <p:par>
-                                <p:cTn id="5" presetID="1" presetClass="entr" presetSubtype="0" fill="hold" grpId="0" nodeType="clickEffect">
-                                  <p:stCondLst>
-                                    <p:cond delay="0"/>
-                                  </p:stCondLst>
-                                  <p:childTnLst>
-                                    <p:set>
-                                      <p:cBhvr>
-                                        <p:cTn id="6" dur="1" fill="hold">
-                                          <p:stCondLst>
-                                            <p:cond delay="0"/>
-                                          </p:stCondLst>
-                                        </p:cTn>
-                                        <p:tgtEl>
-                                          <p:spTgt spid="7">
-                                            <p:txEl>
-                                              <p:pRg st="1" end="1"/>
-                                            </p:txEl>
-                                          </p:spTgt>
-                                        </p:tgtEl>
-                                        <p:attrNameLst>
-                                          <p:attrName>style.visibility</p:attrName>
-                                        </p:attrNameLst>
-                                      </p:cBhvr>
-                                      <p:to>
-                                        <p:strVal val="visible"/>
-                                      </p:to>
-                                    </p:set>
-                                  </p:childTnLst>
-                                </p:cTn>
-                              </p:par>
-                            </p:childTnLst>
-                          </p:cTn>
-                        </p:par>
-                      </p:childTnLst>
-                    </p:cTn>
-                  </p:par>
-                  <p:par>
-                    <p:cTn id="7" fill="hold">
-                      <p:stCondLst>
-                        <p:cond delay="indefinite"/>
-                      </p:stCondLst>
-                      <p:childTnLst>
-                        <p:par>
-                          <p:cTn id="8" fill="hold">
-                            <p:stCondLst>
-                              <p:cond delay="0"/>
-                            </p:stCondLst>
-                            <p:childTnLst>
-                              <p:par>
-                                <p:cTn id="9" presetID="1" presetClass="entr" presetSubtype="0" fill="hold" grpId="0" nodeType="clickEffect">
-                                  <p:stCondLst>
-                                    <p:cond delay="0"/>
-                                  </p:stCondLst>
-                                  <p:childTnLst>
-                                    <p:set>
-                                      <p:cBhvr>
-                                        <p:cTn id="10" dur="1" fill="hold">
-                                          <p:stCondLst>
-                                            <p:cond delay="0"/>
-                                          </p:stCondLst>
-                                        </p:cTn>
-                                        <p:tgtEl>
-                                          <p:spTgt spid="7">
-                                            <p:txEl>
-                                              <p:pRg st="2" end="2"/>
-                                            </p:txEl>
-                                          </p:spTgt>
-                                        </p:tgtEl>
-                                        <p:attrNameLst>
-                                          <p:attrName>style.visibility</p:attrName>
-                                        </p:attrNameLst>
-                                      </p:cBhvr>
-                                      <p:to>
-                                        <p:strVal val="visible"/>
-                                      </p:to>
-                                    </p:set>
-                                  </p:childTnLst>
-                                </p:cTn>
-                              </p:par>
-                            </p:childTnLst>
-                          </p:cTn>
-                        </p:par>
-                      </p:childTnLst>
-                    </p:cTn>
-                  </p:par>
-                  <p:par>
-                    <p:cTn id="11" fill="hold">
-                      <p:stCondLst>
-                        <p:cond delay="indefinite"/>
-                      </p:stCondLst>
-                      <p:childTnLst>
-                        <p:par>
-                          <p:cTn id="12" fill="hold">
-                            <p:stCondLst>
-                              <p:cond delay="0"/>
-                            </p:stCondLst>
-                            <p:childTnLst>
-                              <p:par>
-                                <p:cTn id="13" presetID="1" presetClass="entr" presetSubtype="0" fill="hold" grpId="0" nodeType="clickEffect">
-                                  <p:stCondLst>
-                                    <p:cond delay="0"/>
-                                  </p:stCondLst>
-                                  <p:childTnLst>
-                                    <p:set>
-                                      <p:cBhvr>
-                                        <p:cTn id="14" dur="1" fill="hold">
-                                          <p:stCondLst>
-                                            <p:cond delay="0"/>
-                                          </p:stCondLst>
-                                        </p:cTn>
-                                        <p:tgtEl>
-                                          <p:spTgt spid="7">
-                                            <p:txEl>
-                                              <p:pRg st="3" end="3"/>
-                                            </p:txEl>
-                                          </p:spTgt>
-                                        </p:tgtEl>
-                                        <p:attrNameLst>
-                                          <p:attrName>style.visibility</p:attrName>
-                                        </p:attrNameLst>
-                                      </p:cBhvr>
-                                      <p:to>
-                                        <p:strVal val="visible"/>
-                                      </p:to>
-                                    </p:set>
-                                  </p:childTnLst>
-                                </p:cTn>
-                              </p:par>
-                              <p:par>
-                                <p:cTn id="15" presetID="1" presetClass="entr" presetSubtype="0" fill="hold" grpId="0" nodeType="withEffect">
-                                  <p:stCondLst>
-                                    <p:cond delay="0"/>
-                                  </p:stCondLst>
-                                  <p:childTnLst>
-                                    <p:set>
-                                      <p:cBhvr>
-                                        <p:cTn id="16" dur="1" fill="hold">
-                                          <p:stCondLst>
-                                            <p:cond delay="0"/>
-                                          </p:stCondLst>
-                                        </p:cTn>
-                                        <p:tgtEl>
-                                          <p:spTgt spid="7">
-                                            <p:txEl>
-                                              <p:pRg st="4" end="4"/>
-                                            </p:txEl>
-                                          </p:spTgt>
-                                        </p:tgtEl>
-                                        <p:attrNameLst>
-                                          <p:attrName>style.visibility</p:attrName>
-                                        </p:attrNameLst>
-                                      </p:cBhvr>
-                                      <p:to>
-                                        <p:strVal val="visible"/>
-                                      </p:to>
-                                    </p:set>
-                                  </p:childTnLst>
-                                </p:cTn>
-                              </p:par>
-                            </p:childTnLst>
-                          </p:cTn>
-                        </p:par>
-                      </p:childTnLst>
-                    </p:cTn>
-                  </p:par>
-                  <p:par>
-                    <p:cTn id="17" fill="hold">
-                      <p:stCondLst>
-                        <p:cond delay="indefinite"/>
-                      </p:stCondLst>
-                      <p:childTnLst>
-                        <p:par>
-                          <p:cTn id="18" fill="hold">
-                            <p:stCondLst>
-                              <p:cond delay="0"/>
-                            </p:stCondLst>
-                            <p:childTnLst>
-                              <p:par>
-                                <p:cTn id="19" presetID="1" presetClass="entr" presetSubtype="0" fill="hold" grpId="0" nodeType="clickEffect">
-                                  <p:stCondLst>
-                                    <p:cond delay="0"/>
-                                  </p:stCondLst>
-                                  <p:childTnLst>
-                                    <p:set>
-                                      <p:cBhvr>
-                                        <p:cTn id="20" dur="1" fill="hold">
-                                          <p:stCondLst>
-                                            <p:cond delay="0"/>
-                                          </p:stCondLst>
-                                        </p:cTn>
-                                        <p:tgtEl>
-                                          <p:spTgt spid="7">
-                                            <p:txEl>
-                                              <p:pRg st="5" end="5"/>
-                                            </p:txEl>
-                                          </p:spTgt>
-                                        </p:tgtEl>
-                                        <p:attrNameLst>
-                                          <p:attrName>style.visibility</p:attrName>
-                                        </p:attrNameLst>
-                                      </p:cBhvr>
-                                      <p:to>
-                                        <p:strVal val="visible"/>
-                                      </p:to>
-                                    </p:set>
-                                  </p:childTnLst>
-                                </p:cTn>
-                              </p:par>
-                              <p:par>
-                                <p:cTn id="21" presetID="1" presetClass="entr" presetSubtype="0" fill="hold" grpId="0" nodeType="withEffect">
-                                  <p:stCondLst>
-                                    <p:cond delay="0"/>
-                                  </p:stCondLst>
-                                  <p:childTnLst>
-                                    <p:set>
-                                      <p:cBhvr>
-                                        <p:cTn id="22" dur="1" fill="hold">
-                                          <p:stCondLst>
-                                            <p:cond delay="0"/>
-                                          </p:stCondLst>
-                                        </p:cTn>
-                                        <p:tgtEl>
-                                          <p:spTgt spid="7">
-                                            <p:txEl>
-                                              <p:pRg st="6" end="6"/>
-                                            </p:txEl>
-                                          </p:spTgt>
-                                        </p:tgtEl>
-                                        <p:attrNameLst>
-                                          <p:attrName>style.visibility</p:attrName>
-                                        </p:attrNameLst>
-                                      </p:cBhvr>
-                                      <p:to>
-                                        <p:strVal val="visible"/>
-                                      </p:to>
-                                    </p:set>
-                                  </p:childTnLst>
-                                </p:cTn>
-                              </p:par>
-                            </p:childTnLst>
-                          </p:cTn>
-                        </p:par>
-                      </p:childTnLst>
-                    </p:cTn>
-                  </p:par>
-                  <p:par>
-                    <p:cTn id="23" fill="hold">
-                      <p:stCondLst>
-                        <p:cond delay="indefinite"/>
-                      </p:stCondLst>
-                      <p:childTnLst>
-                        <p:par>
-                          <p:cTn id="24" fill="hold">
-                            <p:stCondLst>
-                              <p:cond delay="0"/>
-                            </p:stCondLst>
-                            <p:childTnLst>
-                              <p:par>
-                                <p:cTn id="25" presetID="1" presetClass="entr" presetSubtype="0" fill="hold" grpId="0" nodeType="clickEffect">
-                                  <p:stCondLst>
-                                    <p:cond delay="0"/>
-                                  </p:stCondLst>
-                                  <p:childTnLst>
-                                    <p:set>
-                                      <p:cBhvr>
-                                        <p:cTn id="26" dur="1" fill="hold">
-                                          <p:stCondLst>
-                                            <p:cond delay="0"/>
-                                          </p:stCondLst>
-                                        </p:cTn>
-                                        <p:tgtEl>
-                                          <p:spTgt spid="7">
-                                            <p:txEl>
-                                              <p:pRg st="7" end="7"/>
-                                            </p:txEl>
-                                          </p:spTgt>
-                                        </p:tgtEl>
-                                        <p:attrNameLst>
-                                          <p:attrName>style.visibility</p:attrName>
-                                        </p:attrNameLst>
-                                      </p:cBhvr>
-                                      <p:to>
-                                        <p:strVal val="visible"/>
-                                      </p:to>
-                                    </p:set>
-                                  </p:childTnLst>
-                                </p:cTn>
-                              </p:par>
-                            </p:childTnLst>
-                          </p:cTn>
-                        </p:par>
-                      </p:childTnLst>
-                    </p:cTn>
-                  </p:par>
-                </p:childTnLst>
-              </p:cTn>
-              <p:prevCondLst>
-                <p:cond evt="onPrev" delay="0">
-                  <p:tgtEl>
-                    <p:sldTgt/>
-                  </p:tgtEl>
-                </p:cond>
-              </p:prevCondLst>
-              <p:nextCondLst>
-                <p:cond evt="onNext" delay="0">
-                  <p:tgtEl>
-                    <p:sldTgt/>
-                  </p:tgtEl>
-                </p:cond>
-              </p:nextCondLst>
-            </p:seq>
-          </p:childTnLst>
-        </p:cTn>
-      </p:par>
-    </p:tnLst>
-    <p:bldLst>
-      <p:bldP spid="7" grpId="0" uiExpand="1" build="p"/>
-    </p:bldLst>
-  </p:timing>
 </p:sld>
 </file>
 
-<file path=ppt/slides/slide43.xml><?xml version="1.0" encoding="utf-8"?>
+<file path=ppt/slides/slide45.xml><?xml version="1.0" encoding="utf-8"?>
 <p:sld xmlns:a="http://schemas.openxmlformats.org/drawingml/2006/main" xmlns:r="http://schemas.openxmlformats.org/officeDocument/2006/relationships" xmlns:p="http://schemas.openxmlformats.org/presentationml/2006/main">
   <p:cSld>
     <p:spTree>
@@ -33516,15 +34703,6 @@
             <a:pPr marL="0" indent="0">
               <a:buNone/>
             </a:pPr>
-            <a:r>
-              <a:rPr lang="en-GB" dirty="0">
-                <a:ea typeface="Segoe UI" panose="020B0502040204020203" pitchFamily="34" charset="0"/>
-                <a:cs typeface="Segoe UI" panose="020B0502040204020203" pitchFamily="34" charset="0"/>
-              </a:rPr>
-              <a:t>Contrast improvement transformations</a:t>
-            </a:r>
-          </a:p>
-          <a:p>
             <a:r>
               <a:rPr lang="en-GB" dirty="0">
                 <a:ea typeface="Segoe UI" panose="020B0502040204020203" pitchFamily="34" charset="0"/>
@@ -33730,33 +34908,15 @@
                                   </p:childTnLst>
                                 </p:cTn>
                               </p:par>
-                            </p:childTnLst>
-                          </p:cTn>
-                        </p:par>
-                      </p:childTnLst>
-                    </p:cTn>
-                  </p:par>
-                  <p:par>
-                    <p:cTn id="7" fill="hold">
-                      <p:stCondLst>
-                        <p:cond delay="indefinite"/>
-                      </p:stCondLst>
-                      <p:childTnLst>
-                        <p:par>
-                          <p:cTn id="8" fill="hold">
-                            <p:stCondLst>
-                              <p:cond delay="0"/>
-                            </p:stCondLst>
-                            <p:childTnLst>
                               <p:par>
-                                <p:cTn id="9" presetID="1" presetClass="entr" presetSubtype="0" fill="hold" grpId="0" nodeType="clickEffect">
+                                <p:cTn id="7" presetID="1" presetClass="entr" presetSubtype="0" fill="hold" grpId="0" nodeType="withEffect">
                                   <p:stCondLst>
                                     <p:cond delay="0"/>
                                   </p:stCondLst>
                                   <p:childTnLst>
                                     <p:set>
                                       <p:cBhvr>
-                                        <p:cTn id="10" dur="1" fill="hold">
+                                        <p:cTn id="8" dur="1" fill="hold">
                                           <p:stCondLst>
                                             <p:cond delay="0"/>
                                           </p:stCondLst>
@@ -33780,14 +34940,14 @@
                                 </p:cTn>
                               </p:par>
                               <p:par>
-                                <p:cTn id="11" presetID="1" presetClass="entr" presetSubtype="0" fill="hold" grpId="0" nodeType="withEffect">
+                                <p:cTn id="9" presetID="1" presetClass="entr" presetSubtype="0" fill="hold" grpId="0" nodeType="withEffect">
                                   <p:stCondLst>
                                     <p:cond delay="0"/>
                                   </p:stCondLst>
                                   <p:childTnLst>
                                     <p:set>
                                       <p:cBhvr>
-                                        <p:cTn id="12" dur="1" fill="hold">
+                                        <p:cTn id="10" dur="1" fill="hold">
                                           <p:stCondLst>
                                             <p:cond delay="0"/>
                                           </p:stCondLst>
@@ -33810,8 +34970,26 @@
                                   </p:childTnLst>
                                 </p:cTn>
                               </p:par>
+                            </p:childTnLst>
+                          </p:cTn>
+                        </p:par>
+                      </p:childTnLst>
+                    </p:cTn>
+                  </p:par>
+                  <p:par>
+                    <p:cTn id="11" fill="hold">
+                      <p:stCondLst>
+                        <p:cond delay="indefinite"/>
+                      </p:stCondLst>
+                      <p:childTnLst>
+                        <p:par>
+                          <p:cTn id="12" fill="hold">
+                            <p:stCondLst>
+                              <p:cond delay="0"/>
+                            </p:stCondLst>
+                            <p:childTnLst>
                               <p:par>
-                                <p:cTn id="13" presetID="1" presetClass="entr" presetSubtype="0" fill="hold" grpId="0" nodeType="withEffect">
+                                <p:cTn id="13" presetID="1" presetClass="entr" presetSubtype="0" fill="hold" grpId="0" nodeType="clickEffect">
                                   <p:stCondLst>
                                     <p:cond delay="0"/>
                                   </p:stCondLst>
@@ -33841,33 +35019,15 @@
                                   </p:childTnLst>
                                 </p:cTn>
                               </p:par>
-                            </p:childTnLst>
-                          </p:cTn>
-                        </p:par>
-                      </p:childTnLst>
-                    </p:cTn>
-                  </p:par>
-                  <p:par>
-                    <p:cTn id="15" fill="hold">
-                      <p:stCondLst>
-                        <p:cond delay="indefinite"/>
-                      </p:stCondLst>
-                      <p:childTnLst>
-                        <p:par>
-                          <p:cTn id="16" fill="hold">
-                            <p:stCondLst>
-                              <p:cond delay="0"/>
-                            </p:stCondLst>
-                            <p:childTnLst>
                               <p:par>
-                                <p:cTn id="17" presetID="1" presetClass="entr" presetSubtype="0" fill="hold" grpId="0" nodeType="clickEffect">
+                                <p:cTn id="15" presetID="1" presetClass="entr" presetSubtype="0" fill="hold" grpId="0" nodeType="withEffect">
                                   <p:stCondLst>
                                     <p:cond delay="0"/>
                                   </p:stCondLst>
                                   <p:childTnLst>
                                     <p:set>
                                       <p:cBhvr>
-                                        <p:cTn id="18" dur="1" fill="hold">
+                                        <p:cTn id="16" dur="1" fill="hold">
                                           <p:stCondLst>
                                             <p:cond delay="0"/>
                                           </p:stCondLst>
@@ -33891,14 +35051,14 @@
                                 </p:cTn>
                               </p:par>
                               <p:par>
-                                <p:cTn id="19" presetID="1" presetClass="entr" presetSubtype="0" fill="hold" grpId="0" nodeType="withEffect">
+                                <p:cTn id="17" presetID="1" presetClass="entr" presetSubtype="0" fill="hold" grpId="0" nodeType="withEffect">
                                   <p:stCondLst>
                                     <p:cond delay="0"/>
                                   </p:stCondLst>
                                   <p:childTnLst>
                                     <p:set>
                                       <p:cBhvr>
-                                        <p:cTn id="20" dur="1" fill="hold">
+                                        <p:cTn id="18" dur="1" fill="hold">
                                           <p:stCondLst>
                                             <p:cond delay="0"/>
                                           </p:stCondLst>
@@ -33921,8 +35081,26 @@
                                   </p:childTnLst>
                                 </p:cTn>
                               </p:par>
+                            </p:childTnLst>
+                          </p:cTn>
+                        </p:par>
+                      </p:childTnLst>
+                    </p:cTn>
+                  </p:par>
+                  <p:par>
+                    <p:cTn id="19" fill="hold">
+                      <p:stCondLst>
+                        <p:cond delay="indefinite"/>
+                      </p:stCondLst>
+                      <p:childTnLst>
+                        <p:par>
+                          <p:cTn id="20" fill="hold">
+                            <p:stCondLst>
+                              <p:cond delay="0"/>
+                            </p:stCondLst>
+                            <p:childTnLst>
                               <p:par>
-                                <p:cTn id="21" presetID="1" presetClass="entr" presetSubtype="0" fill="hold" grpId="0" nodeType="withEffect">
+                                <p:cTn id="21" presetID="1" presetClass="entr" presetSubtype="0" fill="hold" grpId="0" nodeType="clickEffect">
                                   <p:stCondLst>
                                     <p:cond delay="0"/>
                                   </p:stCondLst>
@@ -33938,55 +35116,6 @@
                                           <p:spTgt spid="7">
                                             <p:txEl>
                                               <p:pRg st="7" end="7"/>
-                                            </p:txEl>
-                                          </p:spTgt>
-                                        </p:tgtEl>
-                                        <p:attrNameLst>
-                                          <p:attrName>style.visibility</p:attrName>
-                                        </p:attrNameLst>
-                                      </p:cBhvr>
-                                      <p:to>
-                                        <p:strVal val="visible"/>
-                                      </p:to>
-                                    </p:set>
-                                  </p:childTnLst>
-                                </p:cTn>
-                              </p:par>
-                            </p:childTnLst>
-                          </p:cTn>
-                        </p:par>
-                      </p:childTnLst>
-                    </p:cTn>
-                  </p:par>
-                  <p:par>
-                    <p:cTn id="23" fill="hold">
-                      <p:stCondLst>
-                        <p:cond delay="indefinite"/>
-                      </p:stCondLst>
-                      <p:childTnLst>
-                        <p:par>
-                          <p:cTn id="24" fill="hold">
-                            <p:stCondLst>
-                              <p:cond delay="0"/>
-                            </p:stCondLst>
-                            <p:childTnLst>
-                              <p:par>
-                                <p:cTn id="25" presetID="1" presetClass="entr" presetSubtype="0" fill="hold" grpId="0" nodeType="clickEffect">
-                                  <p:stCondLst>
-                                    <p:cond delay="0"/>
-                                  </p:stCondLst>
-                                  <p:childTnLst>
-                                    <p:set>
-                                      <p:cBhvr>
-                                        <p:cTn id="26" dur="1" fill="hold">
-                                          <p:stCondLst>
-                                            <p:cond delay="0"/>
-                                          </p:stCondLst>
-                                        </p:cTn>
-                                        <p:tgtEl>
-                                          <p:spTgt spid="7">
-                                            <p:txEl>
-                                              <p:pRg st="8" end="8"/>
                                             </p:txEl>
                                           </p:spTgt>
                                         </p:tgtEl>
@@ -34035,7 +35164,1280 @@
 </p:sld>
 </file>
 
-<file path=ppt/slides/slide44.xml><?xml version="1.0" encoding="utf-8"?>
+<file path=ppt/slides/slide46.xml><?xml version="1.0" encoding="utf-8"?>
+<p:sld xmlns:a="http://schemas.openxmlformats.org/drawingml/2006/main" xmlns:r="http://schemas.openxmlformats.org/officeDocument/2006/relationships" xmlns:p="http://schemas.openxmlformats.org/presentationml/2006/main">
+  <p:cSld>
+    <p:spTree>
+      <p:nvGrpSpPr>
+        <p:cNvPr id="1" name=""/>
+        <p:cNvGrpSpPr/>
+        <p:nvPr/>
+      </p:nvGrpSpPr>
+      <p:grpSpPr>
+        <a:xfrm>
+          <a:off x="0" y="0"/>
+          <a:ext cx="0" cy="0"/>
+          <a:chOff x="0" y="0"/>
+          <a:chExt cx="0" cy="0"/>
+        </a:xfrm>
+      </p:grpSpPr>
+      <mc:AlternateContent xmlns:mc="http://schemas.openxmlformats.org/markup-compatibility/2006">
+        <mc:Choice xmlns:a14="http://schemas.microsoft.com/office/drawing/2010/main" Requires="a14">
+          <p:sp>
+            <p:nvSpPr>
+              <p:cNvPr id="7" name="Content Placeholder 6"/>
+              <p:cNvSpPr>
+                <a:spLocks noGrp="1"/>
+              </p:cNvSpPr>
+              <p:nvPr>
+                <p:ph sz="quarter" idx="10"/>
+              </p:nvPr>
+            </p:nvSpPr>
+            <p:spPr>
+              <a:xfrm>
+                <a:off x="378594" y="1399631"/>
+                <a:ext cx="11525250" cy="4972369"/>
+              </a:xfrm>
+            </p:spPr>
+            <p:txBody>
+              <a:bodyPr>
+                <a:normAutofit/>
+              </a:bodyPr>
+              <a:lstStyle/>
+              <a:p>
+                <a:pPr marL="0" indent="0">
+                  <a:buNone/>
+                </a:pPr>
+                <a:r>
+                  <a:rPr lang="en-GB" b="1" dirty="0">
+                    <a:ea typeface="Segoe UI" panose="020B0502040204020203" pitchFamily="34" charset="0"/>
+                    <a:cs typeface="Segoe UI" panose="020B0502040204020203" pitchFamily="34" charset="0"/>
+                    <a:hlinkClick r:id="rId3"/>
+                  </a:rPr>
+                  <a:t>Gamma correction</a:t>
+                </a:r>
+                <a:r>
+                  <a:rPr lang="en-GB" dirty="0">
+                    <a:ea typeface="Segoe UI" panose="020B0502040204020203" pitchFamily="34" charset="0"/>
+                    <a:cs typeface="Segoe UI" panose="020B0502040204020203" pitchFamily="34" charset="0"/>
+                    <a:hlinkClick r:id="rId3"/>
+                  </a:rPr>
+                  <a:t>   </a:t>
+                </a:r>
+                <a:endParaRPr lang="en-GB" dirty="0">
+                  <a:ea typeface="Segoe UI" panose="020B0502040204020203" pitchFamily="34" charset="0"/>
+                  <a:cs typeface="Segoe UI" panose="020B0502040204020203" pitchFamily="34" charset="0"/>
+                </a:endParaRPr>
+              </a:p>
+              <a:p>
+                <a:r>
+                  <a:rPr lang="en-GB" dirty="0">
+                    <a:ea typeface="Segoe UI" panose="020B0502040204020203" pitchFamily="34" charset="0"/>
+                    <a:cs typeface="Segoe UI" panose="020B0502040204020203" pitchFamily="34" charset="0"/>
+                  </a:rPr>
+                  <a:t>Gamma correction shift the mode of the histogram of pixel values    </a:t>
+                </a:r>
+              </a:p>
+              <a:p>
+                <a:r>
+                  <a:rPr lang="en-GB" dirty="0">
+                    <a:ea typeface="Segoe UI" panose="020B0502040204020203" pitchFamily="34" charset="0"/>
+                    <a:cs typeface="Segoe UI" panose="020B0502040204020203" pitchFamily="34" charset="0"/>
+                  </a:rPr>
+                  <a:t>For pixel value, </a:t>
+                </a:r>
+                <a14:m>
+                  <m:oMath xmlns:m="http://schemas.openxmlformats.org/officeDocument/2006/math">
+                    <m:sSub>
+                      <m:sSubPr>
+                        <m:ctrlPr>
+                          <a:rPr lang="en-GB" i="1" smtClean="0">
+                            <a:latin typeface="Cambria Math" panose="02040503050406030204" pitchFamily="18" charset="0"/>
+                            <a:cs typeface="Segoe UI" panose="020B0502040204020203" pitchFamily="34" charset="0"/>
+                          </a:rPr>
+                        </m:ctrlPr>
+                      </m:sSubPr>
+                      <m:e>
+                        <m:r>
+                          <a:rPr lang="en-US" b="0" i="1" smtClean="0">
+                            <a:latin typeface="Cambria Math" panose="02040503050406030204" pitchFamily="18" charset="0"/>
+                            <a:cs typeface="Segoe UI" panose="020B0502040204020203" pitchFamily="34" charset="0"/>
+                          </a:rPr>
+                          <m:t>𝑥</m:t>
+                        </m:r>
+                      </m:e>
+                      <m:sub>
+                        <m:r>
+                          <a:rPr lang="en-US" b="0" i="1" smtClean="0">
+                            <a:latin typeface="Cambria Math" panose="02040503050406030204" pitchFamily="18" charset="0"/>
+                            <a:cs typeface="Segoe UI" panose="020B0502040204020203" pitchFamily="34" charset="0"/>
+                          </a:rPr>
+                          <m:t>𝑖</m:t>
+                        </m:r>
+                      </m:sub>
+                    </m:sSub>
+                  </m:oMath>
+                </a14:m>
+                <a:r>
+                  <a:rPr lang="en-GB" dirty="0">
+                    <a:ea typeface="Segoe UI" panose="020B0502040204020203" pitchFamily="34" charset="0"/>
+                    <a:cs typeface="Segoe UI" panose="020B0502040204020203" pitchFamily="34" charset="0"/>
+                  </a:rPr>
+                  <a:t>, gamma correction, with parameter </a:t>
+                </a:r>
+                <a:r>
+                  <a:rPr lang="en-GB" dirty="0">
+                    <a:latin typeface="Symbol" panose="05050102010706020507" pitchFamily="18" charset="2"/>
+                    <a:ea typeface="Segoe UI" panose="020B0502040204020203" pitchFamily="34" charset="0"/>
+                    <a:cs typeface="Segoe UI" panose="020B0502040204020203" pitchFamily="34" charset="0"/>
+                  </a:rPr>
+                  <a:t>g</a:t>
+                </a:r>
+                <a:r>
+                  <a:rPr lang="en-GB" dirty="0">
+                    <a:ea typeface="Segoe UI" panose="020B0502040204020203" pitchFamily="34" charset="0"/>
+                    <a:cs typeface="Segoe UI" panose="020B0502040204020203" pitchFamily="34" charset="0"/>
+                  </a:rPr>
+                  <a:t>, defined:   </a:t>
+                </a:r>
+              </a:p>
+              <a:p>
+                <a:pPr marL="0" indent="0">
+                  <a:buNone/>
+                </a:pPr>
+                <a14:m>
+                  <m:oMathPara xmlns:m="http://schemas.openxmlformats.org/officeDocument/2006/math">
+                    <m:oMathParaPr>
+                      <m:jc m:val="centerGroup"/>
+                    </m:oMathParaPr>
+                    <m:oMath xmlns:m="http://schemas.openxmlformats.org/officeDocument/2006/math">
+                      <m:sSub>
+                        <m:sSubPr>
+                          <m:ctrlPr>
+                            <a:rPr lang="en-GB" i="1" smtClean="0">
+                              <a:latin typeface="Cambria Math" panose="02040503050406030204" pitchFamily="18" charset="0"/>
+                              <a:cs typeface="Segoe UI" panose="020B0502040204020203" pitchFamily="34" charset="0"/>
+                            </a:rPr>
+                          </m:ctrlPr>
+                        </m:sSubPr>
+                        <m:e>
+                          <m:r>
+                            <a:rPr lang="en-US" b="0" i="1" smtClean="0">
+                              <a:latin typeface="Cambria Math" panose="02040503050406030204" pitchFamily="18" charset="0"/>
+                              <a:cs typeface="Segoe UI" panose="020B0502040204020203" pitchFamily="34" charset="0"/>
+                            </a:rPr>
+                            <m:t>𝑥</m:t>
+                          </m:r>
+                          <m:r>
+                            <a:rPr lang="en-US" b="0" i="1" smtClean="0">
+                              <a:latin typeface="Cambria Math" panose="02040503050406030204" pitchFamily="18" charset="0"/>
+                              <a:cs typeface="Segoe UI" panose="020B0502040204020203" pitchFamily="34" charset="0"/>
+                            </a:rPr>
+                            <m:t>′</m:t>
+                          </m:r>
+                        </m:e>
+                        <m:sub>
+                          <m:r>
+                            <a:rPr lang="en-US" b="0" i="1" smtClean="0">
+                              <a:latin typeface="Cambria Math" panose="02040503050406030204" pitchFamily="18" charset="0"/>
+                              <a:cs typeface="Segoe UI" panose="020B0502040204020203" pitchFamily="34" charset="0"/>
+                            </a:rPr>
+                            <m:t>𝑖</m:t>
+                          </m:r>
+                        </m:sub>
+                      </m:sSub>
+                      <m:r>
+                        <a:rPr lang="en-US" b="0" i="1" smtClean="0">
+                          <a:latin typeface="Cambria Math" panose="02040503050406030204" pitchFamily="18" charset="0"/>
+                          <a:cs typeface="Segoe UI" panose="020B0502040204020203" pitchFamily="34" charset="0"/>
+                        </a:rPr>
+                        <m:t>=</m:t>
+                      </m:r>
+                      <m:sSubSup>
+                        <m:sSubSupPr>
+                          <m:ctrlPr>
+                            <a:rPr lang="en-US" b="0" i="1" smtClean="0">
+                              <a:latin typeface="Cambria Math" panose="02040503050406030204" pitchFamily="18" charset="0"/>
+                              <a:cs typeface="Segoe UI" panose="020B0502040204020203" pitchFamily="34" charset="0"/>
+                            </a:rPr>
+                          </m:ctrlPr>
+                        </m:sSubSupPr>
+                        <m:e>
+                          <m:r>
+                            <a:rPr lang="en-US" b="0" i="1" smtClean="0">
+                              <a:latin typeface="Cambria Math" panose="02040503050406030204" pitchFamily="18" charset="0"/>
+                              <a:cs typeface="Segoe UI" panose="020B0502040204020203" pitchFamily="34" charset="0"/>
+                            </a:rPr>
+                            <m:t>𝑥</m:t>
+                          </m:r>
+                        </m:e>
+                        <m:sub>
+                          <m:r>
+                            <a:rPr lang="en-US" b="0" i="1" smtClean="0">
+                              <a:latin typeface="Cambria Math" panose="02040503050406030204" pitchFamily="18" charset="0"/>
+                              <a:cs typeface="Segoe UI" panose="020B0502040204020203" pitchFamily="34" charset="0"/>
+                            </a:rPr>
+                            <m:t>𝑖</m:t>
+                          </m:r>
+                        </m:sub>
+                        <m:sup>
+                          <m:r>
+                            <a:rPr lang="en-US" b="0" i="1" smtClean="0">
+                              <a:latin typeface="Cambria Math" panose="02040503050406030204" pitchFamily="18" charset="0"/>
+                              <a:ea typeface="Cambria Math" panose="02040503050406030204" pitchFamily="18" charset="0"/>
+                              <a:cs typeface="Segoe UI" panose="020B0502040204020203" pitchFamily="34" charset="0"/>
+                            </a:rPr>
+                            <m:t>𝛾</m:t>
+                          </m:r>
+                        </m:sup>
+                      </m:sSubSup>
+                    </m:oMath>
+                  </m:oMathPara>
+                </a14:m>
+                <a:endParaRPr lang="en-GB" dirty="0">
+                  <a:ea typeface="Segoe UI" panose="020B0502040204020203" pitchFamily="34" charset="0"/>
+                  <a:cs typeface="Segoe UI" panose="020B0502040204020203" pitchFamily="34" charset="0"/>
+                </a:endParaRPr>
+              </a:p>
+              <a:p>
+                <a:r>
+                  <a:rPr lang="en-GB" dirty="0">
+                    <a:ea typeface="Segoe UI" panose="020B0502040204020203" pitchFamily="34" charset="0"/>
+                    <a:cs typeface="Segoe UI" panose="020B0502040204020203" pitchFamily="34" charset="0"/>
+                  </a:rPr>
+                  <a:t>Applied pixel wise   </a:t>
+                </a:r>
+              </a:p>
+              <a:p>
+                <a:r>
+                  <a:rPr lang="en-GB" dirty="0">
+                    <a:ea typeface="Segoe UI" panose="020B0502040204020203" pitchFamily="34" charset="0"/>
+                    <a:cs typeface="Segoe UI" panose="020B0502040204020203" pitchFamily="34" charset="0"/>
+                  </a:rPr>
+                  <a:t>Larger value of </a:t>
+                </a:r>
+                <a:r>
+                  <a:rPr lang="en-GB" dirty="0">
+                    <a:latin typeface="Symbol" panose="05050102010706020507" pitchFamily="18" charset="2"/>
+                    <a:ea typeface="Segoe UI" panose="020B0502040204020203" pitchFamily="34" charset="0"/>
+                    <a:cs typeface="Segoe UI" panose="020B0502040204020203" pitchFamily="34" charset="0"/>
+                  </a:rPr>
+                  <a:t>g</a:t>
+                </a:r>
+                <a:r>
+                  <a:rPr lang="en-GB" dirty="0">
+                    <a:ea typeface="Segoe UI" panose="020B0502040204020203" pitchFamily="34" charset="0"/>
+                    <a:cs typeface="Segoe UI" panose="020B0502040204020203" pitchFamily="34" charset="0"/>
+                  </a:rPr>
+                  <a:t> shifts histogram mode to left  </a:t>
+                </a:r>
+              </a:p>
+              <a:p>
+                <a:endParaRPr lang="en-US" dirty="0">
+                  <a:ea typeface="Segoe UI" panose="020B0502040204020203" pitchFamily="34" charset="0"/>
+                  <a:cs typeface="Segoe UI" panose="020B0502040204020203" pitchFamily="34" charset="0"/>
+                </a:endParaRPr>
+              </a:p>
+            </p:txBody>
+          </p:sp>
+        </mc:Choice>
+        <mc:Fallback>
+          <p:sp>
+            <p:nvSpPr>
+              <p:cNvPr id="7" name="Content Placeholder 6"/>
+              <p:cNvSpPr>
+                <a:spLocks noGrp="1" noRot="1" noChangeAspect="1" noMove="1" noResize="1" noEditPoints="1" noAdjustHandles="1" noChangeArrowheads="1" noChangeShapeType="1" noTextEdit="1"/>
+              </p:cNvSpPr>
+              <p:nvPr>
+                <p:ph sz="quarter" idx="10"/>
+              </p:nvPr>
+            </p:nvSpPr>
+            <p:spPr>
+              <a:xfrm>
+                <a:off x="378594" y="1399631"/>
+                <a:ext cx="11525250" cy="4972369"/>
+              </a:xfrm>
+              <a:blipFill>
+                <a:blip r:embed="rId4"/>
+                <a:stretch>
+                  <a:fillRect l="-1058" t="-2086"/>
+                </a:stretch>
+              </a:blipFill>
+            </p:spPr>
+            <p:txBody>
+              <a:bodyPr/>
+              <a:lstStyle/>
+              <a:p>
+                <a:r>
+                  <a:rPr lang="en-US">
+                    <a:noFill/>
+                  </a:rPr>
+                  <a:t> </a:t>
+                </a:r>
+              </a:p>
+            </p:txBody>
+          </p:sp>
+        </mc:Fallback>
+      </mc:AlternateContent>
+      <p:sp>
+        <p:nvSpPr>
+          <p:cNvPr id="2" name="Title 1"/>
+          <p:cNvSpPr>
+            <a:spLocks noGrp="1"/>
+          </p:cNvSpPr>
+          <p:nvPr>
+            <p:ph type="title"/>
+          </p:nvPr>
+        </p:nvSpPr>
+        <p:spPr>
+          <a:xfrm>
+            <a:off x="378594" y="298282"/>
+            <a:ext cx="11714548" cy="709026"/>
+          </a:xfrm>
+        </p:spPr>
+        <p:txBody>
+          <a:bodyPr>
+            <a:normAutofit/>
+          </a:bodyPr>
+          <a:lstStyle/>
+          <a:p>
+            <a:r>
+              <a:rPr lang="en-US" sz="4000" dirty="0">
+                <a:latin typeface="+mn-lt"/>
+                <a:cs typeface="Segoe UI" panose="020B0502040204020203" pitchFamily="34" charset="0"/>
+              </a:rPr>
+              <a:t>Contrast Improvement</a:t>
+            </a:r>
+            <a:endParaRPr lang="en-US" sz="4000" dirty="0">
+              <a:latin typeface="+mn-lt"/>
+            </a:endParaRPr>
+          </a:p>
+        </p:txBody>
+      </p:sp>
+    </p:spTree>
+    <p:extLst>
+      <p:ext uri="{BB962C8B-B14F-4D97-AF65-F5344CB8AC3E}">
+        <p14:creationId xmlns:p14="http://schemas.microsoft.com/office/powerpoint/2010/main" val="2068093418"/>
+      </p:ext>
+    </p:extLst>
+  </p:cSld>
+  <p:clrMapOvr>
+    <a:masterClrMapping/>
+  </p:clrMapOvr>
+</p:sld>
+</file>
+
+<file path=ppt/slides/slide47.xml><?xml version="1.0" encoding="utf-8"?>
+<p:sld xmlns:a="http://schemas.openxmlformats.org/drawingml/2006/main" xmlns:r="http://schemas.openxmlformats.org/officeDocument/2006/relationships" xmlns:p="http://schemas.openxmlformats.org/presentationml/2006/main">
+  <p:cSld>
+    <p:spTree>
+      <p:nvGrpSpPr>
+        <p:cNvPr id="1" name=""/>
+        <p:cNvGrpSpPr/>
+        <p:nvPr/>
+      </p:nvGrpSpPr>
+      <p:grpSpPr>
+        <a:xfrm>
+          <a:off x="0" y="0"/>
+          <a:ext cx="0" cy="0"/>
+          <a:chOff x="0" y="0"/>
+          <a:chExt cx="0" cy="0"/>
+        </a:xfrm>
+      </p:grpSpPr>
+      <mc:AlternateContent xmlns:mc="http://schemas.openxmlformats.org/markup-compatibility/2006">
+        <mc:Choice xmlns:a14="http://schemas.microsoft.com/office/drawing/2010/main" Requires="a14">
+          <p:sp>
+            <p:nvSpPr>
+              <p:cNvPr id="7" name="Content Placeholder 6"/>
+              <p:cNvSpPr>
+                <a:spLocks noGrp="1"/>
+              </p:cNvSpPr>
+              <p:nvPr>
+                <p:ph sz="quarter" idx="10"/>
+              </p:nvPr>
+            </p:nvSpPr>
+            <p:spPr>
+              <a:xfrm>
+                <a:off x="378594" y="1399631"/>
+                <a:ext cx="11525250" cy="4972369"/>
+              </a:xfrm>
+            </p:spPr>
+            <p:txBody>
+              <a:bodyPr>
+                <a:normAutofit/>
+              </a:bodyPr>
+              <a:lstStyle/>
+              <a:p>
+                <a:pPr marL="0" indent="0">
+                  <a:buNone/>
+                </a:pPr>
+                <a:r>
+                  <a:rPr lang="en-GB" b="1" dirty="0">
+                    <a:ea typeface="Segoe UI" panose="020B0502040204020203" pitchFamily="34" charset="0"/>
+                    <a:cs typeface="Segoe UI" panose="020B0502040204020203" pitchFamily="34" charset="0"/>
+                    <a:hlinkClick r:id="rId3"/>
+                  </a:rPr>
+                  <a:t>Log correction   </a:t>
+                </a:r>
+                <a:endParaRPr lang="en-GB" b="1" dirty="0">
+                  <a:ea typeface="Segoe UI" panose="020B0502040204020203" pitchFamily="34" charset="0"/>
+                  <a:cs typeface="Segoe UI" panose="020B0502040204020203" pitchFamily="34" charset="0"/>
+                </a:endParaRPr>
+              </a:p>
+              <a:p>
+                <a:r>
+                  <a:rPr lang="en-GB" dirty="0">
+                    <a:ea typeface="Segoe UI" panose="020B0502040204020203" pitchFamily="34" charset="0"/>
+                    <a:cs typeface="Segoe UI" panose="020B0502040204020203" pitchFamily="34" charset="0"/>
+                  </a:rPr>
+                  <a:t>Log correction compresses pixel values </a:t>
+                </a:r>
+              </a:p>
+              <a:p>
+                <a:r>
+                  <a:rPr lang="en-GB" dirty="0">
+                    <a:ea typeface="Segoe UI" panose="020B0502040204020203" pitchFamily="34" charset="0"/>
+                    <a:cs typeface="Segoe UI" panose="020B0502040204020203" pitchFamily="34" charset="0"/>
+                  </a:rPr>
+                  <a:t>Apply </a:t>
+                </a:r>
+                <a:r>
+                  <a:rPr lang="en-GB" b="1" dirty="0">
+                    <a:ea typeface="Segoe UI" panose="020B0502040204020203" pitchFamily="34" charset="0"/>
+                    <a:cs typeface="Segoe UI" panose="020B0502040204020203" pitchFamily="34" charset="0"/>
+                  </a:rPr>
+                  <a:t>gain , </a:t>
+                </a:r>
+                <a:r>
+                  <a:rPr lang="en-GB" i="1" dirty="0">
+                    <a:ea typeface="Segoe UI" panose="020B0502040204020203" pitchFamily="34" charset="0"/>
+                    <a:cs typeface="Segoe UI" panose="020B0502040204020203" pitchFamily="34" charset="0"/>
+                  </a:rPr>
+                  <a:t>g</a:t>
+                </a:r>
+                <a:r>
+                  <a:rPr lang="en-GB" b="1" dirty="0">
+                    <a:ea typeface="Segoe UI" panose="020B0502040204020203" pitchFamily="34" charset="0"/>
+                    <a:cs typeface="Segoe UI" panose="020B0502040204020203" pitchFamily="34" charset="0"/>
+                  </a:rPr>
+                  <a:t>, </a:t>
+                </a:r>
+                <a:r>
+                  <a:rPr lang="en-GB" dirty="0">
+                    <a:ea typeface="Segoe UI" panose="020B0502040204020203" pitchFamily="34" charset="0"/>
+                    <a:cs typeface="Segoe UI" panose="020B0502040204020203" pitchFamily="34" charset="0"/>
+                  </a:rPr>
+                  <a:t>to scale to desired range       </a:t>
+                </a:r>
+              </a:p>
+              <a:p>
+                <a:r>
+                  <a:rPr lang="en-GB" dirty="0">
+                    <a:ea typeface="Segoe UI" panose="020B0502040204020203" pitchFamily="34" charset="0"/>
+                    <a:cs typeface="Segoe UI" panose="020B0502040204020203" pitchFamily="34" charset="0"/>
+                  </a:rPr>
+                  <a:t>For pixel value, </a:t>
+                </a:r>
+                <a14:m>
+                  <m:oMath xmlns:m="http://schemas.openxmlformats.org/officeDocument/2006/math">
+                    <m:sSub>
+                      <m:sSubPr>
+                        <m:ctrlPr>
+                          <a:rPr lang="en-GB" i="1" smtClean="0">
+                            <a:latin typeface="Cambria Math" panose="02040503050406030204" pitchFamily="18" charset="0"/>
+                            <a:cs typeface="Segoe UI" panose="020B0502040204020203" pitchFamily="34" charset="0"/>
+                          </a:rPr>
+                        </m:ctrlPr>
+                      </m:sSubPr>
+                      <m:e>
+                        <m:r>
+                          <a:rPr lang="en-US" b="0" i="1" smtClean="0">
+                            <a:latin typeface="Cambria Math" panose="02040503050406030204" pitchFamily="18" charset="0"/>
+                            <a:cs typeface="Segoe UI" panose="020B0502040204020203" pitchFamily="34" charset="0"/>
+                          </a:rPr>
+                          <m:t>𝑥</m:t>
+                        </m:r>
+                      </m:e>
+                      <m:sub>
+                        <m:r>
+                          <a:rPr lang="en-US" b="0" i="1" smtClean="0">
+                            <a:latin typeface="Cambria Math" panose="02040503050406030204" pitchFamily="18" charset="0"/>
+                            <a:cs typeface="Segoe UI" panose="020B0502040204020203" pitchFamily="34" charset="0"/>
+                          </a:rPr>
+                          <m:t>𝑖</m:t>
+                        </m:r>
+                      </m:sub>
+                    </m:sSub>
+                  </m:oMath>
+                </a14:m>
+                <a:r>
+                  <a:rPr lang="en-GB" dirty="0">
+                    <a:ea typeface="Segoe UI" panose="020B0502040204020203" pitchFamily="34" charset="0"/>
+                    <a:cs typeface="Segoe UI" panose="020B0502040204020203" pitchFamily="34" charset="0"/>
+                  </a:rPr>
+                  <a:t>, log correction defined:   </a:t>
+                </a:r>
+              </a:p>
+              <a:p>
+                <a:pPr marL="0" indent="0">
+                  <a:buNone/>
+                </a:pPr>
+                <a14:m>
+                  <m:oMathPara xmlns:m="http://schemas.openxmlformats.org/officeDocument/2006/math">
+                    <m:oMathParaPr>
+                      <m:jc m:val="centerGroup"/>
+                    </m:oMathParaPr>
+                    <m:oMath xmlns:m="http://schemas.openxmlformats.org/officeDocument/2006/math">
+                      <m:sSub>
+                        <m:sSubPr>
+                          <m:ctrlPr>
+                            <a:rPr lang="en-GB" i="1" smtClean="0">
+                              <a:latin typeface="Cambria Math" panose="02040503050406030204" pitchFamily="18" charset="0"/>
+                              <a:cs typeface="Segoe UI" panose="020B0502040204020203" pitchFamily="34" charset="0"/>
+                            </a:rPr>
+                          </m:ctrlPr>
+                        </m:sSubPr>
+                        <m:e>
+                          <m:r>
+                            <a:rPr lang="en-US" b="0" i="1" smtClean="0">
+                              <a:latin typeface="Cambria Math" panose="02040503050406030204" pitchFamily="18" charset="0"/>
+                              <a:cs typeface="Segoe UI" panose="020B0502040204020203" pitchFamily="34" charset="0"/>
+                            </a:rPr>
+                            <m:t>𝑥</m:t>
+                          </m:r>
+                          <m:r>
+                            <a:rPr lang="en-US" b="0" i="1" smtClean="0">
+                              <a:latin typeface="Cambria Math" panose="02040503050406030204" pitchFamily="18" charset="0"/>
+                              <a:cs typeface="Segoe UI" panose="020B0502040204020203" pitchFamily="34" charset="0"/>
+                            </a:rPr>
+                            <m:t>′</m:t>
+                          </m:r>
+                        </m:e>
+                        <m:sub>
+                          <m:r>
+                            <a:rPr lang="en-US" b="0" i="1" smtClean="0">
+                              <a:latin typeface="Cambria Math" panose="02040503050406030204" pitchFamily="18" charset="0"/>
+                              <a:cs typeface="Segoe UI" panose="020B0502040204020203" pitchFamily="34" charset="0"/>
+                            </a:rPr>
+                            <m:t>𝑖</m:t>
+                          </m:r>
+                        </m:sub>
+                      </m:sSub>
+                      <m:r>
+                        <a:rPr lang="en-US" b="0" i="1" smtClean="0">
+                          <a:latin typeface="Cambria Math" panose="02040503050406030204" pitchFamily="18" charset="0"/>
+                          <a:cs typeface="Segoe UI" panose="020B0502040204020203" pitchFamily="34" charset="0"/>
+                        </a:rPr>
+                        <m:t>=</m:t>
+                      </m:r>
+                      <m:r>
+                        <a:rPr lang="en-US" b="0" i="1" smtClean="0">
+                          <a:latin typeface="Cambria Math" panose="02040503050406030204" pitchFamily="18" charset="0"/>
+                          <a:cs typeface="Segoe UI" panose="020B0502040204020203" pitchFamily="34" charset="0"/>
+                        </a:rPr>
+                        <m:t>𝑔</m:t>
+                      </m:r>
+                      <m:sSubSup>
+                        <m:sSubSupPr>
+                          <m:ctrlPr>
+                            <a:rPr lang="en-US" b="0" i="1" smtClean="0">
+                              <a:latin typeface="Cambria Math" panose="02040503050406030204" pitchFamily="18" charset="0"/>
+                              <a:cs typeface="Segoe UI" panose="020B0502040204020203" pitchFamily="34" charset="0"/>
+                            </a:rPr>
+                          </m:ctrlPr>
+                        </m:sSubSupPr>
+                        <m:e>
+                          <m:r>
+                            <a:rPr lang="en-US" i="1">
+                              <a:latin typeface="Cambria Math" panose="02040503050406030204" pitchFamily="18" charset="0"/>
+                              <a:ea typeface="Cambria Math" panose="02040503050406030204" pitchFamily="18" charset="0"/>
+                              <a:cs typeface="Segoe UI" panose="020B0502040204020203" pitchFamily="34" charset="0"/>
+                            </a:rPr>
+                            <m:t>∙</m:t>
+                          </m:r>
+                          <m:r>
+                            <a:rPr lang="en-US" b="0" i="1" smtClean="0">
+                              <a:latin typeface="Cambria Math" panose="02040503050406030204" pitchFamily="18" charset="0"/>
+                              <a:ea typeface="Cambria Math" panose="02040503050406030204" pitchFamily="18" charset="0"/>
+                              <a:cs typeface="Segoe UI" panose="020B0502040204020203" pitchFamily="34" charset="0"/>
+                            </a:rPr>
+                            <m:t>𝑙𝑜𝑔</m:t>
+                          </m:r>
+                          <m:d>
+                            <m:dPr>
+                              <m:ctrlPr>
+                                <a:rPr lang="en-US" i="1" smtClean="0">
+                                  <a:latin typeface="Cambria Math" panose="02040503050406030204" pitchFamily="18" charset="0"/>
+                                  <a:ea typeface="Cambria Math" panose="02040503050406030204" pitchFamily="18" charset="0"/>
+                                  <a:cs typeface="Segoe UI" panose="020B0502040204020203" pitchFamily="34" charset="0"/>
+                                </a:rPr>
+                              </m:ctrlPr>
+                            </m:dPr>
+                            <m:e>
+                              <m:r>
+                                <a:rPr lang="en-US" b="0" i="1" smtClean="0">
+                                  <a:latin typeface="Cambria Math" panose="02040503050406030204" pitchFamily="18" charset="0"/>
+                                  <a:ea typeface="Cambria Math" panose="02040503050406030204" pitchFamily="18" charset="0"/>
+                                  <a:cs typeface="Segoe UI" panose="020B0502040204020203" pitchFamily="34" charset="0"/>
+                                </a:rPr>
+                                <m:t>1+</m:t>
+                              </m:r>
+                              <m:sSub>
+                                <m:sSubPr>
+                                  <m:ctrlPr>
+                                    <a:rPr lang="en-US" b="0" i="1" smtClean="0">
+                                      <a:latin typeface="Cambria Math" panose="02040503050406030204" pitchFamily="18" charset="0"/>
+                                      <a:ea typeface="Cambria Math" panose="02040503050406030204" pitchFamily="18" charset="0"/>
+                                      <a:cs typeface="Segoe UI" panose="020B0502040204020203" pitchFamily="34" charset="0"/>
+                                    </a:rPr>
+                                  </m:ctrlPr>
+                                </m:sSubPr>
+                                <m:e>
+                                  <m:r>
+                                    <a:rPr lang="en-US" b="0" i="1" smtClean="0">
+                                      <a:latin typeface="Cambria Math" panose="02040503050406030204" pitchFamily="18" charset="0"/>
+                                      <a:ea typeface="Cambria Math" panose="02040503050406030204" pitchFamily="18" charset="0"/>
+                                      <a:cs typeface="Segoe UI" panose="020B0502040204020203" pitchFamily="34" charset="0"/>
+                                    </a:rPr>
+                                    <m:t>𝑥</m:t>
+                                  </m:r>
+                                </m:e>
+                                <m:sub>
+                                  <m:r>
+                                    <a:rPr lang="en-US" b="0" i="1" smtClean="0">
+                                      <a:latin typeface="Cambria Math" panose="02040503050406030204" pitchFamily="18" charset="0"/>
+                                      <a:ea typeface="Cambria Math" panose="02040503050406030204" pitchFamily="18" charset="0"/>
+                                      <a:cs typeface="Segoe UI" panose="020B0502040204020203" pitchFamily="34" charset="0"/>
+                                    </a:rPr>
+                                    <m:t>𝑖</m:t>
+                                  </m:r>
+                                </m:sub>
+                              </m:sSub>
+                            </m:e>
+                          </m:d>
+                        </m:e>
+                        <m:sub>
+                          <m:r>
+                            <a:rPr lang="en-US" b="0" i="1" smtClean="0">
+                              <a:latin typeface="Cambria Math" panose="02040503050406030204" pitchFamily="18" charset="0"/>
+                              <a:cs typeface="Segoe UI" panose="020B0502040204020203" pitchFamily="34" charset="0"/>
+                            </a:rPr>
+                            <m:t> </m:t>
+                          </m:r>
+                        </m:sub>
+                        <m:sup>
+                          <m:r>
+                            <a:rPr lang="en-US" b="0" i="1" smtClean="0">
+                              <a:latin typeface="Cambria Math" panose="02040503050406030204" pitchFamily="18" charset="0"/>
+                              <a:cs typeface="Segoe UI" panose="020B0502040204020203" pitchFamily="34" charset="0"/>
+                            </a:rPr>
+                            <m:t> </m:t>
+                          </m:r>
+                        </m:sup>
+                      </m:sSubSup>
+                    </m:oMath>
+                  </m:oMathPara>
+                </a14:m>
+                <a:endParaRPr lang="en-GB" dirty="0">
+                  <a:ea typeface="Segoe UI" panose="020B0502040204020203" pitchFamily="34" charset="0"/>
+                  <a:cs typeface="Segoe UI" panose="020B0502040204020203" pitchFamily="34" charset="0"/>
+                </a:endParaRPr>
+              </a:p>
+              <a:p>
+                <a:r>
+                  <a:rPr lang="en-GB" dirty="0">
+                    <a:ea typeface="Segoe UI" panose="020B0502040204020203" pitchFamily="34" charset="0"/>
+                    <a:cs typeface="Segoe UI" panose="020B0502040204020203" pitchFamily="34" charset="0"/>
+                  </a:rPr>
+                  <a:t>Applied pixel wise   </a:t>
+                </a:r>
+              </a:p>
+            </p:txBody>
+          </p:sp>
+        </mc:Choice>
+        <mc:Fallback>
+          <p:sp>
+            <p:nvSpPr>
+              <p:cNvPr id="7" name="Content Placeholder 6"/>
+              <p:cNvSpPr>
+                <a:spLocks noGrp="1" noRot="1" noChangeAspect="1" noMove="1" noResize="1" noEditPoints="1" noAdjustHandles="1" noChangeArrowheads="1" noChangeShapeType="1" noTextEdit="1"/>
+              </p:cNvSpPr>
+              <p:nvPr>
+                <p:ph sz="quarter" idx="10"/>
+              </p:nvPr>
+            </p:nvSpPr>
+            <p:spPr>
+              <a:xfrm>
+                <a:off x="378594" y="1399631"/>
+                <a:ext cx="11525250" cy="4972369"/>
+              </a:xfrm>
+              <a:blipFill>
+                <a:blip r:embed="rId4"/>
+                <a:stretch>
+                  <a:fillRect l="-1058" t="-2086"/>
+                </a:stretch>
+              </a:blipFill>
+            </p:spPr>
+            <p:txBody>
+              <a:bodyPr/>
+              <a:lstStyle/>
+              <a:p>
+                <a:r>
+                  <a:rPr lang="en-US">
+                    <a:noFill/>
+                  </a:rPr>
+                  <a:t> </a:t>
+                </a:r>
+              </a:p>
+            </p:txBody>
+          </p:sp>
+        </mc:Fallback>
+      </mc:AlternateContent>
+      <p:sp>
+        <p:nvSpPr>
+          <p:cNvPr id="2" name="Title 1"/>
+          <p:cNvSpPr>
+            <a:spLocks noGrp="1"/>
+          </p:cNvSpPr>
+          <p:nvPr>
+            <p:ph type="title"/>
+          </p:nvPr>
+        </p:nvSpPr>
+        <p:spPr>
+          <a:xfrm>
+            <a:off x="378594" y="298282"/>
+            <a:ext cx="11714548" cy="709026"/>
+          </a:xfrm>
+        </p:spPr>
+        <p:txBody>
+          <a:bodyPr>
+            <a:normAutofit/>
+          </a:bodyPr>
+          <a:lstStyle/>
+          <a:p>
+            <a:r>
+              <a:rPr lang="en-US" sz="4000" dirty="0">
+                <a:latin typeface="+mn-lt"/>
+                <a:cs typeface="Segoe UI" panose="020B0502040204020203" pitchFamily="34" charset="0"/>
+              </a:rPr>
+              <a:t>Contrast Improvement</a:t>
+            </a:r>
+            <a:endParaRPr lang="en-US" sz="4000" dirty="0">
+              <a:latin typeface="+mn-lt"/>
+            </a:endParaRPr>
+          </a:p>
+        </p:txBody>
+      </p:sp>
+    </p:spTree>
+    <p:extLst>
+      <p:ext uri="{BB962C8B-B14F-4D97-AF65-F5344CB8AC3E}">
+        <p14:creationId xmlns:p14="http://schemas.microsoft.com/office/powerpoint/2010/main" val="2920648422"/>
+      </p:ext>
+    </p:extLst>
+  </p:cSld>
+  <p:clrMapOvr>
+    <a:masterClrMapping/>
+  </p:clrMapOvr>
+</p:sld>
+</file>
+
+<file path=ppt/slides/slide48.xml><?xml version="1.0" encoding="utf-8"?>
+<p:sld xmlns:a="http://schemas.openxmlformats.org/drawingml/2006/main" xmlns:r="http://schemas.openxmlformats.org/officeDocument/2006/relationships" xmlns:p="http://schemas.openxmlformats.org/presentationml/2006/main">
+  <p:cSld>
+    <p:spTree>
+      <p:nvGrpSpPr>
+        <p:cNvPr id="1" name=""/>
+        <p:cNvGrpSpPr/>
+        <p:nvPr/>
+      </p:nvGrpSpPr>
+      <p:grpSpPr>
+        <a:xfrm>
+          <a:off x="0" y="0"/>
+          <a:ext cx="0" cy="0"/>
+          <a:chOff x="0" y="0"/>
+          <a:chExt cx="0" cy="0"/>
+        </a:xfrm>
+      </p:grpSpPr>
+      <mc:AlternateContent xmlns:mc="http://schemas.openxmlformats.org/markup-compatibility/2006">
+        <mc:Choice xmlns:a14="http://schemas.microsoft.com/office/drawing/2010/main" Requires="a14">
+          <p:sp>
+            <p:nvSpPr>
+              <p:cNvPr id="7" name="Content Placeholder 6"/>
+              <p:cNvSpPr>
+                <a:spLocks noGrp="1"/>
+              </p:cNvSpPr>
+              <p:nvPr>
+                <p:ph sz="quarter" idx="10"/>
+              </p:nvPr>
+            </p:nvSpPr>
+            <p:spPr>
+              <a:xfrm>
+                <a:off x="378594" y="1399631"/>
+                <a:ext cx="11525250" cy="4972369"/>
+              </a:xfrm>
+            </p:spPr>
+            <p:txBody>
+              <a:bodyPr>
+                <a:normAutofit/>
+              </a:bodyPr>
+              <a:lstStyle/>
+              <a:p>
+                <a:pPr marL="0" indent="0">
+                  <a:buNone/>
+                </a:pPr>
+                <a:r>
+                  <a:rPr lang="en-GB" b="1" dirty="0">
+                    <a:ea typeface="Segoe UI" panose="020B0502040204020203" pitchFamily="34" charset="0"/>
+                    <a:cs typeface="Segoe UI" panose="020B0502040204020203" pitchFamily="34" charset="0"/>
+                    <a:hlinkClick r:id="rId3"/>
+                  </a:rPr>
+                  <a:t>Sigmodal correction   </a:t>
+                </a:r>
+                <a:endParaRPr lang="en-GB" b="1" dirty="0">
+                  <a:ea typeface="Segoe UI" panose="020B0502040204020203" pitchFamily="34" charset="0"/>
+                  <a:cs typeface="Segoe UI" panose="020B0502040204020203" pitchFamily="34" charset="0"/>
+                </a:endParaRPr>
+              </a:p>
+              <a:p>
+                <a:r>
+                  <a:rPr lang="en-GB" dirty="0">
+                    <a:ea typeface="Segoe UI" panose="020B0502040204020203" pitchFamily="34" charset="0"/>
+                    <a:cs typeface="Segoe UI" panose="020B0502040204020203" pitchFamily="34" charset="0"/>
+                  </a:rPr>
+                  <a:t>Sigmoidal correction compresses pixel values </a:t>
+                </a:r>
+              </a:p>
+              <a:p>
+                <a:r>
+                  <a:rPr lang="en-GB" dirty="0">
+                    <a:ea typeface="Segoe UI" panose="020B0502040204020203" pitchFamily="34" charset="0"/>
+                    <a:cs typeface="Segoe UI" panose="020B0502040204020203" pitchFamily="34" charset="0"/>
+                  </a:rPr>
+                  <a:t>Apply </a:t>
+                </a:r>
+                <a:r>
+                  <a:rPr lang="en-GB" b="1" dirty="0">
+                    <a:ea typeface="Segoe UI" panose="020B0502040204020203" pitchFamily="34" charset="0"/>
+                    <a:cs typeface="Segoe UI" panose="020B0502040204020203" pitchFamily="34" charset="0"/>
+                  </a:rPr>
+                  <a:t>gain , </a:t>
+                </a:r>
+                <a:r>
+                  <a:rPr lang="en-GB" i="1" dirty="0">
+                    <a:ea typeface="Segoe UI" panose="020B0502040204020203" pitchFamily="34" charset="0"/>
+                    <a:cs typeface="Segoe UI" panose="020B0502040204020203" pitchFamily="34" charset="0"/>
+                  </a:rPr>
+                  <a:t>g</a:t>
+                </a:r>
+                <a:r>
+                  <a:rPr lang="en-GB" b="1" dirty="0">
+                    <a:ea typeface="Segoe UI" panose="020B0502040204020203" pitchFamily="34" charset="0"/>
+                    <a:cs typeface="Segoe UI" panose="020B0502040204020203" pitchFamily="34" charset="0"/>
+                  </a:rPr>
+                  <a:t>, </a:t>
+                </a:r>
+                <a:r>
+                  <a:rPr lang="en-GB" dirty="0">
+                    <a:ea typeface="Segoe UI" panose="020B0502040204020203" pitchFamily="34" charset="0"/>
+                    <a:cs typeface="Segoe UI" panose="020B0502040204020203" pitchFamily="34" charset="0"/>
+                  </a:rPr>
+                  <a:t>to scale to desired range       </a:t>
+                </a:r>
+              </a:p>
+              <a:p>
+                <a:r>
+                  <a:rPr lang="en-GB" dirty="0">
+                    <a:ea typeface="Segoe UI" panose="020B0502040204020203" pitchFamily="34" charset="0"/>
+                    <a:cs typeface="Segoe UI" panose="020B0502040204020203" pitchFamily="34" charset="0"/>
+                  </a:rPr>
+                  <a:t>For pixel value, </a:t>
+                </a:r>
+                <a14:m>
+                  <m:oMath xmlns:m="http://schemas.openxmlformats.org/officeDocument/2006/math">
+                    <m:sSub>
+                      <m:sSubPr>
+                        <m:ctrlPr>
+                          <a:rPr lang="en-GB" i="1" smtClean="0">
+                            <a:latin typeface="Cambria Math" panose="02040503050406030204" pitchFamily="18" charset="0"/>
+                            <a:cs typeface="Segoe UI" panose="020B0502040204020203" pitchFamily="34" charset="0"/>
+                          </a:rPr>
+                        </m:ctrlPr>
+                      </m:sSubPr>
+                      <m:e>
+                        <m:r>
+                          <a:rPr lang="en-US" b="0" i="1" smtClean="0">
+                            <a:latin typeface="Cambria Math" panose="02040503050406030204" pitchFamily="18" charset="0"/>
+                            <a:cs typeface="Segoe UI" panose="020B0502040204020203" pitchFamily="34" charset="0"/>
+                          </a:rPr>
+                          <m:t>𝑥</m:t>
+                        </m:r>
+                      </m:e>
+                      <m:sub>
+                        <m:r>
+                          <a:rPr lang="en-US" b="0" i="1" smtClean="0">
+                            <a:latin typeface="Cambria Math" panose="02040503050406030204" pitchFamily="18" charset="0"/>
+                            <a:cs typeface="Segoe UI" panose="020B0502040204020203" pitchFamily="34" charset="0"/>
+                          </a:rPr>
+                          <m:t>𝑖</m:t>
+                        </m:r>
+                      </m:sub>
+                    </m:sSub>
+                  </m:oMath>
+                </a14:m>
+                <a:r>
+                  <a:rPr lang="en-GB" dirty="0">
+                    <a:ea typeface="Segoe UI" panose="020B0502040204020203" pitchFamily="34" charset="0"/>
+                    <a:cs typeface="Segoe UI" panose="020B0502040204020203" pitchFamily="34" charset="0"/>
+                  </a:rPr>
+                  <a:t>, </a:t>
+                </a:r>
+                <a:r>
+                  <a:rPr lang="en-GB" dirty="0" err="1">
+                    <a:ea typeface="Segoe UI" panose="020B0502040204020203" pitchFamily="34" charset="0"/>
+                    <a:cs typeface="Segoe UI" panose="020B0502040204020203" pitchFamily="34" charset="0"/>
+                  </a:rPr>
+                  <a:t>sigmodial</a:t>
+                </a:r>
+                <a:r>
+                  <a:rPr lang="en-GB" dirty="0">
+                    <a:ea typeface="Segoe UI" panose="020B0502040204020203" pitchFamily="34" charset="0"/>
+                    <a:cs typeface="Segoe UI" panose="020B0502040204020203" pitchFamily="34" charset="0"/>
+                  </a:rPr>
+                  <a:t> correction, with </a:t>
+                </a:r>
+                <a:r>
+                  <a:rPr lang="en-GB" dirty="0" err="1">
+                    <a:ea typeface="Segoe UI" panose="020B0502040204020203" pitchFamily="34" charset="0"/>
+                    <a:cs typeface="Segoe UI" panose="020B0502040204020203" pitchFamily="34" charset="0"/>
+                  </a:rPr>
+                  <a:t>cutoff</a:t>
+                </a:r>
+                <a:r>
+                  <a:rPr lang="en-GB" dirty="0">
+                    <a:ea typeface="Segoe UI" panose="020B0502040204020203" pitchFamily="34" charset="0"/>
+                    <a:cs typeface="Segoe UI" panose="020B0502040204020203" pitchFamily="34" charset="0"/>
+                  </a:rPr>
+                  <a:t> value, defined:   </a:t>
+                </a:r>
+              </a:p>
+              <a:p>
+                <a:pPr marL="0" indent="0">
+                  <a:buNone/>
+                </a:pPr>
+                <a14:m>
+                  <m:oMathPara xmlns:m="http://schemas.openxmlformats.org/officeDocument/2006/math">
+                    <m:oMathParaPr>
+                      <m:jc m:val="centerGroup"/>
+                    </m:oMathParaPr>
+                    <m:oMath xmlns:m="http://schemas.openxmlformats.org/officeDocument/2006/math">
+                      <m:sSub>
+                        <m:sSubPr>
+                          <m:ctrlPr>
+                            <a:rPr lang="en-GB" i="1" smtClean="0">
+                              <a:latin typeface="Cambria Math" panose="02040503050406030204" pitchFamily="18" charset="0"/>
+                              <a:cs typeface="Segoe UI" panose="020B0502040204020203" pitchFamily="34" charset="0"/>
+                            </a:rPr>
+                          </m:ctrlPr>
+                        </m:sSubPr>
+                        <m:e>
+                          <m:r>
+                            <a:rPr lang="en-US" b="0" i="1" smtClean="0">
+                              <a:latin typeface="Cambria Math" panose="02040503050406030204" pitchFamily="18" charset="0"/>
+                              <a:cs typeface="Segoe UI" panose="020B0502040204020203" pitchFamily="34" charset="0"/>
+                            </a:rPr>
+                            <m:t>𝑥</m:t>
+                          </m:r>
+                          <m:r>
+                            <a:rPr lang="en-US" b="0" i="1" smtClean="0">
+                              <a:latin typeface="Cambria Math" panose="02040503050406030204" pitchFamily="18" charset="0"/>
+                              <a:cs typeface="Segoe UI" panose="020B0502040204020203" pitchFamily="34" charset="0"/>
+                            </a:rPr>
+                            <m:t>′</m:t>
+                          </m:r>
+                        </m:e>
+                        <m:sub>
+                          <m:r>
+                            <a:rPr lang="en-US" b="0" i="1" smtClean="0">
+                              <a:latin typeface="Cambria Math" panose="02040503050406030204" pitchFamily="18" charset="0"/>
+                              <a:cs typeface="Segoe UI" panose="020B0502040204020203" pitchFamily="34" charset="0"/>
+                            </a:rPr>
+                            <m:t>𝑖</m:t>
+                          </m:r>
+                        </m:sub>
+                      </m:sSub>
+                      <m:r>
+                        <a:rPr lang="en-US" b="0" i="1" smtClean="0">
+                          <a:latin typeface="Cambria Math" panose="02040503050406030204" pitchFamily="18" charset="0"/>
+                          <a:cs typeface="Segoe UI" panose="020B0502040204020203" pitchFamily="34" charset="0"/>
+                        </a:rPr>
+                        <m:t>=</m:t>
+                      </m:r>
+                      <m:f>
+                        <m:fPr>
+                          <m:ctrlPr>
+                            <a:rPr lang="en-US" b="0" i="1" smtClean="0">
+                              <a:latin typeface="Cambria Math" panose="02040503050406030204" pitchFamily="18" charset="0"/>
+                              <a:cs typeface="Segoe UI" panose="020B0502040204020203" pitchFamily="34" charset="0"/>
+                            </a:rPr>
+                          </m:ctrlPr>
+                        </m:fPr>
+                        <m:num>
+                          <m:r>
+                            <a:rPr lang="en-US" b="0" i="1" smtClean="0">
+                              <a:latin typeface="Cambria Math" panose="02040503050406030204" pitchFamily="18" charset="0"/>
+                              <a:cs typeface="Segoe UI" panose="020B0502040204020203" pitchFamily="34" charset="0"/>
+                            </a:rPr>
+                            <m:t>1</m:t>
+                          </m:r>
+                        </m:num>
+                        <m:den>
+                          <m:r>
+                            <a:rPr lang="en-US" b="0" i="1" smtClean="0">
+                              <a:latin typeface="Cambria Math" panose="02040503050406030204" pitchFamily="18" charset="0"/>
+                              <a:cs typeface="Segoe UI" panose="020B0502040204020203" pitchFamily="34" charset="0"/>
+                            </a:rPr>
+                            <m:t>1+</m:t>
+                          </m:r>
+                          <m:sSup>
+                            <m:sSupPr>
+                              <m:ctrlPr>
+                                <a:rPr lang="en-US" b="0" i="1" smtClean="0">
+                                  <a:latin typeface="Cambria Math" panose="02040503050406030204" pitchFamily="18" charset="0"/>
+                                  <a:cs typeface="Segoe UI" panose="020B0502040204020203" pitchFamily="34" charset="0"/>
+                                </a:rPr>
+                              </m:ctrlPr>
+                            </m:sSupPr>
+                            <m:e>
+                              <m:r>
+                                <a:rPr lang="en-US" b="0" i="1" smtClean="0">
+                                  <a:latin typeface="Cambria Math" panose="02040503050406030204" pitchFamily="18" charset="0"/>
+                                  <a:cs typeface="Segoe UI" panose="020B0502040204020203" pitchFamily="34" charset="0"/>
+                                </a:rPr>
+                                <m:t>𝑒</m:t>
+                              </m:r>
+                            </m:e>
+                            <m:sup>
+                              <m:d>
+                                <m:dPr>
+                                  <m:ctrlPr>
+                                    <a:rPr lang="en-US" i="1">
+                                      <a:latin typeface="Cambria Math" panose="02040503050406030204" pitchFamily="18" charset="0"/>
+                                      <a:cs typeface="Segoe UI" panose="020B0502040204020203" pitchFamily="34" charset="0"/>
+                                    </a:rPr>
+                                  </m:ctrlPr>
+                                </m:dPr>
+                                <m:e>
+                                  <m:r>
+                                    <a:rPr lang="en-US" i="1">
+                                      <a:latin typeface="Cambria Math" panose="02040503050406030204" pitchFamily="18" charset="0"/>
+                                      <a:cs typeface="Segoe UI" panose="020B0502040204020203" pitchFamily="34" charset="0"/>
+                                    </a:rPr>
+                                    <m:t>𝑔</m:t>
+                                  </m:r>
+                                  <m:r>
+                                    <a:rPr lang="en-US" i="1">
+                                      <a:latin typeface="Cambria Math" panose="02040503050406030204" pitchFamily="18" charset="0"/>
+                                      <a:ea typeface="Cambria Math" panose="02040503050406030204" pitchFamily="18" charset="0"/>
+                                      <a:cs typeface="Segoe UI" panose="020B0502040204020203" pitchFamily="34" charset="0"/>
+                                    </a:rPr>
+                                    <m:t>∙</m:t>
+                                  </m:r>
+                                  <m:d>
+                                    <m:dPr>
+                                      <m:ctrlPr>
+                                        <a:rPr lang="en-US" i="1">
+                                          <a:latin typeface="Cambria Math" panose="02040503050406030204" pitchFamily="18" charset="0"/>
+                                          <a:ea typeface="Cambria Math" panose="02040503050406030204" pitchFamily="18" charset="0"/>
+                                          <a:cs typeface="Segoe UI" panose="020B0502040204020203" pitchFamily="34" charset="0"/>
+                                        </a:rPr>
+                                      </m:ctrlPr>
+                                    </m:dPr>
+                                    <m:e>
+                                      <m:r>
+                                        <a:rPr lang="en-US" i="1">
+                                          <a:latin typeface="Cambria Math" panose="02040503050406030204" pitchFamily="18" charset="0"/>
+                                          <a:ea typeface="Cambria Math" panose="02040503050406030204" pitchFamily="18" charset="0"/>
+                                          <a:cs typeface="Segoe UI" panose="020B0502040204020203" pitchFamily="34" charset="0"/>
+                                        </a:rPr>
+                                        <m:t>𝑐𝑢𝑡𝑜𝑓𝑓</m:t>
+                                      </m:r>
+                                      <m:r>
+                                        <a:rPr lang="en-US" i="1">
+                                          <a:latin typeface="Cambria Math" panose="02040503050406030204" pitchFamily="18" charset="0"/>
+                                          <a:ea typeface="Cambria Math" panose="02040503050406030204" pitchFamily="18" charset="0"/>
+                                          <a:cs typeface="Segoe UI" panose="020B0502040204020203" pitchFamily="34" charset="0"/>
+                                        </a:rPr>
+                                        <m:t>−</m:t>
+                                      </m:r>
+                                      <m:sSub>
+                                        <m:sSubPr>
+                                          <m:ctrlPr>
+                                            <a:rPr lang="en-US" i="1">
+                                              <a:latin typeface="Cambria Math" panose="02040503050406030204" pitchFamily="18" charset="0"/>
+                                              <a:ea typeface="Cambria Math" panose="02040503050406030204" pitchFamily="18" charset="0"/>
+                                              <a:cs typeface="Segoe UI" panose="020B0502040204020203" pitchFamily="34" charset="0"/>
+                                            </a:rPr>
+                                          </m:ctrlPr>
+                                        </m:sSubPr>
+                                        <m:e>
+                                          <m:r>
+                                            <a:rPr lang="en-US" i="1">
+                                              <a:latin typeface="Cambria Math" panose="02040503050406030204" pitchFamily="18" charset="0"/>
+                                              <a:ea typeface="Cambria Math" panose="02040503050406030204" pitchFamily="18" charset="0"/>
+                                              <a:cs typeface="Segoe UI" panose="020B0502040204020203" pitchFamily="34" charset="0"/>
+                                            </a:rPr>
+                                            <m:t>𝑥</m:t>
+                                          </m:r>
+                                        </m:e>
+                                        <m:sub>
+                                          <m:r>
+                                            <a:rPr lang="en-US" i="1">
+                                              <a:latin typeface="Cambria Math" panose="02040503050406030204" pitchFamily="18" charset="0"/>
+                                              <a:ea typeface="Cambria Math" panose="02040503050406030204" pitchFamily="18" charset="0"/>
+                                              <a:cs typeface="Segoe UI" panose="020B0502040204020203" pitchFamily="34" charset="0"/>
+                                            </a:rPr>
+                                            <m:t>𝑖</m:t>
+                                          </m:r>
+                                        </m:sub>
+                                      </m:sSub>
+                                    </m:e>
+                                  </m:d>
+                                </m:e>
+                              </m:d>
+                            </m:sup>
+                          </m:sSup>
+                        </m:den>
+                      </m:f>
+                    </m:oMath>
+                  </m:oMathPara>
+                </a14:m>
+                <a:endParaRPr lang="en-GB" dirty="0">
+                  <a:ea typeface="Segoe UI" panose="020B0502040204020203" pitchFamily="34" charset="0"/>
+                  <a:cs typeface="Segoe UI" panose="020B0502040204020203" pitchFamily="34" charset="0"/>
+                </a:endParaRPr>
+              </a:p>
+              <a:p>
+                <a:r>
+                  <a:rPr lang="en-GB" dirty="0">
+                    <a:ea typeface="Segoe UI" panose="020B0502040204020203" pitchFamily="34" charset="0"/>
+                    <a:cs typeface="Segoe UI" panose="020B0502040204020203" pitchFamily="34" charset="0"/>
+                  </a:rPr>
+                  <a:t>Applied pixel wise   </a:t>
+                </a:r>
+              </a:p>
+              <a:p>
+                <a:r>
+                  <a:rPr lang="en-GB" dirty="0">
+                    <a:ea typeface="Segoe UI" panose="020B0502040204020203" pitchFamily="34" charset="0"/>
+                    <a:cs typeface="Segoe UI" panose="020B0502040204020203" pitchFamily="34" charset="0"/>
+                  </a:rPr>
+                  <a:t>Different </a:t>
+                </a:r>
+                <a:r>
+                  <a:rPr lang="en-GB" dirty="0" err="1">
+                    <a:ea typeface="Segoe UI" panose="020B0502040204020203" pitchFamily="34" charset="0"/>
+                    <a:cs typeface="Segoe UI" panose="020B0502040204020203" pitchFamily="34" charset="0"/>
+                  </a:rPr>
+                  <a:t>cutoff</a:t>
+                </a:r>
+                <a:r>
+                  <a:rPr lang="en-GB" dirty="0">
+                    <a:ea typeface="Segoe UI" panose="020B0502040204020203" pitchFamily="34" charset="0"/>
+                    <a:cs typeface="Segoe UI" panose="020B0502040204020203" pitchFamily="34" charset="0"/>
+                  </a:rPr>
+                  <a:t> values give different transformations   </a:t>
+                </a:r>
+              </a:p>
+            </p:txBody>
+          </p:sp>
+        </mc:Choice>
+        <mc:Fallback>
+          <p:sp>
+            <p:nvSpPr>
+              <p:cNvPr id="7" name="Content Placeholder 6"/>
+              <p:cNvSpPr>
+                <a:spLocks noGrp="1" noRot="1" noChangeAspect="1" noMove="1" noResize="1" noEditPoints="1" noAdjustHandles="1" noChangeArrowheads="1" noChangeShapeType="1" noTextEdit="1"/>
+              </p:cNvSpPr>
+              <p:nvPr>
+                <p:ph sz="quarter" idx="10"/>
+              </p:nvPr>
+            </p:nvSpPr>
+            <p:spPr>
+              <a:xfrm>
+                <a:off x="378594" y="1399631"/>
+                <a:ext cx="11525250" cy="4972369"/>
+              </a:xfrm>
+              <a:blipFill>
+                <a:blip r:embed="rId4"/>
+                <a:stretch>
+                  <a:fillRect l="-1058" t="-2086"/>
+                </a:stretch>
+              </a:blipFill>
+            </p:spPr>
+            <p:txBody>
+              <a:bodyPr/>
+              <a:lstStyle/>
+              <a:p>
+                <a:r>
+                  <a:rPr lang="en-US">
+                    <a:noFill/>
+                  </a:rPr>
+                  <a:t> </a:t>
+                </a:r>
+              </a:p>
+            </p:txBody>
+          </p:sp>
+        </mc:Fallback>
+      </mc:AlternateContent>
+      <p:sp>
+        <p:nvSpPr>
+          <p:cNvPr id="2" name="Title 1"/>
+          <p:cNvSpPr>
+            <a:spLocks noGrp="1"/>
+          </p:cNvSpPr>
+          <p:nvPr>
+            <p:ph type="title"/>
+          </p:nvPr>
+        </p:nvSpPr>
+        <p:spPr>
+          <a:xfrm>
+            <a:off x="378594" y="298282"/>
+            <a:ext cx="11714548" cy="709026"/>
+          </a:xfrm>
+        </p:spPr>
+        <p:txBody>
+          <a:bodyPr>
+            <a:normAutofit/>
+          </a:bodyPr>
+          <a:lstStyle/>
+          <a:p>
+            <a:r>
+              <a:rPr lang="en-US" sz="4000" dirty="0">
+                <a:latin typeface="+mn-lt"/>
+                <a:cs typeface="Segoe UI" panose="020B0502040204020203" pitchFamily="34" charset="0"/>
+              </a:rPr>
+              <a:t>Contrast Improvement</a:t>
+            </a:r>
+            <a:endParaRPr lang="en-US" sz="4000" dirty="0">
+              <a:latin typeface="+mn-lt"/>
+            </a:endParaRPr>
+          </a:p>
+        </p:txBody>
+      </p:sp>
+    </p:spTree>
+    <p:extLst>
+      <p:ext uri="{BB962C8B-B14F-4D97-AF65-F5344CB8AC3E}">
+        <p14:creationId xmlns:p14="http://schemas.microsoft.com/office/powerpoint/2010/main" val="1798678518"/>
+      </p:ext>
+    </p:extLst>
+  </p:cSld>
+  <p:clrMapOvr>
+    <a:masterClrMapping/>
+  </p:clrMapOvr>
+</p:sld>
+</file>
+
+<file path=ppt/slides/slide49.xml><?xml version="1.0" encoding="utf-8"?>
 <p:sld xmlns:a="http://schemas.openxmlformats.org/drawingml/2006/main" xmlns:r="http://schemas.openxmlformats.org/officeDocument/2006/relationships" xmlns:p="http://schemas.openxmlformats.org/presentationml/2006/main">
   <p:cSld>
     <p:spTree>

</xml_diff>

<commit_message>
Updated and corre4cted slides
</commit_message>
<xml_diff>
--- a/Slides/1_Introduction.pptx
+++ b/Slides/1_Introduction.pptx
@@ -5,7 +5,7 @@
     <p:sldMasterId id="2147483648" r:id="rId1"/>
   </p:sldMasterIdLst>
   <p:notesMasterIdLst>
-    <p:notesMasterId r:id="rId51"/>
+    <p:notesMasterId r:id="rId52"/>
   </p:notesMasterIdLst>
   <p:sldIdLst>
     <p:sldId id="257" r:id="rId2"/>
@@ -21,42 +21,43 @@
     <p:sldId id="389" r:id="rId12"/>
     <p:sldId id="385" r:id="rId13"/>
     <p:sldId id="381" r:id="rId14"/>
-    <p:sldId id="443" r:id="rId15"/>
-    <p:sldId id="439" r:id="rId16"/>
-    <p:sldId id="291" r:id="rId17"/>
-    <p:sldId id="290" r:id="rId18"/>
-    <p:sldId id="400" r:id="rId19"/>
-    <p:sldId id="401" r:id="rId20"/>
-    <p:sldId id="402" r:id="rId21"/>
-    <p:sldId id="403" r:id="rId22"/>
-    <p:sldId id="440" r:id="rId23"/>
-    <p:sldId id="330" r:id="rId24"/>
-    <p:sldId id="390" r:id="rId25"/>
-    <p:sldId id="331" r:id="rId26"/>
-    <p:sldId id="395" r:id="rId27"/>
-    <p:sldId id="396" r:id="rId28"/>
-    <p:sldId id="404" r:id="rId29"/>
-    <p:sldId id="332" r:id="rId30"/>
-    <p:sldId id="333" r:id="rId31"/>
-    <p:sldId id="441" r:id="rId32"/>
-    <p:sldId id="391" r:id="rId33"/>
-    <p:sldId id="392" r:id="rId34"/>
-    <p:sldId id="393" r:id="rId35"/>
-    <p:sldId id="394" r:id="rId36"/>
-    <p:sldId id="442" r:id="rId37"/>
-    <p:sldId id="382" r:id="rId38"/>
-    <p:sldId id="399" r:id="rId39"/>
-    <p:sldId id="398" r:id="rId40"/>
-    <p:sldId id="444" r:id="rId41"/>
-    <p:sldId id="383" r:id="rId42"/>
-    <p:sldId id="386" r:id="rId43"/>
-    <p:sldId id="445" r:id="rId44"/>
-    <p:sldId id="387" r:id="rId45"/>
-    <p:sldId id="397" r:id="rId46"/>
-    <p:sldId id="446" r:id="rId47"/>
-    <p:sldId id="447" r:id="rId48"/>
-    <p:sldId id="448" r:id="rId49"/>
-    <p:sldId id="407" r:id="rId50"/>
+    <p:sldId id="449" r:id="rId15"/>
+    <p:sldId id="443" r:id="rId16"/>
+    <p:sldId id="439" r:id="rId17"/>
+    <p:sldId id="291" r:id="rId18"/>
+    <p:sldId id="290" r:id="rId19"/>
+    <p:sldId id="400" r:id="rId20"/>
+    <p:sldId id="401" r:id="rId21"/>
+    <p:sldId id="402" r:id="rId22"/>
+    <p:sldId id="403" r:id="rId23"/>
+    <p:sldId id="440" r:id="rId24"/>
+    <p:sldId id="330" r:id="rId25"/>
+    <p:sldId id="390" r:id="rId26"/>
+    <p:sldId id="331" r:id="rId27"/>
+    <p:sldId id="395" r:id="rId28"/>
+    <p:sldId id="396" r:id="rId29"/>
+    <p:sldId id="404" r:id="rId30"/>
+    <p:sldId id="332" r:id="rId31"/>
+    <p:sldId id="333" r:id="rId32"/>
+    <p:sldId id="441" r:id="rId33"/>
+    <p:sldId id="391" r:id="rId34"/>
+    <p:sldId id="392" r:id="rId35"/>
+    <p:sldId id="393" r:id="rId36"/>
+    <p:sldId id="394" r:id="rId37"/>
+    <p:sldId id="442" r:id="rId38"/>
+    <p:sldId id="382" r:id="rId39"/>
+    <p:sldId id="399" r:id="rId40"/>
+    <p:sldId id="398" r:id="rId41"/>
+    <p:sldId id="444" r:id="rId42"/>
+    <p:sldId id="383" r:id="rId43"/>
+    <p:sldId id="386" r:id="rId44"/>
+    <p:sldId id="445" r:id="rId45"/>
+    <p:sldId id="387" r:id="rId46"/>
+    <p:sldId id="397" r:id="rId47"/>
+    <p:sldId id="446" r:id="rId48"/>
+    <p:sldId id="447" r:id="rId49"/>
+    <p:sldId id="448" r:id="rId50"/>
+    <p:sldId id="407" r:id="rId51"/>
   </p:sldIdLst>
   <p:sldSz cx="12192000" cy="6858000"/>
   <p:notesSz cx="6858000" cy="9144000"/>
@@ -580,7 +581,7 @@
             <a:fld id="{13F0F35F-DD44-4607-AEC1-49D7A4BC4066}" type="slidenum">
               <a:rPr lang="en-US" smtClean="0"/>
               <a:pPr/>
-              <a:t>23</a:t>
+              <a:t>24</a:t>
             </a:fld>
             <a:endParaRPr lang="en-US" dirty="0"/>
           </a:p>
@@ -667,7 +668,7 @@
             <a:fld id="{13F0F35F-DD44-4607-AEC1-49D7A4BC4066}" type="slidenum">
               <a:rPr lang="en-US" smtClean="0"/>
               <a:pPr/>
-              <a:t>33</a:t>
+              <a:t>34</a:t>
             </a:fld>
             <a:endParaRPr lang="en-US" dirty="0"/>
           </a:p>
@@ -754,7 +755,7 @@
             <a:fld id="{13F0F35F-DD44-4607-AEC1-49D7A4BC4066}" type="slidenum">
               <a:rPr lang="en-US" smtClean="0"/>
               <a:pPr/>
-              <a:t>34</a:t>
+              <a:t>35</a:t>
             </a:fld>
             <a:endParaRPr lang="en-US" dirty="0"/>
           </a:p>
@@ -841,7 +842,7 @@
             <a:fld id="{13F0F35F-DD44-4607-AEC1-49D7A4BC4066}" type="slidenum">
               <a:rPr lang="en-US" smtClean="0"/>
               <a:pPr/>
-              <a:t>35</a:t>
+              <a:t>36</a:t>
             </a:fld>
             <a:endParaRPr lang="en-US" dirty="0"/>
           </a:p>
@@ -928,7 +929,7 @@
             <a:fld id="{13F0F35F-DD44-4607-AEC1-49D7A4BC4066}" type="slidenum">
               <a:rPr lang="en-US" smtClean="0"/>
               <a:pPr/>
-              <a:t>37</a:t>
+              <a:t>38</a:t>
             </a:fld>
             <a:endParaRPr lang="en-US" dirty="0"/>
           </a:p>
@@ -1015,7 +1016,7 @@
             <a:fld id="{13F0F35F-DD44-4607-AEC1-49D7A4BC4066}" type="slidenum">
               <a:rPr lang="en-US" smtClean="0"/>
               <a:pPr/>
-              <a:t>38</a:t>
+              <a:t>39</a:t>
             </a:fld>
             <a:endParaRPr lang="en-US" dirty="0"/>
           </a:p>
@@ -1102,7 +1103,7 @@
             <a:fld id="{13F0F35F-DD44-4607-AEC1-49D7A4BC4066}" type="slidenum">
               <a:rPr lang="en-US" smtClean="0"/>
               <a:pPr/>
-              <a:t>39</a:t>
+              <a:t>40</a:t>
             </a:fld>
             <a:endParaRPr lang="en-US" dirty="0"/>
           </a:p>
@@ -1192,7 +1193,7 @@
             <a:fld id="{13F0F35F-DD44-4607-AEC1-49D7A4BC4066}" type="slidenum">
               <a:rPr lang="en-US" smtClean="0"/>
               <a:pPr/>
-              <a:t>40</a:t>
+              <a:t>41</a:t>
             </a:fld>
             <a:endParaRPr lang="en-US" dirty="0"/>
           </a:p>
@@ -1279,7 +1280,7 @@
             <a:fld id="{13F0F35F-DD44-4607-AEC1-49D7A4BC4066}" type="slidenum">
               <a:rPr lang="en-US" smtClean="0"/>
               <a:pPr/>
-              <a:t>41</a:t>
+              <a:t>42</a:t>
             </a:fld>
             <a:endParaRPr lang="en-US" dirty="0"/>
           </a:p>
@@ -1366,7 +1367,7 @@
             <a:fld id="{13F0F35F-DD44-4607-AEC1-49D7A4BC4066}" type="slidenum">
               <a:rPr lang="en-US" smtClean="0"/>
               <a:pPr/>
-              <a:t>42</a:t>
+              <a:t>43</a:t>
             </a:fld>
             <a:endParaRPr lang="en-US" dirty="0"/>
           </a:p>
@@ -1456,7 +1457,7 @@
             <a:fld id="{13F0F35F-DD44-4607-AEC1-49D7A4BC4066}" type="slidenum">
               <a:rPr lang="en-US" smtClean="0"/>
               <a:pPr/>
-              <a:t>43</a:t>
+              <a:t>44</a:t>
             </a:fld>
             <a:endParaRPr lang="en-US" dirty="0"/>
           </a:p>
@@ -1543,7 +1544,7 @@
             <a:fld id="{13F0F35F-DD44-4607-AEC1-49D7A4BC4066}" type="slidenum">
               <a:rPr lang="en-US" smtClean="0"/>
               <a:pPr/>
-              <a:t>24</a:t>
+              <a:t>25</a:t>
             </a:fld>
             <a:endParaRPr lang="en-US" dirty="0"/>
           </a:p>
@@ -1630,7 +1631,7 @@
             <a:fld id="{13F0F35F-DD44-4607-AEC1-49D7A4BC4066}" type="slidenum">
               <a:rPr lang="en-US" smtClean="0"/>
               <a:pPr/>
-              <a:t>44</a:t>
+              <a:t>45</a:t>
             </a:fld>
             <a:endParaRPr lang="en-US" dirty="0"/>
           </a:p>
@@ -1720,7 +1721,7 @@
             <a:fld id="{13F0F35F-DD44-4607-AEC1-49D7A4BC4066}" type="slidenum">
               <a:rPr lang="en-US" smtClean="0"/>
               <a:pPr/>
-              <a:t>45</a:t>
+              <a:t>46</a:t>
             </a:fld>
             <a:endParaRPr lang="en-US" dirty="0"/>
           </a:p>
@@ -1810,7 +1811,7 @@
             <a:fld id="{13F0F35F-DD44-4607-AEC1-49D7A4BC4066}" type="slidenum">
               <a:rPr lang="en-US" smtClean="0"/>
               <a:pPr/>
-              <a:t>46</a:t>
+              <a:t>47</a:t>
             </a:fld>
             <a:endParaRPr lang="en-US" dirty="0"/>
           </a:p>
@@ -1900,7 +1901,7 @@
             <a:fld id="{13F0F35F-DD44-4607-AEC1-49D7A4BC4066}" type="slidenum">
               <a:rPr lang="en-US" smtClean="0"/>
               <a:pPr/>
-              <a:t>47</a:t>
+              <a:t>48</a:t>
             </a:fld>
             <a:endParaRPr lang="en-US" dirty="0"/>
           </a:p>
@@ -1990,7 +1991,7 @@
             <a:fld id="{13F0F35F-DD44-4607-AEC1-49D7A4BC4066}" type="slidenum">
               <a:rPr lang="en-US" smtClean="0"/>
               <a:pPr/>
-              <a:t>48</a:t>
+              <a:t>49</a:t>
             </a:fld>
             <a:endParaRPr lang="en-US" dirty="0"/>
           </a:p>
@@ -2077,7 +2078,7 @@
             <a:fld id="{13F0F35F-DD44-4607-AEC1-49D7A4BC4066}" type="slidenum">
               <a:rPr lang="en-US" smtClean="0"/>
               <a:pPr/>
-              <a:t>25</a:t>
+              <a:t>26</a:t>
             </a:fld>
             <a:endParaRPr lang="en-US" dirty="0"/>
           </a:p>
@@ -2164,7 +2165,7 @@
             <a:fld id="{13F0F35F-DD44-4607-AEC1-49D7A4BC4066}" type="slidenum">
               <a:rPr lang="en-US" smtClean="0"/>
               <a:pPr/>
-              <a:t>26</a:t>
+              <a:t>27</a:t>
             </a:fld>
             <a:endParaRPr lang="en-US" dirty="0"/>
           </a:p>
@@ -2251,7 +2252,7 @@
             <a:fld id="{13F0F35F-DD44-4607-AEC1-49D7A4BC4066}" type="slidenum">
               <a:rPr lang="en-US" smtClean="0"/>
               <a:pPr/>
-              <a:t>27</a:t>
+              <a:t>28</a:t>
             </a:fld>
             <a:endParaRPr lang="en-US" dirty="0"/>
           </a:p>
@@ -2338,7 +2339,7 @@
             <a:fld id="{13F0F35F-DD44-4607-AEC1-49D7A4BC4066}" type="slidenum">
               <a:rPr lang="en-US" smtClean="0"/>
               <a:pPr/>
-              <a:t>28</a:t>
+              <a:t>29</a:t>
             </a:fld>
             <a:endParaRPr lang="en-US" dirty="0"/>
           </a:p>
@@ -2425,7 +2426,7 @@
             <a:fld id="{13F0F35F-DD44-4607-AEC1-49D7A4BC4066}" type="slidenum">
               <a:rPr lang="en-US" smtClean="0"/>
               <a:pPr/>
-              <a:t>29</a:t>
+              <a:t>30</a:t>
             </a:fld>
             <a:endParaRPr lang="en-US" dirty="0"/>
           </a:p>
@@ -2512,7 +2513,7 @@
             <a:fld id="{13F0F35F-DD44-4607-AEC1-49D7A4BC4066}" type="slidenum">
               <a:rPr lang="en-US" smtClean="0"/>
               <a:pPr/>
-              <a:t>30</a:t>
+              <a:t>31</a:t>
             </a:fld>
             <a:endParaRPr lang="en-US" dirty="0"/>
           </a:p>
@@ -2599,7 +2600,7 @@
             <a:fld id="{13F0F35F-DD44-4607-AEC1-49D7A4BC4066}" type="slidenum">
               <a:rPr lang="en-US" smtClean="0"/>
               <a:pPr/>
-              <a:t>32</a:t>
+              <a:t>33</a:t>
             </a:fld>
             <a:endParaRPr lang="en-US" dirty="0"/>
           </a:p>
@@ -9353,6 +9354,193 @@
 </file>
 
 <file path=ppt/slides/slide14.xml><?xml version="1.0" encoding="utf-8"?>
+<p:sld xmlns:a="http://schemas.openxmlformats.org/drawingml/2006/main" xmlns:r="http://schemas.openxmlformats.org/officeDocument/2006/relationships" xmlns:p="http://schemas.openxmlformats.org/presentationml/2006/main">
+  <p:cSld>
+    <p:spTree>
+      <p:nvGrpSpPr>
+        <p:cNvPr id="1" name=""/>
+        <p:cNvGrpSpPr/>
+        <p:nvPr/>
+      </p:nvGrpSpPr>
+      <p:grpSpPr>
+        <a:xfrm>
+          <a:off x="0" y="0"/>
+          <a:ext cx="0" cy="0"/>
+          <a:chOff x="0" y="0"/>
+          <a:chExt cx="0" cy="0"/>
+        </a:xfrm>
+      </p:grpSpPr>
+      <p:sp>
+        <p:nvSpPr>
+          <p:cNvPr id="3" name="Content Placeholder 2">
+            <a:extLst>
+              <a:ext uri="{FF2B5EF4-FFF2-40B4-BE49-F238E27FC236}">
+                <a16:creationId xmlns:a16="http://schemas.microsoft.com/office/drawing/2014/main" id="{258E6AF3-7615-4BD1-878E-A94C93E98F90}"/>
+              </a:ext>
+            </a:extLst>
+          </p:cNvPr>
+          <p:cNvSpPr>
+            <a:spLocks noGrp="1"/>
+          </p:cNvSpPr>
+          <p:nvPr>
+            <p:ph idx="1"/>
+          </p:nvPr>
+        </p:nvSpPr>
+        <p:spPr>
+          <a:xfrm>
+            <a:off x="838200" y="1324927"/>
+            <a:ext cx="10515600" cy="4898217"/>
+          </a:xfrm>
+        </p:spPr>
+        <p:txBody>
+          <a:bodyPr>
+            <a:normAutofit/>
+          </a:bodyPr>
+          <a:lstStyle/>
+          <a:p>
+            <a:pPr marL="0" indent="0">
+              <a:buNone/>
+            </a:pPr>
+            <a:r>
+              <a:rPr lang="en-US" dirty="0"/>
+              <a:t>Timely release of assignment solutions is an important part of the learning process </a:t>
+            </a:r>
+          </a:p>
+          <a:p>
+            <a:r>
+              <a:rPr lang="en-US" b="1" dirty="0"/>
+              <a:t>Do not fall behind! </a:t>
+            </a:r>
+            <a:r>
+              <a:rPr lang="en-US"/>
+              <a:t>With approximately 12 </a:t>
+            </a:r>
+            <a:r>
+              <a:rPr lang="en-US" dirty="0"/>
+              <a:t>assignments and a project, there is very </a:t>
+            </a:r>
+            <a:r>
+              <a:rPr lang="en-US" b="1" dirty="0"/>
+              <a:t>little time to “catch-up”</a:t>
+            </a:r>
+            <a:endParaRPr lang="en-US" dirty="0"/>
+          </a:p>
+          <a:p>
+            <a:r>
+              <a:rPr lang="en-US" dirty="0"/>
+              <a:t>Late assignment policy:   </a:t>
+            </a:r>
+          </a:p>
+          <a:p>
+            <a:pPr lvl="1"/>
+            <a:r>
+              <a:rPr lang="en-US" dirty="0"/>
+              <a:t>Up to one day late - no penalty  </a:t>
+            </a:r>
+          </a:p>
+          <a:p>
+            <a:pPr lvl="1"/>
+            <a:r>
+              <a:rPr lang="en-US" dirty="0"/>
+              <a:t>Up to 6 days late - less 20% </a:t>
+            </a:r>
+          </a:p>
+          <a:p>
+            <a:pPr lvl="1"/>
+            <a:r>
+              <a:rPr lang="en-US" dirty="0"/>
+              <a:t>More than 6 days late - no credit   </a:t>
+            </a:r>
+          </a:p>
+          <a:p>
+            <a:pPr lvl="1"/>
+            <a:endParaRPr lang="en-US" dirty="0"/>
+          </a:p>
+          <a:p>
+            <a:pPr marL="0" indent="0">
+              <a:buNone/>
+            </a:pPr>
+            <a:r>
+              <a:rPr lang="en-US" dirty="0">
+                <a:solidFill>
+                  <a:srgbClr val="C00000"/>
+                </a:solidFill>
+              </a:rPr>
+              <a:t>Make sure you turn in work on time!</a:t>
+            </a:r>
+          </a:p>
+        </p:txBody>
+      </p:sp>
+      <p:sp>
+        <p:nvSpPr>
+          <p:cNvPr id="6" name="Title 1">
+            <a:extLst>
+              <a:ext uri="{FF2B5EF4-FFF2-40B4-BE49-F238E27FC236}">
+                <a16:creationId xmlns:a16="http://schemas.microsoft.com/office/drawing/2014/main" id="{CD29F70F-B868-451B-A65D-8721F4C7A2D9}"/>
+              </a:ext>
+            </a:extLst>
+          </p:cNvPr>
+          <p:cNvSpPr txBox="1">
+            <a:spLocks/>
+          </p:cNvSpPr>
+          <p:nvPr/>
+        </p:nvSpPr>
+        <p:spPr>
+          <a:xfrm>
+            <a:off x="838200" y="-635"/>
+            <a:ext cx="10515600" cy="1325563"/>
+          </a:xfrm>
+          <a:prstGeom prst="rect">
+            <a:avLst/>
+          </a:prstGeom>
+        </p:spPr>
+        <p:txBody>
+          <a:bodyPr vert="horz" lIns="91440" tIns="45720" rIns="91440" bIns="45720" rtlCol="0" anchor="ctr">
+            <a:normAutofit/>
+          </a:bodyPr>
+          <a:lstStyle>
+            <a:lvl1pPr algn="l" defTabSz="914400" rtl="0" eaLnBrk="1" latinLnBrk="0" hangingPunct="1">
+              <a:lnSpc>
+                <a:spcPct val="90000"/>
+              </a:lnSpc>
+              <a:spcBef>
+                <a:spcPct val="0"/>
+              </a:spcBef>
+              <a:buNone/>
+              <a:defRPr sz="4400" kern="1200">
+                <a:solidFill>
+                  <a:schemeClr val="tx1"/>
+                </a:solidFill>
+                <a:latin typeface="+mj-lt"/>
+                <a:ea typeface="+mj-ea"/>
+                <a:cs typeface="+mj-cs"/>
+              </a:defRPr>
+            </a:lvl1pPr>
+          </a:lstStyle>
+          <a:p>
+            <a:r>
+              <a:rPr lang="en-US" dirty="0">
+                <a:latin typeface="+mn-lt"/>
+              </a:rPr>
+              <a:t>Late Assignment Policy</a:t>
+            </a:r>
+          </a:p>
+        </p:txBody>
+      </p:sp>
+    </p:spTree>
+    <p:extLst>
+      <p:ext uri="{BB962C8B-B14F-4D97-AF65-F5344CB8AC3E}">
+        <p14:creationId xmlns:p14="http://schemas.microsoft.com/office/powerpoint/2010/main" val="1228520043"/>
+      </p:ext>
+    </p:extLst>
+  </p:cSld>
+  <p:clrMapOvr>
+    <a:masterClrMapping/>
+  </p:clrMapOvr>
+</p:sld>
+</file>
+
+<file path=ppt/slides/slide15.xml><?xml version="1.0" encoding="utf-8"?>
 <p:sld xmlns:a="http://schemas.openxmlformats.org/drawingml/2006/main" xmlns:r="http://schemas.openxmlformats.org/officeDocument/2006/relationships" xmlns:p="http://schemas.openxmlformats.org/presentationml/2006/main" show="0">
   <p:cSld>
     <p:spTree>
@@ -9867,7 +10055,7 @@
 </p:sld>
 </file>
 
-<file path=ppt/slides/slide15.xml><?xml version="1.0" encoding="utf-8"?>
+<file path=ppt/slides/slide16.xml><?xml version="1.0" encoding="utf-8"?>
 <p:sld xmlns:a="http://schemas.openxmlformats.org/drawingml/2006/main" xmlns:r="http://schemas.openxmlformats.org/officeDocument/2006/relationships" xmlns:p="http://schemas.openxmlformats.org/presentationml/2006/main">
   <p:cSld>
     <p:spTree>
@@ -9932,7 +10120,7 @@
 </p:sld>
 </file>
 
-<file path=ppt/slides/slide16.xml><?xml version="1.0" encoding="utf-8"?>
+<file path=ppt/slides/slide17.xml><?xml version="1.0" encoding="utf-8"?>
 <p:sld xmlns:a="http://schemas.openxmlformats.org/drawingml/2006/main" xmlns:r="http://schemas.openxmlformats.org/officeDocument/2006/relationships" xmlns:p="http://schemas.openxmlformats.org/presentationml/2006/main">
   <p:cSld>
     <p:spTree>
@@ -10294,7 +10482,7 @@
 </p:sld>
 </file>
 
-<file path=ppt/slides/slide17.xml><?xml version="1.0" encoding="utf-8"?>
+<file path=ppt/slides/slide18.xml><?xml version="1.0" encoding="utf-8"?>
 <p:sld xmlns:a="http://schemas.openxmlformats.org/drawingml/2006/main" xmlns:r="http://schemas.openxmlformats.org/officeDocument/2006/relationships" xmlns:p="http://schemas.openxmlformats.org/presentationml/2006/main">
   <p:cSld>
     <p:spTree>
@@ -10867,7 +11055,7 @@
 </p:sld>
 </file>
 
-<file path=ppt/slides/slide18.xml><?xml version="1.0" encoding="utf-8"?>
+<file path=ppt/slides/slide19.xml><?xml version="1.0" encoding="utf-8"?>
 <p:sld xmlns:a="http://schemas.openxmlformats.org/drawingml/2006/main" xmlns:r="http://schemas.openxmlformats.org/officeDocument/2006/relationships" xmlns:p="http://schemas.openxmlformats.org/presentationml/2006/main">
   <p:cSld>
     <p:spTree>
@@ -11215,379 +11403,6 @@
                                         </p:cTn>
                                         <p:tgtEl>
                                           <p:spTgt spid="6"/>
-                                        </p:tgtEl>
-                                        <p:attrNameLst>
-                                          <p:attrName>style.visibility</p:attrName>
-                                        </p:attrNameLst>
-                                      </p:cBhvr>
-                                      <p:to>
-                                        <p:strVal val="visible"/>
-                                      </p:to>
-                                    </p:set>
-                                  </p:childTnLst>
-                                </p:cTn>
-                              </p:par>
-                            </p:childTnLst>
-                          </p:cTn>
-                        </p:par>
-                      </p:childTnLst>
-                    </p:cTn>
-                  </p:par>
-                </p:childTnLst>
-              </p:cTn>
-              <p:prevCondLst>
-                <p:cond evt="onPrev" delay="0">
-                  <p:tgtEl>
-                    <p:sldTgt/>
-                  </p:tgtEl>
-                </p:cond>
-              </p:prevCondLst>
-              <p:nextCondLst>
-                <p:cond evt="onNext" delay="0">
-                  <p:tgtEl>
-                    <p:sldTgt/>
-                  </p:tgtEl>
-                </p:cond>
-              </p:nextCondLst>
-            </p:seq>
-          </p:childTnLst>
-        </p:cTn>
-      </p:par>
-    </p:tnLst>
-    <p:bldLst>
-      <p:bldP spid="6" grpId="0"/>
-    </p:bldLst>
-  </p:timing>
-</p:sld>
-</file>
-
-<file path=ppt/slides/slide19.xml><?xml version="1.0" encoding="utf-8"?>
-<p:sld xmlns:a="http://schemas.openxmlformats.org/drawingml/2006/main" xmlns:r="http://schemas.openxmlformats.org/officeDocument/2006/relationships" xmlns:p="http://schemas.openxmlformats.org/presentationml/2006/main">
-  <p:cSld>
-    <p:spTree>
-      <p:nvGrpSpPr>
-        <p:cNvPr id="1" name=""/>
-        <p:cNvGrpSpPr/>
-        <p:nvPr/>
-      </p:nvGrpSpPr>
-      <p:grpSpPr>
-        <a:xfrm>
-          <a:off x="0" y="0"/>
-          <a:ext cx="0" cy="0"/>
-          <a:chOff x="0" y="0"/>
-          <a:chExt cx="0" cy="0"/>
-        </a:xfrm>
-      </p:grpSpPr>
-      <p:sp>
-        <p:nvSpPr>
-          <p:cNvPr id="2" name="Title 1">
-            <a:extLst>
-              <a:ext uri="{FF2B5EF4-FFF2-40B4-BE49-F238E27FC236}">
-                <a16:creationId xmlns:a16="http://schemas.microsoft.com/office/drawing/2014/main" id="{DDFB6AB4-96EB-434D-8BFC-6697DE744D73}"/>
-              </a:ext>
-            </a:extLst>
-          </p:cNvPr>
-          <p:cNvSpPr>
-            <a:spLocks noGrp="1"/>
-          </p:cNvSpPr>
-          <p:nvPr>
-            <p:ph type="title"/>
-          </p:nvPr>
-        </p:nvSpPr>
-        <p:spPr>
-          <a:xfrm>
-            <a:off x="789301" y="140193"/>
-            <a:ext cx="10515600" cy="725309"/>
-          </a:xfrm>
-        </p:spPr>
-        <p:txBody>
-          <a:bodyPr>
-            <a:normAutofit/>
-          </a:bodyPr>
-          <a:lstStyle/>
-          <a:p>
-            <a:r>
-              <a:rPr lang="en-US" sz="4000" dirty="0">
-                <a:latin typeface="+mn-lt"/>
-              </a:rPr>
-              <a:t>The Nature of Images</a:t>
-            </a:r>
-          </a:p>
-        </p:txBody>
-      </p:sp>
-      <p:sp>
-        <p:nvSpPr>
-          <p:cNvPr id="3" name="Content Placeholder 2">
-            <a:extLst>
-              <a:ext uri="{FF2B5EF4-FFF2-40B4-BE49-F238E27FC236}">
-                <a16:creationId xmlns:a16="http://schemas.microsoft.com/office/drawing/2014/main" id="{4DBC6555-A8E7-4F73-8035-156F702D1410}"/>
-              </a:ext>
-            </a:extLst>
-          </p:cNvPr>
-          <p:cNvSpPr>
-            <a:spLocks noGrp="1"/>
-          </p:cNvSpPr>
-          <p:nvPr>
-            <p:ph idx="1"/>
-          </p:nvPr>
-        </p:nvSpPr>
-        <p:spPr>
-          <a:xfrm>
-            <a:off x="789301" y="1012197"/>
-            <a:ext cx="10325304" cy="5705610"/>
-          </a:xfrm>
-        </p:spPr>
-        <p:txBody>
-          <a:bodyPr/>
-          <a:lstStyle/>
-          <a:p>
-            <a:pPr marL="0" indent="0">
-              <a:buNone/>
-            </a:pPr>
-            <a:r>
-              <a:rPr lang="en-US" dirty="0"/>
-              <a:t>Basic image camera image formation </a:t>
-            </a:r>
-          </a:p>
-          <a:p>
-            <a:r>
-              <a:rPr lang="en-US" dirty="0"/>
-              <a:t>The smaller the aperture of the pinhole the light is focused to a point and the image is sharper, but less light passes</a:t>
-            </a:r>
-          </a:p>
-          <a:p>
-            <a:r>
-              <a:rPr lang="en-US" dirty="0"/>
-              <a:t>Aperture is parameterized by </a:t>
-            </a:r>
-            <a:r>
-              <a:rPr lang="en-US" b="1" dirty="0">
-                <a:hlinkClick r:id="rId2"/>
-              </a:rPr>
-              <a:t>f-stops or f-number</a:t>
-            </a:r>
-            <a:endParaRPr lang="en-US" b="1" dirty="0"/>
-          </a:p>
-        </p:txBody>
-      </p:sp>
-      <p:sp>
-        <p:nvSpPr>
-          <p:cNvPr id="6" name="TextBox 5">
-            <a:extLst>
-              <a:ext uri="{FF2B5EF4-FFF2-40B4-BE49-F238E27FC236}">
-                <a16:creationId xmlns:a16="http://schemas.microsoft.com/office/drawing/2014/main" id="{B7B32BF3-3201-4633-9970-6A18582B644A}"/>
-              </a:ext>
-            </a:extLst>
-          </p:cNvPr>
-          <p:cNvSpPr txBox="1"/>
-          <p:nvPr/>
-        </p:nvSpPr>
-        <p:spPr>
-          <a:xfrm>
-            <a:off x="4215041" y="6348475"/>
-            <a:ext cx="3938637" cy="369332"/>
-          </a:xfrm>
-          <a:prstGeom prst="rect">
-            <a:avLst/>
-          </a:prstGeom>
-          <a:noFill/>
-        </p:spPr>
-        <p:txBody>
-          <a:bodyPr wrap="square" rtlCol="0">
-            <a:spAutoFit/>
-          </a:bodyPr>
-          <a:lstStyle/>
-          <a:p>
-            <a:pPr algn="ctr"/>
-            <a:r>
-              <a:rPr lang="en-US" dirty="0"/>
-              <a:t>Credit, Wikipedia commons</a:t>
-            </a:r>
-          </a:p>
-        </p:txBody>
-      </p:sp>
-      <p:pic>
-        <p:nvPicPr>
-          <p:cNvPr id="7" name="Picture 6">
-            <a:extLst>
-              <a:ext uri="{FF2B5EF4-FFF2-40B4-BE49-F238E27FC236}">
-                <a16:creationId xmlns:a16="http://schemas.microsoft.com/office/drawing/2014/main" id="{3C1DF783-1E08-4942-9562-885C79708FD1}"/>
-              </a:ext>
-            </a:extLst>
-          </p:cNvPr>
-          <p:cNvPicPr>
-            <a:picLocks noChangeAspect="1"/>
-          </p:cNvPicPr>
-          <p:nvPr/>
-        </p:nvPicPr>
-        <p:blipFill>
-          <a:blip r:embed="rId3"/>
-          <a:stretch>
-            <a:fillRect/>
-          </a:stretch>
-        </p:blipFill>
-        <p:spPr>
-          <a:xfrm>
-            <a:off x="1077395" y="2955094"/>
-            <a:ext cx="8808253" cy="3320034"/>
-          </a:xfrm>
-          <a:prstGeom prst="rect">
-            <a:avLst/>
-          </a:prstGeom>
-        </p:spPr>
-      </p:pic>
-    </p:spTree>
-    <p:extLst>
-      <p:ext uri="{BB962C8B-B14F-4D97-AF65-F5344CB8AC3E}">
-        <p14:creationId xmlns:p14="http://schemas.microsoft.com/office/powerpoint/2010/main" val="665797988"/>
-      </p:ext>
-    </p:extLst>
-  </p:cSld>
-  <p:clrMapOvr>
-    <a:masterClrMapping/>
-  </p:clrMapOvr>
-  <p:timing>
-    <p:tnLst>
-      <p:par>
-        <p:cTn id="1" dur="indefinite" restart="never" nodeType="tmRoot">
-          <p:childTnLst>
-            <p:seq concurrent="1" nextAc="seek">
-              <p:cTn id="2" dur="indefinite" nodeType="mainSeq">
-                <p:childTnLst>
-                  <p:par>
-                    <p:cTn id="3" fill="hold">
-                      <p:stCondLst>
-                        <p:cond delay="indefinite"/>
-                      </p:stCondLst>
-                      <p:childTnLst>
-                        <p:par>
-                          <p:cTn id="4" fill="hold">
-                            <p:stCondLst>
-                              <p:cond delay="0"/>
-                            </p:stCondLst>
-                            <p:childTnLst>
-                              <p:par>
-                                <p:cTn id="5" presetID="1" presetClass="entr" presetSubtype="0" fill="hold" nodeType="clickEffect">
-                                  <p:stCondLst>
-                                    <p:cond delay="0"/>
-                                  </p:stCondLst>
-                                  <p:childTnLst>
-                                    <p:set>
-                                      <p:cBhvr>
-                                        <p:cTn id="6" dur="1" fill="hold">
-                                          <p:stCondLst>
-                                            <p:cond delay="0"/>
-                                          </p:stCondLst>
-                                        </p:cTn>
-                                        <p:tgtEl>
-                                          <p:spTgt spid="3">
-                                            <p:txEl>
-                                              <p:pRg st="1" end="1"/>
-                                            </p:txEl>
-                                          </p:spTgt>
-                                        </p:tgtEl>
-                                        <p:attrNameLst>
-                                          <p:attrName>style.visibility</p:attrName>
-                                        </p:attrNameLst>
-                                      </p:cBhvr>
-                                      <p:to>
-                                        <p:strVal val="visible"/>
-                                      </p:to>
-                                    </p:set>
-                                  </p:childTnLst>
-                                </p:cTn>
-                              </p:par>
-                            </p:childTnLst>
-                          </p:cTn>
-                        </p:par>
-                      </p:childTnLst>
-                    </p:cTn>
-                  </p:par>
-                  <p:par>
-                    <p:cTn id="7" fill="hold">
-                      <p:stCondLst>
-                        <p:cond delay="indefinite"/>
-                      </p:stCondLst>
-                      <p:childTnLst>
-                        <p:par>
-                          <p:cTn id="8" fill="hold">
-                            <p:stCondLst>
-                              <p:cond delay="0"/>
-                            </p:stCondLst>
-                            <p:childTnLst>
-                              <p:par>
-                                <p:cTn id="9" presetID="1" presetClass="entr" presetSubtype="0" fill="hold" nodeType="clickEffect">
-                                  <p:stCondLst>
-                                    <p:cond delay="0"/>
-                                  </p:stCondLst>
-                                  <p:childTnLst>
-                                    <p:set>
-                                      <p:cBhvr>
-                                        <p:cTn id="10" dur="1" fill="hold">
-                                          <p:stCondLst>
-                                            <p:cond delay="0"/>
-                                          </p:stCondLst>
-                                        </p:cTn>
-                                        <p:tgtEl>
-                                          <p:spTgt spid="3">
-                                            <p:txEl>
-                                              <p:pRg st="2" end="2"/>
-                                            </p:txEl>
-                                          </p:spTgt>
-                                        </p:tgtEl>
-                                        <p:attrNameLst>
-                                          <p:attrName>style.visibility</p:attrName>
-                                        </p:attrNameLst>
-                                      </p:cBhvr>
-                                      <p:to>
-                                        <p:strVal val="visible"/>
-                                      </p:to>
-                                    </p:set>
-                                  </p:childTnLst>
-                                </p:cTn>
-                              </p:par>
-                              <p:par>
-                                <p:cTn id="11" presetID="1" presetClass="entr" presetSubtype="0" fill="hold" grpId="0" nodeType="withEffect">
-                                  <p:stCondLst>
-                                    <p:cond delay="0"/>
-                                  </p:stCondLst>
-                                  <p:childTnLst>
-                                    <p:set>
-                                      <p:cBhvr>
-                                        <p:cTn id="12" dur="1" fill="hold">
-                                          <p:stCondLst>
-                                            <p:cond delay="0"/>
-                                          </p:stCondLst>
-                                        </p:cTn>
-                                        <p:tgtEl>
-                                          <p:spTgt spid="6"/>
-                                        </p:tgtEl>
-                                        <p:attrNameLst>
-                                          <p:attrName>style.visibility</p:attrName>
-                                        </p:attrNameLst>
-                                      </p:cBhvr>
-                                      <p:to>
-                                        <p:strVal val="visible"/>
-                                      </p:to>
-                                    </p:set>
-                                  </p:childTnLst>
-                                </p:cTn>
-                              </p:par>
-                              <p:par>
-                                <p:cTn id="13" presetID="1" presetClass="entr" presetSubtype="0" fill="hold" nodeType="withEffect">
-                                  <p:stCondLst>
-                                    <p:cond delay="0"/>
-                                  </p:stCondLst>
-                                  <p:childTnLst>
-                                    <p:set>
-                                      <p:cBhvr>
-                                        <p:cTn id="14" dur="1" fill="hold">
-                                          <p:stCondLst>
-                                            <p:cond delay="0"/>
-                                          </p:stCondLst>
-                                        </p:cTn>
-                                        <p:tgtEl>
-                                          <p:spTgt spid="7"/>
                                         </p:tgtEl>
                                         <p:attrNameLst>
                                           <p:attrName>style.visibility</p:attrName>
@@ -12301,6 +12116,379 @@
           <a:p>
             <a:r>
               <a:rPr lang="en-US" dirty="0"/>
+              <a:t>The smaller the aperture of the pinhole the light is focused to a point and the image is sharper, but less light passes</a:t>
+            </a:r>
+          </a:p>
+          <a:p>
+            <a:r>
+              <a:rPr lang="en-US" dirty="0"/>
+              <a:t>Aperture is parameterized by </a:t>
+            </a:r>
+            <a:r>
+              <a:rPr lang="en-US" b="1" dirty="0">
+                <a:hlinkClick r:id="rId2"/>
+              </a:rPr>
+              <a:t>f-stops or f-number</a:t>
+            </a:r>
+            <a:endParaRPr lang="en-US" b="1" dirty="0"/>
+          </a:p>
+        </p:txBody>
+      </p:sp>
+      <p:sp>
+        <p:nvSpPr>
+          <p:cNvPr id="6" name="TextBox 5">
+            <a:extLst>
+              <a:ext uri="{FF2B5EF4-FFF2-40B4-BE49-F238E27FC236}">
+                <a16:creationId xmlns:a16="http://schemas.microsoft.com/office/drawing/2014/main" id="{B7B32BF3-3201-4633-9970-6A18582B644A}"/>
+              </a:ext>
+            </a:extLst>
+          </p:cNvPr>
+          <p:cNvSpPr txBox="1"/>
+          <p:nvPr/>
+        </p:nvSpPr>
+        <p:spPr>
+          <a:xfrm>
+            <a:off x="4215041" y="6348475"/>
+            <a:ext cx="3938637" cy="369332"/>
+          </a:xfrm>
+          <a:prstGeom prst="rect">
+            <a:avLst/>
+          </a:prstGeom>
+          <a:noFill/>
+        </p:spPr>
+        <p:txBody>
+          <a:bodyPr wrap="square" rtlCol="0">
+            <a:spAutoFit/>
+          </a:bodyPr>
+          <a:lstStyle/>
+          <a:p>
+            <a:pPr algn="ctr"/>
+            <a:r>
+              <a:rPr lang="en-US" dirty="0"/>
+              <a:t>Credit, Wikipedia commons</a:t>
+            </a:r>
+          </a:p>
+        </p:txBody>
+      </p:sp>
+      <p:pic>
+        <p:nvPicPr>
+          <p:cNvPr id="7" name="Picture 6">
+            <a:extLst>
+              <a:ext uri="{FF2B5EF4-FFF2-40B4-BE49-F238E27FC236}">
+                <a16:creationId xmlns:a16="http://schemas.microsoft.com/office/drawing/2014/main" id="{3C1DF783-1E08-4942-9562-885C79708FD1}"/>
+              </a:ext>
+            </a:extLst>
+          </p:cNvPr>
+          <p:cNvPicPr>
+            <a:picLocks noChangeAspect="1"/>
+          </p:cNvPicPr>
+          <p:nvPr/>
+        </p:nvPicPr>
+        <p:blipFill>
+          <a:blip r:embed="rId3"/>
+          <a:stretch>
+            <a:fillRect/>
+          </a:stretch>
+        </p:blipFill>
+        <p:spPr>
+          <a:xfrm>
+            <a:off x="1077395" y="2955094"/>
+            <a:ext cx="8808253" cy="3320034"/>
+          </a:xfrm>
+          <a:prstGeom prst="rect">
+            <a:avLst/>
+          </a:prstGeom>
+        </p:spPr>
+      </p:pic>
+    </p:spTree>
+    <p:extLst>
+      <p:ext uri="{BB962C8B-B14F-4D97-AF65-F5344CB8AC3E}">
+        <p14:creationId xmlns:p14="http://schemas.microsoft.com/office/powerpoint/2010/main" val="665797988"/>
+      </p:ext>
+    </p:extLst>
+  </p:cSld>
+  <p:clrMapOvr>
+    <a:masterClrMapping/>
+  </p:clrMapOvr>
+  <p:timing>
+    <p:tnLst>
+      <p:par>
+        <p:cTn id="1" dur="indefinite" restart="never" nodeType="tmRoot">
+          <p:childTnLst>
+            <p:seq concurrent="1" nextAc="seek">
+              <p:cTn id="2" dur="indefinite" nodeType="mainSeq">
+                <p:childTnLst>
+                  <p:par>
+                    <p:cTn id="3" fill="hold">
+                      <p:stCondLst>
+                        <p:cond delay="indefinite"/>
+                      </p:stCondLst>
+                      <p:childTnLst>
+                        <p:par>
+                          <p:cTn id="4" fill="hold">
+                            <p:stCondLst>
+                              <p:cond delay="0"/>
+                            </p:stCondLst>
+                            <p:childTnLst>
+                              <p:par>
+                                <p:cTn id="5" presetID="1" presetClass="entr" presetSubtype="0" fill="hold" nodeType="clickEffect">
+                                  <p:stCondLst>
+                                    <p:cond delay="0"/>
+                                  </p:stCondLst>
+                                  <p:childTnLst>
+                                    <p:set>
+                                      <p:cBhvr>
+                                        <p:cTn id="6" dur="1" fill="hold">
+                                          <p:stCondLst>
+                                            <p:cond delay="0"/>
+                                          </p:stCondLst>
+                                        </p:cTn>
+                                        <p:tgtEl>
+                                          <p:spTgt spid="3">
+                                            <p:txEl>
+                                              <p:pRg st="1" end="1"/>
+                                            </p:txEl>
+                                          </p:spTgt>
+                                        </p:tgtEl>
+                                        <p:attrNameLst>
+                                          <p:attrName>style.visibility</p:attrName>
+                                        </p:attrNameLst>
+                                      </p:cBhvr>
+                                      <p:to>
+                                        <p:strVal val="visible"/>
+                                      </p:to>
+                                    </p:set>
+                                  </p:childTnLst>
+                                </p:cTn>
+                              </p:par>
+                            </p:childTnLst>
+                          </p:cTn>
+                        </p:par>
+                      </p:childTnLst>
+                    </p:cTn>
+                  </p:par>
+                  <p:par>
+                    <p:cTn id="7" fill="hold">
+                      <p:stCondLst>
+                        <p:cond delay="indefinite"/>
+                      </p:stCondLst>
+                      <p:childTnLst>
+                        <p:par>
+                          <p:cTn id="8" fill="hold">
+                            <p:stCondLst>
+                              <p:cond delay="0"/>
+                            </p:stCondLst>
+                            <p:childTnLst>
+                              <p:par>
+                                <p:cTn id="9" presetID="1" presetClass="entr" presetSubtype="0" fill="hold" nodeType="clickEffect">
+                                  <p:stCondLst>
+                                    <p:cond delay="0"/>
+                                  </p:stCondLst>
+                                  <p:childTnLst>
+                                    <p:set>
+                                      <p:cBhvr>
+                                        <p:cTn id="10" dur="1" fill="hold">
+                                          <p:stCondLst>
+                                            <p:cond delay="0"/>
+                                          </p:stCondLst>
+                                        </p:cTn>
+                                        <p:tgtEl>
+                                          <p:spTgt spid="3">
+                                            <p:txEl>
+                                              <p:pRg st="2" end="2"/>
+                                            </p:txEl>
+                                          </p:spTgt>
+                                        </p:tgtEl>
+                                        <p:attrNameLst>
+                                          <p:attrName>style.visibility</p:attrName>
+                                        </p:attrNameLst>
+                                      </p:cBhvr>
+                                      <p:to>
+                                        <p:strVal val="visible"/>
+                                      </p:to>
+                                    </p:set>
+                                  </p:childTnLst>
+                                </p:cTn>
+                              </p:par>
+                              <p:par>
+                                <p:cTn id="11" presetID="1" presetClass="entr" presetSubtype="0" fill="hold" grpId="0" nodeType="withEffect">
+                                  <p:stCondLst>
+                                    <p:cond delay="0"/>
+                                  </p:stCondLst>
+                                  <p:childTnLst>
+                                    <p:set>
+                                      <p:cBhvr>
+                                        <p:cTn id="12" dur="1" fill="hold">
+                                          <p:stCondLst>
+                                            <p:cond delay="0"/>
+                                          </p:stCondLst>
+                                        </p:cTn>
+                                        <p:tgtEl>
+                                          <p:spTgt spid="6"/>
+                                        </p:tgtEl>
+                                        <p:attrNameLst>
+                                          <p:attrName>style.visibility</p:attrName>
+                                        </p:attrNameLst>
+                                      </p:cBhvr>
+                                      <p:to>
+                                        <p:strVal val="visible"/>
+                                      </p:to>
+                                    </p:set>
+                                  </p:childTnLst>
+                                </p:cTn>
+                              </p:par>
+                              <p:par>
+                                <p:cTn id="13" presetID="1" presetClass="entr" presetSubtype="0" fill="hold" nodeType="withEffect">
+                                  <p:stCondLst>
+                                    <p:cond delay="0"/>
+                                  </p:stCondLst>
+                                  <p:childTnLst>
+                                    <p:set>
+                                      <p:cBhvr>
+                                        <p:cTn id="14" dur="1" fill="hold">
+                                          <p:stCondLst>
+                                            <p:cond delay="0"/>
+                                          </p:stCondLst>
+                                        </p:cTn>
+                                        <p:tgtEl>
+                                          <p:spTgt spid="7"/>
+                                        </p:tgtEl>
+                                        <p:attrNameLst>
+                                          <p:attrName>style.visibility</p:attrName>
+                                        </p:attrNameLst>
+                                      </p:cBhvr>
+                                      <p:to>
+                                        <p:strVal val="visible"/>
+                                      </p:to>
+                                    </p:set>
+                                  </p:childTnLst>
+                                </p:cTn>
+                              </p:par>
+                            </p:childTnLst>
+                          </p:cTn>
+                        </p:par>
+                      </p:childTnLst>
+                    </p:cTn>
+                  </p:par>
+                </p:childTnLst>
+              </p:cTn>
+              <p:prevCondLst>
+                <p:cond evt="onPrev" delay="0">
+                  <p:tgtEl>
+                    <p:sldTgt/>
+                  </p:tgtEl>
+                </p:cond>
+              </p:prevCondLst>
+              <p:nextCondLst>
+                <p:cond evt="onNext" delay="0">
+                  <p:tgtEl>
+                    <p:sldTgt/>
+                  </p:tgtEl>
+                </p:cond>
+              </p:nextCondLst>
+            </p:seq>
+          </p:childTnLst>
+        </p:cTn>
+      </p:par>
+    </p:tnLst>
+    <p:bldLst>
+      <p:bldP spid="6" grpId="0"/>
+    </p:bldLst>
+  </p:timing>
+</p:sld>
+</file>
+
+<file path=ppt/slides/slide21.xml><?xml version="1.0" encoding="utf-8"?>
+<p:sld xmlns:a="http://schemas.openxmlformats.org/drawingml/2006/main" xmlns:r="http://schemas.openxmlformats.org/officeDocument/2006/relationships" xmlns:p="http://schemas.openxmlformats.org/presentationml/2006/main">
+  <p:cSld>
+    <p:spTree>
+      <p:nvGrpSpPr>
+        <p:cNvPr id="1" name=""/>
+        <p:cNvGrpSpPr/>
+        <p:nvPr/>
+      </p:nvGrpSpPr>
+      <p:grpSpPr>
+        <a:xfrm>
+          <a:off x="0" y="0"/>
+          <a:ext cx="0" cy="0"/>
+          <a:chOff x="0" y="0"/>
+          <a:chExt cx="0" cy="0"/>
+        </a:xfrm>
+      </p:grpSpPr>
+      <p:sp>
+        <p:nvSpPr>
+          <p:cNvPr id="2" name="Title 1">
+            <a:extLst>
+              <a:ext uri="{FF2B5EF4-FFF2-40B4-BE49-F238E27FC236}">
+                <a16:creationId xmlns:a16="http://schemas.microsoft.com/office/drawing/2014/main" id="{DDFB6AB4-96EB-434D-8BFC-6697DE744D73}"/>
+              </a:ext>
+            </a:extLst>
+          </p:cNvPr>
+          <p:cNvSpPr>
+            <a:spLocks noGrp="1"/>
+          </p:cNvSpPr>
+          <p:nvPr>
+            <p:ph type="title"/>
+          </p:nvPr>
+        </p:nvSpPr>
+        <p:spPr>
+          <a:xfrm>
+            <a:off x="789301" y="140193"/>
+            <a:ext cx="10515600" cy="725309"/>
+          </a:xfrm>
+        </p:spPr>
+        <p:txBody>
+          <a:bodyPr>
+            <a:normAutofit/>
+          </a:bodyPr>
+          <a:lstStyle/>
+          <a:p>
+            <a:r>
+              <a:rPr lang="en-US" sz="4000" dirty="0">
+                <a:latin typeface="+mn-lt"/>
+              </a:rPr>
+              <a:t>The Nature of Images</a:t>
+            </a:r>
+          </a:p>
+        </p:txBody>
+      </p:sp>
+      <p:sp>
+        <p:nvSpPr>
+          <p:cNvPr id="3" name="Content Placeholder 2">
+            <a:extLst>
+              <a:ext uri="{FF2B5EF4-FFF2-40B4-BE49-F238E27FC236}">
+                <a16:creationId xmlns:a16="http://schemas.microsoft.com/office/drawing/2014/main" id="{4DBC6555-A8E7-4F73-8035-156F702D1410}"/>
+              </a:ext>
+            </a:extLst>
+          </p:cNvPr>
+          <p:cNvSpPr>
+            <a:spLocks noGrp="1"/>
+          </p:cNvSpPr>
+          <p:nvPr>
+            <p:ph idx="1"/>
+          </p:nvPr>
+        </p:nvSpPr>
+        <p:spPr>
+          <a:xfrm>
+            <a:off x="789301" y="1012197"/>
+            <a:ext cx="10325304" cy="5705610"/>
+          </a:xfrm>
+        </p:spPr>
+        <p:txBody>
+          <a:bodyPr/>
+          <a:lstStyle/>
+          <a:p>
+            <a:pPr marL="0" indent="0">
+              <a:buNone/>
+            </a:pPr>
+            <a:r>
+              <a:rPr lang="en-US" dirty="0"/>
+              <a:t>Basic image camera image formation </a:t>
+            </a:r>
+          </a:p>
+          <a:p>
+            <a:r>
+              <a:rPr lang="en-US" dirty="0"/>
               <a:t>Adding a lens to the camera allows capturing more light with larger f-stop </a:t>
             </a:r>
             <a:endParaRPr lang="en-US" b="1" dirty="0"/>
@@ -12386,7 +12574,7 @@
 </p:sld>
 </file>
 
-<file path=ppt/slides/slide21.xml><?xml version="1.0" encoding="utf-8"?>
+<file path=ppt/slides/slide22.xml><?xml version="1.0" encoding="utf-8"?>
 <p:sld xmlns:a="http://schemas.openxmlformats.org/drawingml/2006/main" xmlns:r="http://schemas.openxmlformats.org/officeDocument/2006/relationships" xmlns:p="http://schemas.openxmlformats.org/presentationml/2006/main">
   <p:cSld>
     <p:spTree>
@@ -12915,7 +13103,7 @@
 </p:sld>
 </file>
 
-<file path=ppt/slides/slide22.xml><?xml version="1.0" encoding="utf-8"?>
+<file path=ppt/slides/slide23.xml><?xml version="1.0" encoding="utf-8"?>
 <p:sld xmlns:a="http://schemas.openxmlformats.org/drawingml/2006/main" xmlns:r="http://schemas.openxmlformats.org/officeDocument/2006/relationships" xmlns:p="http://schemas.openxmlformats.org/presentationml/2006/main">
   <p:cSld>
     <p:spTree>
@@ -12988,7 +13176,7 @@
 </p:sld>
 </file>
 
-<file path=ppt/slides/slide23.xml><?xml version="1.0" encoding="utf-8"?>
+<file path=ppt/slides/slide24.xml><?xml version="1.0" encoding="utf-8"?>
 <p:sld xmlns:a="http://schemas.openxmlformats.org/drawingml/2006/main" xmlns:r="http://schemas.openxmlformats.org/officeDocument/2006/relationships" xmlns:p="http://schemas.openxmlformats.org/presentationml/2006/main">
   <p:cSld>
     <p:spTree>
@@ -15652,7 +15840,7 @@
 </p:sld>
 </file>
 
-<file path=ppt/slides/slide24.xml><?xml version="1.0" encoding="utf-8"?>
+<file path=ppt/slides/slide25.xml><?xml version="1.0" encoding="utf-8"?>
 <p:sld xmlns:a="http://schemas.openxmlformats.org/drawingml/2006/main" xmlns:r="http://schemas.openxmlformats.org/officeDocument/2006/relationships" xmlns:p="http://schemas.openxmlformats.org/presentationml/2006/main">
   <p:cSld>
     <p:spTree>
@@ -16277,7 +16465,7 @@
 </p:sld>
 </file>
 
-<file path=ppt/slides/slide25.xml><?xml version="1.0" encoding="utf-8"?>
+<file path=ppt/slides/slide26.xml><?xml version="1.0" encoding="utf-8"?>
 <p:sld xmlns:a="http://schemas.openxmlformats.org/drawingml/2006/main" xmlns:r="http://schemas.openxmlformats.org/officeDocument/2006/relationships" xmlns:p="http://schemas.openxmlformats.org/presentationml/2006/main">
   <p:cSld>
     <p:spTree>
@@ -22432,7 +22620,7 @@
 </p:sld>
 </file>
 
-<file path=ppt/slides/slide26.xml><?xml version="1.0" encoding="utf-8"?>
+<file path=ppt/slides/slide27.xml><?xml version="1.0" encoding="utf-8"?>
 <p:sld xmlns:a="http://schemas.openxmlformats.org/drawingml/2006/main" xmlns:r="http://schemas.openxmlformats.org/officeDocument/2006/relationships" xmlns:p="http://schemas.openxmlformats.org/presentationml/2006/main">
   <p:cSld>
     <p:spTree>
@@ -22864,7 +23052,7 @@
 </p:sld>
 </file>
 
-<file path=ppt/slides/slide27.xml><?xml version="1.0" encoding="utf-8"?>
+<file path=ppt/slides/slide28.xml><?xml version="1.0" encoding="utf-8"?>
 <p:sld xmlns:a="http://schemas.openxmlformats.org/drawingml/2006/main" xmlns:r="http://schemas.openxmlformats.org/officeDocument/2006/relationships" xmlns:p="http://schemas.openxmlformats.org/presentationml/2006/main">
   <p:cSld>
     <p:spTree>
@@ -23498,7 +23686,7 @@
 </p:sld>
 </file>
 
-<file path=ppt/slides/slide28.xml><?xml version="1.0" encoding="utf-8"?>
+<file path=ppt/slides/slide29.xml><?xml version="1.0" encoding="utf-8"?>
 <p:sld xmlns:a="http://schemas.openxmlformats.org/drawingml/2006/main" xmlns:r="http://schemas.openxmlformats.org/officeDocument/2006/relationships" xmlns:p="http://schemas.openxmlformats.org/presentationml/2006/main">
   <p:cSld>
     <p:spTree>
@@ -24047,466 +24235,6 @@
     <p:bldLst>
       <p:bldP spid="7" grpId="0" uiExpand="1" build="p"/>
       <p:bldP spid="6" grpId="0"/>
-    </p:bldLst>
-  </p:timing>
-</p:sld>
-</file>
-
-<file path=ppt/slides/slide29.xml><?xml version="1.0" encoding="utf-8"?>
-<p:sld xmlns:a="http://schemas.openxmlformats.org/drawingml/2006/main" xmlns:r="http://schemas.openxmlformats.org/officeDocument/2006/relationships" xmlns:p="http://schemas.openxmlformats.org/presentationml/2006/main">
-  <p:cSld>
-    <p:spTree>
-      <p:nvGrpSpPr>
-        <p:cNvPr id="1" name=""/>
-        <p:cNvGrpSpPr/>
-        <p:nvPr/>
-      </p:nvGrpSpPr>
-      <p:grpSpPr>
-        <a:xfrm>
-          <a:off x="0" y="0"/>
-          <a:ext cx="0" cy="0"/>
-          <a:chOff x="0" y="0"/>
-          <a:chExt cx="0" cy="0"/>
-        </a:xfrm>
-      </p:grpSpPr>
-      <p:sp>
-        <p:nvSpPr>
-          <p:cNvPr id="7" name="Content Placeholder 6"/>
-          <p:cNvSpPr>
-            <a:spLocks noGrp="1"/>
-          </p:cNvSpPr>
-          <p:nvPr>
-            <p:ph sz="quarter" idx="10"/>
-          </p:nvPr>
-        </p:nvSpPr>
-        <p:spPr>
-          <a:xfrm>
-            <a:off x="378595" y="1399631"/>
-            <a:ext cx="11525250" cy="4972369"/>
-          </a:xfrm>
-        </p:spPr>
-        <p:txBody>
-          <a:bodyPr>
-            <a:normAutofit/>
-          </a:bodyPr>
-          <a:lstStyle/>
-          <a:p>
-            <a:pPr marL="0" indent="0">
-              <a:buNone/>
-            </a:pPr>
-            <a:r>
-              <a:rPr lang="en-GB" dirty="0">
-                <a:ea typeface="Segoe UI" panose="020B0502040204020203" pitchFamily="34" charset="0"/>
-                <a:cs typeface="Segoe UI" panose="020B0502040204020203" pitchFamily="34" charset="0"/>
-              </a:rPr>
-              <a:t>Video is represented as a 4-dimensional tensor</a:t>
-            </a:r>
-          </a:p>
-          <a:p>
-            <a:pPr>
-              <a:buFont typeface="Wingdings" panose="05000000000000000000" pitchFamily="2" charset="2"/>
-              <a:buChar char="§"/>
-            </a:pPr>
-            <a:r>
-              <a:rPr lang="en-GB" dirty="0">
-                <a:ea typeface="Segoe UI" panose="020B0502040204020203" pitchFamily="34" charset="0"/>
-                <a:cs typeface="Segoe UI" panose="020B0502040204020203" pitchFamily="34" charset="0"/>
-              </a:rPr>
-              <a:t>2 spatial dimensions per RGB </a:t>
-            </a:r>
-            <a:r>
-              <a:rPr lang="en-GB" dirty="0" err="1">
-                <a:ea typeface="Segoe UI" panose="020B0502040204020203" pitchFamily="34" charset="0"/>
-                <a:cs typeface="Segoe UI" panose="020B0502040204020203" pitchFamily="34" charset="0"/>
-              </a:rPr>
-              <a:t>color</a:t>
-            </a:r>
-            <a:r>
-              <a:rPr lang="en-GB" dirty="0">
-                <a:ea typeface="Segoe UI" panose="020B0502040204020203" pitchFamily="34" charset="0"/>
-                <a:cs typeface="Segoe UI" panose="020B0502040204020203" pitchFamily="34" charset="0"/>
-              </a:rPr>
-              <a:t> channel</a:t>
-            </a:r>
-          </a:p>
-          <a:p>
-            <a:pPr>
-              <a:buFont typeface="Wingdings" panose="05000000000000000000" pitchFamily="2" charset="2"/>
-              <a:buChar char="§"/>
-            </a:pPr>
-            <a:r>
-              <a:rPr lang="en-GB" dirty="0">
-                <a:ea typeface="Segoe UI" panose="020B0502040204020203" pitchFamily="34" charset="0"/>
-                <a:cs typeface="Segoe UI" panose="020B0502040204020203" pitchFamily="34" charset="0"/>
-              </a:rPr>
-              <a:t>3</a:t>
-            </a:r>
-            <a:r>
-              <a:rPr lang="en-GB" baseline="30000" dirty="0">
-                <a:ea typeface="Segoe UI" panose="020B0502040204020203" pitchFamily="34" charset="0"/>
-                <a:cs typeface="Segoe UI" panose="020B0502040204020203" pitchFamily="34" charset="0"/>
-              </a:rPr>
-              <a:t>rd</a:t>
-            </a:r>
-            <a:r>
-              <a:rPr lang="en-GB" dirty="0">
-                <a:ea typeface="Segoe UI" panose="020B0502040204020203" pitchFamily="34" charset="0"/>
-                <a:cs typeface="Segoe UI" panose="020B0502040204020203" pitchFamily="34" charset="0"/>
-              </a:rPr>
-              <a:t> dimension are 3 </a:t>
-            </a:r>
-            <a:r>
-              <a:rPr lang="en-GB" dirty="0" err="1">
-                <a:ea typeface="Segoe UI" panose="020B0502040204020203" pitchFamily="34" charset="0"/>
-                <a:cs typeface="Segoe UI" panose="020B0502040204020203" pitchFamily="34" charset="0"/>
-              </a:rPr>
-              <a:t>color</a:t>
-            </a:r>
-            <a:r>
-              <a:rPr lang="en-GB" dirty="0">
-                <a:ea typeface="Segoe UI" panose="020B0502040204020203" pitchFamily="34" charset="0"/>
-                <a:cs typeface="Segoe UI" panose="020B0502040204020203" pitchFamily="34" charset="0"/>
-              </a:rPr>
-              <a:t> channels</a:t>
-            </a:r>
-          </a:p>
-          <a:p>
-            <a:pPr>
-              <a:buFont typeface="Wingdings" panose="05000000000000000000" pitchFamily="2" charset="2"/>
-              <a:buChar char="§"/>
-            </a:pPr>
-            <a:r>
-              <a:rPr lang="en-GB" dirty="0">
-                <a:ea typeface="Segoe UI" panose="020B0502040204020203" pitchFamily="34" charset="0"/>
-                <a:cs typeface="Segoe UI" panose="020B0502040204020203" pitchFamily="34" charset="0"/>
-              </a:rPr>
-              <a:t>Or, 3</a:t>
-            </a:r>
-            <a:r>
-              <a:rPr lang="en-GB" baseline="30000" dirty="0">
-                <a:ea typeface="Segoe UI" panose="020B0502040204020203" pitchFamily="34" charset="0"/>
-                <a:cs typeface="Segoe UI" panose="020B0502040204020203" pitchFamily="34" charset="0"/>
-              </a:rPr>
-              <a:t>rd</a:t>
-            </a:r>
-            <a:r>
-              <a:rPr lang="en-GB" dirty="0">
-                <a:ea typeface="Segoe UI" panose="020B0502040204020203" pitchFamily="34" charset="0"/>
-                <a:cs typeface="Segoe UI" panose="020B0502040204020203" pitchFamily="34" charset="0"/>
-              </a:rPr>
-              <a:t> dimension can be depth; e.g. medical images</a:t>
-            </a:r>
-          </a:p>
-          <a:p>
-            <a:pPr>
-              <a:buFont typeface="Wingdings" panose="05000000000000000000" pitchFamily="2" charset="2"/>
-              <a:buChar char="§"/>
-            </a:pPr>
-            <a:r>
-              <a:rPr lang="en-GB" dirty="0">
-                <a:ea typeface="Segoe UI" panose="020B0502040204020203" pitchFamily="34" charset="0"/>
-                <a:cs typeface="Segoe UI" panose="020B0502040204020203" pitchFamily="34" charset="0"/>
-              </a:rPr>
-              <a:t>4</a:t>
-            </a:r>
-            <a:r>
-              <a:rPr lang="en-GB" baseline="30000" dirty="0">
-                <a:ea typeface="Segoe UI" panose="020B0502040204020203" pitchFamily="34" charset="0"/>
-                <a:cs typeface="Segoe UI" panose="020B0502040204020203" pitchFamily="34" charset="0"/>
-              </a:rPr>
-              <a:t>th</a:t>
-            </a:r>
-            <a:r>
-              <a:rPr lang="en-GB" dirty="0">
-                <a:ea typeface="Segoe UI" panose="020B0502040204020203" pitchFamily="34" charset="0"/>
-                <a:cs typeface="Segoe UI" panose="020B0502040204020203" pitchFamily="34" charset="0"/>
-              </a:rPr>
-              <a:t> dimension is the time sequence of images (frames)</a:t>
-            </a:r>
-          </a:p>
-          <a:p>
-            <a:pPr marL="0" indent="0">
-              <a:buNone/>
-            </a:pPr>
-            <a:endParaRPr lang="en-GB" dirty="0">
-              <a:ea typeface="Segoe UI" panose="020B0502040204020203" pitchFamily="34" charset="0"/>
-              <a:cs typeface="Segoe UI" panose="020B0502040204020203" pitchFamily="34" charset="0"/>
-            </a:endParaRPr>
-          </a:p>
-        </p:txBody>
-      </p:sp>
-      <p:sp>
-        <p:nvSpPr>
-          <p:cNvPr id="2" name="Title 1"/>
-          <p:cNvSpPr>
-            <a:spLocks noGrp="1"/>
-          </p:cNvSpPr>
-          <p:nvPr>
-            <p:ph type="title"/>
-          </p:nvPr>
-        </p:nvSpPr>
-        <p:spPr>
-          <a:xfrm>
-            <a:off x="425416" y="298280"/>
-            <a:ext cx="11478429" cy="694357"/>
-          </a:xfrm>
-        </p:spPr>
-        <p:txBody>
-          <a:bodyPr>
-            <a:normAutofit/>
-          </a:bodyPr>
-          <a:lstStyle/>
-          <a:p>
-            <a:r>
-              <a:rPr lang="en-US" sz="4000" dirty="0">
-                <a:latin typeface="+mn-lt"/>
-                <a:cs typeface="Segoe UI" panose="020B0502040204020203" pitchFamily="34" charset="0"/>
-              </a:rPr>
-              <a:t>Working with Image Data</a:t>
-            </a:r>
-            <a:endParaRPr lang="en-US" sz="4000" dirty="0">
-              <a:latin typeface="+mn-lt"/>
-            </a:endParaRPr>
-          </a:p>
-        </p:txBody>
-      </p:sp>
-    </p:spTree>
-    <p:extLst>
-      <p:ext uri="{BB962C8B-B14F-4D97-AF65-F5344CB8AC3E}">
-        <p14:creationId xmlns:p14="http://schemas.microsoft.com/office/powerpoint/2010/main" val="284198839"/>
-      </p:ext>
-    </p:extLst>
-  </p:cSld>
-  <p:clrMapOvr>
-    <a:masterClrMapping/>
-  </p:clrMapOvr>
-  <p:timing>
-    <p:tnLst>
-      <p:par>
-        <p:cTn id="1" dur="indefinite" restart="never" nodeType="tmRoot">
-          <p:childTnLst>
-            <p:seq concurrent="1" nextAc="seek">
-              <p:cTn id="2" dur="indefinite" nodeType="mainSeq">
-                <p:childTnLst>
-                  <p:par>
-                    <p:cTn id="3" fill="hold">
-                      <p:stCondLst>
-                        <p:cond delay="indefinite"/>
-                      </p:stCondLst>
-                      <p:childTnLst>
-                        <p:par>
-                          <p:cTn id="4" fill="hold">
-                            <p:stCondLst>
-                              <p:cond delay="0"/>
-                            </p:stCondLst>
-                            <p:childTnLst>
-                              <p:par>
-                                <p:cTn id="5" presetID="1" presetClass="entr" presetSubtype="0" fill="hold" grpId="0" nodeType="clickEffect">
-                                  <p:stCondLst>
-                                    <p:cond delay="0"/>
-                                  </p:stCondLst>
-                                  <p:childTnLst>
-                                    <p:set>
-                                      <p:cBhvr>
-                                        <p:cTn id="6" dur="1" fill="hold">
-                                          <p:stCondLst>
-                                            <p:cond delay="0"/>
-                                          </p:stCondLst>
-                                        </p:cTn>
-                                        <p:tgtEl>
-                                          <p:spTgt spid="7">
-                                            <p:txEl>
-                                              <p:pRg st="1" end="1"/>
-                                            </p:txEl>
-                                          </p:spTgt>
-                                        </p:tgtEl>
-                                        <p:attrNameLst>
-                                          <p:attrName>style.visibility</p:attrName>
-                                        </p:attrNameLst>
-                                      </p:cBhvr>
-                                      <p:to>
-                                        <p:strVal val="visible"/>
-                                      </p:to>
-                                    </p:set>
-                                  </p:childTnLst>
-                                </p:cTn>
-                              </p:par>
-                            </p:childTnLst>
-                          </p:cTn>
-                        </p:par>
-                      </p:childTnLst>
-                    </p:cTn>
-                  </p:par>
-                  <p:par>
-                    <p:cTn id="7" fill="hold">
-                      <p:stCondLst>
-                        <p:cond delay="indefinite"/>
-                      </p:stCondLst>
-                      <p:childTnLst>
-                        <p:par>
-                          <p:cTn id="8" fill="hold">
-                            <p:stCondLst>
-                              <p:cond delay="0"/>
-                            </p:stCondLst>
-                            <p:childTnLst>
-                              <p:par>
-                                <p:cTn id="9" presetID="1" presetClass="entr" presetSubtype="0" fill="hold" grpId="0" nodeType="clickEffect">
-                                  <p:stCondLst>
-                                    <p:cond delay="0"/>
-                                  </p:stCondLst>
-                                  <p:childTnLst>
-                                    <p:set>
-                                      <p:cBhvr>
-                                        <p:cTn id="10" dur="1" fill="hold">
-                                          <p:stCondLst>
-                                            <p:cond delay="0"/>
-                                          </p:stCondLst>
-                                        </p:cTn>
-                                        <p:tgtEl>
-                                          <p:spTgt spid="7">
-                                            <p:txEl>
-                                              <p:pRg st="2" end="2"/>
-                                            </p:txEl>
-                                          </p:spTgt>
-                                        </p:tgtEl>
-                                        <p:attrNameLst>
-                                          <p:attrName>style.visibility</p:attrName>
-                                        </p:attrNameLst>
-                                      </p:cBhvr>
-                                      <p:to>
-                                        <p:strVal val="visible"/>
-                                      </p:to>
-                                    </p:set>
-                                  </p:childTnLst>
-                                </p:cTn>
-                              </p:par>
-                            </p:childTnLst>
-                          </p:cTn>
-                        </p:par>
-                      </p:childTnLst>
-                    </p:cTn>
-                  </p:par>
-                  <p:par>
-                    <p:cTn id="11" fill="hold">
-                      <p:stCondLst>
-                        <p:cond delay="indefinite"/>
-                      </p:stCondLst>
-                      <p:childTnLst>
-                        <p:par>
-                          <p:cTn id="12" fill="hold">
-                            <p:stCondLst>
-                              <p:cond delay="0"/>
-                            </p:stCondLst>
-                            <p:childTnLst>
-                              <p:par>
-                                <p:cTn id="13" presetID="1" presetClass="entr" presetSubtype="0" fill="hold" grpId="0" nodeType="clickEffect">
-                                  <p:stCondLst>
-                                    <p:cond delay="0"/>
-                                  </p:stCondLst>
-                                  <p:childTnLst>
-                                    <p:set>
-                                      <p:cBhvr>
-                                        <p:cTn id="14" dur="1" fill="hold">
-                                          <p:stCondLst>
-                                            <p:cond delay="0"/>
-                                          </p:stCondLst>
-                                        </p:cTn>
-                                        <p:tgtEl>
-                                          <p:spTgt spid="7">
-                                            <p:txEl>
-                                              <p:pRg st="3" end="3"/>
-                                            </p:txEl>
-                                          </p:spTgt>
-                                        </p:tgtEl>
-                                        <p:attrNameLst>
-                                          <p:attrName>style.visibility</p:attrName>
-                                        </p:attrNameLst>
-                                      </p:cBhvr>
-                                      <p:to>
-                                        <p:strVal val="visible"/>
-                                      </p:to>
-                                    </p:set>
-                                  </p:childTnLst>
-                                </p:cTn>
-                              </p:par>
-                            </p:childTnLst>
-                          </p:cTn>
-                        </p:par>
-                      </p:childTnLst>
-                    </p:cTn>
-                  </p:par>
-                  <p:par>
-                    <p:cTn id="15" fill="hold">
-                      <p:stCondLst>
-                        <p:cond delay="indefinite"/>
-                      </p:stCondLst>
-                      <p:childTnLst>
-                        <p:par>
-                          <p:cTn id="16" fill="hold">
-                            <p:stCondLst>
-                              <p:cond delay="0"/>
-                            </p:stCondLst>
-                            <p:childTnLst>
-                              <p:par>
-                                <p:cTn id="17" presetID="1" presetClass="entr" presetSubtype="0" fill="hold" grpId="0" nodeType="clickEffect">
-                                  <p:stCondLst>
-                                    <p:cond delay="0"/>
-                                  </p:stCondLst>
-                                  <p:childTnLst>
-                                    <p:set>
-                                      <p:cBhvr>
-                                        <p:cTn id="18" dur="1" fill="hold">
-                                          <p:stCondLst>
-                                            <p:cond delay="0"/>
-                                          </p:stCondLst>
-                                        </p:cTn>
-                                        <p:tgtEl>
-                                          <p:spTgt spid="7">
-                                            <p:txEl>
-                                              <p:pRg st="4" end="4"/>
-                                            </p:txEl>
-                                          </p:spTgt>
-                                        </p:tgtEl>
-                                        <p:attrNameLst>
-                                          <p:attrName>style.visibility</p:attrName>
-                                        </p:attrNameLst>
-                                      </p:cBhvr>
-                                      <p:to>
-                                        <p:strVal val="visible"/>
-                                      </p:to>
-                                    </p:set>
-                                  </p:childTnLst>
-                                </p:cTn>
-                              </p:par>
-                            </p:childTnLst>
-                          </p:cTn>
-                        </p:par>
-                      </p:childTnLst>
-                    </p:cTn>
-                  </p:par>
-                </p:childTnLst>
-              </p:cTn>
-              <p:prevCondLst>
-                <p:cond evt="onPrev" delay="0">
-                  <p:tgtEl>
-                    <p:sldTgt/>
-                  </p:tgtEl>
-                </p:cond>
-              </p:prevCondLst>
-              <p:nextCondLst>
-                <p:cond evt="onNext" delay="0">
-                  <p:tgtEl>
-                    <p:sldTgt/>
-                  </p:tgtEl>
-                </p:cond>
-              </p:nextCondLst>
-            </p:seq>
-          </p:childTnLst>
-        </p:cTn>
-      </p:par>
-    </p:tnLst>
-    <p:bldLst>
-      <p:bldP spid="7" grpId="0" uiExpand="1" build="p"/>
     </p:bldLst>
   </p:timing>
 </p:sld>
@@ -25163,6 +24891,466 @@
 </file>
 
 <file path=ppt/slides/slide30.xml><?xml version="1.0" encoding="utf-8"?>
+<p:sld xmlns:a="http://schemas.openxmlformats.org/drawingml/2006/main" xmlns:r="http://schemas.openxmlformats.org/officeDocument/2006/relationships" xmlns:p="http://schemas.openxmlformats.org/presentationml/2006/main">
+  <p:cSld>
+    <p:spTree>
+      <p:nvGrpSpPr>
+        <p:cNvPr id="1" name=""/>
+        <p:cNvGrpSpPr/>
+        <p:nvPr/>
+      </p:nvGrpSpPr>
+      <p:grpSpPr>
+        <a:xfrm>
+          <a:off x="0" y="0"/>
+          <a:ext cx="0" cy="0"/>
+          <a:chOff x="0" y="0"/>
+          <a:chExt cx="0" cy="0"/>
+        </a:xfrm>
+      </p:grpSpPr>
+      <p:sp>
+        <p:nvSpPr>
+          <p:cNvPr id="7" name="Content Placeholder 6"/>
+          <p:cNvSpPr>
+            <a:spLocks noGrp="1"/>
+          </p:cNvSpPr>
+          <p:nvPr>
+            <p:ph sz="quarter" idx="10"/>
+          </p:nvPr>
+        </p:nvSpPr>
+        <p:spPr>
+          <a:xfrm>
+            <a:off x="378595" y="1399631"/>
+            <a:ext cx="11525250" cy="4972369"/>
+          </a:xfrm>
+        </p:spPr>
+        <p:txBody>
+          <a:bodyPr>
+            <a:normAutofit/>
+          </a:bodyPr>
+          <a:lstStyle/>
+          <a:p>
+            <a:pPr marL="0" indent="0">
+              <a:buNone/>
+            </a:pPr>
+            <a:r>
+              <a:rPr lang="en-GB" dirty="0">
+                <a:ea typeface="Segoe UI" panose="020B0502040204020203" pitchFamily="34" charset="0"/>
+                <a:cs typeface="Segoe UI" panose="020B0502040204020203" pitchFamily="34" charset="0"/>
+              </a:rPr>
+              <a:t>Video is represented as a 4-dimensional tensor</a:t>
+            </a:r>
+          </a:p>
+          <a:p>
+            <a:pPr>
+              <a:buFont typeface="Wingdings" panose="05000000000000000000" pitchFamily="2" charset="2"/>
+              <a:buChar char="§"/>
+            </a:pPr>
+            <a:r>
+              <a:rPr lang="en-GB" dirty="0">
+                <a:ea typeface="Segoe UI" panose="020B0502040204020203" pitchFamily="34" charset="0"/>
+                <a:cs typeface="Segoe UI" panose="020B0502040204020203" pitchFamily="34" charset="0"/>
+              </a:rPr>
+              <a:t>2 spatial dimensions per RGB </a:t>
+            </a:r>
+            <a:r>
+              <a:rPr lang="en-GB" dirty="0" err="1">
+                <a:ea typeface="Segoe UI" panose="020B0502040204020203" pitchFamily="34" charset="0"/>
+                <a:cs typeface="Segoe UI" panose="020B0502040204020203" pitchFamily="34" charset="0"/>
+              </a:rPr>
+              <a:t>color</a:t>
+            </a:r>
+            <a:r>
+              <a:rPr lang="en-GB" dirty="0">
+                <a:ea typeface="Segoe UI" panose="020B0502040204020203" pitchFamily="34" charset="0"/>
+                <a:cs typeface="Segoe UI" panose="020B0502040204020203" pitchFamily="34" charset="0"/>
+              </a:rPr>
+              <a:t> channel</a:t>
+            </a:r>
+          </a:p>
+          <a:p>
+            <a:pPr>
+              <a:buFont typeface="Wingdings" panose="05000000000000000000" pitchFamily="2" charset="2"/>
+              <a:buChar char="§"/>
+            </a:pPr>
+            <a:r>
+              <a:rPr lang="en-GB" dirty="0">
+                <a:ea typeface="Segoe UI" panose="020B0502040204020203" pitchFamily="34" charset="0"/>
+                <a:cs typeface="Segoe UI" panose="020B0502040204020203" pitchFamily="34" charset="0"/>
+              </a:rPr>
+              <a:t>3</a:t>
+            </a:r>
+            <a:r>
+              <a:rPr lang="en-GB" baseline="30000" dirty="0">
+                <a:ea typeface="Segoe UI" panose="020B0502040204020203" pitchFamily="34" charset="0"/>
+                <a:cs typeface="Segoe UI" panose="020B0502040204020203" pitchFamily="34" charset="0"/>
+              </a:rPr>
+              <a:t>rd</a:t>
+            </a:r>
+            <a:r>
+              <a:rPr lang="en-GB" dirty="0">
+                <a:ea typeface="Segoe UI" panose="020B0502040204020203" pitchFamily="34" charset="0"/>
+                <a:cs typeface="Segoe UI" panose="020B0502040204020203" pitchFamily="34" charset="0"/>
+              </a:rPr>
+              <a:t> dimension are 3 </a:t>
+            </a:r>
+            <a:r>
+              <a:rPr lang="en-GB" dirty="0" err="1">
+                <a:ea typeface="Segoe UI" panose="020B0502040204020203" pitchFamily="34" charset="0"/>
+                <a:cs typeface="Segoe UI" panose="020B0502040204020203" pitchFamily="34" charset="0"/>
+              </a:rPr>
+              <a:t>color</a:t>
+            </a:r>
+            <a:r>
+              <a:rPr lang="en-GB" dirty="0">
+                <a:ea typeface="Segoe UI" panose="020B0502040204020203" pitchFamily="34" charset="0"/>
+                <a:cs typeface="Segoe UI" panose="020B0502040204020203" pitchFamily="34" charset="0"/>
+              </a:rPr>
+              <a:t> channels</a:t>
+            </a:r>
+          </a:p>
+          <a:p>
+            <a:pPr>
+              <a:buFont typeface="Wingdings" panose="05000000000000000000" pitchFamily="2" charset="2"/>
+              <a:buChar char="§"/>
+            </a:pPr>
+            <a:r>
+              <a:rPr lang="en-GB" dirty="0">
+                <a:ea typeface="Segoe UI" panose="020B0502040204020203" pitchFamily="34" charset="0"/>
+                <a:cs typeface="Segoe UI" panose="020B0502040204020203" pitchFamily="34" charset="0"/>
+              </a:rPr>
+              <a:t>Or, 3</a:t>
+            </a:r>
+            <a:r>
+              <a:rPr lang="en-GB" baseline="30000" dirty="0">
+                <a:ea typeface="Segoe UI" panose="020B0502040204020203" pitchFamily="34" charset="0"/>
+                <a:cs typeface="Segoe UI" panose="020B0502040204020203" pitchFamily="34" charset="0"/>
+              </a:rPr>
+              <a:t>rd</a:t>
+            </a:r>
+            <a:r>
+              <a:rPr lang="en-GB" dirty="0">
+                <a:ea typeface="Segoe UI" panose="020B0502040204020203" pitchFamily="34" charset="0"/>
+                <a:cs typeface="Segoe UI" panose="020B0502040204020203" pitchFamily="34" charset="0"/>
+              </a:rPr>
+              <a:t> dimension can be depth; e.g. medical images</a:t>
+            </a:r>
+          </a:p>
+          <a:p>
+            <a:pPr>
+              <a:buFont typeface="Wingdings" panose="05000000000000000000" pitchFamily="2" charset="2"/>
+              <a:buChar char="§"/>
+            </a:pPr>
+            <a:r>
+              <a:rPr lang="en-GB" dirty="0">
+                <a:ea typeface="Segoe UI" panose="020B0502040204020203" pitchFamily="34" charset="0"/>
+                <a:cs typeface="Segoe UI" panose="020B0502040204020203" pitchFamily="34" charset="0"/>
+              </a:rPr>
+              <a:t>4</a:t>
+            </a:r>
+            <a:r>
+              <a:rPr lang="en-GB" baseline="30000" dirty="0">
+                <a:ea typeface="Segoe UI" panose="020B0502040204020203" pitchFamily="34" charset="0"/>
+                <a:cs typeface="Segoe UI" panose="020B0502040204020203" pitchFamily="34" charset="0"/>
+              </a:rPr>
+              <a:t>th</a:t>
+            </a:r>
+            <a:r>
+              <a:rPr lang="en-GB" dirty="0">
+                <a:ea typeface="Segoe UI" panose="020B0502040204020203" pitchFamily="34" charset="0"/>
+                <a:cs typeface="Segoe UI" panose="020B0502040204020203" pitchFamily="34" charset="0"/>
+              </a:rPr>
+              <a:t> dimension is the time sequence of images (frames)</a:t>
+            </a:r>
+          </a:p>
+          <a:p>
+            <a:pPr marL="0" indent="0">
+              <a:buNone/>
+            </a:pPr>
+            <a:endParaRPr lang="en-GB" dirty="0">
+              <a:ea typeface="Segoe UI" panose="020B0502040204020203" pitchFamily="34" charset="0"/>
+              <a:cs typeface="Segoe UI" panose="020B0502040204020203" pitchFamily="34" charset="0"/>
+            </a:endParaRPr>
+          </a:p>
+        </p:txBody>
+      </p:sp>
+      <p:sp>
+        <p:nvSpPr>
+          <p:cNvPr id="2" name="Title 1"/>
+          <p:cNvSpPr>
+            <a:spLocks noGrp="1"/>
+          </p:cNvSpPr>
+          <p:nvPr>
+            <p:ph type="title"/>
+          </p:nvPr>
+        </p:nvSpPr>
+        <p:spPr>
+          <a:xfrm>
+            <a:off x="425416" y="298280"/>
+            <a:ext cx="11478429" cy="694357"/>
+          </a:xfrm>
+        </p:spPr>
+        <p:txBody>
+          <a:bodyPr>
+            <a:normAutofit/>
+          </a:bodyPr>
+          <a:lstStyle/>
+          <a:p>
+            <a:r>
+              <a:rPr lang="en-US" sz="4000" dirty="0">
+                <a:latin typeface="+mn-lt"/>
+                <a:cs typeface="Segoe UI" panose="020B0502040204020203" pitchFamily="34" charset="0"/>
+              </a:rPr>
+              <a:t>Working with Image Data</a:t>
+            </a:r>
+            <a:endParaRPr lang="en-US" sz="4000" dirty="0">
+              <a:latin typeface="+mn-lt"/>
+            </a:endParaRPr>
+          </a:p>
+        </p:txBody>
+      </p:sp>
+    </p:spTree>
+    <p:extLst>
+      <p:ext uri="{BB962C8B-B14F-4D97-AF65-F5344CB8AC3E}">
+        <p14:creationId xmlns:p14="http://schemas.microsoft.com/office/powerpoint/2010/main" val="284198839"/>
+      </p:ext>
+    </p:extLst>
+  </p:cSld>
+  <p:clrMapOvr>
+    <a:masterClrMapping/>
+  </p:clrMapOvr>
+  <p:timing>
+    <p:tnLst>
+      <p:par>
+        <p:cTn id="1" dur="indefinite" restart="never" nodeType="tmRoot">
+          <p:childTnLst>
+            <p:seq concurrent="1" nextAc="seek">
+              <p:cTn id="2" dur="indefinite" nodeType="mainSeq">
+                <p:childTnLst>
+                  <p:par>
+                    <p:cTn id="3" fill="hold">
+                      <p:stCondLst>
+                        <p:cond delay="indefinite"/>
+                      </p:stCondLst>
+                      <p:childTnLst>
+                        <p:par>
+                          <p:cTn id="4" fill="hold">
+                            <p:stCondLst>
+                              <p:cond delay="0"/>
+                            </p:stCondLst>
+                            <p:childTnLst>
+                              <p:par>
+                                <p:cTn id="5" presetID="1" presetClass="entr" presetSubtype="0" fill="hold" grpId="0" nodeType="clickEffect">
+                                  <p:stCondLst>
+                                    <p:cond delay="0"/>
+                                  </p:stCondLst>
+                                  <p:childTnLst>
+                                    <p:set>
+                                      <p:cBhvr>
+                                        <p:cTn id="6" dur="1" fill="hold">
+                                          <p:stCondLst>
+                                            <p:cond delay="0"/>
+                                          </p:stCondLst>
+                                        </p:cTn>
+                                        <p:tgtEl>
+                                          <p:spTgt spid="7">
+                                            <p:txEl>
+                                              <p:pRg st="1" end="1"/>
+                                            </p:txEl>
+                                          </p:spTgt>
+                                        </p:tgtEl>
+                                        <p:attrNameLst>
+                                          <p:attrName>style.visibility</p:attrName>
+                                        </p:attrNameLst>
+                                      </p:cBhvr>
+                                      <p:to>
+                                        <p:strVal val="visible"/>
+                                      </p:to>
+                                    </p:set>
+                                  </p:childTnLst>
+                                </p:cTn>
+                              </p:par>
+                            </p:childTnLst>
+                          </p:cTn>
+                        </p:par>
+                      </p:childTnLst>
+                    </p:cTn>
+                  </p:par>
+                  <p:par>
+                    <p:cTn id="7" fill="hold">
+                      <p:stCondLst>
+                        <p:cond delay="indefinite"/>
+                      </p:stCondLst>
+                      <p:childTnLst>
+                        <p:par>
+                          <p:cTn id="8" fill="hold">
+                            <p:stCondLst>
+                              <p:cond delay="0"/>
+                            </p:stCondLst>
+                            <p:childTnLst>
+                              <p:par>
+                                <p:cTn id="9" presetID="1" presetClass="entr" presetSubtype="0" fill="hold" grpId="0" nodeType="clickEffect">
+                                  <p:stCondLst>
+                                    <p:cond delay="0"/>
+                                  </p:stCondLst>
+                                  <p:childTnLst>
+                                    <p:set>
+                                      <p:cBhvr>
+                                        <p:cTn id="10" dur="1" fill="hold">
+                                          <p:stCondLst>
+                                            <p:cond delay="0"/>
+                                          </p:stCondLst>
+                                        </p:cTn>
+                                        <p:tgtEl>
+                                          <p:spTgt spid="7">
+                                            <p:txEl>
+                                              <p:pRg st="2" end="2"/>
+                                            </p:txEl>
+                                          </p:spTgt>
+                                        </p:tgtEl>
+                                        <p:attrNameLst>
+                                          <p:attrName>style.visibility</p:attrName>
+                                        </p:attrNameLst>
+                                      </p:cBhvr>
+                                      <p:to>
+                                        <p:strVal val="visible"/>
+                                      </p:to>
+                                    </p:set>
+                                  </p:childTnLst>
+                                </p:cTn>
+                              </p:par>
+                            </p:childTnLst>
+                          </p:cTn>
+                        </p:par>
+                      </p:childTnLst>
+                    </p:cTn>
+                  </p:par>
+                  <p:par>
+                    <p:cTn id="11" fill="hold">
+                      <p:stCondLst>
+                        <p:cond delay="indefinite"/>
+                      </p:stCondLst>
+                      <p:childTnLst>
+                        <p:par>
+                          <p:cTn id="12" fill="hold">
+                            <p:stCondLst>
+                              <p:cond delay="0"/>
+                            </p:stCondLst>
+                            <p:childTnLst>
+                              <p:par>
+                                <p:cTn id="13" presetID="1" presetClass="entr" presetSubtype="0" fill="hold" grpId="0" nodeType="clickEffect">
+                                  <p:stCondLst>
+                                    <p:cond delay="0"/>
+                                  </p:stCondLst>
+                                  <p:childTnLst>
+                                    <p:set>
+                                      <p:cBhvr>
+                                        <p:cTn id="14" dur="1" fill="hold">
+                                          <p:stCondLst>
+                                            <p:cond delay="0"/>
+                                          </p:stCondLst>
+                                        </p:cTn>
+                                        <p:tgtEl>
+                                          <p:spTgt spid="7">
+                                            <p:txEl>
+                                              <p:pRg st="3" end="3"/>
+                                            </p:txEl>
+                                          </p:spTgt>
+                                        </p:tgtEl>
+                                        <p:attrNameLst>
+                                          <p:attrName>style.visibility</p:attrName>
+                                        </p:attrNameLst>
+                                      </p:cBhvr>
+                                      <p:to>
+                                        <p:strVal val="visible"/>
+                                      </p:to>
+                                    </p:set>
+                                  </p:childTnLst>
+                                </p:cTn>
+                              </p:par>
+                            </p:childTnLst>
+                          </p:cTn>
+                        </p:par>
+                      </p:childTnLst>
+                    </p:cTn>
+                  </p:par>
+                  <p:par>
+                    <p:cTn id="15" fill="hold">
+                      <p:stCondLst>
+                        <p:cond delay="indefinite"/>
+                      </p:stCondLst>
+                      <p:childTnLst>
+                        <p:par>
+                          <p:cTn id="16" fill="hold">
+                            <p:stCondLst>
+                              <p:cond delay="0"/>
+                            </p:stCondLst>
+                            <p:childTnLst>
+                              <p:par>
+                                <p:cTn id="17" presetID="1" presetClass="entr" presetSubtype="0" fill="hold" grpId="0" nodeType="clickEffect">
+                                  <p:stCondLst>
+                                    <p:cond delay="0"/>
+                                  </p:stCondLst>
+                                  <p:childTnLst>
+                                    <p:set>
+                                      <p:cBhvr>
+                                        <p:cTn id="18" dur="1" fill="hold">
+                                          <p:stCondLst>
+                                            <p:cond delay="0"/>
+                                          </p:stCondLst>
+                                        </p:cTn>
+                                        <p:tgtEl>
+                                          <p:spTgt spid="7">
+                                            <p:txEl>
+                                              <p:pRg st="4" end="4"/>
+                                            </p:txEl>
+                                          </p:spTgt>
+                                        </p:tgtEl>
+                                        <p:attrNameLst>
+                                          <p:attrName>style.visibility</p:attrName>
+                                        </p:attrNameLst>
+                                      </p:cBhvr>
+                                      <p:to>
+                                        <p:strVal val="visible"/>
+                                      </p:to>
+                                    </p:set>
+                                  </p:childTnLst>
+                                </p:cTn>
+                              </p:par>
+                            </p:childTnLst>
+                          </p:cTn>
+                        </p:par>
+                      </p:childTnLst>
+                    </p:cTn>
+                  </p:par>
+                </p:childTnLst>
+              </p:cTn>
+              <p:prevCondLst>
+                <p:cond evt="onPrev" delay="0">
+                  <p:tgtEl>
+                    <p:sldTgt/>
+                  </p:tgtEl>
+                </p:cond>
+              </p:prevCondLst>
+              <p:nextCondLst>
+                <p:cond evt="onNext" delay="0">
+                  <p:tgtEl>
+                    <p:sldTgt/>
+                  </p:tgtEl>
+                </p:cond>
+              </p:nextCondLst>
+            </p:seq>
+          </p:childTnLst>
+        </p:cTn>
+      </p:par>
+    </p:tnLst>
+    <p:bldLst>
+      <p:bldP spid="7" grpId="0" uiExpand="1" build="p"/>
+    </p:bldLst>
+  </p:timing>
+</p:sld>
+</file>
+
+<file path=ppt/slides/slide31.xml><?xml version="1.0" encoding="utf-8"?>
 <p:sld xmlns:a="http://schemas.openxmlformats.org/drawingml/2006/main" xmlns:r="http://schemas.openxmlformats.org/officeDocument/2006/relationships" xmlns:p="http://schemas.openxmlformats.org/presentationml/2006/main">
   <p:cSld>
     <p:spTree>
@@ -28723,7 +28911,7 @@
 </p:sld>
 </file>
 
-<file path=ppt/slides/slide31.xml><?xml version="1.0" encoding="utf-8"?>
+<file path=ppt/slides/slide32.xml><?xml version="1.0" encoding="utf-8"?>
 <p:sld xmlns:a="http://schemas.openxmlformats.org/drawingml/2006/main" xmlns:r="http://schemas.openxmlformats.org/officeDocument/2006/relationships" xmlns:p="http://schemas.openxmlformats.org/presentationml/2006/main">
   <p:cSld>
     <p:spTree>
@@ -28788,7 +28976,7 @@
 </p:sld>
 </file>
 
-<file path=ppt/slides/slide32.xml><?xml version="1.0" encoding="utf-8"?>
+<file path=ppt/slides/slide33.xml><?xml version="1.0" encoding="utf-8"?>
 <p:sld xmlns:a="http://schemas.openxmlformats.org/drawingml/2006/main" xmlns:r="http://schemas.openxmlformats.org/officeDocument/2006/relationships" xmlns:p="http://schemas.openxmlformats.org/presentationml/2006/main">
   <p:cSld>
     <p:spTree>
@@ -29267,7 +29455,7 @@
 </p:sld>
 </file>
 
-<file path=ppt/slides/slide33.xml><?xml version="1.0" encoding="utf-8"?>
+<file path=ppt/slides/slide34.xml><?xml version="1.0" encoding="utf-8"?>
 <p:sld xmlns:a="http://schemas.openxmlformats.org/drawingml/2006/main" xmlns:r="http://schemas.openxmlformats.org/officeDocument/2006/relationships" xmlns:p="http://schemas.openxmlformats.org/presentationml/2006/main">
   <p:cSld>
     <p:spTree>
@@ -29795,7 +29983,7 @@
 </p:sld>
 </file>
 
-<file path=ppt/slides/slide34.xml><?xml version="1.0" encoding="utf-8"?>
+<file path=ppt/slides/slide35.xml><?xml version="1.0" encoding="utf-8"?>
 <p:sld xmlns:a="http://schemas.openxmlformats.org/drawingml/2006/main" xmlns:r="http://schemas.openxmlformats.org/officeDocument/2006/relationships" xmlns:p="http://schemas.openxmlformats.org/presentationml/2006/main">
   <p:cSld>
     <p:spTree>
@@ -30088,7 +30276,7 @@
 </p:sld>
 </file>
 
-<file path=ppt/slides/slide35.xml><?xml version="1.0" encoding="utf-8"?>
+<file path=ppt/slides/slide36.xml><?xml version="1.0" encoding="utf-8"?>
 <p:sld xmlns:a="http://schemas.openxmlformats.org/drawingml/2006/main" xmlns:r="http://schemas.openxmlformats.org/officeDocument/2006/relationships" xmlns:p="http://schemas.openxmlformats.org/presentationml/2006/main">
   <p:cSld>
     <p:spTree>
@@ -30494,7 +30682,7 @@
 </p:sld>
 </file>
 
-<file path=ppt/slides/slide36.xml><?xml version="1.0" encoding="utf-8"?>
+<file path=ppt/slides/slide37.xml><?xml version="1.0" encoding="utf-8"?>
 <p:sld xmlns:a="http://schemas.openxmlformats.org/drawingml/2006/main" xmlns:r="http://schemas.openxmlformats.org/officeDocument/2006/relationships" xmlns:p="http://schemas.openxmlformats.org/presentationml/2006/main">
   <p:cSld>
     <p:spTree>
@@ -30559,7 +30747,7 @@
 </p:sld>
 </file>
 
-<file path=ppt/slides/slide37.xml><?xml version="1.0" encoding="utf-8"?>
+<file path=ppt/slides/slide38.xml><?xml version="1.0" encoding="utf-8"?>
 <p:sld xmlns:a="http://schemas.openxmlformats.org/drawingml/2006/main" xmlns:r="http://schemas.openxmlformats.org/officeDocument/2006/relationships" xmlns:p="http://schemas.openxmlformats.org/presentationml/2006/main">
   <p:cSld>
     <p:spTree>
@@ -31026,7 +31214,7 @@
 </p:sld>
 </file>
 
-<file path=ppt/slides/slide38.xml><?xml version="1.0" encoding="utf-8"?>
+<file path=ppt/slides/slide39.xml><?xml version="1.0" encoding="utf-8"?>
 <p:sld xmlns:a="http://schemas.openxmlformats.org/drawingml/2006/main" xmlns:r="http://schemas.openxmlformats.org/officeDocument/2006/relationships" xmlns:p="http://schemas.openxmlformats.org/presentationml/2006/main">
   <p:cSld>
     <p:spTree>
@@ -31552,404 +31740,6 @@
                                           <p:spTgt spid="7">
                                             <p:txEl>
                                               <p:pRg st="9" end="9"/>
-                                            </p:txEl>
-                                          </p:spTgt>
-                                        </p:tgtEl>
-                                        <p:attrNameLst>
-                                          <p:attrName>style.visibility</p:attrName>
-                                        </p:attrNameLst>
-                                      </p:cBhvr>
-                                      <p:to>
-                                        <p:strVal val="visible"/>
-                                      </p:to>
-                                    </p:set>
-                                  </p:childTnLst>
-                                </p:cTn>
-                              </p:par>
-                            </p:childTnLst>
-                          </p:cTn>
-                        </p:par>
-                      </p:childTnLst>
-                    </p:cTn>
-                  </p:par>
-                </p:childTnLst>
-              </p:cTn>
-              <p:prevCondLst>
-                <p:cond evt="onPrev" delay="0">
-                  <p:tgtEl>
-                    <p:sldTgt/>
-                  </p:tgtEl>
-                </p:cond>
-              </p:prevCondLst>
-              <p:nextCondLst>
-                <p:cond evt="onNext" delay="0">
-                  <p:tgtEl>
-                    <p:sldTgt/>
-                  </p:tgtEl>
-                </p:cond>
-              </p:nextCondLst>
-            </p:seq>
-          </p:childTnLst>
-        </p:cTn>
-      </p:par>
-    </p:tnLst>
-    <p:bldLst>
-      <p:bldP spid="7" grpId="0" uiExpand="1" build="p"/>
-    </p:bldLst>
-  </p:timing>
-</p:sld>
-</file>
-
-<file path=ppt/slides/slide39.xml><?xml version="1.0" encoding="utf-8"?>
-<p:sld xmlns:a="http://schemas.openxmlformats.org/drawingml/2006/main" xmlns:r="http://schemas.openxmlformats.org/officeDocument/2006/relationships" xmlns:p="http://schemas.openxmlformats.org/presentationml/2006/main">
-  <p:cSld>
-    <p:spTree>
-      <p:nvGrpSpPr>
-        <p:cNvPr id="1" name=""/>
-        <p:cNvGrpSpPr/>
-        <p:nvPr/>
-      </p:nvGrpSpPr>
-      <p:grpSpPr>
-        <a:xfrm>
-          <a:off x="0" y="0"/>
-          <a:ext cx="0" cy="0"/>
-          <a:chOff x="0" y="0"/>
-          <a:chExt cx="0" cy="0"/>
-        </a:xfrm>
-      </p:grpSpPr>
-      <p:sp>
-        <p:nvSpPr>
-          <p:cNvPr id="7" name="Content Placeholder 6"/>
-          <p:cNvSpPr>
-            <a:spLocks noGrp="1"/>
-          </p:cNvSpPr>
-          <p:nvPr>
-            <p:ph sz="quarter" idx="10"/>
-          </p:nvPr>
-        </p:nvSpPr>
-        <p:spPr>
-          <a:xfrm>
-            <a:off x="378595" y="1399631"/>
-            <a:ext cx="11525250" cy="4972369"/>
-          </a:xfrm>
-        </p:spPr>
-        <p:txBody>
-          <a:bodyPr>
-            <a:normAutofit/>
-          </a:bodyPr>
-          <a:lstStyle/>
-          <a:p>
-            <a:pPr marL="0" indent="0">
-              <a:buNone/>
-            </a:pPr>
-            <a:r>
-              <a:rPr lang="en-GB" dirty="0">
-                <a:ea typeface="Segoe UI" panose="020B0502040204020203" pitchFamily="34" charset="0"/>
-                <a:cs typeface="Segoe UI" panose="020B0502040204020203" pitchFamily="34" charset="0"/>
-              </a:rPr>
-              <a:t>Performance of computer vision algorithms can never be better than the input image   </a:t>
-            </a:r>
-          </a:p>
-          <a:p>
-            <a:r>
-              <a:rPr lang="en-GB" dirty="0">
-                <a:ea typeface="Segoe UI" panose="020B0502040204020203" pitchFamily="34" charset="0"/>
-                <a:cs typeface="Segoe UI" panose="020B0502040204020203" pitchFamily="34" charset="0"/>
-              </a:rPr>
-              <a:t>If the features required for the task are not clear and well-defined in the image, no algorithm can reliably perform the task</a:t>
-            </a:r>
-          </a:p>
-          <a:p>
-            <a:r>
-              <a:rPr lang="en-GB" dirty="0">
-                <a:ea typeface="Segoe UI" panose="020B0502040204020203" pitchFamily="34" charset="0"/>
-                <a:cs typeface="Segoe UI" panose="020B0502040204020203" pitchFamily="34" charset="0"/>
-              </a:rPr>
-              <a:t>Common problems with images:</a:t>
-            </a:r>
-          </a:p>
-          <a:p>
-            <a:pPr lvl="1"/>
-            <a:r>
-              <a:rPr lang="en-GB" dirty="0">
-                <a:ea typeface="Segoe UI" panose="020B0502040204020203" pitchFamily="34" charset="0"/>
-                <a:cs typeface="Segoe UI" panose="020B0502040204020203" pitchFamily="34" charset="0"/>
-              </a:rPr>
-              <a:t>Poor illumination  </a:t>
-            </a:r>
-          </a:p>
-          <a:p>
-            <a:pPr lvl="1"/>
-            <a:r>
-              <a:rPr lang="en-GB" dirty="0">
-                <a:ea typeface="Segoe UI" panose="020B0502040204020203" pitchFamily="34" charset="0"/>
-                <a:cs typeface="Segoe UI" panose="020B0502040204020203" pitchFamily="34" charset="0"/>
-              </a:rPr>
-              <a:t>Low contrast</a:t>
-            </a:r>
-          </a:p>
-          <a:p>
-            <a:r>
-              <a:rPr lang="en-GB" dirty="0">
-                <a:ea typeface="Segoe UI" panose="020B0502040204020203" pitchFamily="34" charset="0"/>
-                <a:cs typeface="Segoe UI" panose="020B0502040204020203" pitchFamily="34" charset="0"/>
-              </a:rPr>
-              <a:t>Correction of images is often the first pre-processing step in a CV pipeline</a:t>
-            </a:r>
-          </a:p>
-          <a:p>
-            <a:pPr marL="0" indent="0">
-              <a:buNone/>
-            </a:pPr>
-            <a:endParaRPr lang="en-GB" dirty="0">
-              <a:ea typeface="Segoe UI" panose="020B0502040204020203" pitchFamily="34" charset="0"/>
-              <a:cs typeface="Segoe UI" panose="020B0502040204020203" pitchFamily="34" charset="0"/>
-            </a:endParaRPr>
-          </a:p>
-        </p:txBody>
-      </p:sp>
-      <p:sp>
-        <p:nvSpPr>
-          <p:cNvPr id="2" name="Title 1"/>
-          <p:cNvSpPr>
-            <a:spLocks noGrp="1"/>
-          </p:cNvSpPr>
-          <p:nvPr>
-            <p:ph type="title"/>
-          </p:nvPr>
-        </p:nvSpPr>
-        <p:spPr>
-          <a:xfrm>
-            <a:off x="378595" y="1"/>
-            <a:ext cx="11525250" cy="1142999"/>
-          </a:xfrm>
-        </p:spPr>
-        <p:txBody>
-          <a:bodyPr>
-            <a:normAutofit/>
-          </a:bodyPr>
-          <a:lstStyle/>
-          <a:p>
-            <a:r>
-              <a:rPr lang="en-US" sz="4000" dirty="0">
-                <a:latin typeface="+mn-lt"/>
-                <a:cs typeface="Segoe UI" panose="020B0502040204020203" pitchFamily="34" charset="0"/>
-              </a:rPr>
-              <a:t>Contrast and Illumination</a:t>
-            </a:r>
-            <a:endParaRPr lang="en-US" sz="4000" dirty="0">
-              <a:latin typeface="+mn-lt"/>
-            </a:endParaRPr>
-          </a:p>
-        </p:txBody>
-      </p:sp>
-    </p:spTree>
-    <p:extLst>
-      <p:ext uri="{BB962C8B-B14F-4D97-AF65-F5344CB8AC3E}">
-        <p14:creationId xmlns:p14="http://schemas.microsoft.com/office/powerpoint/2010/main" val="2713294354"/>
-      </p:ext>
-    </p:extLst>
-  </p:cSld>
-  <p:clrMapOvr>
-    <a:masterClrMapping/>
-  </p:clrMapOvr>
-  <p:timing>
-    <p:tnLst>
-      <p:par>
-        <p:cTn id="1" dur="indefinite" restart="never" nodeType="tmRoot">
-          <p:childTnLst>
-            <p:seq concurrent="1" nextAc="seek">
-              <p:cTn id="2" dur="indefinite" nodeType="mainSeq">
-                <p:childTnLst>
-                  <p:par>
-                    <p:cTn id="3" fill="hold">
-                      <p:stCondLst>
-                        <p:cond delay="indefinite"/>
-                      </p:stCondLst>
-                      <p:childTnLst>
-                        <p:par>
-                          <p:cTn id="4" fill="hold">
-                            <p:stCondLst>
-                              <p:cond delay="0"/>
-                            </p:stCondLst>
-                            <p:childTnLst>
-                              <p:par>
-                                <p:cTn id="5" presetID="1" presetClass="entr" presetSubtype="0" fill="hold" grpId="0" nodeType="clickEffect">
-                                  <p:stCondLst>
-                                    <p:cond delay="0"/>
-                                  </p:stCondLst>
-                                  <p:childTnLst>
-                                    <p:set>
-                                      <p:cBhvr>
-                                        <p:cTn id="6" dur="1" fill="hold">
-                                          <p:stCondLst>
-                                            <p:cond delay="0"/>
-                                          </p:stCondLst>
-                                        </p:cTn>
-                                        <p:tgtEl>
-                                          <p:spTgt spid="7">
-                                            <p:txEl>
-                                              <p:pRg st="1" end="1"/>
-                                            </p:txEl>
-                                          </p:spTgt>
-                                        </p:tgtEl>
-                                        <p:attrNameLst>
-                                          <p:attrName>style.visibility</p:attrName>
-                                        </p:attrNameLst>
-                                      </p:cBhvr>
-                                      <p:to>
-                                        <p:strVal val="visible"/>
-                                      </p:to>
-                                    </p:set>
-                                  </p:childTnLst>
-                                </p:cTn>
-                              </p:par>
-                            </p:childTnLst>
-                          </p:cTn>
-                        </p:par>
-                      </p:childTnLst>
-                    </p:cTn>
-                  </p:par>
-                  <p:par>
-                    <p:cTn id="7" fill="hold">
-                      <p:stCondLst>
-                        <p:cond delay="indefinite"/>
-                      </p:stCondLst>
-                      <p:childTnLst>
-                        <p:par>
-                          <p:cTn id="8" fill="hold">
-                            <p:stCondLst>
-                              <p:cond delay="0"/>
-                            </p:stCondLst>
-                            <p:childTnLst>
-                              <p:par>
-                                <p:cTn id="9" presetID="1" presetClass="entr" presetSubtype="0" fill="hold" grpId="0" nodeType="clickEffect">
-                                  <p:stCondLst>
-                                    <p:cond delay="0"/>
-                                  </p:stCondLst>
-                                  <p:childTnLst>
-                                    <p:set>
-                                      <p:cBhvr>
-                                        <p:cTn id="10" dur="1" fill="hold">
-                                          <p:stCondLst>
-                                            <p:cond delay="0"/>
-                                          </p:stCondLst>
-                                        </p:cTn>
-                                        <p:tgtEl>
-                                          <p:spTgt spid="7">
-                                            <p:txEl>
-                                              <p:pRg st="2" end="2"/>
-                                            </p:txEl>
-                                          </p:spTgt>
-                                        </p:tgtEl>
-                                        <p:attrNameLst>
-                                          <p:attrName>style.visibility</p:attrName>
-                                        </p:attrNameLst>
-                                      </p:cBhvr>
-                                      <p:to>
-                                        <p:strVal val="visible"/>
-                                      </p:to>
-                                    </p:set>
-                                  </p:childTnLst>
-                                </p:cTn>
-                              </p:par>
-                              <p:par>
-                                <p:cTn id="11" presetID="1" presetClass="entr" presetSubtype="0" fill="hold" grpId="0" nodeType="withEffect">
-                                  <p:stCondLst>
-                                    <p:cond delay="0"/>
-                                  </p:stCondLst>
-                                  <p:childTnLst>
-                                    <p:set>
-                                      <p:cBhvr>
-                                        <p:cTn id="12" dur="1" fill="hold">
-                                          <p:stCondLst>
-                                            <p:cond delay="0"/>
-                                          </p:stCondLst>
-                                        </p:cTn>
-                                        <p:tgtEl>
-                                          <p:spTgt spid="7">
-                                            <p:txEl>
-                                              <p:pRg st="3" end="3"/>
-                                            </p:txEl>
-                                          </p:spTgt>
-                                        </p:tgtEl>
-                                        <p:attrNameLst>
-                                          <p:attrName>style.visibility</p:attrName>
-                                        </p:attrNameLst>
-                                      </p:cBhvr>
-                                      <p:to>
-                                        <p:strVal val="visible"/>
-                                      </p:to>
-                                    </p:set>
-                                  </p:childTnLst>
-                                </p:cTn>
-                              </p:par>
-                              <p:par>
-                                <p:cTn id="13" presetID="1" presetClass="entr" presetSubtype="0" fill="hold" grpId="0" nodeType="withEffect">
-                                  <p:stCondLst>
-                                    <p:cond delay="0"/>
-                                  </p:stCondLst>
-                                  <p:childTnLst>
-                                    <p:set>
-                                      <p:cBhvr>
-                                        <p:cTn id="14" dur="1" fill="hold">
-                                          <p:stCondLst>
-                                            <p:cond delay="0"/>
-                                          </p:stCondLst>
-                                        </p:cTn>
-                                        <p:tgtEl>
-                                          <p:spTgt spid="7">
-                                            <p:txEl>
-                                              <p:pRg st="4" end="4"/>
-                                            </p:txEl>
-                                          </p:spTgt>
-                                        </p:tgtEl>
-                                        <p:attrNameLst>
-                                          <p:attrName>style.visibility</p:attrName>
-                                        </p:attrNameLst>
-                                      </p:cBhvr>
-                                      <p:to>
-                                        <p:strVal val="visible"/>
-                                      </p:to>
-                                    </p:set>
-                                  </p:childTnLst>
-                                </p:cTn>
-                              </p:par>
-                            </p:childTnLst>
-                          </p:cTn>
-                        </p:par>
-                      </p:childTnLst>
-                    </p:cTn>
-                  </p:par>
-                  <p:par>
-                    <p:cTn id="15" fill="hold">
-                      <p:stCondLst>
-                        <p:cond delay="indefinite"/>
-                      </p:stCondLst>
-                      <p:childTnLst>
-                        <p:par>
-                          <p:cTn id="16" fill="hold">
-                            <p:stCondLst>
-                              <p:cond delay="0"/>
-                            </p:stCondLst>
-                            <p:childTnLst>
-                              <p:par>
-                                <p:cTn id="17" presetID="1" presetClass="entr" presetSubtype="0" fill="hold" grpId="0" nodeType="clickEffect">
-                                  <p:stCondLst>
-                                    <p:cond delay="0"/>
-                                  </p:stCondLst>
-                                  <p:childTnLst>
-                                    <p:set>
-                                      <p:cBhvr>
-                                        <p:cTn id="18" dur="1" fill="hold">
-                                          <p:stCondLst>
-                                            <p:cond delay="0"/>
-                                          </p:stCondLst>
-                                        </p:cTn>
-                                        <p:tgtEl>
-                                          <p:spTgt spid="7">
-                                            <p:txEl>
-                                              <p:pRg st="5" end="5"/>
                                             </p:txEl>
                                           </p:spTgt>
                                         </p:tgtEl>
@@ -32636,6 +32426,404 @@
 </file>
 
 <file path=ppt/slides/slide40.xml><?xml version="1.0" encoding="utf-8"?>
+<p:sld xmlns:a="http://schemas.openxmlformats.org/drawingml/2006/main" xmlns:r="http://schemas.openxmlformats.org/officeDocument/2006/relationships" xmlns:p="http://schemas.openxmlformats.org/presentationml/2006/main">
+  <p:cSld>
+    <p:spTree>
+      <p:nvGrpSpPr>
+        <p:cNvPr id="1" name=""/>
+        <p:cNvGrpSpPr/>
+        <p:nvPr/>
+      </p:nvGrpSpPr>
+      <p:grpSpPr>
+        <a:xfrm>
+          <a:off x="0" y="0"/>
+          <a:ext cx="0" cy="0"/>
+          <a:chOff x="0" y="0"/>
+          <a:chExt cx="0" cy="0"/>
+        </a:xfrm>
+      </p:grpSpPr>
+      <p:sp>
+        <p:nvSpPr>
+          <p:cNvPr id="7" name="Content Placeholder 6"/>
+          <p:cNvSpPr>
+            <a:spLocks noGrp="1"/>
+          </p:cNvSpPr>
+          <p:nvPr>
+            <p:ph sz="quarter" idx="10"/>
+          </p:nvPr>
+        </p:nvSpPr>
+        <p:spPr>
+          <a:xfrm>
+            <a:off x="378595" y="1399631"/>
+            <a:ext cx="11525250" cy="4972369"/>
+          </a:xfrm>
+        </p:spPr>
+        <p:txBody>
+          <a:bodyPr>
+            <a:normAutofit/>
+          </a:bodyPr>
+          <a:lstStyle/>
+          <a:p>
+            <a:pPr marL="0" indent="0">
+              <a:buNone/>
+            </a:pPr>
+            <a:r>
+              <a:rPr lang="en-GB" dirty="0">
+                <a:ea typeface="Segoe UI" panose="020B0502040204020203" pitchFamily="34" charset="0"/>
+                <a:cs typeface="Segoe UI" panose="020B0502040204020203" pitchFamily="34" charset="0"/>
+              </a:rPr>
+              <a:t>Performance of computer vision algorithms can never be better than the input image   </a:t>
+            </a:r>
+          </a:p>
+          <a:p>
+            <a:r>
+              <a:rPr lang="en-GB" dirty="0">
+                <a:ea typeface="Segoe UI" panose="020B0502040204020203" pitchFamily="34" charset="0"/>
+                <a:cs typeface="Segoe UI" panose="020B0502040204020203" pitchFamily="34" charset="0"/>
+              </a:rPr>
+              <a:t>If the features required for the task are not clear and well-defined in the image, no algorithm can reliably perform the task</a:t>
+            </a:r>
+          </a:p>
+          <a:p>
+            <a:r>
+              <a:rPr lang="en-GB" dirty="0">
+                <a:ea typeface="Segoe UI" panose="020B0502040204020203" pitchFamily="34" charset="0"/>
+                <a:cs typeface="Segoe UI" panose="020B0502040204020203" pitchFamily="34" charset="0"/>
+              </a:rPr>
+              <a:t>Common problems with images:</a:t>
+            </a:r>
+          </a:p>
+          <a:p>
+            <a:pPr lvl="1"/>
+            <a:r>
+              <a:rPr lang="en-GB" dirty="0">
+                <a:ea typeface="Segoe UI" panose="020B0502040204020203" pitchFamily="34" charset="0"/>
+                <a:cs typeface="Segoe UI" panose="020B0502040204020203" pitchFamily="34" charset="0"/>
+              </a:rPr>
+              <a:t>Poor illumination  </a:t>
+            </a:r>
+          </a:p>
+          <a:p>
+            <a:pPr lvl="1"/>
+            <a:r>
+              <a:rPr lang="en-GB" dirty="0">
+                <a:ea typeface="Segoe UI" panose="020B0502040204020203" pitchFamily="34" charset="0"/>
+                <a:cs typeface="Segoe UI" panose="020B0502040204020203" pitchFamily="34" charset="0"/>
+              </a:rPr>
+              <a:t>Low contrast</a:t>
+            </a:r>
+          </a:p>
+          <a:p>
+            <a:r>
+              <a:rPr lang="en-GB" dirty="0">
+                <a:ea typeface="Segoe UI" panose="020B0502040204020203" pitchFamily="34" charset="0"/>
+                <a:cs typeface="Segoe UI" panose="020B0502040204020203" pitchFamily="34" charset="0"/>
+              </a:rPr>
+              <a:t>Correction of images is often the first pre-processing step in a CV pipeline</a:t>
+            </a:r>
+          </a:p>
+          <a:p>
+            <a:pPr marL="0" indent="0">
+              <a:buNone/>
+            </a:pPr>
+            <a:endParaRPr lang="en-GB" dirty="0">
+              <a:ea typeface="Segoe UI" panose="020B0502040204020203" pitchFamily="34" charset="0"/>
+              <a:cs typeface="Segoe UI" panose="020B0502040204020203" pitchFamily="34" charset="0"/>
+            </a:endParaRPr>
+          </a:p>
+        </p:txBody>
+      </p:sp>
+      <p:sp>
+        <p:nvSpPr>
+          <p:cNvPr id="2" name="Title 1"/>
+          <p:cNvSpPr>
+            <a:spLocks noGrp="1"/>
+          </p:cNvSpPr>
+          <p:nvPr>
+            <p:ph type="title"/>
+          </p:nvPr>
+        </p:nvSpPr>
+        <p:spPr>
+          <a:xfrm>
+            <a:off x="378595" y="1"/>
+            <a:ext cx="11525250" cy="1142999"/>
+          </a:xfrm>
+        </p:spPr>
+        <p:txBody>
+          <a:bodyPr>
+            <a:normAutofit/>
+          </a:bodyPr>
+          <a:lstStyle/>
+          <a:p>
+            <a:r>
+              <a:rPr lang="en-US" sz="4000" dirty="0">
+                <a:latin typeface="+mn-lt"/>
+                <a:cs typeface="Segoe UI" panose="020B0502040204020203" pitchFamily="34" charset="0"/>
+              </a:rPr>
+              <a:t>Contrast and Illumination</a:t>
+            </a:r>
+            <a:endParaRPr lang="en-US" sz="4000" dirty="0">
+              <a:latin typeface="+mn-lt"/>
+            </a:endParaRPr>
+          </a:p>
+        </p:txBody>
+      </p:sp>
+    </p:spTree>
+    <p:extLst>
+      <p:ext uri="{BB962C8B-B14F-4D97-AF65-F5344CB8AC3E}">
+        <p14:creationId xmlns:p14="http://schemas.microsoft.com/office/powerpoint/2010/main" val="2713294354"/>
+      </p:ext>
+    </p:extLst>
+  </p:cSld>
+  <p:clrMapOvr>
+    <a:masterClrMapping/>
+  </p:clrMapOvr>
+  <p:timing>
+    <p:tnLst>
+      <p:par>
+        <p:cTn id="1" dur="indefinite" restart="never" nodeType="tmRoot">
+          <p:childTnLst>
+            <p:seq concurrent="1" nextAc="seek">
+              <p:cTn id="2" dur="indefinite" nodeType="mainSeq">
+                <p:childTnLst>
+                  <p:par>
+                    <p:cTn id="3" fill="hold">
+                      <p:stCondLst>
+                        <p:cond delay="indefinite"/>
+                      </p:stCondLst>
+                      <p:childTnLst>
+                        <p:par>
+                          <p:cTn id="4" fill="hold">
+                            <p:stCondLst>
+                              <p:cond delay="0"/>
+                            </p:stCondLst>
+                            <p:childTnLst>
+                              <p:par>
+                                <p:cTn id="5" presetID="1" presetClass="entr" presetSubtype="0" fill="hold" grpId="0" nodeType="clickEffect">
+                                  <p:stCondLst>
+                                    <p:cond delay="0"/>
+                                  </p:stCondLst>
+                                  <p:childTnLst>
+                                    <p:set>
+                                      <p:cBhvr>
+                                        <p:cTn id="6" dur="1" fill="hold">
+                                          <p:stCondLst>
+                                            <p:cond delay="0"/>
+                                          </p:stCondLst>
+                                        </p:cTn>
+                                        <p:tgtEl>
+                                          <p:spTgt spid="7">
+                                            <p:txEl>
+                                              <p:pRg st="1" end="1"/>
+                                            </p:txEl>
+                                          </p:spTgt>
+                                        </p:tgtEl>
+                                        <p:attrNameLst>
+                                          <p:attrName>style.visibility</p:attrName>
+                                        </p:attrNameLst>
+                                      </p:cBhvr>
+                                      <p:to>
+                                        <p:strVal val="visible"/>
+                                      </p:to>
+                                    </p:set>
+                                  </p:childTnLst>
+                                </p:cTn>
+                              </p:par>
+                            </p:childTnLst>
+                          </p:cTn>
+                        </p:par>
+                      </p:childTnLst>
+                    </p:cTn>
+                  </p:par>
+                  <p:par>
+                    <p:cTn id="7" fill="hold">
+                      <p:stCondLst>
+                        <p:cond delay="indefinite"/>
+                      </p:stCondLst>
+                      <p:childTnLst>
+                        <p:par>
+                          <p:cTn id="8" fill="hold">
+                            <p:stCondLst>
+                              <p:cond delay="0"/>
+                            </p:stCondLst>
+                            <p:childTnLst>
+                              <p:par>
+                                <p:cTn id="9" presetID="1" presetClass="entr" presetSubtype="0" fill="hold" grpId="0" nodeType="clickEffect">
+                                  <p:stCondLst>
+                                    <p:cond delay="0"/>
+                                  </p:stCondLst>
+                                  <p:childTnLst>
+                                    <p:set>
+                                      <p:cBhvr>
+                                        <p:cTn id="10" dur="1" fill="hold">
+                                          <p:stCondLst>
+                                            <p:cond delay="0"/>
+                                          </p:stCondLst>
+                                        </p:cTn>
+                                        <p:tgtEl>
+                                          <p:spTgt spid="7">
+                                            <p:txEl>
+                                              <p:pRg st="2" end="2"/>
+                                            </p:txEl>
+                                          </p:spTgt>
+                                        </p:tgtEl>
+                                        <p:attrNameLst>
+                                          <p:attrName>style.visibility</p:attrName>
+                                        </p:attrNameLst>
+                                      </p:cBhvr>
+                                      <p:to>
+                                        <p:strVal val="visible"/>
+                                      </p:to>
+                                    </p:set>
+                                  </p:childTnLst>
+                                </p:cTn>
+                              </p:par>
+                              <p:par>
+                                <p:cTn id="11" presetID="1" presetClass="entr" presetSubtype="0" fill="hold" grpId="0" nodeType="withEffect">
+                                  <p:stCondLst>
+                                    <p:cond delay="0"/>
+                                  </p:stCondLst>
+                                  <p:childTnLst>
+                                    <p:set>
+                                      <p:cBhvr>
+                                        <p:cTn id="12" dur="1" fill="hold">
+                                          <p:stCondLst>
+                                            <p:cond delay="0"/>
+                                          </p:stCondLst>
+                                        </p:cTn>
+                                        <p:tgtEl>
+                                          <p:spTgt spid="7">
+                                            <p:txEl>
+                                              <p:pRg st="3" end="3"/>
+                                            </p:txEl>
+                                          </p:spTgt>
+                                        </p:tgtEl>
+                                        <p:attrNameLst>
+                                          <p:attrName>style.visibility</p:attrName>
+                                        </p:attrNameLst>
+                                      </p:cBhvr>
+                                      <p:to>
+                                        <p:strVal val="visible"/>
+                                      </p:to>
+                                    </p:set>
+                                  </p:childTnLst>
+                                </p:cTn>
+                              </p:par>
+                              <p:par>
+                                <p:cTn id="13" presetID="1" presetClass="entr" presetSubtype="0" fill="hold" grpId="0" nodeType="withEffect">
+                                  <p:stCondLst>
+                                    <p:cond delay="0"/>
+                                  </p:stCondLst>
+                                  <p:childTnLst>
+                                    <p:set>
+                                      <p:cBhvr>
+                                        <p:cTn id="14" dur="1" fill="hold">
+                                          <p:stCondLst>
+                                            <p:cond delay="0"/>
+                                          </p:stCondLst>
+                                        </p:cTn>
+                                        <p:tgtEl>
+                                          <p:spTgt spid="7">
+                                            <p:txEl>
+                                              <p:pRg st="4" end="4"/>
+                                            </p:txEl>
+                                          </p:spTgt>
+                                        </p:tgtEl>
+                                        <p:attrNameLst>
+                                          <p:attrName>style.visibility</p:attrName>
+                                        </p:attrNameLst>
+                                      </p:cBhvr>
+                                      <p:to>
+                                        <p:strVal val="visible"/>
+                                      </p:to>
+                                    </p:set>
+                                  </p:childTnLst>
+                                </p:cTn>
+                              </p:par>
+                            </p:childTnLst>
+                          </p:cTn>
+                        </p:par>
+                      </p:childTnLst>
+                    </p:cTn>
+                  </p:par>
+                  <p:par>
+                    <p:cTn id="15" fill="hold">
+                      <p:stCondLst>
+                        <p:cond delay="indefinite"/>
+                      </p:stCondLst>
+                      <p:childTnLst>
+                        <p:par>
+                          <p:cTn id="16" fill="hold">
+                            <p:stCondLst>
+                              <p:cond delay="0"/>
+                            </p:stCondLst>
+                            <p:childTnLst>
+                              <p:par>
+                                <p:cTn id="17" presetID="1" presetClass="entr" presetSubtype="0" fill="hold" grpId="0" nodeType="clickEffect">
+                                  <p:stCondLst>
+                                    <p:cond delay="0"/>
+                                  </p:stCondLst>
+                                  <p:childTnLst>
+                                    <p:set>
+                                      <p:cBhvr>
+                                        <p:cTn id="18" dur="1" fill="hold">
+                                          <p:stCondLst>
+                                            <p:cond delay="0"/>
+                                          </p:stCondLst>
+                                        </p:cTn>
+                                        <p:tgtEl>
+                                          <p:spTgt spid="7">
+                                            <p:txEl>
+                                              <p:pRg st="5" end="5"/>
+                                            </p:txEl>
+                                          </p:spTgt>
+                                        </p:tgtEl>
+                                        <p:attrNameLst>
+                                          <p:attrName>style.visibility</p:attrName>
+                                        </p:attrNameLst>
+                                      </p:cBhvr>
+                                      <p:to>
+                                        <p:strVal val="visible"/>
+                                      </p:to>
+                                    </p:set>
+                                  </p:childTnLst>
+                                </p:cTn>
+                              </p:par>
+                            </p:childTnLst>
+                          </p:cTn>
+                        </p:par>
+                      </p:childTnLst>
+                    </p:cTn>
+                  </p:par>
+                </p:childTnLst>
+              </p:cTn>
+              <p:prevCondLst>
+                <p:cond evt="onPrev" delay="0">
+                  <p:tgtEl>
+                    <p:sldTgt/>
+                  </p:tgtEl>
+                </p:cond>
+              </p:prevCondLst>
+              <p:nextCondLst>
+                <p:cond evt="onNext" delay="0">
+                  <p:tgtEl>
+                    <p:sldTgt/>
+                  </p:tgtEl>
+                </p:cond>
+              </p:nextCondLst>
+            </p:seq>
+          </p:childTnLst>
+        </p:cTn>
+      </p:par>
+    </p:tnLst>
+    <p:bldLst>
+      <p:bldP spid="7" grpId="0" uiExpand="1" build="p"/>
+    </p:bldLst>
+  </p:timing>
+</p:sld>
+</file>
+
+<file path=ppt/slides/slide41.xml><?xml version="1.0" encoding="utf-8"?>
 <p:sld xmlns:a="http://schemas.openxmlformats.org/drawingml/2006/main" xmlns:r="http://schemas.openxmlformats.org/officeDocument/2006/relationships" xmlns:p="http://schemas.openxmlformats.org/presentationml/2006/main">
   <p:cSld>
     <p:spTree>
@@ -33274,7 +33462,7 @@
 </p:sld>
 </file>
 
-<file path=ppt/slides/slide41.xml><?xml version="1.0" encoding="utf-8"?>
+<file path=ppt/slides/slide42.xml><?xml version="1.0" encoding="utf-8"?>
 <p:sld xmlns:a="http://schemas.openxmlformats.org/drawingml/2006/main" xmlns:r="http://schemas.openxmlformats.org/officeDocument/2006/relationships" xmlns:p="http://schemas.openxmlformats.org/presentationml/2006/main">
   <p:cSld>
     <p:spTree>
@@ -33620,7 +33808,7 @@
 </p:sld>
 </file>
 
-<file path=ppt/slides/slide42.xml><?xml version="1.0" encoding="utf-8"?>
+<file path=ppt/slides/slide43.xml><?xml version="1.0" encoding="utf-8"?>
 <p:sld xmlns:a="http://schemas.openxmlformats.org/drawingml/2006/main" xmlns:r="http://schemas.openxmlformats.org/officeDocument/2006/relationships" xmlns:p="http://schemas.openxmlformats.org/presentationml/2006/main">
   <p:cSld>
     <p:spTree>
@@ -33895,7 +34083,7 @@
 </p:sld>
 </file>
 
-<file path=ppt/slides/slide43.xml><?xml version="1.0" encoding="utf-8"?>
+<file path=ppt/slides/slide44.xml><?xml version="1.0" encoding="utf-8"?>
 <p:sld xmlns:a="http://schemas.openxmlformats.org/drawingml/2006/main" xmlns:r="http://schemas.openxmlformats.org/officeDocument/2006/relationships" xmlns:p="http://schemas.openxmlformats.org/presentationml/2006/main">
   <p:cSld>
     <p:spTree>
@@ -34465,7 +34653,7 @@
 </p:sld>
 </file>
 
-<file path=ppt/slides/slide44.xml><?xml version="1.0" encoding="utf-8"?>
+<file path=ppt/slides/slide45.xml><?xml version="1.0" encoding="utf-8"?>
 <p:sld xmlns:a="http://schemas.openxmlformats.org/drawingml/2006/main" xmlns:r="http://schemas.openxmlformats.org/officeDocument/2006/relationships" xmlns:p="http://schemas.openxmlformats.org/presentationml/2006/main">
   <p:cSld>
     <p:spTree>
@@ -34942,7 +35130,7 @@
 </p:sld>
 </file>
 
-<file path=ppt/slides/slide45.xml><?xml version="1.0" encoding="utf-8"?>
+<file path=ppt/slides/slide46.xml><?xml version="1.0" encoding="utf-8"?>
 <p:sld xmlns:a="http://schemas.openxmlformats.org/drawingml/2006/main" xmlns:r="http://schemas.openxmlformats.org/officeDocument/2006/relationships" xmlns:p="http://schemas.openxmlformats.org/presentationml/2006/main">
   <p:cSld>
     <p:spTree>
@@ -35431,7 +35619,7 @@
 </p:sld>
 </file>
 
-<file path=ppt/slides/slide46.xml><?xml version="1.0" encoding="utf-8"?>
+<file path=ppt/slides/slide47.xml><?xml version="1.0" encoding="utf-8"?>
 <p:sld xmlns:a="http://schemas.openxmlformats.org/drawingml/2006/main" xmlns:r="http://schemas.openxmlformats.org/officeDocument/2006/relationships" xmlns:p="http://schemas.openxmlformats.org/presentationml/2006/main">
   <p:cSld>
     <p:spTree>
@@ -35846,7 +36034,7 @@
 </p:sld>
 </file>
 
-<file path=ppt/slides/slide47.xml><?xml version="1.0" encoding="utf-8"?>
+<file path=ppt/slides/slide48.xml><?xml version="1.0" encoding="utf-8"?>
 <p:sld xmlns:a="http://schemas.openxmlformats.org/drawingml/2006/main" xmlns:r="http://schemas.openxmlformats.org/officeDocument/2006/relationships" xmlns:p="http://schemas.openxmlformats.org/presentationml/2006/main">
   <p:cSld>
     <p:spTree>
@@ -36260,7 +36448,7 @@
 </p:sld>
 </file>
 
-<file path=ppt/slides/slide48.xml><?xml version="1.0" encoding="utf-8"?>
+<file path=ppt/slides/slide49.xml><?xml version="1.0" encoding="utf-8"?>
 <p:sld xmlns:a="http://schemas.openxmlformats.org/drawingml/2006/main" xmlns:r="http://schemas.openxmlformats.org/officeDocument/2006/relationships" xmlns:p="http://schemas.openxmlformats.org/presentationml/2006/main">
   <p:cSld>
     <p:spTree>
@@ -36756,7 +36944,176 @@
 </p:sld>
 </file>
 
-<file path=ppt/slides/slide49.xml><?xml version="1.0" encoding="utf-8"?>
+<file path=ppt/slides/slide5.xml><?xml version="1.0" encoding="utf-8"?>
+<p:sld xmlns:a="http://schemas.openxmlformats.org/drawingml/2006/main" xmlns:r="http://schemas.openxmlformats.org/officeDocument/2006/relationships" xmlns:p="http://schemas.openxmlformats.org/presentationml/2006/main">
+  <p:cSld>
+    <p:spTree>
+      <p:nvGrpSpPr>
+        <p:cNvPr id="1" name=""/>
+        <p:cNvGrpSpPr/>
+        <p:nvPr/>
+      </p:nvGrpSpPr>
+      <p:grpSpPr>
+        <a:xfrm>
+          <a:off x="0" y="0"/>
+          <a:ext cx="0" cy="0"/>
+          <a:chOff x="0" y="0"/>
+          <a:chExt cx="0" cy="0"/>
+        </a:xfrm>
+      </p:grpSpPr>
+      <p:sp>
+        <p:nvSpPr>
+          <p:cNvPr id="2" name="Title 1">
+            <a:extLst>
+              <a:ext uri="{FF2B5EF4-FFF2-40B4-BE49-F238E27FC236}">
+                <a16:creationId xmlns:a16="http://schemas.microsoft.com/office/drawing/2014/main" id="{FDA802E0-8834-4A3F-B84B-C334800C9753}"/>
+              </a:ext>
+            </a:extLst>
+          </p:cNvPr>
+          <p:cNvSpPr>
+            <a:spLocks noGrp="1"/>
+          </p:cNvSpPr>
+          <p:nvPr>
+            <p:ph type="title"/>
+          </p:nvPr>
+        </p:nvSpPr>
+        <p:spPr>
+          <a:xfrm>
+            <a:off x="838199" y="262439"/>
+            <a:ext cx="10515600" cy="583504"/>
+          </a:xfrm>
+        </p:spPr>
+        <p:txBody>
+          <a:bodyPr>
+            <a:normAutofit fontScale="90000"/>
+          </a:bodyPr>
+          <a:lstStyle/>
+          <a:p>
+            <a:r>
+              <a:rPr lang="en-US" dirty="0">
+                <a:latin typeface="+mn-lt"/>
+              </a:rPr>
+              <a:t>Medical Application of Computer Vision</a:t>
+            </a:r>
+          </a:p>
+        </p:txBody>
+      </p:sp>
+      <p:pic>
+        <p:nvPicPr>
+          <p:cNvPr id="4" name="Picture 3">
+            <a:extLst>
+              <a:ext uri="{FF2B5EF4-FFF2-40B4-BE49-F238E27FC236}">
+                <a16:creationId xmlns:a16="http://schemas.microsoft.com/office/drawing/2014/main" id="{77563C94-51BC-431E-B60F-39D8489899F0}"/>
+              </a:ext>
+            </a:extLst>
+          </p:cNvPr>
+          <p:cNvPicPr>
+            <a:picLocks noChangeAspect="1"/>
+          </p:cNvPicPr>
+          <p:nvPr/>
+        </p:nvPicPr>
+        <p:blipFill>
+          <a:blip r:embed="rId2"/>
+          <a:stretch>
+            <a:fillRect/>
+          </a:stretch>
+        </p:blipFill>
+        <p:spPr>
+          <a:xfrm>
+            <a:off x="1046425" y="962320"/>
+            <a:ext cx="9241797" cy="3927176"/>
+          </a:xfrm>
+          <a:prstGeom prst="rect">
+            <a:avLst/>
+          </a:prstGeom>
+        </p:spPr>
+      </p:pic>
+      <p:sp>
+        <p:nvSpPr>
+          <p:cNvPr id="5" name="TextBox 4">
+            <a:extLst>
+              <a:ext uri="{FF2B5EF4-FFF2-40B4-BE49-F238E27FC236}">
+                <a16:creationId xmlns:a16="http://schemas.microsoft.com/office/drawing/2014/main" id="{6602666B-3A66-442A-8183-0B640B8F2638}"/>
+              </a:ext>
+            </a:extLst>
+          </p:cNvPr>
+          <p:cNvSpPr txBox="1"/>
+          <p:nvPr/>
+        </p:nvSpPr>
+        <p:spPr>
+          <a:xfrm>
+            <a:off x="658498" y="4840940"/>
+            <a:ext cx="10875003" cy="1938992"/>
+          </a:xfrm>
+          <a:prstGeom prst="rect">
+            <a:avLst/>
+          </a:prstGeom>
+          <a:noFill/>
+        </p:spPr>
+        <p:txBody>
+          <a:bodyPr wrap="square" rtlCol="0">
+            <a:spAutoFit/>
+          </a:bodyPr>
+          <a:lstStyle/>
+          <a:p>
+            <a:r>
+              <a:rPr lang="en-US" sz="2800" dirty="0"/>
+              <a:t>Learning to virtually stain histological samples to simplify pathology diagnoses</a:t>
+            </a:r>
+          </a:p>
+          <a:p>
+            <a:endParaRPr lang="en-US" sz="2800" dirty="0"/>
+          </a:p>
+          <a:p>
+            <a:r>
+              <a:rPr lang="en-US" dirty="0" err="1">
+                <a:hlinkClick r:id="rId3"/>
+              </a:rPr>
+              <a:t>Hnna</a:t>
+            </a:r>
+            <a:r>
+              <a:rPr lang="en-US" dirty="0">
+                <a:hlinkClick r:id="rId3"/>
+              </a:rPr>
+              <a:t>,  et. al., </a:t>
+            </a:r>
+            <a:r>
+              <a:rPr lang="en-US" b="0" i="0" dirty="0">
+                <a:solidFill>
+                  <a:srgbClr val="000000"/>
+                </a:solidFill>
+                <a:effectLst/>
+                <a:hlinkClick r:id="rId3"/>
+              </a:rPr>
+              <a:t>Deep learning-based transformation of H&amp;E stained tissues into special stains, Nature</a:t>
+            </a:r>
+            <a:r>
+              <a:rPr lang="en-US" dirty="0">
+                <a:solidFill>
+                  <a:srgbClr val="000000"/>
+                </a:solidFill>
+                <a:hlinkClick r:id="rId3"/>
+              </a:rPr>
+              <a:t> Communications, 2021.</a:t>
+            </a:r>
+            <a:endParaRPr lang="en-US" dirty="0"/>
+          </a:p>
+        </p:txBody>
+      </p:sp>
+    </p:spTree>
+    <p:extLst>
+      <p:ext uri="{BB962C8B-B14F-4D97-AF65-F5344CB8AC3E}">
+        <p14:creationId xmlns:p14="http://schemas.microsoft.com/office/powerpoint/2010/main" val="2643378001"/>
+      </p:ext>
+    </p:extLst>
+  </p:cSld>
+  <p:clrMapOvr>
+    <a:masterClrMapping/>
+  </p:clrMapOvr>
+</p:sld>
+</file>
+
+<file path=ppt/slides/slide50.xml><?xml version="1.0" encoding="utf-8"?>
 <p:sld xmlns:a="http://schemas.openxmlformats.org/drawingml/2006/main" xmlns:r="http://schemas.openxmlformats.org/officeDocument/2006/relationships" xmlns:p="http://schemas.openxmlformats.org/presentationml/2006/main">
   <p:cSld>
     <p:spTree>
@@ -36859,13 +37216,8 @@
           <a:p>
             <a:r>
               <a:rPr lang="en-US" dirty="0"/>
-              <a:t>Digital image data sampling and </a:t>
-            </a:r>
-            <a:r>
-              <a:rPr lang="en-US"/>
-              <a:t>aliasing effects</a:t>
-            </a:r>
-            <a:endParaRPr lang="en-US" dirty="0"/>
+              <a:t>Digital image data sampling and aliasing effects</a:t>
+            </a:r>
           </a:p>
           <a:p>
             <a:r>
@@ -37120,175 +37472,6 @@
       </p:par>
     </p:tnLst>
   </p:timing>
-</p:sld>
-</file>
-
-<file path=ppt/slides/slide5.xml><?xml version="1.0" encoding="utf-8"?>
-<p:sld xmlns:a="http://schemas.openxmlformats.org/drawingml/2006/main" xmlns:r="http://schemas.openxmlformats.org/officeDocument/2006/relationships" xmlns:p="http://schemas.openxmlformats.org/presentationml/2006/main">
-  <p:cSld>
-    <p:spTree>
-      <p:nvGrpSpPr>
-        <p:cNvPr id="1" name=""/>
-        <p:cNvGrpSpPr/>
-        <p:nvPr/>
-      </p:nvGrpSpPr>
-      <p:grpSpPr>
-        <a:xfrm>
-          <a:off x="0" y="0"/>
-          <a:ext cx="0" cy="0"/>
-          <a:chOff x="0" y="0"/>
-          <a:chExt cx="0" cy="0"/>
-        </a:xfrm>
-      </p:grpSpPr>
-      <p:sp>
-        <p:nvSpPr>
-          <p:cNvPr id="2" name="Title 1">
-            <a:extLst>
-              <a:ext uri="{FF2B5EF4-FFF2-40B4-BE49-F238E27FC236}">
-                <a16:creationId xmlns:a16="http://schemas.microsoft.com/office/drawing/2014/main" id="{FDA802E0-8834-4A3F-B84B-C334800C9753}"/>
-              </a:ext>
-            </a:extLst>
-          </p:cNvPr>
-          <p:cNvSpPr>
-            <a:spLocks noGrp="1"/>
-          </p:cNvSpPr>
-          <p:nvPr>
-            <p:ph type="title"/>
-          </p:nvPr>
-        </p:nvSpPr>
-        <p:spPr>
-          <a:xfrm>
-            <a:off x="838199" y="262439"/>
-            <a:ext cx="10515600" cy="583504"/>
-          </a:xfrm>
-        </p:spPr>
-        <p:txBody>
-          <a:bodyPr>
-            <a:normAutofit fontScale="90000"/>
-          </a:bodyPr>
-          <a:lstStyle/>
-          <a:p>
-            <a:r>
-              <a:rPr lang="en-US" dirty="0">
-                <a:latin typeface="+mn-lt"/>
-              </a:rPr>
-              <a:t>Medical Application of Computer Vision</a:t>
-            </a:r>
-          </a:p>
-        </p:txBody>
-      </p:sp>
-      <p:pic>
-        <p:nvPicPr>
-          <p:cNvPr id="4" name="Picture 3">
-            <a:extLst>
-              <a:ext uri="{FF2B5EF4-FFF2-40B4-BE49-F238E27FC236}">
-                <a16:creationId xmlns:a16="http://schemas.microsoft.com/office/drawing/2014/main" id="{77563C94-51BC-431E-B60F-39D8489899F0}"/>
-              </a:ext>
-            </a:extLst>
-          </p:cNvPr>
-          <p:cNvPicPr>
-            <a:picLocks noChangeAspect="1"/>
-          </p:cNvPicPr>
-          <p:nvPr/>
-        </p:nvPicPr>
-        <p:blipFill>
-          <a:blip r:embed="rId2"/>
-          <a:stretch>
-            <a:fillRect/>
-          </a:stretch>
-        </p:blipFill>
-        <p:spPr>
-          <a:xfrm>
-            <a:off x="1046425" y="962320"/>
-            <a:ext cx="9241797" cy="3927176"/>
-          </a:xfrm>
-          <a:prstGeom prst="rect">
-            <a:avLst/>
-          </a:prstGeom>
-        </p:spPr>
-      </p:pic>
-      <p:sp>
-        <p:nvSpPr>
-          <p:cNvPr id="5" name="TextBox 4">
-            <a:extLst>
-              <a:ext uri="{FF2B5EF4-FFF2-40B4-BE49-F238E27FC236}">
-                <a16:creationId xmlns:a16="http://schemas.microsoft.com/office/drawing/2014/main" id="{6602666B-3A66-442A-8183-0B640B8F2638}"/>
-              </a:ext>
-            </a:extLst>
-          </p:cNvPr>
-          <p:cNvSpPr txBox="1"/>
-          <p:nvPr/>
-        </p:nvSpPr>
-        <p:spPr>
-          <a:xfrm>
-            <a:off x="658498" y="4840940"/>
-            <a:ext cx="10875003" cy="1938992"/>
-          </a:xfrm>
-          <a:prstGeom prst="rect">
-            <a:avLst/>
-          </a:prstGeom>
-          <a:noFill/>
-        </p:spPr>
-        <p:txBody>
-          <a:bodyPr wrap="square" rtlCol="0">
-            <a:spAutoFit/>
-          </a:bodyPr>
-          <a:lstStyle/>
-          <a:p>
-            <a:r>
-              <a:rPr lang="en-US" sz="2800" dirty="0"/>
-              <a:t>Learning to virtually stain histological samples to simplify pathology diagnoses</a:t>
-            </a:r>
-          </a:p>
-          <a:p>
-            <a:endParaRPr lang="en-US" sz="2800" dirty="0"/>
-          </a:p>
-          <a:p>
-            <a:r>
-              <a:rPr lang="en-US" dirty="0" err="1">
-                <a:hlinkClick r:id="rId3"/>
-              </a:rPr>
-              <a:t>Hnna</a:t>
-            </a:r>
-            <a:r>
-              <a:rPr lang="en-US" dirty="0">
-                <a:hlinkClick r:id="rId3"/>
-              </a:rPr>
-              <a:t>,  et. al., </a:t>
-            </a:r>
-            <a:r>
-              <a:rPr lang="en-US" b="0" i="0" dirty="0">
-                <a:solidFill>
-                  <a:srgbClr val="000000"/>
-                </a:solidFill>
-                <a:effectLst/>
-                <a:hlinkClick r:id="rId3"/>
-              </a:rPr>
-              <a:t>Deep learning-based transformation of H&amp;E stained tissues into special stains, Nature</a:t>
-            </a:r>
-            <a:r>
-              <a:rPr lang="en-US" dirty="0">
-                <a:solidFill>
-                  <a:srgbClr val="000000"/>
-                </a:solidFill>
-                <a:hlinkClick r:id="rId3"/>
-              </a:rPr>
-              <a:t> Communications, 2021.</a:t>
-            </a:r>
-            <a:endParaRPr lang="en-US" dirty="0"/>
-          </a:p>
-        </p:txBody>
-      </p:sp>
-    </p:spTree>
-    <p:extLst>
-      <p:ext uri="{BB962C8B-B14F-4D97-AF65-F5344CB8AC3E}">
-        <p14:creationId xmlns:p14="http://schemas.microsoft.com/office/powerpoint/2010/main" val="2643378001"/>
-      </p:ext>
-    </p:extLst>
-  </p:cSld>
-  <p:clrMapOvr>
-    <a:masterClrMapping/>
-  </p:clrMapOvr>
 </p:sld>
 </file>
 

</xml_diff>

<commit_message>
Corrected typos noticed in lecture
</commit_message>
<xml_diff>
--- a/Slides/1_Introduction.pptx
+++ b/Slides/1_Introduction.pptx
@@ -246,7 +246,7 @@
           <a:p>
             <a:fld id="{75A03C7D-3751-4F45-A7C4-5947DC6E787B}" type="datetimeFigureOut">
               <a:rPr lang="en-US" smtClean="0"/>
-              <a:t>1/23/2023</a:t>
+              <a:t>1/27/2023</a:t>
             </a:fld>
             <a:endParaRPr lang="en-US"/>
           </a:p>
@@ -2766,7 +2766,7 @@
           <a:p>
             <a:fld id="{61FA4C16-8A72-4D45-80AF-E8D5756146B3}" type="datetimeFigureOut">
               <a:rPr lang="en-US" smtClean="0"/>
-              <a:t>1/23/2023</a:t>
+              <a:t>1/27/2023</a:t>
             </a:fld>
             <a:endParaRPr lang="en-US"/>
           </a:p>
@@ -2964,7 +2964,7 @@
           <a:p>
             <a:fld id="{61FA4C16-8A72-4D45-80AF-E8D5756146B3}" type="datetimeFigureOut">
               <a:rPr lang="en-US" smtClean="0"/>
-              <a:t>1/23/2023</a:t>
+              <a:t>1/27/2023</a:t>
             </a:fld>
             <a:endParaRPr lang="en-US"/>
           </a:p>
@@ -3172,7 +3172,7 @@
           <a:p>
             <a:fld id="{61FA4C16-8A72-4D45-80AF-E8D5756146B3}" type="datetimeFigureOut">
               <a:rPr lang="en-US" smtClean="0"/>
-              <a:t>1/23/2023</a:t>
+              <a:t>1/27/2023</a:t>
             </a:fld>
             <a:endParaRPr lang="en-US"/>
           </a:p>
@@ -4148,7 +4148,7 @@
           <a:p>
             <a:fld id="{61FA4C16-8A72-4D45-80AF-E8D5756146B3}" type="datetimeFigureOut">
               <a:rPr lang="en-US" smtClean="0"/>
-              <a:t>1/23/2023</a:t>
+              <a:t>1/27/2023</a:t>
             </a:fld>
             <a:endParaRPr lang="en-US"/>
           </a:p>
@@ -4423,7 +4423,7 @@
           <a:p>
             <a:fld id="{61FA4C16-8A72-4D45-80AF-E8D5756146B3}" type="datetimeFigureOut">
               <a:rPr lang="en-US" smtClean="0"/>
-              <a:t>1/23/2023</a:t>
+              <a:t>1/27/2023</a:t>
             </a:fld>
             <a:endParaRPr lang="en-US"/>
           </a:p>
@@ -4688,7 +4688,7 @@
           <a:p>
             <a:fld id="{61FA4C16-8A72-4D45-80AF-E8D5756146B3}" type="datetimeFigureOut">
               <a:rPr lang="en-US" smtClean="0"/>
-              <a:t>1/23/2023</a:t>
+              <a:t>1/27/2023</a:t>
             </a:fld>
             <a:endParaRPr lang="en-US"/>
           </a:p>
@@ -5100,7 +5100,7 @@
           <a:p>
             <a:fld id="{61FA4C16-8A72-4D45-80AF-E8D5756146B3}" type="datetimeFigureOut">
               <a:rPr lang="en-US" smtClean="0"/>
-              <a:t>1/23/2023</a:t>
+              <a:t>1/27/2023</a:t>
             </a:fld>
             <a:endParaRPr lang="en-US"/>
           </a:p>
@@ -5241,7 +5241,7 @@
           <a:p>
             <a:fld id="{61FA4C16-8A72-4D45-80AF-E8D5756146B3}" type="datetimeFigureOut">
               <a:rPr lang="en-US" smtClean="0"/>
-              <a:t>1/23/2023</a:t>
+              <a:t>1/27/2023</a:t>
             </a:fld>
             <a:endParaRPr lang="en-US"/>
           </a:p>
@@ -5354,7 +5354,7 @@
           <a:p>
             <a:fld id="{61FA4C16-8A72-4D45-80AF-E8D5756146B3}" type="datetimeFigureOut">
               <a:rPr lang="en-US" smtClean="0"/>
-              <a:t>1/23/2023</a:t>
+              <a:t>1/27/2023</a:t>
             </a:fld>
             <a:endParaRPr lang="en-US"/>
           </a:p>
@@ -5665,7 +5665,7 @@
           <a:p>
             <a:fld id="{61FA4C16-8A72-4D45-80AF-E8D5756146B3}" type="datetimeFigureOut">
               <a:rPr lang="en-US" smtClean="0"/>
-              <a:t>1/23/2023</a:t>
+              <a:t>1/27/2023</a:t>
             </a:fld>
             <a:endParaRPr lang="en-US"/>
           </a:p>
@@ -5953,7 +5953,7 @@
           <a:p>
             <a:fld id="{61FA4C16-8A72-4D45-80AF-E8D5756146B3}" type="datetimeFigureOut">
               <a:rPr lang="en-US" smtClean="0"/>
-              <a:t>1/23/2023</a:t>
+              <a:t>1/27/2023</a:t>
             </a:fld>
             <a:endParaRPr lang="en-US"/>
           </a:p>
@@ -6194,7 +6194,7 @@
           <a:p>
             <a:fld id="{61FA4C16-8A72-4D45-80AF-E8D5756146B3}" type="datetimeFigureOut">
               <a:rPr lang="en-US" smtClean="0"/>
-              <a:t>1/23/2023</a:t>
+              <a:t>1/27/2023</a:t>
             </a:fld>
             <a:endParaRPr lang="en-US"/>
           </a:p>
@@ -7150,7 +7150,7 @@
             </a:r>
             <a:r>
               <a:rPr lang="en-US" dirty="0"/>
-              <a:t> Pro (or Pro+)</a:t>
+              <a:t> Pro (or Pro+) for some assignments</a:t>
             </a:r>
           </a:p>
           <a:p>
@@ -10591,31 +10591,31 @@
           <a:p>
             <a:r>
               <a:rPr lang="en-US" dirty="0"/>
-              <a:t>Volumetric – e.g. medical images, CAT, MRI</a:t>
+              <a:t>Volumetric – CAT, MRI, seismic </a:t>
             </a:r>
           </a:p>
           <a:p>
             <a:r>
               <a:rPr lang="en-US" dirty="0"/>
-              <a:t>Multi-spectral – e.g. remote sensing </a:t>
+              <a:t>Multi-spectral – remote sensing, material handling, agriculture </a:t>
             </a:r>
           </a:p>
           <a:p>
             <a:r>
               <a:rPr lang="en-US" dirty="0"/>
-              <a:t>Specialized –e.g.  industrial and scientific imaging</a:t>
+              <a:t>Specialized – industrial and scientific imaging</a:t>
             </a:r>
           </a:p>
           <a:p>
             <a:r>
               <a:rPr lang="en-US" dirty="0"/>
-              <a:t>RADAR, LIDAR, etc.</a:t>
+              <a:t>RADAR, LIDAR – earth science, autonomous vehicles</a:t>
             </a:r>
           </a:p>
           <a:p>
             <a:r>
               <a:rPr lang="en-US" dirty="0"/>
-              <a:t>Acoustic, medical, seismic  </a:t>
+              <a:t>Acoustic - medical, seismic  </a:t>
             </a:r>
           </a:p>
           <a:p>
@@ -11546,7 +11546,7 @@
           <a:p>
             <a:r>
               <a:rPr lang="en-US" dirty="0"/>
-              <a:t>Image enhancement and filtering</a:t>
+              <a:t>Image enhancement, filtering, and projection</a:t>
             </a:r>
           </a:p>
           <a:p>
@@ -13156,15 +13156,7 @@
           <a:p>
             <a:r>
               <a:rPr lang="en-US" sz="4400" b="1" dirty="0"/>
-              <a:t>Working With and Representation of </a:t>
-            </a:r>
-            <a:r>
-              <a:rPr lang="en-US" sz="4400" b="1" dirty="0" err="1"/>
-              <a:t>Digiatl</a:t>
-            </a:r>
-            <a:r>
-              <a:rPr lang="en-US" sz="4400" b="1" dirty="0"/>
-              <a:t> Image Data</a:t>
+              <a:t>Working With and Representation of Digital Image Data</a:t>
             </a:r>
           </a:p>
         </p:txBody>
@@ -13474,7 +13466,7 @@
                 <a:ea typeface="Segoe UI" panose="020B0502040204020203" pitchFamily="34" charset="0"/>
                 <a:cs typeface="Segoe UI" panose="020B0502040204020203" pitchFamily="34" charset="0"/>
               </a:rPr>
-              <a:t>Floating point pixel values I the range {0,1}; white to black</a:t>
+              <a:t>Floating point pixel values I the range {0,1}; black to white</a:t>
             </a:r>
           </a:p>
         </p:txBody>
@@ -15956,18 +15948,25 @@
               <a:buChar char="§"/>
             </a:pPr>
             <a:r>
+              <a:rPr lang="en-GB" dirty="0">
+                <a:ea typeface="Segoe UI" panose="020B0502040204020203" pitchFamily="34" charset="0"/>
+                <a:cs typeface="Segoe UI" panose="020B0502040204020203" pitchFamily="34" charset="0"/>
+              </a:rPr>
+              <a:t>Ordinary </a:t>
+            </a:r>
+            <a:r>
               <a:rPr lang="en-GB" dirty="0" err="1">
                 <a:ea typeface="Segoe UI" panose="020B0502040204020203" pitchFamily="34" charset="0"/>
                 <a:cs typeface="Segoe UI" panose="020B0502040204020203" pitchFamily="34" charset="0"/>
               </a:rPr>
-              <a:t>Color</a:t>
+              <a:t>color</a:t>
             </a:r>
             <a:r>
               <a:rPr lang="en-GB" dirty="0">
                 <a:ea typeface="Segoe UI" panose="020B0502040204020203" pitchFamily="34" charset="0"/>
                 <a:cs typeface="Segoe UI" panose="020B0502040204020203" pitchFamily="34" charset="0"/>
               </a:rPr>
-              <a:t> images have three channels – most usually red, green and blue</a:t>
+              <a:t> images have 3 channels – most usually red, green and blue</a:t>
             </a:r>
           </a:p>
           <a:p>
@@ -23168,15 +23167,6 @@
                 <a:ea typeface="Segoe UI" panose="020B0502040204020203" pitchFamily="34" charset="0"/>
                 <a:cs typeface="Segoe UI" panose="020B0502040204020203" pitchFamily="34" charset="0"/>
               </a:rPr>
-              <a:t>Many other schemes exist and are used</a:t>
-            </a:r>
-          </a:p>
-          <a:p>
-            <a:r>
-              <a:rPr lang="en-GB" dirty="0">
-                <a:ea typeface="Segoe UI" panose="020B0502040204020203" pitchFamily="34" charset="0"/>
-                <a:cs typeface="Segoe UI" panose="020B0502040204020203" pitchFamily="34" charset="0"/>
-              </a:rPr>
               <a:t>Can convert between schemes – </a:t>
             </a:r>
             <a:r>
@@ -23595,55 +23585,6 @@
                                           <p:spTgt spid="7">
                                             <p:txEl>
                                               <p:pRg st="4" end="4"/>
-                                            </p:txEl>
-                                          </p:spTgt>
-                                        </p:tgtEl>
-                                        <p:attrNameLst>
-                                          <p:attrName>style.visibility</p:attrName>
-                                        </p:attrNameLst>
-                                      </p:cBhvr>
-                                      <p:to>
-                                        <p:strVal val="visible"/>
-                                      </p:to>
-                                    </p:set>
-                                  </p:childTnLst>
-                                </p:cTn>
-                              </p:par>
-                            </p:childTnLst>
-                          </p:cTn>
-                        </p:par>
-                      </p:childTnLst>
-                    </p:cTn>
-                  </p:par>
-                  <p:par>
-                    <p:cTn id="25" fill="hold">
-                      <p:stCondLst>
-                        <p:cond delay="indefinite"/>
-                      </p:stCondLst>
-                      <p:childTnLst>
-                        <p:par>
-                          <p:cTn id="26" fill="hold">
-                            <p:stCondLst>
-                              <p:cond delay="0"/>
-                            </p:stCondLst>
-                            <p:childTnLst>
-                              <p:par>
-                                <p:cTn id="27" presetID="1" presetClass="entr" presetSubtype="0" fill="hold" grpId="0" nodeType="clickEffect">
-                                  <p:stCondLst>
-                                    <p:cond delay="0"/>
-                                  </p:stCondLst>
-                                  <p:childTnLst>
-                                    <p:set>
-                                      <p:cBhvr>
-                                        <p:cTn id="28" dur="1" fill="hold">
-                                          <p:stCondLst>
-                                            <p:cond delay="0"/>
-                                          </p:stCondLst>
-                                        </p:cTn>
-                                        <p:tgtEl>
-                                          <p:spTgt spid="7">
-                                            <p:txEl>
-                                              <p:pRg st="5" end="5"/>
                                             </p:txEl>
                                           </p:spTgt>
                                         </p:tgtEl>
@@ -25024,6 +24965,33 @@
                 <a:ea typeface="Segoe UI" panose="020B0502040204020203" pitchFamily="34" charset="0"/>
                 <a:cs typeface="Segoe UI" panose="020B0502040204020203" pitchFamily="34" charset="0"/>
               </a:rPr>
+              <a:t>4</a:t>
+            </a:r>
+            <a:r>
+              <a:rPr lang="en-GB" baseline="30000" dirty="0">
+                <a:ea typeface="Segoe UI" panose="020B0502040204020203" pitchFamily="34" charset="0"/>
+                <a:cs typeface="Segoe UI" panose="020B0502040204020203" pitchFamily="34" charset="0"/>
+              </a:rPr>
+              <a:t>th</a:t>
+            </a:r>
+            <a:r>
+              <a:rPr lang="en-GB" dirty="0">
+                <a:ea typeface="Segoe UI" panose="020B0502040204020203" pitchFamily="34" charset="0"/>
+                <a:cs typeface="Segoe UI" panose="020B0502040204020203" pitchFamily="34" charset="0"/>
+              </a:rPr>
+              <a:t> dimension is the time sequence of images (frames)</a:t>
+            </a:r>
+          </a:p>
+          <a:p>
+            <a:pPr>
+              <a:buFont typeface="Wingdings" panose="05000000000000000000" pitchFamily="2" charset="2"/>
+              <a:buChar char="§"/>
+            </a:pPr>
+            <a:r>
+              <a:rPr lang="en-GB" dirty="0">
+                <a:ea typeface="Segoe UI" panose="020B0502040204020203" pitchFamily="34" charset="0"/>
+                <a:cs typeface="Segoe UI" panose="020B0502040204020203" pitchFamily="34" charset="0"/>
+              </a:rPr>
               <a:t>Or, 3</a:t>
             </a:r>
             <a:r>
@@ -25046,27 +25014,10 @@
               <a:buFont typeface="Wingdings" panose="05000000000000000000" pitchFamily="2" charset="2"/>
               <a:buChar char="§"/>
             </a:pPr>
-            <a:r>
-              <a:rPr lang="en-GB" dirty="0">
-                <a:ea typeface="Segoe UI" panose="020B0502040204020203" pitchFamily="34" charset="0"/>
-                <a:cs typeface="Segoe UI" panose="020B0502040204020203" pitchFamily="34" charset="0"/>
-              </a:rPr>
-              <a:t>4</a:t>
-            </a:r>
-            <a:r>
-              <a:rPr lang="en-GB" baseline="30000" dirty="0">
-                <a:ea typeface="Segoe UI" panose="020B0502040204020203" pitchFamily="34" charset="0"/>
-                <a:cs typeface="Segoe UI" panose="020B0502040204020203" pitchFamily="34" charset="0"/>
-              </a:rPr>
-              <a:t>th</a:t>
-            </a:r>
-            <a:r>
-              <a:rPr lang="en-GB" dirty="0">
-                <a:ea typeface="Segoe UI" panose="020B0502040204020203" pitchFamily="34" charset="0"/>
-                <a:cs typeface="Segoe UI" panose="020B0502040204020203" pitchFamily="34" charset="0"/>
-              </a:rPr>
-              <a:t> dimension is the time sequence of images (frames)</a:t>
-            </a:r>
+            <a:endParaRPr lang="en-GB" dirty="0">
+              <a:ea typeface="Segoe UI" panose="020B0502040204020203" pitchFamily="34" charset="0"/>
+              <a:cs typeface="Segoe UI" panose="020B0502040204020203" pitchFamily="34" charset="0"/>
+            </a:endParaRPr>
           </a:p>
           <a:p>
             <a:pPr marL="0" indent="0">
@@ -29478,8 +29429,8 @@
           <a:chExt cx="0" cy="0"/>
         </a:xfrm>
       </p:grpSpPr>
-      <mc:AlternateContent xmlns:mc="http://schemas.openxmlformats.org/markup-compatibility/2006">
-        <mc:Choice xmlns:a14="http://schemas.microsoft.com/office/drawing/2010/main" Requires="a14">
+      <mc:AlternateContent xmlns:mc="http://schemas.openxmlformats.org/markup-compatibility/2006" xmlns:a14="http://schemas.microsoft.com/office/drawing/2010/main">
+        <mc:Choice Requires="a14">
           <p:sp>
             <p:nvSpPr>
               <p:cNvPr id="7" name="Content Placeholder 6"/>
@@ -29674,7 +29625,7 @@
             </p:txBody>
           </p:sp>
         </mc:Choice>
-        <mc:Fallback>
+        <mc:Fallback xmlns="">
           <p:sp>
             <p:nvSpPr>
               <p:cNvPr id="7" name="Content Placeholder 6"/>
@@ -30853,11 +30804,18 @@
           </a:p>
           <a:p>
             <a:r>
-              <a:rPr lang="en-GB" dirty="0">
+              <a:rPr lang="en-GB">
                 <a:ea typeface="Segoe UI" panose="020B0502040204020203" pitchFamily="34" charset="0"/>
                 <a:cs typeface="Segoe UI" panose="020B0502040204020203" pitchFamily="34" charset="0"/>
               </a:rPr>
-              <a:t>Use </a:t>
+              <a:t>Use</a:t>
+            </a:r>
+            <a:r>
+              <a:rPr lang="en-GB" b="1">
+                <a:ea typeface="Segoe UI" panose="020B0502040204020203" pitchFamily="34" charset="0"/>
+                <a:cs typeface="Segoe UI" panose="020B0502040204020203" pitchFamily="34" charset="0"/>
+              </a:rPr>
+              <a:t> </a:t>
             </a:r>
             <a:r>
               <a:rPr lang="en-GB" b="1" dirty="0">
@@ -32846,8 +32804,8 @@
           <a:chExt cx="0" cy="0"/>
         </a:xfrm>
       </p:grpSpPr>
-      <mc:AlternateContent xmlns:mc="http://schemas.openxmlformats.org/markup-compatibility/2006">
-        <mc:Choice xmlns:a14="http://schemas.microsoft.com/office/drawing/2010/main" Requires="a14">
+      <mc:AlternateContent xmlns:mc="http://schemas.openxmlformats.org/markup-compatibility/2006" xmlns:a14="http://schemas.microsoft.com/office/drawing/2010/main">
+        <mc:Choice Requires="a14">
           <p:sp>
             <p:nvSpPr>
               <p:cNvPr id="7" name="Content Placeholder 6"/>
@@ -33382,7 +33340,7 @@
             </p:txBody>
           </p:sp>
         </mc:Choice>
-        <mc:Fallback>
+        <mc:Fallback xmlns="">
           <p:sp>
             <p:nvSpPr>
               <p:cNvPr id="7" name="Content Placeholder 6"/>
@@ -35209,7 +35167,7 @@
                 <a:ea typeface="Segoe UI" panose="020B0502040204020203" pitchFamily="34" charset="0"/>
                 <a:cs typeface="Segoe UI" panose="020B0502040204020203" pitchFamily="34" charset="0"/>
               </a:rPr>
-              <a:t>Contrast improvement is optimal globally</a:t>
+              <a:t>Contrast improvement may not be optimal globally</a:t>
             </a:r>
           </a:p>
           <a:p>
@@ -35219,8 +35177,19 @@
                 <a:ea typeface="Segoe UI" panose="020B0502040204020203" pitchFamily="34" charset="0"/>
                 <a:cs typeface="Segoe UI" panose="020B0502040204020203" pitchFamily="34" charset="0"/>
               </a:rPr>
-              <a:t>But, contrast not optimized locally</a:t>
-            </a:r>
+              <a:t> Can </a:t>
+            </a:r>
+            <a:r>
+              <a:rPr lang="en-US">
+                <a:ea typeface="Segoe UI" panose="020B0502040204020203" pitchFamily="34" charset="0"/>
+                <a:cs typeface="Segoe UI" panose="020B0502040204020203" pitchFamily="34" charset="0"/>
+              </a:rPr>
+              <a:t>optimized contrast locally</a:t>
+            </a:r>
+            <a:endParaRPr lang="en-US" dirty="0">
+              <a:ea typeface="Segoe UI" panose="020B0502040204020203" pitchFamily="34" charset="0"/>
+              <a:cs typeface="Segoe UI" panose="020B0502040204020203" pitchFamily="34" charset="0"/>
+            </a:endParaRPr>
           </a:p>
           <a:p>
             <a:r>
@@ -35642,8 +35611,8 @@
           <a:chExt cx="0" cy="0"/>
         </a:xfrm>
       </p:grpSpPr>
-      <mc:AlternateContent xmlns:mc="http://schemas.openxmlformats.org/markup-compatibility/2006">
-        <mc:Choice xmlns:a14="http://schemas.microsoft.com/office/drawing/2010/main" Requires="a14">
+      <mc:AlternateContent xmlns:mc="http://schemas.openxmlformats.org/markup-compatibility/2006" xmlns:a14="http://schemas.microsoft.com/office/drawing/2010/main">
+        <mc:Choice Requires="a14">
           <p:sp>
             <p:nvSpPr>
               <p:cNvPr id="7" name="Content Placeholder 6"/>
@@ -35954,7 +35923,7 @@
             </p:txBody>
           </p:sp>
         </mc:Choice>
-        <mc:Fallback>
+        <mc:Fallback xmlns="">
           <p:sp>
             <p:nvSpPr>
               <p:cNvPr id="7" name="Content Placeholder 6"/>

</xml_diff>

<commit_message>
Correct typo added communication slide
</commit_message>
<xml_diff>
--- a/Slides/1_Introduction.pptx
+++ b/Slides/1_Introduction.pptx
@@ -5,7 +5,7 @@
     <p:sldMasterId id="2147483648" r:id="rId1"/>
   </p:sldMasterIdLst>
   <p:notesMasterIdLst>
-    <p:notesMasterId r:id="rId52"/>
+    <p:notesMasterId r:id="rId53"/>
   </p:notesMasterIdLst>
   <p:sldIdLst>
     <p:sldId id="257" r:id="rId2"/>
@@ -21,43 +21,44 @@
     <p:sldId id="389" r:id="rId12"/>
     <p:sldId id="385" r:id="rId13"/>
     <p:sldId id="381" r:id="rId14"/>
-    <p:sldId id="449" r:id="rId15"/>
-    <p:sldId id="443" r:id="rId16"/>
-    <p:sldId id="439" r:id="rId17"/>
-    <p:sldId id="291" r:id="rId18"/>
-    <p:sldId id="290" r:id="rId19"/>
-    <p:sldId id="400" r:id="rId20"/>
-    <p:sldId id="401" r:id="rId21"/>
-    <p:sldId id="402" r:id="rId22"/>
-    <p:sldId id="403" r:id="rId23"/>
-    <p:sldId id="440" r:id="rId24"/>
-    <p:sldId id="330" r:id="rId25"/>
-    <p:sldId id="390" r:id="rId26"/>
-    <p:sldId id="331" r:id="rId27"/>
-    <p:sldId id="395" r:id="rId28"/>
-    <p:sldId id="396" r:id="rId29"/>
-    <p:sldId id="404" r:id="rId30"/>
-    <p:sldId id="332" r:id="rId31"/>
-    <p:sldId id="333" r:id="rId32"/>
-    <p:sldId id="441" r:id="rId33"/>
-    <p:sldId id="391" r:id="rId34"/>
-    <p:sldId id="392" r:id="rId35"/>
-    <p:sldId id="393" r:id="rId36"/>
-    <p:sldId id="394" r:id="rId37"/>
-    <p:sldId id="442" r:id="rId38"/>
-    <p:sldId id="382" r:id="rId39"/>
-    <p:sldId id="399" r:id="rId40"/>
-    <p:sldId id="398" r:id="rId41"/>
-    <p:sldId id="444" r:id="rId42"/>
-    <p:sldId id="383" r:id="rId43"/>
-    <p:sldId id="386" r:id="rId44"/>
-    <p:sldId id="445" r:id="rId45"/>
-    <p:sldId id="387" r:id="rId46"/>
-    <p:sldId id="397" r:id="rId47"/>
-    <p:sldId id="446" r:id="rId48"/>
-    <p:sldId id="447" r:id="rId49"/>
-    <p:sldId id="448" r:id="rId50"/>
-    <p:sldId id="407" r:id="rId51"/>
+    <p:sldId id="450" r:id="rId15"/>
+    <p:sldId id="449" r:id="rId16"/>
+    <p:sldId id="443" r:id="rId17"/>
+    <p:sldId id="439" r:id="rId18"/>
+    <p:sldId id="291" r:id="rId19"/>
+    <p:sldId id="290" r:id="rId20"/>
+    <p:sldId id="400" r:id="rId21"/>
+    <p:sldId id="401" r:id="rId22"/>
+    <p:sldId id="402" r:id="rId23"/>
+    <p:sldId id="403" r:id="rId24"/>
+    <p:sldId id="440" r:id="rId25"/>
+    <p:sldId id="330" r:id="rId26"/>
+    <p:sldId id="390" r:id="rId27"/>
+    <p:sldId id="331" r:id="rId28"/>
+    <p:sldId id="395" r:id="rId29"/>
+    <p:sldId id="396" r:id="rId30"/>
+    <p:sldId id="404" r:id="rId31"/>
+    <p:sldId id="332" r:id="rId32"/>
+    <p:sldId id="333" r:id="rId33"/>
+    <p:sldId id="441" r:id="rId34"/>
+    <p:sldId id="391" r:id="rId35"/>
+    <p:sldId id="392" r:id="rId36"/>
+    <p:sldId id="393" r:id="rId37"/>
+    <p:sldId id="394" r:id="rId38"/>
+    <p:sldId id="442" r:id="rId39"/>
+    <p:sldId id="382" r:id="rId40"/>
+    <p:sldId id="399" r:id="rId41"/>
+    <p:sldId id="398" r:id="rId42"/>
+    <p:sldId id="444" r:id="rId43"/>
+    <p:sldId id="383" r:id="rId44"/>
+    <p:sldId id="386" r:id="rId45"/>
+    <p:sldId id="445" r:id="rId46"/>
+    <p:sldId id="387" r:id="rId47"/>
+    <p:sldId id="397" r:id="rId48"/>
+    <p:sldId id="446" r:id="rId49"/>
+    <p:sldId id="447" r:id="rId50"/>
+    <p:sldId id="448" r:id="rId51"/>
+    <p:sldId id="407" r:id="rId52"/>
   </p:sldIdLst>
   <p:sldSz cx="12192000" cy="6858000"/>
   <p:notesSz cx="6858000" cy="9144000"/>
@@ -246,7 +247,7 @@
           <a:p>
             <a:fld id="{75A03C7D-3751-4F45-A7C4-5947DC6E787B}" type="datetimeFigureOut">
               <a:rPr lang="en-US" smtClean="0"/>
-              <a:t>1/27/2023</a:t>
+              <a:t>6/7/2023</a:t>
             </a:fld>
             <a:endParaRPr lang="en-US"/>
           </a:p>
@@ -581,7 +582,7 @@
             <a:fld id="{13F0F35F-DD44-4607-AEC1-49D7A4BC4066}" type="slidenum">
               <a:rPr lang="en-US" smtClean="0"/>
               <a:pPr/>
-              <a:t>24</a:t>
+              <a:t>25</a:t>
             </a:fld>
             <a:endParaRPr lang="en-US" dirty="0"/>
           </a:p>
@@ -668,7 +669,7 @@
             <a:fld id="{13F0F35F-DD44-4607-AEC1-49D7A4BC4066}" type="slidenum">
               <a:rPr lang="en-US" smtClean="0"/>
               <a:pPr/>
-              <a:t>34</a:t>
+              <a:t>35</a:t>
             </a:fld>
             <a:endParaRPr lang="en-US" dirty="0"/>
           </a:p>
@@ -755,7 +756,7 @@
             <a:fld id="{13F0F35F-DD44-4607-AEC1-49D7A4BC4066}" type="slidenum">
               <a:rPr lang="en-US" smtClean="0"/>
               <a:pPr/>
-              <a:t>35</a:t>
+              <a:t>36</a:t>
             </a:fld>
             <a:endParaRPr lang="en-US" dirty="0"/>
           </a:p>
@@ -842,7 +843,7 @@
             <a:fld id="{13F0F35F-DD44-4607-AEC1-49D7A4BC4066}" type="slidenum">
               <a:rPr lang="en-US" smtClean="0"/>
               <a:pPr/>
-              <a:t>36</a:t>
+              <a:t>37</a:t>
             </a:fld>
             <a:endParaRPr lang="en-US" dirty="0"/>
           </a:p>
@@ -929,7 +930,7 @@
             <a:fld id="{13F0F35F-DD44-4607-AEC1-49D7A4BC4066}" type="slidenum">
               <a:rPr lang="en-US" smtClean="0"/>
               <a:pPr/>
-              <a:t>38</a:t>
+              <a:t>39</a:t>
             </a:fld>
             <a:endParaRPr lang="en-US" dirty="0"/>
           </a:p>
@@ -1016,7 +1017,7 @@
             <a:fld id="{13F0F35F-DD44-4607-AEC1-49D7A4BC4066}" type="slidenum">
               <a:rPr lang="en-US" smtClean="0"/>
               <a:pPr/>
-              <a:t>39</a:t>
+              <a:t>40</a:t>
             </a:fld>
             <a:endParaRPr lang="en-US" dirty="0"/>
           </a:p>
@@ -1103,7 +1104,7 @@
             <a:fld id="{13F0F35F-DD44-4607-AEC1-49D7A4BC4066}" type="slidenum">
               <a:rPr lang="en-US" smtClean="0"/>
               <a:pPr/>
-              <a:t>40</a:t>
+              <a:t>41</a:t>
             </a:fld>
             <a:endParaRPr lang="en-US" dirty="0"/>
           </a:p>
@@ -1193,7 +1194,7 @@
             <a:fld id="{13F0F35F-DD44-4607-AEC1-49D7A4BC4066}" type="slidenum">
               <a:rPr lang="en-US" smtClean="0"/>
               <a:pPr/>
-              <a:t>41</a:t>
+              <a:t>42</a:t>
             </a:fld>
             <a:endParaRPr lang="en-US" dirty="0"/>
           </a:p>
@@ -1280,7 +1281,7 @@
             <a:fld id="{13F0F35F-DD44-4607-AEC1-49D7A4BC4066}" type="slidenum">
               <a:rPr lang="en-US" smtClean="0"/>
               <a:pPr/>
-              <a:t>42</a:t>
+              <a:t>43</a:t>
             </a:fld>
             <a:endParaRPr lang="en-US" dirty="0"/>
           </a:p>
@@ -1367,7 +1368,7 @@
             <a:fld id="{13F0F35F-DD44-4607-AEC1-49D7A4BC4066}" type="slidenum">
               <a:rPr lang="en-US" smtClean="0"/>
               <a:pPr/>
-              <a:t>43</a:t>
+              <a:t>44</a:t>
             </a:fld>
             <a:endParaRPr lang="en-US" dirty="0"/>
           </a:p>
@@ -1457,7 +1458,7 @@
             <a:fld id="{13F0F35F-DD44-4607-AEC1-49D7A4BC4066}" type="slidenum">
               <a:rPr lang="en-US" smtClean="0"/>
               <a:pPr/>
-              <a:t>44</a:t>
+              <a:t>45</a:t>
             </a:fld>
             <a:endParaRPr lang="en-US" dirty="0"/>
           </a:p>
@@ -1544,7 +1545,7 @@
             <a:fld id="{13F0F35F-DD44-4607-AEC1-49D7A4BC4066}" type="slidenum">
               <a:rPr lang="en-US" smtClean="0"/>
               <a:pPr/>
-              <a:t>25</a:t>
+              <a:t>26</a:t>
             </a:fld>
             <a:endParaRPr lang="en-US" dirty="0"/>
           </a:p>
@@ -1631,7 +1632,7 @@
             <a:fld id="{13F0F35F-DD44-4607-AEC1-49D7A4BC4066}" type="slidenum">
               <a:rPr lang="en-US" smtClean="0"/>
               <a:pPr/>
-              <a:t>45</a:t>
+              <a:t>46</a:t>
             </a:fld>
             <a:endParaRPr lang="en-US" dirty="0"/>
           </a:p>
@@ -1721,7 +1722,7 @@
             <a:fld id="{13F0F35F-DD44-4607-AEC1-49D7A4BC4066}" type="slidenum">
               <a:rPr lang="en-US" smtClean="0"/>
               <a:pPr/>
-              <a:t>46</a:t>
+              <a:t>47</a:t>
             </a:fld>
             <a:endParaRPr lang="en-US" dirty="0"/>
           </a:p>
@@ -1811,7 +1812,7 @@
             <a:fld id="{13F0F35F-DD44-4607-AEC1-49D7A4BC4066}" type="slidenum">
               <a:rPr lang="en-US" smtClean="0"/>
               <a:pPr/>
-              <a:t>47</a:t>
+              <a:t>48</a:t>
             </a:fld>
             <a:endParaRPr lang="en-US" dirty="0"/>
           </a:p>
@@ -1901,7 +1902,7 @@
             <a:fld id="{13F0F35F-DD44-4607-AEC1-49D7A4BC4066}" type="slidenum">
               <a:rPr lang="en-US" smtClean="0"/>
               <a:pPr/>
-              <a:t>48</a:t>
+              <a:t>49</a:t>
             </a:fld>
             <a:endParaRPr lang="en-US" dirty="0"/>
           </a:p>
@@ -1991,7 +1992,7 @@
             <a:fld id="{13F0F35F-DD44-4607-AEC1-49D7A4BC4066}" type="slidenum">
               <a:rPr lang="en-US" smtClean="0"/>
               <a:pPr/>
-              <a:t>49</a:t>
+              <a:t>50</a:t>
             </a:fld>
             <a:endParaRPr lang="en-US" dirty="0"/>
           </a:p>
@@ -2078,7 +2079,7 @@
             <a:fld id="{13F0F35F-DD44-4607-AEC1-49D7A4BC4066}" type="slidenum">
               <a:rPr lang="en-US" smtClean="0"/>
               <a:pPr/>
-              <a:t>26</a:t>
+              <a:t>27</a:t>
             </a:fld>
             <a:endParaRPr lang="en-US" dirty="0"/>
           </a:p>
@@ -2165,7 +2166,7 @@
             <a:fld id="{13F0F35F-DD44-4607-AEC1-49D7A4BC4066}" type="slidenum">
               <a:rPr lang="en-US" smtClean="0"/>
               <a:pPr/>
-              <a:t>27</a:t>
+              <a:t>28</a:t>
             </a:fld>
             <a:endParaRPr lang="en-US" dirty="0"/>
           </a:p>
@@ -2252,7 +2253,7 @@
             <a:fld id="{13F0F35F-DD44-4607-AEC1-49D7A4BC4066}" type="slidenum">
               <a:rPr lang="en-US" smtClean="0"/>
               <a:pPr/>
-              <a:t>28</a:t>
+              <a:t>29</a:t>
             </a:fld>
             <a:endParaRPr lang="en-US" dirty="0"/>
           </a:p>
@@ -2339,7 +2340,7 @@
             <a:fld id="{13F0F35F-DD44-4607-AEC1-49D7A4BC4066}" type="slidenum">
               <a:rPr lang="en-US" smtClean="0"/>
               <a:pPr/>
-              <a:t>29</a:t>
+              <a:t>30</a:t>
             </a:fld>
             <a:endParaRPr lang="en-US" dirty="0"/>
           </a:p>
@@ -2426,7 +2427,7 @@
             <a:fld id="{13F0F35F-DD44-4607-AEC1-49D7A4BC4066}" type="slidenum">
               <a:rPr lang="en-US" smtClean="0"/>
               <a:pPr/>
-              <a:t>30</a:t>
+              <a:t>31</a:t>
             </a:fld>
             <a:endParaRPr lang="en-US" dirty="0"/>
           </a:p>
@@ -2513,7 +2514,7 @@
             <a:fld id="{13F0F35F-DD44-4607-AEC1-49D7A4BC4066}" type="slidenum">
               <a:rPr lang="en-US" smtClean="0"/>
               <a:pPr/>
-              <a:t>31</a:t>
+              <a:t>32</a:t>
             </a:fld>
             <a:endParaRPr lang="en-US" dirty="0"/>
           </a:p>
@@ -2600,7 +2601,7 @@
             <a:fld id="{13F0F35F-DD44-4607-AEC1-49D7A4BC4066}" type="slidenum">
               <a:rPr lang="en-US" smtClean="0"/>
               <a:pPr/>
-              <a:t>33</a:t>
+              <a:t>34</a:t>
             </a:fld>
             <a:endParaRPr lang="en-US" dirty="0"/>
           </a:p>
@@ -2766,7 +2767,7 @@
           <a:p>
             <a:fld id="{61FA4C16-8A72-4D45-80AF-E8D5756146B3}" type="datetimeFigureOut">
               <a:rPr lang="en-US" smtClean="0"/>
-              <a:t>1/27/2023</a:t>
+              <a:t>6/7/2023</a:t>
             </a:fld>
             <a:endParaRPr lang="en-US"/>
           </a:p>
@@ -2964,7 +2965,7 @@
           <a:p>
             <a:fld id="{61FA4C16-8A72-4D45-80AF-E8D5756146B3}" type="datetimeFigureOut">
               <a:rPr lang="en-US" smtClean="0"/>
-              <a:t>1/27/2023</a:t>
+              <a:t>6/7/2023</a:t>
             </a:fld>
             <a:endParaRPr lang="en-US"/>
           </a:p>
@@ -3172,7 +3173,7 @@
           <a:p>
             <a:fld id="{61FA4C16-8A72-4D45-80AF-E8D5756146B3}" type="datetimeFigureOut">
               <a:rPr lang="en-US" smtClean="0"/>
-              <a:t>1/27/2023</a:t>
+              <a:t>6/7/2023</a:t>
             </a:fld>
             <a:endParaRPr lang="en-US"/>
           </a:p>
@@ -4148,7 +4149,7 @@
           <a:p>
             <a:fld id="{61FA4C16-8A72-4D45-80AF-E8D5756146B3}" type="datetimeFigureOut">
               <a:rPr lang="en-US" smtClean="0"/>
-              <a:t>1/27/2023</a:t>
+              <a:t>6/7/2023</a:t>
             </a:fld>
             <a:endParaRPr lang="en-US"/>
           </a:p>
@@ -4423,7 +4424,7 @@
           <a:p>
             <a:fld id="{61FA4C16-8A72-4D45-80AF-E8D5756146B3}" type="datetimeFigureOut">
               <a:rPr lang="en-US" smtClean="0"/>
-              <a:t>1/27/2023</a:t>
+              <a:t>6/7/2023</a:t>
             </a:fld>
             <a:endParaRPr lang="en-US"/>
           </a:p>
@@ -4688,7 +4689,7 @@
           <a:p>
             <a:fld id="{61FA4C16-8A72-4D45-80AF-E8D5756146B3}" type="datetimeFigureOut">
               <a:rPr lang="en-US" smtClean="0"/>
-              <a:t>1/27/2023</a:t>
+              <a:t>6/7/2023</a:t>
             </a:fld>
             <a:endParaRPr lang="en-US"/>
           </a:p>
@@ -5100,7 +5101,7 @@
           <a:p>
             <a:fld id="{61FA4C16-8A72-4D45-80AF-E8D5756146B3}" type="datetimeFigureOut">
               <a:rPr lang="en-US" smtClean="0"/>
-              <a:t>1/27/2023</a:t>
+              <a:t>6/7/2023</a:t>
             </a:fld>
             <a:endParaRPr lang="en-US"/>
           </a:p>
@@ -5241,7 +5242,7 @@
           <a:p>
             <a:fld id="{61FA4C16-8A72-4D45-80AF-E8D5756146B3}" type="datetimeFigureOut">
               <a:rPr lang="en-US" smtClean="0"/>
-              <a:t>1/27/2023</a:t>
+              <a:t>6/7/2023</a:t>
             </a:fld>
             <a:endParaRPr lang="en-US"/>
           </a:p>
@@ -5354,7 +5355,7 @@
           <a:p>
             <a:fld id="{61FA4C16-8A72-4D45-80AF-E8D5756146B3}" type="datetimeFigureOut">
               <a:rPr lang="en-US" smtClean="0"/>
-              <a:t>1/27/2023</a:t>
+              <a:t>6/7/2023</a:t>
             </a:fld>
             <a:endParaRPr lang="en-US"/>
           </a:p>
@@ -5665,7 +5666,7 @@
           <a:p>
             <a:fld id="{61FA4C16-8A72-4D45-80AF-E8D5756146B3}" type="datetimeFigureOut">
               <a:rPr lang="en-US" smtClean="0"/>
-              <a:t>1/27/2023</a:t>
+              <a:t>6/7/2023</a:t>
             </a:fld>
             <a:endParaRPr lang="en-US"/>
           </a:p>
@@ -5953,7 +5954,7 @@
           <a:p>
             <a:fld id="{61FA4C16-8A72-4D45-80AF-E8D5756146B3}" type="datetimeFigureOut">
               <a:rPr lang="en-US" smtClean="0"/>
-              <a:t>1/27/2023</a:t>
+              <a:t>6/7/2023</a:t>
             </a:fld>
             <a:endParaRPr lang="en-US"/>
           </a:p>
@@ -6194,7 +6195,7 @@
           <a:p>
             <a:fld id="{61FA4C16-8A72-4D45-80AF-E8D5756146B3}" type="datetimeFigureOut">
               <a:rPr lang="en-US" smtClean="0"/>
-              <a:t>1/27/2023</a:t>
+              <a:t>6/7/2023</a:t>
             </a:fld>
             <a:endParaRPr lang="en-US"/>
           </a:p>
@@ -7107,15 +7108,15 @@
             <a:pPr lvl="1"/>
             <a:r>
               <a:rPr lang="en-US" dirty="0"/>
-              <a:t>Building on this foundation you can explore  rapidly changing </a:t>
-            </a:r>
-            <a:r>
-              <a:rPr lang="en-US" dirty="0" err="1"/>
-              <a:t>algorithmws</a:t>
+              <a:t>Building on this foundation you can explore  rapidly </a:t>
+            </a:r>
+            <a:r>
+              <a:rPr lang="en-US"/>
+              <a:t>changing algorithms </a:t>
             </a:r>
             <a:r>
               <a:rPr lang="en-US" dirty="0"/>
-              <a:t> and applications during your career    </a:t>
+              <a:t>and applications during your career    </a:t>
             </a:r>
           </a:p>
           <a:p>
@@ -9393,7 +9394,7 @@
         <p:spPr>
           <a:xfrm>
             <a:off x="838200" y="1324927"/>
-            <a:ext cx="10515600" cy="4898217"/>
+            <a:ext cx="10515600" cy="5311004"/>
           </a:xfrm>
         </p:spPr>
         <p:txBody>
@@ -9406,73 +9407,89 @@
               <a:buNone/>
             </a:pPr>
             <a:r>
+              <a:rPr lang="en-US" b="1" dirty="0"/>
+              <a:t>Ed Discussion is the primary means of communication </a:t>
+            </a:r>
+            <a:r>
               <a:rPr lang="en-US" dirty="0"/>
-              <a:t>Timely release of assignment solutions is an important part of the learning process </a:t>
+              <a:t>for this course  </a:t>
             </a:r>
           </a:p>
           <a:p>
             <a:r>
               <a:rPr lang="en-US" dirty="0"/>
-              <a:t>This is a fast-moving survey course  </a:t>
+              <a:t>Use Ed for help with assignments and projects </a:t>
+            </a:r>
+          </a:p>
+          <a:p>
+            <a:pPr lvl="1"/>
+            <a:r>
+              <a:rPr lang="en-US" dirty="0"/>
+              <a:t>It’s okay to post small amounts of code!</a:t>
+            </a:r>
+          </a:p>
+          <a:p>
+            <a:pPr lvl="1"/>
+            <a:r>
+              <a:rPr lang="en-US" dirty="0"/>
+              <a:t>Post complete exception messages if you are dealing with an error</a:t>
+            </a:r>
+          </a:p>
+          <a:p>
+            <a:r>
+              <a:rPr lang="en-US" dirty="0"/>
+              <a:t>Graded online class discussions take place in Ed    </a:t>
+            </a:r>
+          </a:p>
+          <a:p>
+            <a:r>
+              <a:rPr lang="en-US" dirty="0"/>
+              <a:t>Private communications regarding matters such as grades</a:t>
+            </a:r>
+          </a:p>
+          <a:p>
+            <a:pPr lvl="1"/>
+            <a:r>
+              <a:rPr lang="en-US" dirty="0"/>
+              <a:t>Use Ed private messages for fastest </a:t>
+            </a:r>
+            <a:r>
+              <a:rPr lang="en-US" dirty="0" err="1"/>
+              <a:t>reponse</a:t>
+            </a:r>
+            <a:endParaRPr lang="en-US" dirty="0"/>
+          </a:p>
+          <a:p>
+            <a:pPr lvl="1"/>
+            <a:r>
+              <a:rPr lang="en-US" dirty="0"/>
+              <a:t>Or, </a:t>
+            </a:r>
+            <a:r>
+              <a:rPr lang="en-US" dirty="0">
+                <a:hlinkClick r:id="rId2"/>
+              </a:rPr>
+              <a:t>stephen_elston@g.harvard.edu</a:t>
+            </a:r>
+            <a:r>
+              <a:rPr lang="en-US" dirty="0"/>
+              <a:t> and </a:t>
+            </a:r>
+            <a:r>
+              <a:rPr lang="en-US" dirty="0">
+                <a:hlinkClick r:id="rId3"/>
+              </a:rPr>
+              <a:t>tatyanaboland@gmail.com</a:t>
+            </a:r>
+            <a:r>
+              <a:rPr lang="en-US" dirty="0"/>
+              <a:t> </a:t>
             </a:r>
           </a:p>
           <a:p>
             <a:r>
               <a:rPr lang="en-US" b="1" dirty="0"/>
-              <a:t>Do not fall behind! </a:t>
-            </a:r>
-            <a:r>
-              <a:rPr lang="en-US" dirty="0"/>
-              <a:t>With approximately 12 assignments and a project, there is very </a:t>
-            </a:r>
-            <a:r>
-              <a:rPr lang="en-US" b="1" dirty="0"/>
-              <a:t>little time to “catch-up”</a:t>
-            </a:r>
-            <a:endParaRPr lang="en-US" dirty="0"/>
-          </a:p>
-          <a:p>
-            <a:r>
-              <a:rPr lang="en-US" dirty="0"/>
-              <a:t>Late assignment policy:   </a:t>
-            </a:r>
-          </a:p>
-          <a:p>
-            <a:pPr lvl="1"/>
-            <a:r>
-              <a:rPr lang="en-US" dirty="0"/>
-              <a:t>Up to one day late - no penalty  </a:t>
-            </a:r>
-          </a:p>
-          <a:p>
-            <a:pPr lvl="1"/>
-            <a:r>
-              <a:rPr lang="en-US" dirty="0"/>
-              <a:t>Up to 6 days late - less 20% </a:t>
-            </a:r>
-          </a:p>
-          <a:p>
-            <a:pPr lvl="1"/>
-            <a:r>
-              <a:rPr lang="en-US" dirty="0"/>
-              <a:t>More than 6 days late - no credit   </a:t>
-            </a:r>
-          </a:p>
-          <a:p>
-            <a:pPr lvl="1"/>
-            <a:endParaRPr lang="en-US" dirty="0"/>
-          </a:p>
-          <a:p>
-            <a:pPr marL="0" indent="0">
-              <a:buNone/>
-            </a:pPr>
-            <a:r>
-              <a:rPr lang="en-US" dirty="0">
-                <a:solidFill>
-                  <a:srgbClr val="C00000"/>
-                </a:solidFill>
-              </a:rPr>
-              <a:t>Make sure you turn in work on time!</a:t>
+              <a:t>Do not use Canvas messages, unless you want a delayed response!   </a:t>
             </a:r>
           </a:p>
         </p:txBody>
@@ -9528,6 +9545,195 @@
               <a:rPr lang="en-US" dirty="0">
                 <a:latin typeface="+mn-lt"/>
               </a:rPr>
+              <a:t>Communication </a:t>
+            </a:r>
+          </a:p>
+        </p:txBody>
+      </p:sp>
+    </p:spTree>
+    <p:extLst>
+      <p:ext uri="{BB962C8B-B14F-4D97-AF65-F5344CB8AC3E}">
+        <p14:creationId xmlns:p14="http://schemas.microsoft.com/office/powerpoint/2010/main" val="1067142538"/>
+      </p:ext>
+    </p:extLst>
+  </p:cSld>
+  <p:clrMapOvr>
+    <a:masterClrMapping/>
+  </p:clrMapOvr>
+</p:sld>
+</file>
+
+<file path=ppt/slides/slide15.xml><?xml version="1.0" encoding="utf-8"?>
+<p:sld xmlns:a="http://schemas.openxmlformats.org/drawingml/2006/main" xmlns:r="http://schemas.openxmlformats.org/officeDocument/2006/relationships" xmlns:p="http://schemas.openxmlformats.org/presentationml/2006/main">
+  <p:cSld>
+    <p:spTree>
+      <p:nvGrpSpPr>
+        <p:cNvPr id="1" name=""/>
+        <p:cNvGrpSpPr/>
+        <p:nvPr/>
+      </p:nvGrpSpPr>
+      <p:grpSpPr>
+        <a:xfrm>
+          <a:off x="0" y="0"/>
+          <a:ext cx="0" cy="0"/>
+          <a:chOff x="0" y="0"/>
+          <a:chExt cx="0" cy="0"/>
+        </a:xfrm>
+      </p:grpSpPr>
+      <p:sp>
+        <p:nvSpPr>
+          <p:cNvPr id="3" name="Content Placeholder 2">
+            <a:extLst>
+              <a:ext uri="{FF2B5EF4-FFF2-40B4-BE49-F238E27FC236}">
+                <a16:creationId xmlns:a16="http://schemas.microsoft.com/office/drawing/2014/main" id="{258E6AF3-7615-4BD1-878E-A94C93E98F90}"/>
+              </a:ext>
+            </a:extLst>
+          </p:cNvPr>
+          <p:cNvSpPr>
+            <a:spLocks noGrp="1"/>
+          </p:cNvSpPr>
+          <p:nvPr>
+            <p:ph idx="1"/>
+          </p:nvPr>
+        </p:nvSpPr>
+        <p:spPr>
+          <a:xfrm>
+            <a:off x="838200" y="1324927"/>
+            <a:ext cx="10515600" cy="4898217"/>
+          </a:xfrm>
+        </p:spPr>
+        <p:txBody>
+          <a:bodyPr>
+            <a:normAutofit/>
+          </a:bodyPr>
+          <a:lstStyle/>
+          <a:p>
+            <a:pPr marL="0" indent="0">
+              <a:buNone/>
+            </a:pPr>
+            <a:r>
+              <a:rPr lang="en-US" dirty="0"/>
+              <a:t>Timely release of assignment solutions is an important part of the learning process </a:t>
+            </a:r>
+          </a:p>
+          <a:p>
+            <a:r>
+              <a:rPr lang="en-US" dirty="0"/>
+              <a:t>This is a fast-moving survey course  </a:t>
+            </a:r>
+          </a:p>
+          <a:p>
+            <a:r>
+              <a:rPr lang="en-US" b="1" dirty="0"/>
+              <a:t>Do not fall behind! </a:t>
+            </a:r>
+            <a:r>
+              <a:rPr lang="en-US" dirty="0"/>
+              <a:t>With approximately 12 assignments and a project, there is very </a:t>
+            </a:r>
+            <a:r>
+              <a:rPr lang="en-US" b="1" dirty="0"/>
+              <a:t>little time to “catch-up”</a:t>
+            </a:r>
+            <a:endParaRPr lang="en-US" dirty="0"/>
+          </a:p>
+          <a:p>
+            <a:r>
+              <a:rPr lang="en-US" dirty="0"/>
+              <a:t>Late assignment policy:   </a:t>
+            </a:r>
+          </a:p>
+          <a:p>
+            <a:pPr lvl="1"/>
+            <a:r>
+              <a:rPr lang="en-US" dirty="0"/>
+              <a:t>Up to one day late - no penalty  </a:t>
+            </a:r>
+          </a:p>
+          <a:p>
+            <a:pPr lvl="1"/>
+            <a:r>
+              <a:rPr lang="en-US" dirty="0"/>
+              <a:t>Up to 6 days late - less 20% </a:t>
+            </a:r>
+          </a:p>
+          <a:p>
+            <a:pPr lvl="1"/>
+            <a:r>
+              <a:rPr lang="en-US" dirty="0"/>
+              <a:t>More than 6 days late - no credit   </a:t>
+            </a:r>
+          </a:p>
+          <a:p>
+            <a:pPr lvl="1"/>
+            <a:endParaRPr lang="en-US" dirty="0"/>
+          </a:p>
+          <a:p>
+            <a:pPr marL="0" indent="0">
+              <a:buNone/>
+            </a:pPr>
+            <a:r>
+              <a:rPr lang="en-US" dirty="0">
+                <a:solidFill>
+                  <a:srgbClr val="C00000"/>
+                </a:solidFill>
+              </a:rPr>
+              <a:t>Make sure you turn in work on time!</a:t>
+            </a:r>
+          </a:p>
+        </p:txBody>
+      </p:sp>
+      <p:sp>
+        <p:nvSpPr>
+          <p:cNvPr id="6" name="Title 1">
+            <a:extLst>
+              <a:ext uri="{FF2B5EF4-FFF2-40B4-BE49-F238E27FC236}">
+                <a16:creationId xmlns:a16="http://schemas.microsoft.com/office/drawing/2014/main" id="{CD29F70F-B868-451B-A65D-8721F4C7A2D9}"/>
+              </a:ext>
+            </a:extLst>
+          </p:cNvPr>
+          <p:cNvSpPr txBox="1">
+            <a:spLocks/>
+          </p:cNvSpPr>
+          <p:nvPr/>
+        </p:nvSpPr>
+        <p:spPr>
+          <a:xfrm>
+            <a:off x="838200" y="-635"/>
+            <a:ext cx="10515600" cy="1325563"/>
+          </a:xfrm>
+          <a:prstGeom prst="rect">
+            <a:avLst/>
+          </a:prstGeom>
+        </p:spPr>
+        <p:txBody>
+          <a:bodyPr vert="horz" lIns="91440" tIns="45720" rIns="91440" bIns="45720" rtlCol="0" anchor="ctr">
+            <a:normAutofit/>
+          </a:bodyPr>
+          <a:lstStyle>
+            <a:lvl1pPr algn="l" defTabSz="914400" rtl="0" eaLnBrk="1" latinLnBrk="0" hangingPunct="1">
+              <a:lnSpc>
+                <a:spcPct val="90000"/>
+              </a:lnSpc>
+              <a:spcBef>
+                <a:spcPct val="0"/>
+              </a:spcBef>
+              <a:buNone/>
+              <a:defRPr sz="4400" kern="1200">
+                <a:solidFill>
+                  <a:schemeClr val="tx1"/>
+                </a:solidFill>
+                <a:latin typeface="+mj-lt"/>
+                <a:ea typeface="+mj-ea"/>
+                <a:cs typeface="+mj-cs"/>
+              </a:defRPr>
+            </a:lvl1pPr>
+          </a:lstStyle>
+          <a:p>
+            <a:r>
+              <a:rPr lang="en-US" dirty="0">
+                <a:latin typeface="+mn-lt"/>
+              </a:rPr>
               <a:t>Late Assignment Policy</a:t>
             </a:r>
           </a:p>
@@ -9546,7 +9752,7 @@
 </p:sld>
 </file>
 
-<file path=ppt/slides/slide15.xml><?xml version="1.0" encoding="utf-8"?>
+<file path=ppt/slides/slide16.xml><?xml version="1.0" encoding="utf-8"?>
 <p:sld xmlns:a="http://schemas.openxmlformats.org/drawingml/2006/main" xmlns:r="http://schemas.openxmlformats.org/officeDocument/2006/relationships" xmlns:p="http://schemas.openxmlformats.org/presentationml/2006/main" show="0">
   <p:cSld>
     <p:spTree>
@@ -10061,7 +10267,7 @@
 </p:sld>
 </file>
 
-<file path=ppt/slides/slide16.xml><?xml version="1.0" encoding="utf-8"?>
+<file path=ppt/slides/slide17.xml><?xml version="1.0" encoding="utf-8"?>
 <p:sld xmlns:a="http://schemas.openxmlformats.org/drawingml/2006/main" xmlns:r="http://schemas.openxmlformats.org/officeDocument/2006/relationships" xmlns:p="http://schemas.openxmlformats.org/presentationml/2006/main">
   <p:cSld>
     <p:spTree>
@@ -10126,7 +10332,7 @@
 </p:sld>
 </file>
 
-<file path=ppt/slides/slide17.xml><?xml version="1.0" encoding="utf-8"?>
+<file path=ppt/slides/slide18.xml><?xml version="1.0" encoding="utf-8"?>
 <p:sld xmlns:a="http://schemas.openxmlformats.org/drawingml/2006/main" xmlns:r="http://schemas.openxmlformats.org/officeDocument/2006/relationships" xmlns:p="http://schemas.openxmlformats.org/presentationml/2006/main">
   <p:cSld>
     <p:spTree>
@@ -10488,7 +10694,7 @@
 </p:sld>
 </file>
 
-<file path=ppt/slides/slide18.xml><?xml version="1.0" encoding="utf-8"?>
+<file path=ppt/slides/slide19.xml><?xml version="1.0" encoding="utf-8"?>
 <p:sld xmlns:a="http://schemas.openxmlformats.org/drawingml/2006/main" xmlns:r="http://schemas.openxmlformats.org/officeDocument/2006/relationships" xmlns:p="http://schemas.openxmlformats.org/presentationml/2006/main">
   <p:cSld>
     <p:spTree>
@@ -11057,400 +11263,6 @@
         </p:cTn>
       </p:par>
     </p:tnLst>
-  </p:timing>
-</p:sld>
-</file>
-
-<file path=ppt/slides/slide19.xml><?xml version="1.0" encoding="utf-8"?>
-<p:sld xmlns:a="http://schemas.openxmlformats.org/drawingml/2006/main" xmlns:r="http://schemas.openxmlformats.org/officeDocument/2006/relationships" xmlns:p="http://schemas.openxmlformats.org/presentationml/2006/main">
-  <p:cSld>
-    <p:spTree>
-      <p:nvGrpSpPr>
-        <p:cNvPr id="1" name=""/>
-        <p:cNvGrpSpPr/>
-        <p:nvPr/>
-      </p:nvGrpSpPr>
-      <p:grpSpPr>
-        <a:xfrm>
-          <a:off x="0" y="0"/>
-          <a:ext cx="0" cy="0"/>
-          <a:chOff x="0" y="0"/>
-          <a:chExt cx="0" cy="0"/>
-        </a:xfrm>
-      </p:grpSpPr>
-      <p:sp>
-        <p:nvSpPr>
-          <p:cNvPr id="2" name="Title 1">
-            <a:extLst>
-              <a:ext uri="{FF2B5EF4-FFF2-40B4-BE49-F238E27FC236}">
-                <a16:creationId xmlns:a16="http://schemas.microsoft.com/office/drawing/2014/main" id="{DDFB6AB4-96EB-434D-8BFC-6697DE744D73}"/>
-              </a:ext>
-            </a:extLst>
-          </p:cNvPr>
-          <p:cNvSpPr>
-            <a:spLocks noGrp="1"/>
-          </p:cNvSpPr>
-          <p:nvPr>
-            <p:ph type="title"/>
-          </p:nvPr>
-        </p:nvSpPr>
-        <p:spPr>
-          <a:xfrm>
-            <a:off x="789301" y="140193"/>
-            <a:ext cx="10515600" cy="725309"/>
-          </a:xfrm>
-        </p:spPr>
-        <p:txBody>
-          <a:bodyPr>
-            <a:normAutofit/>
-          </a:bodyPr>
-          <a:lstStyle/>
-          <a:p>
-            <a:r>
-              <a:rPr lang="en-US" sz="4000" dirty="0">
-                <a:latin typeface="+mn-lt"/>
-              </a:rPr>
-              <a:t>The Nature of Images</a:t>
-            </a:r>
-          </a:p>
-        </p:txBody>
-      </p:sp>
-      <p:sp>
-        <p:nvSpPr>
-          <p:cNvPr id="3" name="Content Placeholder 2">
-            <a:extLst>
-              <a:ext uri="{FF2B5EF4-FFF2-40B4-BE49-F238E27FC236}">
-                <a16:creationId xmlns:a16="http://schemas.microsoft.com/office/drawing/2014/main" id="{4DBC6555-A8E7-4F73-8035-156F702D1410}"/>
-              </a:ext>
-            </a:extLst>
-          </p:cNvPr>
-          <p:cNvSpPr>
-            <a:spLocks noGrp="1"/>
-          </p:cNvSpPr>
-          <p:nvPr>
-            <p:ph idx="1"/>
-          </p:nvPr>
-        </p:nvSpPr>
-        <p:spPr>
-          <a:xfrm>
-            <a:off x="789301" y="1012197"/>
-            <a:ext cx="10325304" cy="5705610"/>
-          </a:xfrm>
-        </p:spPr>
-        <p:txBody>
-          <a:bodyPr/>
-          <a:lstStyle/>
-          <a:p>
-            <a:pPr marL="0" indent="0">
-              <a:buNone/>
-            </a:pPr>
-            <a:r>
-              <a:rPr lang="en-US" dirty="0"/>
-              <a:t>Basic image camera image formation</a:t>
-            </a:r>
-          </a:p>
-          <a:p>
-            <a:r>
-              <a:rPr lang="en-US" dirty="0"/>
-              <a:t>A camera forms an image from </a:t>
-            </a:r>
-            <a:r>
-              <a:rPr lang="en-US" b="1" dirty="0"/>
-              <a:t>scattered light</a:t>
-            </a:r>
-            <a:r>
-              <a:rPr lang="en-US" dirty="0"/>
-              <a:t> from an object </a:t>
-            </a:r>
-          </a:p>
-          <a:p>
-            <a:r>
-              <a:rPr lang="en-US" dirty="0"/>
-              <a:t>A </a:t>
-            </a:r>
-            <a:r>
-              <a:rPr lang="en-US" b="1" dirty="0">
-                <a:hlinkClick r:id="rId2"/>
-              </a:rPr>
-              <a:t>pinhole camera </a:t>
-            </a:r>
-            <a:r>
-              <a:rPr lang="en-US" dirty="0"/>
-              <a:t>or </a:t>
-            </a:r>
-            <a:r>
-              <a:rPr lang="en-US" b="1" dirty="0">
-                <a:hlinkClick r:id="rId3"/>
-              </a:rPr>
-              <a:t>camera obscura </a:t>
-            </a:r>
-            <a:r>
-              <a:rPr lang="en-US" dirty="0"/>
-              <a:t>forms an image by projecting light rays back to their source</a:t>
-            </a:r>
-          </a:p>
-        </p:txBody>
-      </p:sp>
-      <p:pic>
-        <p:nvPicPr>
-          <p:cNvPr id="5" name="Picture 4">
-            <a:extLst>
-              <a:ext uri="{FF2B5EF4-FFF2-40B4-BE49-F238E27FC236}">
-                <a16:creationId xmlns:a16="http://schemas.microsoft.com/office/drawing/2014/main" id="{37519D95-0F2C-4DEC-A4BF-4153FDCB18F6}"/>
-              </a:ext>
-            </a:extLst>
-          </p:cNvPr>
-          <p:cNvPicPr>
-            <a:picLocks noChangeAspect="1"/>
-          </p:cNvPicPr>
-          <p:nvPr/>
-        </p:nvPicPr>
-        <p:blipFill>
-          <a:blip r:embed="rId4"/>
-          <a:stretch>
-            <a:fillRect/>
-          </a:stretch>
-        </p:blipFill>
-        <p:spPr>
-          <a:xfrm>
-            <a:off x="3561434" y="2858396"/>
-            <a:ext cx="4862026" cy="3640968"/>
-          </a:xfrm>
-          <a:prstGeom prst="rect">
-            <a:avLst/>
-          </a:prstGeom>
-        </p:spPr>
-      </p:pic>
-      <p:sp>
-        <p:nvSpPr>
-          <p:cNvPr id="6" name="TextBox 5">
-            <a:extLst>
-              <a:ext uri="{FF2B5EF4-FFF2-40B4-BE49-F238E27FC236}">
-                <a16:creationId xmlns:a16="http://schemas.microsoft.com/office/drawing/2014/main" id="{B7B32BF3-3201-4633-9970-6A18582B644A}"/>
-              </a:ext>
-            </a:extLst>
-          </p:cNvPr>
-          <p:cNvSpPr txBox="1"/>
-          <p:nvPr/>
-        </p:nvSpPr>
-        <p:spPr>
-          <a:xfrm>
-            <a:off x="4215041" y="6348475"/>
-            <a:ext cx="3938637" cy="369332"/>
-          </a:xfrm>
-          <a:prstGeom prst="rect">
-            <a:avLst/>
-          </a:prstGeom>
-          <a:noFill/>
-        </p:spPr>
-        <p:txBody>
-          <a:bodyPr wrap="square" rtlCol="0">
-            <a:spAutoFit/>
-          </a:bodyPr>
-          <a:lstStyle/>
-          <a:p>
-            <a:pPr algn="ctr"/>
-            <a:r>
-              <a:rPr lang="en-US" dirty="0"/>
-              <a:t>Credit, Wikipedia commons</a:t>
-            </a:r>
-          </a:p>
-        </p:txBody>
-      </p:sp>
-    </p:spTree>
-    <p:extLst>
-      <p:ext uri="{BB962C8B-B14F-4D97-AF65-F5344CB8AC3E}">
-        <p14:creationId xmlns:p14="http://schemas.microsoft.com/office/powerpoint/2010/main" val="3612648543"/>
-      </p:ext>
-    </p:extLst>
-  </p:cSld>
-  <p:clrMapOvr>
-    <a:masterClrMapping/>
-  </p:clrMapOvr>
-  <p:timing>
-    <p:tnLst>
-      <p:par>
-        <p:cTn id="1" dur="indefinite" restart="never" nodeType="tmRoot">
-          <p:childTnLst>
-            <p:seq concurrent="1" nextAc="seek">
-              <p:cTn id="2" dur="indefinite" nodeType="mainSeq">
-                <p:childTnLst>
-                  <p:par>
-                    <p:cTn id="3" fill="hold">
-                      <p:stCondLst>
-                        <p:cond delay="indefinite"/>
-                      </p:stCondLst>
-                      <p:childTnLst>
-                        <p:par>
-                          <p:cTn id="4" fill="hold">
-                            <p:stCondLst>
-                              <p:cond delay="0"/>
-                            </p:stCondLst>
-                            <p:childTnLst>
-                              <p:par>
-                                <p:cTn id="5" presetID="1" presetClass="entr" presetSubtype="0" fill="hold" nodeType="clickEffect">
-                                  <p:stCondLst>
-                                    <p:cond delay="0"/>
-                                  </p:stCondLst>
-                                  <p:childTnLst>
-                                    <p:set>
-                                      <p:cBhvr>
-                                        <p:cTn id="6" dur="1" fill="hold">
-                                          <p:stCondLst>
-                                            <p:cond delay="0"/>
-                                          </p:stCondLst>
-                                        </p:cTn>
-                                        <p:tgtEl>
-                                          <p:spTgt spid="3">
-                                            <p:txEl>
-                                              <p:pRg st="1" end="1"/>
-                                            </p:txEl>
-                                          </p:spTgt>
-                                        </p:tgtEl>
-                                        <p:attrNameLst>
-                                          <p:attrName>style.visibility</p:attrName>
-                                        </p:attrNameLst>
-                                      </p:cBhvr>
-                                      <p:to>
-                                        <p:strVal val="visible"/>
-                                      </p:to>
-                                    </p:set>
-                                  </p:childTnLst>
-                                </p:cTn>
-                              </p:par>
-                            </p:childTnLst>
-                          </p:cTn>
-                        </p:par>
-                      </p:childTnLst>
-                    </p:cTn>
-                  </p:par>
-                  <p:par>
-                    <p:cTn id="7" fill="hold">
-                      <p:stCondLst>
-                        <p:cond delay="indefinite"/>
-                      </p:stCondLst>
-                      <p:childTnLst>
-                        <p:par>
-                          <p:cTn id="8" fill="hold">
-                            <p:stCondLst>
-                              <p:cond delay="0"/>
-                            </p:stCondLst>
-                            <p:childTnLst>
-                              <p:par>
-                                <p:cTn id="9" presetID="1" presetClass="entr" presetSubtype="0" fill="hold" nodeType="clickEffect">
-                                  <p:stCondLst>
-                                    <p:cond delay="0"/>
-                                  </p:stCondLst>
-                                  <p:childTnLst>
-                                    <p:set>
-                                      <p:cBhvr>
-                                        <p:cTn id="10" dur="1" fill="hold">
-                                          <p:stCondLst>
-                                            <p:cond delay="0"/>
-                                          </p:stCondLst>
-                                        </p:cTn>
-                                        <p:tgtEl>
-                                          <p:spTgt spid="3">
-                                            <p:txEl>
-                                              <p:pRg st="2" end="2"/>
-                                            </p:txEl>
-                                          </p:spTgt>
-                                        </p:tgtEl>
-                                        <p:attrNameLst>
-                                          <p:attrName>style.visibility</p:attrName>
-                                        </p:attrNameLst>
-                                      </p:cBhvr>
-                                      <p:to>
-                                        <p:strVal val="visible"/>
-                                      </p:to>
-                                    </p:set>
-                                  </p:childTnLst>
-                                </p:cTn>
-                              </p:par>
-                              <p:par>
-                                <p:cTn id="11" presetID="1" presetClass="entr" presetSubtype="0" fill="hold" nodeType="withEffect">
-                                  <p:stCondLst>
-                                    <p:cond delay="0"/>
-                                  </p:stCondLst>
-                                  <p:childTnLst>
-                                    <p:set>
-                                      <p:cBhvr>
-                                        <p:cTn id="12" dur="1" fill="hold">
-                                          <p:stCondLst>
-                                            <p:cond delay="0"/>
-                                          </p:stCondLst>
-                                        </p:cTn>
-                                        <p:tgtEl>
-                                          <p:spTgt spid="5"/>
-                                        </p:tgtEl>
-                                        <p:attrNameLst>
-                                          <p:attrName>style.visibility</p:attrName>
-                                        </p:attrNameLst>
-                                      </p:cBhvr>
-                                      <p:to>
-                                        <p:strVal val="visible"/>
-                                      </p:to>
-                                    </p:set>
-                                  </p:childTnLst>
-                                </p:cTn>
-                              </p:par>
-                              <p:par>
-                                <p:cTn id="13" presetID="1" presetClass="entr" presetSubtype="0" fill="hold" grpId="0" nodeType="withEffect">
-                                  <p:stCondLst>
-                                    <p:cond delay="0"/>
-                                  </p:stCondLst>
-                                  <p:childTnLst>
-                                    <p:set>
-                                      <p:cBhvr>
-                                        <p:cTn id="14" dur="1" fill="hold">
-                                          <p:stCondLst>
-                                            <p:cond delay="0"/>
-                                          </p:stCondLst>
-                                        </p:cTn>
-                                        <p:tgtEl>
-                                          <p:spTgt spid="6"/>
-                                        </p:tgtEl>
-                                        <p:attrNameLst>
-                                          <p:attrName>style.visibility</p:attrName>
-                                        </p:attrNameLst>
-                                      </p:cBhvr>
-                                      <p:to>
-                                        <p:strVal val="visible"/>
-                                      </p:to>
-                                    </p:set>
-                                  </p:childTnLst>
-                                </p:cTn>
-                              </p:par>
-                            </p:childTnLst>
-                          </p:cTn>
-                        </p:par>
-                      </p:childTnLst>
-                    </p:cTn>
-                  </p:par>
-                </p:childTnLst>
-              </p:cTn>
-              <p:prevCondLst>
-                <p:cond evt="onPrev" delay="0">
-                  <p:tgtEl>
-                    <p:sldTgt/>
-                  </p:tgtEl>
-                </p:cond>
-              </p:prevCondLst>
-              <p:nextCondLst>
-                <p:cond evt="onNext" delay="0">
-                  <p:tgtEl>
-                    <p:sldTgt/>
-                  </p:tgtEl>
-                </p:cond>
-              </p:nextCondLst>
-            </p:seq>
-          </p:childTnLst>
-        </p:cTn>
-      </p:par>
-    </p:tnLst>
-    <p:bldLst>
-      <p:bldP spid="6" grpId="0"/>
-    </p:bldLst>
   </p:timing>
 </p:sld>
 </file>
@@ -12116,6 +11928,400 @@
             </a:pPr>
             <a:r>
               <a:rPr lang="en-US" dirty="0"/>
+              <a:t>Basic image camera image formation</a:t>
+            </a:r>
+          </a:p>
+          <a:p>
+            <a:r>
+              <a:rPr lang="en-US" dirty="0"/>
+              <a:t>A camera forms an image from </a:t>
+            </a:r>
+            <a:r>
+              <a:rPr lang="en-US" b="1" dirty="0"/>
+              <a:t>scattered light</a:t>
+            </a:r>
+            <a:r>
+              <a:rPr lang="en-US" dirty="0"/>
+              <a:t> from an object </a:t>
+            </a:r>
+          </a:p>
+          <a:p>
+            <a:r>
+              <a:rPr lang="en-US" dirty="0"/>
+              <a:t>A </a:t>
+            </a:r>
+            <a:r>
+              <a:rPr lang="en-US" b="1" dirty="0">
+                <a:hlinkClick r:id="rId2"/>
+              </a:rPr>
+              <a:t>pinhole camera </a:t>
+            </a:r>
+            <a:r>
+              <a:rPr lang="en-US" dirty="0"/>
+              <a:t>or </a:t>
+            </a:r>
+            <a:r>
+              <a:rPr lang="en-US" b="1" dirty="0">
+                <a:hlinkClick r:id="rId3"/>
+              </a:rPr>
+              <a:t>camera obscura </a:t>
+            </a:r>
+            <a:r>
+              <a:rPr lang="en-US" dirty="0"/>
+              <a:t>forms an image by projecting light rays back to their source</a:t>
+            </a:r>
+          </a:p>
+        </p:txBody>
+      </p:sp>
+      <p:pic>
+        <p:nvPicPr>
+          <p:cNvPr id="5" name="Picture 4">
+            <a:extLst>
+              <a:ext uri="{FF2B5EF4-FFF2-40B4-BE49-F238E27FC236}">
+                <a16:creationId xmlns:a16="http://schemas.microsoft.com/office/drawing/2014/main" id="{37519D95-0F2C-4DEC-A4BF-4153FDCB18F6}"/>
+              </a:ext>
+            </a:extLst>
+          </p:cNvPr>
+          <p:cNvPicPr>
+            <a:picLocks noChangeAspect="1"/>
+          </p:cNvPicPr>
+          <p:nvPr/>
+        </p:nvPicPr>
+        <p:blipFill>
+          <a:blip r:embed="rId4"/>
+          <a:stretch>
+            <a:fillRect/>
+          </a:stretch>
+        </p:blipFill>
+        <p:spPr>
+          <a:xfrm>
+            <a:off x="3561434" y="2858396"/>
+            <a:ext cx="4862026" cy="3640968"/>
+          </a:xfrm>
+          <a:prstGeom prst="rect">
+            <a:avLst/>
+          </a:prstGeom>
+        </p:spPr>
+      </p:pic>
+      <p:sp>
+        <p:nvSpPr>
+          <p:cNvPr id="6" name="TextBox 5">
+            <a:extLst>
+              <a:ext uri="{FF2B5EF4-FFF2-40B4-BE49-F238E27FC236}">
+                <a16:creationId xmlns:a16="http://schemas.microsoft.com/office/drawing/2014/main" id="{B7B32BF3-3201-4633-9970-6A18582B644A}"/>
+              </a:ext>
+            </a:extLst>
+          </p:cNvPr>
+          <p:cNvSpPr txBox="1"/>
+          <p:nvPr/>
+        </p:nvSpPr>
+        <p:spPr>
+          <a:xfrm>
+            <a:off x="4215041" y="6348475"/>
+            <a:ext cx="3938637" cy="369332"/>
+          </a:xfrm>
+          <a:prstGeom prst="rect">
+            <a:avLst/>
+          </a:prstGeom>
+          <a:noFill/>
+        </p:spPr>
+        <p:txBody>
+          <a:bodyPr wrap="square" rtlCol="0">
+            <a:spAutoFit/>
+          </a:bodyPr>
+          <a:lstStyle/>
+          <a:p>
+            <a:pPr algn="ctr"/>
+            <a:r>
+              <a:rPr lang="en-US" dirty="0"/>
+              <a:t>Credit, Wikipedia commons</a:t>
+            </a:r>
+          </a:p>
+        </p:txBody>
+      </p:sp>
+    </p:spTree>
+    <p:extLst>
+      <p:ext uri="{BB962C8B-B14F-4D97-AF65-F5344CB8AC3E}">
+        <p14:creationId xmlns:p14="http://schemas.microsoft.com/office/powerpoint/2010/main" val="3612648543"/>
+      </p:ext>
+    </p:extLst>
+  </p:cSld>
+  <p:clrMapOvr>
+    <a:masterClrMapping/>
+  </p:clrMapOvr>
+  <p:timing>
+    <p:tnLst>
+      <p:par>
+        <p:cTn id="1" dur="indefinite" restart="never" nodeType="tmRoot">
+          <p:childTnLst>
+            <p:seq concurrent="1" nextAc="seek">
+              <p:cTn id="2" dur="indefinite" nodeType="mainSeq">
+                <p:childTnLst>
+                  <p:par>
+                    <p:cTn id="3" fill="hold">
+                      <p:stCondLst>
+                        <p:cond delay="indefinite"/>
+                      </p:stCondLst>
+                      <p:childTnLst>
+                        <p:par>
+                          <p:cTn id="4" fill="hold">
+                            <p:stCondLst>
+                              <p:cond delay="0"/>
+                            </p:stCondLst>
+                            <p:childTnLst>
+                              <p:par>
+                                <p:cTn id="5" presetID="1" presetClass="entr" presetSubtype="0" fill="hold" nodeType="clickEffect">
+                                  <p:stCondLst>
+                                    <p:cond delay="0"/>
+                                  </p:stCondLst>
+                                  <p:childTnLst>
+                                    <p:set>
+                                      <p:cBhvr>
+                                        <p:cTn id="6" dur="1" fill="hold">
+                                          <p:stCondLst>
+                                            <p:cond delay="0"/>
+                                          </p:stCondLst>
+                                        </p:cTn>
+                                        <p:tgtEl>
+                                          <p:spTgt spid="3">
+                                            <p:txEl>
+                                              <p:pRg st="1" end="1"/>
+                                            </p:txEl>
+                                          </p:spTgt>
+                                        </p:tgtEl>
+                                        <p:attrNameLst>
+                                          <p:attrName>style.visibility</p:attrName>
+                                        </p:attrNameLst>
+                                      </p:cBhvr>
+                                      <p:to>
+                                        <p:strVal val="visible"/>
+                                      </p:to>
+                                    </p:set>
+                                  </p:childTnLst>
+                                </p:cTn>
+                              </p:par>
+                            </p:childTnLst>
+                          </p:cTn>
+                        </p:par>
+                      </p:childTnLst>
+                    </p:cTn>
+                  </p:par>
+                  <p:par>
+                    <p:cTn id="7" fill="hold">
+                      <p:stCondLst>
+                        <p:cond delay="indefinite"/>
+                      </p:stCondLst>
+                      <p:childTnLst>
+                        <p:par>
+                          <p:cTn id="8" fill="hold">
+                            <p:stCondLst>
+                              <p:cond delay="0"/>
+                            </p:stCondLst>
+                            <p:childTnLst>
+                              <p:par>
+                                <p:cTn id="9" presetID="1" presetClass="entr" presetSubtype="0" fill="hold" nodeType="clickEffect">
+                                  <p:stCondLst>
+                                    <p:cond delay="0"/>
+                                  </p:stCondLst>
+                                  <p:childTnLst>
+                                    <p:set>
+                                      <p:cBhvr>
+                                        <p:cTn id="10" dur="1" fill="hold">
+                                          <p:stCondLst>
+                                            <p:cond delay="0"/>
+                                          </p:stCondLst>
+                                        </p:cTn>
+                                        <p:tgtEl>
+                                          <p:spTgt spid="3">
+                                            <p:txEl>
+                                              <p:pRg st="2" end="2"/>
+                                            </p:txEl>
+                                          </p:spTgt>
+                                        </p:tgtEl>
+                                        <p:attrNameLst>
+                                          <p:attrName>style.visibility</p:attrName>
+                                        </p:attrNameLst>
+                                      </p:cBhvr>
+                                      <p:to>
+                                        <p:strVal val="visible"/>
+                                      </p:to>
+                                    </p:set>
+                                  </p:childTnLst>
+                                </p:cTn>
+                              </p:par>
+                              <p:par>
+                                <p:cTn id="11" presetID="1" presetClass="entr" presetSubtype="0" fill="hold" nodeType="withEffect">
+                                  <p:stCondLst>
+                                    <p:cond delay="0"/>
+                                  </p:stCondLst>
+                                  <p:childTnLst>
+                                    <p:set>
+                                      <p:cBhvr>
+                                        <p:cTn id="12" dur="1" fill="hold">
+                                          <p:stCondLst>
+                                            <p:cond delay="0"/>
+                                          </p:stCondLst>
+                                        </p:cTn>
+                                        <p:tgtEl>
+                                          <p:spTgt spid="5"/>
+                                        </p:tgtEl>
+                                        <p:attrNameLst>
+                                          <p:attrName>style.visibility</p:attrName>
+                                        </p:attrNameLst>
+                                      </p:cBhvr>
+                                      <p:to>
+                                        <p:strVal val="visible"/>
+                                      </p:to>
+                                    </p:set>
+                                  </p:childTnLst>
+                                </p:cTn>
+                              </p:par>
+                              <p:par>
+                                <p:cTn id="13" presetID="1" presetClass="entr" presetSubtype="0" fill="hold" grpId="0" nodeType="withEffect">
+                                  <p:stCondLst>
+                                    <p:cond delay="0"/>
+                                  </p:stCondLst>
+                                  <p:childTnLst>
+                                    <p:set>
+                                      <p:cBhvr>
+                                        <p:cTn id="14" dur="1" fill="hold">
+                                          <p:stCondLst>
+                                            <p:cond delay="0"/>
+                                          </p:stCondLst>
+                                        </p:cTn>
+                                        <p:tgtEl>
+                                          <p:spTgt spid="6"/>
+                                        </p:tgtEl>
+                                        <p:attrNameLst>
+                                          <p:attrName>style.visibility</p:attrName>
+                                        </p:attrNameLst>
+                                      </p:cBhvr>
+                                      <p:to>
+                                        <p:strVal val="visible"/>
+                                      </p:to>
+                                    </p:set>
+                                  </p:childTnLst>
+                                </p:cTn>
+                              </p:par>
+                            </p:childTnLst>
+                          </p:cTn>
+                        </p:par>
+                      </p:childTnLst>
+                    </p:cTn>
+                  </p:par>
+                </p:childTnLst>
+              </p:cTn>
+              <p:prevCondLst>
+                <p:cond evt="onPrev" delay="0">
+                  <p:tgtEl>
+                    <p:sldTgt/>
+                  </p:tgtEl>
+                </p:cond>
+              </p:prevCondLst>
+              <p:nextCondLst>
+                <p:cond evt="onNext" delay="0">
+                  <p:tgtEl>
+                    <p:sldTgt/>
+                  </p:tgtEl>
+                </p:cond>
+              </p:nextCondLst>
+            </p:seq>
+          </p:childTnLst>
+        </p:cTn>
+      </p:par>
+    </p:tnLst>
+    <p:bldLst>
+      <p:bldP spid="6" grpId="0"/>
+    </p:bldLst>
+  </p:timing>
+</p:sld>
+</file>
+
+<file path=ppt/slides/slide21.xml><?xml version="1.0" encoding="utf-8"?>
+<p:sld xmlns:a="http://schemas.openxmlformats.org/drawingml/2006/main" xmlns:r="http://schemas.openxmlformats.org/officeDocument/2006/relationships" xmlns:p="http://schemas.openxmlformats.org/presentationml/2006/main">
+  <p:cSld>
+    <p:spTree>
+      <p:nvGrpSpPr>
+        <p:cNvPr id="1" name=""/>
+        <p:cNvGrpSpPr/>
+        <p:nvPr/>
+      </p:nvGrpSpPr>
+      <p:grpSpPr>
+        <a:xfrm>
+          <a:off x="0" y="0"/>
+          <a:ext cx="0" cy="0"/>
+          <a:chOff x="0" y="0"/>
+          <a:chExt cx="0" cy="0"/>
+        </a:xfrm>
+      </p:grpSpPr>
+      <p:sp>
+        <p:nvSpPr>
+          <p:cNvPr id="2" name="Title 1">
+            <a:extLst>
+              <a:ext uri="{FF2B5EF4-FFF2-40B4-BE49-F238E27FC236}">
+                <a16:creationId xmlns:a16="http://schemas.microsoft.com/office/drawing/2014/main" id="{DDFB6AB4-96EB-434D-8BFC-6697DE744D73}"/>
+              </a:ext>
+            </a:extLst>
+          </p:cNvPr>
+          <p:cNvSpPr>
+            <a:spLocks noGrp="1"/>
+          </p:cNvSpPr>
+          <p:nvPr>
+            <p:ph type="title"/>
+          </p:nvPr>
+        </p:nvSpPr>
+        <p:spPr>
+          <a:xfrm>
+            <a:off x="789301" y="140193"/>
+            <a:ext cx="10515600" cy="725309"/>
+          </a:xfrm>
+        </p:spPr>
+        <p:txBody>
+          <a:bodyPr>
+            <a:normAutofit/>
+          </a:bodyPr>
+          <a:lstStyle/>
+          <a:p>
+            <a:r>
+              <a:rPr lang="en-US" sz="4000" dirty="0">
+                <a:latin typeface="+mn-lt"/>
+              </a:rPr>
+              <a:t>The Nature of Images</a:t>
+            </a:r>
+          </a:p>
+        </p:txBody>
+      </p:sp>
+      <p:sp>
+        <p:nvSpPr>
+          <p:cNvPr id="3" name="Content Placeholder 2">
+            <a:extLst>
+              <a:ext uri="{FF2B5EF4-FFF2-40B4-BE49-F238E27FC236}">
+                <a16:creationId xmlns:a16="http://schemas.microsoft.com/office/drawing/2014/main" id="{4DBC6555-A8E7-4F73-8035-156F702D1410}"/>
+              </a:ext>
+            </a:extLst>
+          </p:cNvPr>
+          <p:cNvSpPr>
+            <a:spLocks noGrp="1"/>
+          </p:cNvSpPr>
+          <p:nvPr>
+            <p:ph idx="1"/>
+          </p:nvPr>
+        </p:nvSpPr>
+        <p:spPr>
+          <a:xfrm>
+            <a:off x="789301" y="1012197"/>
+            <a:ext cx="10325304" cy="5705610"/>
+          </a:xfrm>
+        </p:spPr>
+        <p:txBody>
+          <a:bodyPr/>
+          <a:lstStyle/>
+          <a:p>
+            <a:pPr marL="0" indent="0">
+              <a:buNone/>
+            </a:pPr>
+            <a:r>
+              <a:rPr lang="en-US" dirty="0"/>
               <a:t>Basic image camera image formation </a:t>
             </a:r>
           </a:p>
@@ -12404,7 +12610,7 @@
 </p:sld>
 </file>
 
-<file path=ppt/slides/slide21.xml><?xml version="1.0" encoding="utf-8"?>
+<file path=ppt/slides/slide22.xml><?xml version="1.0" encoding="utf-8"?>
 <p:sld xmlns:a="http://schemas.openxmlformats.org/drawingml/2006/main" xmlns:r="http://schemas.openxmlformats.org/officeDocument/2006/relationships" xmlns:p="http://schemas.openxmlformats.org/presentationml/2006/main">
   <p:cSld>
     <p:spTree>
@@ -12580,7 +12786,7 @@
 </p:sld>
 </file>
 
-<file path=ppt/slides/slide22.xml><?xml version="1.0" encoding="utf-8"?>
+<file path=ppt/slides/slide23.xml><?xml version="1.0" encoding="utf-8"?>
 <p:sld xmlns:a="http://schemas.openxmlformats.org/drawingml/2006/main" xmlns:r="http://schemas.openxmlformats.org/officeDocument/2006/relationships" xmlns:p="http://schemas.openxmlformats.org/presentationml/2006/main">
   <p:cSld>
     <p:spTree>
@@ -13109,7 +13315,7 @@
 </p:sld>
 </file>
 
-<file path=ppt/slides/slide23.xml><?xml version="1.0" encoding="utf-8"?>
+<file path=ppt/slides/slide24.xml><?xml version="1.0" encoding="utf-8"?>
 <p:sld xmlns:a="http://schemas.openxmlformats.org/drawingml/2006/main" xmlns:r="http://schemas.openxmlformats.org/officeDocument/2006/relationships" xmlns:p="http://schemas.openxmlformats.org/presentationml/2006/main">
   <p:cSld>
     <p:spTree>
@@ -13174,7 +13380,7 @@
 </p:sld>
 </file>
 
-<file path=ppt/slides/slide24.xml><?xml version="1.0" encoding="utf-8"?>
+<file path=ppt/slides/slide25.xml><?xml version="1.0" encoding="utf-8"?>
 <p:sld xmlns:a="http://schemas.openxmlformats.org/drawingml/2006/main" xmlns:r="http://schemas.openxmlformats.org/officeDocument/2006/relationships" xmlns:p="http://schemas.openxmlformats.org/presentationml/2006/main">
   <p:cSld>
     <p:spTree>
@@ -15838,7 +16044,7 @@
 </p:sld>
 </file>
 
-<file path=ppt/slides/slide25.xml><?xml version="1.0" encoding="utf-8"?>
+<file path=ppt/slides/slide26.xml><?xml version="1.0" encoding="utf-8"?>
 <p:sld xmlns:a="http://schemas.openxmlformats.org/drawingml/2006/main" xmlns:r="http://schemas.openxmlformats.org/officeDocument/2006/relationships" xmlns:p="http://schemas.openxmlformats.org/presentationml/2006/main">
   <p:cSld>
     <p:spTree>
@@ -16470,7 +16676,7 @@
 </p:sld>
 </file>
 
-<file path=ppt/slides/slide26.xml><?xml version="1.0" encoding="utf-8"?>
+<file path=ppt/slides/slide27.xml><?xml version="1.0" encoding="utf-8"?>
 <p:sld xmlns:a="http://schemas.openxmlformats.org/drawingml/2006/main" xmlns:r="http://schemas.openxmlformats.org/officeDocument/2006/relationships" xmlns:p="http://schemas.openxmlformats.org/presentationml/2006/main">
   <p:cSld>
     <p:spTree>
@@ -22625,7 +22831,7 @@
 </p:sld>
 </file>
 
-<file path=ppt/slides/slide27.xml><?xml version="1.0" encoding="utf-8"?>
+<file path=ppt/slides/slide28.xml><?xml version="1.0" encoding="utf-8"?>
 <p:sld xmlns:a="http://schemas.openxmlformats.org/drawingml/2006/main" xmlns:r="http://schemas.openxmlformats.org/officeDocument/2006/relationships" xmlns:p="http://schemas.openxmlformats.org/presentationml/2006/main">
   <p:cSld>
     <p:spTree>
@@ -23057,7 +23263,7 @@
 </p:sld>
 </file>
 
-<file path=ppt/slides/slide28.xml><?xml version="1.0" encoding="utf-8"?>
+<file path=ppt/slides/slide29.xml><?xml version="1.0" encoding="utf-8"?>
 <p:sld xmlns:a="http://schemas.openxmlformats.org/drawingml/2006/main" xmlns:r="http://schemas.openxmlformats.org/officeDocument/2006/relationships" xmlns:p="http://schemas.openxmlformats.org/presentationml/2006/main">
   <p:cSld>
     <p:spTree>
@@ -23628,560 +23834,6 @@
     </p:tnLst>
     <p:bldLst>
       <p:bldP spid="7" grpId="0" uiExpand="1" build="p"/>
-    </p:bldLst>
-  </p:timing>
-</p:sld>
-</file>
-
-<file path=ppt/slides/slide29.xml><?xml version="1.0" encoding="utf-8"?>
-<p:sld xmlns:a="http://schemas.openxmlformats.org/drawingml/2006/main" xmlns:r="http://schemas.openxmlformats.org/officeDocument/2006/relationships" xmlns:p="http://schemas.openxmlformats.org/presentationml/2006/main">
-  <p:cSld>
-    <p:spTree>
-      <p:nvGrpSpPr>
-        <p:cNvPr id="1" name=""/>
-        <p:cNvGrpSpPr/>
-        <p:nvPr/>
-      </p:nvGrpSpPr>
-      <p:grpSpPr>
-        <a:xfrm>
-          <a:off x="0" y="0"/>
-          <a:ext cx="0" cy="0"/>
-          <a:chOff x="0" y="0"/>
-          <a:chExt cx="0" cy="0"/>
-        </a:xfrm>
-      </p:grpSpPr>
-      <p:sp>
-        <p:nvSpPr>
-          <p:cNvPr id="7" name="Content Placeholder 6"/>
-          <p:cNvSpPr>
-            <a:spLocks noGrp="1"/>
-          </p:cNvSpPr>
-          <p:nvPr>
-            <p:ph sz="quarter" idx="10"/>
-          </p:nvPr>
-        </p:nvSpPr>
-        <p:spPr>
-          <a:xfrm>
-            <a:off x="429619" y="1244922"/>
-            <a:ext cx="11720967" cy="2288440"/>
-          </a:xfrm>
-        </p:spPr>
-        <p:txBody>
-          <a:bodyPr>
-            <a:normAutofit/>
-          </a:bodyPr>
-          <a:lstStyle/>
-          <a:p>
-            <a:pPr marL="0" indent="0">
-              <a:buNone/>
-            </a:pPr>
-            <a:r>
-              <a:rPr lang="en-GB" dirty="0">
-                <a:ea typeface="Segoe UI" panose="020B0502040204020203" pitchFamily="34" charset="0"/>
-                <a:cs typeface="Segoe UI" panose="020B0502040204020203" pitchFamily="34" charset="0"/>
-              </a:rPr>
-              <a:t>Many </a:t>
-            </a:r>
-            <a:r>
-              <a:rPr lang="en-GB" dirty="0" err="1">
-                <a:ea typeface="Segoe UI" panose="020B0502040204020203" pitchFamily="34" charset="0"/>
-                <a:cs typeface="Segoe UI" panose="020B0502040204020203" pitchFamily="34" charset="0"/>
-              </a:rPr>
-              <a:t>color</a:t>
-            </a:r>
-            <a:r>
-              <a:rPr lang="en-GB" dirty="0">
-                <a:ea typeface="Segoe UI" panose="020B0502040204020203" pitchFamily="34" charset="0"/>
-                <a:cs typeface="Segoe UI" panose="020B0502040204020203" pitchFamily="34" charset="0"/>
-              </a:rPr>
-              <a:t> schemes used in image representation</a:t>
-            </a:r>
-          </a:p>
-          <a:p>
-            <a:r>
-              <a:rPr lang="en-GB" dirty="0">
-                <a:ea typeface="Segoe UI" panose="020B0502040204020203" pitchFamily="34" charset="0"/>
-                <a:cs typeface="Segoe UI" panose="020B0502040204020203" pitchFamily="34" charset="0"/>
-                <a:hlinkClick r:id="rId3"/>
-              </a:rPr>
-              <a:t>Hue, Saturation and Value (HSV) </a:t>
-            </a:r>
-            <a:r>
-              <a:rPr lang="en-GB" dirty="0">
-                <a:ea typeface="Segoe UI" panose="020B0502040204020203" pitchFamily="34" charset="0"/>
-                <a:cs typeface="Segoe UI" panose="020B0502040204020203" pitchFamily="34" charset="0"/>
-              </a:rPr>
-              <a:t>another alternative</a:t>
-            </a:r>
-          </a:p>
-          <a:p>
-            <a:r>
-              <a:rPr lang="en-GB" dirty="0">
-                <a:ea typeface="Segoe UI" panose="020B0502040204020203" pitchFamily="34" charset="0"/>
-                <a:cs typeface="Segoe UI" panose="020B0502040204020203" pitchFamily="34" charset="0"/>
-              </a:rPr>
-              <a:t>Can convert between schemes – </a:t>
-            </a:r>
-            <a:r>
-              <a:rPr lang="en-GB" dirty="0">
-                <a:ea typeface="Segoe UI" panose="020B0502040204020203" pitchFamily="34" charset="0"/>
-                <a:cs typeface="Segoe UI" panose="020B0502040204020203" pitchFamily="34" charset="0"/>
-                <a:hlinkClick r:id="rId4"/>
-              </a:rPr>
-              <a:t>e.g. </a:t>
-            </a:r>
-            <a:r>
-              <a:rPr lang="en-GB" dirty="0" err="1">
-                <a:ea typeface="Segoe UI" panose="020B0502040204020203" pitchFamily="34" charset="0"/>
-                <a:cs typeface="Segoe UI" panose="020B0502040204020203" pitchFamily="34" charset="0"/>
-                <a:hlinkClick r:id="rId4"/>
-              </a:rPr>
-              <a:t>skimage</a:t>
-            </a:r>
-            <a:r>
-              <a:rPr lang="en-GB" dirty="0">
-                <a:ea typeface="Segoe UI" panose="020B0502040204020203" pitchFamily="34" charset="0"/>
-                <a:cs typeface="Segoe UI" panose="020B0502040204020203" pitchFamily="34" charset="0"/>
-                <a:hlinkClick r:id="rId4"/>
-              </a:rPr>
-              <a:t> </a:t>
-            </a:r>
-            <a:endParaRPr lang="en-GB" dirty="0">
-              <a:ea typeface="Segoe UI" panose="020B0502040204020203" pitchFamily="34" charset="0"/>
-              <a:cs typeface="Segoe UI" panose="020B0502040204020203" pitchFamily="34" charset="0"/>
-            </a:endParaRPr>
-          </a:p>
-          <a:p>
-            <a:r>
-              <a:rPr lang="en-GB" dirty="0">
-                <a:ea typeface="Segoe UI" panose="020B0502040204020203" pitchFamily="34" charset="0"/>
-                <a:cs typeface="Segoe UI" panose="020B0502040204020203" pitchFamily="34" charset="0"/>
-              </a:rPr>
-              <a:t>But conversion may not be exact!</a:t>
-            </a:r>
-          </a:p>
-          <a:p>
-            <a:pPr marL="0" indent="0">
-              <a:buNone/>
-            </a:pPr>
-            <a:endParaRPr lang="en-GB" dirty="0">
-              <a:latin typeface="Segoe UI" panose="020B0502040204020203" pitchFamily="34" charset="0"/>
-              <a:ea typeface="Segoe UI" panose="020B0502040204020203" pitchFamily="34" charset="0"/>
-              <a:cs typeface="Segoe UI" panose="020B0502040204020203" pitchFamily="34" charset="0"/>
-            </a:endParaRPr>
-          </a:p>
-        </p:txBody>
-      </p:sp>
-      <p:sp>
-        <p:nvSpPr>
-          <p:cNvPr id="2" name="Title 1"/>
-          <p:cNvSpPr>
-            <a:spLocks noGrp="1"/>
-          </p:cNvSpPr>
-          <p:nvPr>
-            <p:ph type="title"/>
-          </p:nvPr>
-        </p:nvSpPr>
-        <p:spPr>
-          <a:xfrm>
-            <a:off x="429620" y="339142"/>
-            <a:ext cx="11386547" cy="493021"/>
-          </a:xfrm>
-        </p:spPr>
-        <p:txBody>
-          <a:bodyPr>
-            <a:normAutofit fontScale="90000"/>
-          </a:bodyPr>
-          <a:lstStyle/>
-          <a:p>
-            <a:r>
-              <a:rPr lang="en-US" dirty="0">
-                <a:latin typeface="Segoe UI" panose="020B0502040204020203" pitchFamily="34" charset="0"/>
-                <a:cs typeface="Segoe UI" panose="020B0502040204020203" pitchFamily="34" charset="0"/>
-              </a:rPr>
-              <a:t>Working with Image Data</a:t>
-            </a:r>
-            <a:endParaRPr lang="en-US" dirty="0">
-              <a:latin typeface="Segoe"/>
-            </a:endParaRPr>
-          </a:p>
-        </p:txBody>
-      </p:sp>
-      <p:sp>
-        <p:nvSpPr>
-          <p:cNvPr id="6" name="TextBox 5">
-            <a:extLst>
-              <a:ext uri="{FF2B5EF4-FFF2-40B4-BE49-F238E27FC236}">
-                <a16:creationId xmlns:a16="http://schemas.microsoft.com/office/drawing/2014/main" id="{6D4439ED-9C7B-4DAF-8A30-4AA105FBC841}"/>
-              </a:ext>
-            </a:extLst>
-          </p:cNvPr>
-          <p:cNvSpPr txBox="1"/>
-          <p:nvPr/>
-        </p:nvSpPr>
-        <p:spPr>
-          <a:xfrm>
-            <a:off x="7921540" y="6005426"/>
-            <a:ext cx="3938637" cy="369332"/>
-          </a:xfrm>
-          <a:prstGeom prst="rect">
-            <a:avLst/>
-          </a:prstGeom>
-          <a:noFill/>
-        </p:spPr>
-        <p:txBody>
-          <a:bodyPr wrap="square" rtlCol="0">
-            <a:spAutoFit/>
-          </a:bodyPr>
-          <a:lstStyle/>
-          <a:p>
-            <a:pPr algn="ctr"/>
-            <a:r>
-              <a:rPr lang="en-US" dirty="0"/>
-              <a:t>Credit, Wikipedia commons</a:t>
-            </a:r>
-          </a:p>
-        </p:txBody>
-      </p:sp>
-      <p:pic>
-        <p:nvPicPr>
-          <p:cNvPr id="1026" name="Picture 2">
-            <a:extLst>
-              <a:ext uri="{FF2B5EF4-FFF2-40B4-BE49-F238E27FC236}">
-                <a16:creationId xmlns:a16="http://schemas.microsoft.com/office/drawing/2014/main" id="{7D009939-B6EE-4FB4-8BEF-D3FD06E3303D}"/>
-              </a:ext>
-            </a:extLst>
-          </p:cNvPr>
-          <p:cNvPicPr>
-            <a:picLocks noChangeAspect="1" noChangeArrowheads="1"/>
-          </p:cNvPicPr>
-          <p:nvPr/>
-        </p:nvPicPr>
-        <p:blipFill>
-          <a:blip r:embed="rId5">
-            <a:extLst>
-              <a:ext uri="{28A0092B-C50C-407E-A947-70E740481C1C}">
-                <a14:useLocalDpi xmlns:a14="http://schemas.microsoft.com/office/drawing/2010/main" val="0"/>
-              </a:ext>
-            </a:extLst>
-          </a:blip>
-          <a:srcRect/>
-          <a:stretch>
-            <a:fillRect/>
-          </a:stretch>
-        </p:blipFill>
-        <p:spPr bwMode="auto">
-          <a:xfrm>
-            <a:off x="570676" y="3533362"/>
-            <a:ext cx="7991475" cy="3209925"/>
-          </a:xfrm>
-          <a:prstGeom prst="rect">
-            <a:avLst/>
-          </a:prstGeom>
-          <a:noFill/>
-          <a:extLst>
-            <a:ext uri="{909E8E84-426E-40DD-AFC4-6F175D3DCCD1}">
-              <a14:hiddenFill xmlns:a14="http://schemas.microsoft.com/office/drawing/2010/main">
-                <a:solidFill>
-                  <a:srgbClr val="FFFFFF"/>
-                </a:solidFill>
-              </a14:hiddenFill>
-            </a:ext>
-          </a:extLst>
-        </p:spPr>
-      </p:pic>
-    </p:spTree>
-    <p:extLst>
-      <p:ext uri="{BB962C8B-B14F-4D97-AF65-F5344CB8AC3E}">
-        <p14:creationId xmlns:p14="http://schemas.microsoft.com/office/powerpoint/2010/main" val="1099730449"/>
-      </p:ext>
-    </p:extLst>
-  </p:cSld>
-  <p:clrMapOvr>
-    <a:masterClrMapping/>
-  </p:clrMapOvr>
-  <p:timing>
-    <p:tnLst>
-      <p:par>
-        <p:cTn id="1" dur="indefinite" restart="never" nodeType="tmRoot">
-          <p:childTnLst>
-            <p:seq concurrent="1" nextAc="seek">
-              <p:cTn id="2" dur="indefinite" nodeType="mainSeq">
-                <p:childTnLst>
-                  <p:par>
-                    <p:cTn id="3" fill="hold">
-                      <p:stCondLst>
-                        <p:cond delay="indefinite"/>
-                      </p:stCondLst>
-                      <p:childTnLst>
-                        <p:par>
-                          <p:cTn id="4" fill="hold">
-                            <p:stCondLst>
-                              <p:cond delay="0"/>
-                            </p:stCondLst>
-                            <p:childTnLst>
-                              <p:par>
-                                <p:cTn id="5" presetID="1" presetClass="entr" presetSubtype="0" fill="hold" grpId="0" nodeType="clickEffect">
-                                  <p:stCondLst>
-                                    <p:cond delay="0"/>
-                                  </p:stCondLst>
-                                  <p:childTnLst>
-                                    <p:set>
-                                      <p:cBhvr>
-                                        <p:cTn id="6" dur="1" fill="hold">
-                                          <p:stCondLst>
-                                            <p:cond delay="0"/>
-                                          </p:stCondLst>
-                                        </p:cTn>
-                                        <p:tgtEl>
-                                          <p:spTgt spid="7">
-                                            <p:txEl>
-                                              <p:pRg st="0" end="0"/>
-                                            </p:txEl>
-                                          </p:spTgt>
-                                        </p:tgtEl>
-                                        <p:attrNameLst>
-                                          <p:attrName>style.visibility</p:attrName>
-                                        </p:attrNameLst>
-                                      </p:cBhvr>
-                                      <p:to>
-                                        <p:strVal val="visible"/>
-                                      </p:to>
-                                    </p:set>
-                                  </p:childTnLst>
-                                </p:cTn>
-                              </p:par>
-                            </p:childTnLst>
-                          </p:cTn>
-                        </p:par>
-                      </p:childTnLst>
-                    </p:cTn>
-                  </p:par>
-                  <p:par>
-                    <p:cTn id="7" fill="hold">
-                      <p:stCondLst>
-                        <p:cond delay="indefinite"/>
-                      </p:stCondLst>
-                      <p:childTnLst>
-                        <p:par>
-                          <p:cTn id="8" fill="hold">
-                            <p:stCondLst>
-                              <p:cond delay="0"/>
-                            </p:stCondLst>
-                            <p:childTnLst>
-                              <p:par>
-                                <p:cTn id="9" presetID="1" presetClass="entr" presetSubtype="0" fill="hold" grpId="0" nodeType="clickEffect">
-                                  <p:stCondLst>
-                                    <p:cond delay="0"/>
-                                  </p:stCondLst>
-                                  <p:childTnLst>
-                                    <p:set>
-                                      <p:cBhvr>
-                                        <p:cTn id="10" dur="1" fill="hold">
-                                          <p:stCondLst>
-                                            <p:cond delay="0"/>
-                                          </p:stCondLst>
-                                        </p:cTn>
-                                        <p:tgtEl>
-                                          <p:spTgt spid="7">
-                                            <p:txEl>
-                                              <p:pRg st="1" end="1"/>
-                                            </p:txEl>
-                                          </p:spTgt>
-                                        </p:tgtEl>
-                                        <p:attrNameLst>
-                                          <p:attrName>style.visibility</p:attrName>
-                                        </p:attrNameLst>
-                                      </p:cBhvr>
-                                      <p:to>
-                                        <p:strVal val="visible"/>
-                                      </p:to>
-                                    </p:set>
-                                  </p:childTnLst>
-                                </p:cTn>
-                              </p:par>
-                              <p:par>
-                                <p:cTn id="11" presetID="1" presetClass="entr" presetSubtype="0" fill="hold" grpId="0" nodeType="withEffect">
-                                  <p:stCondLst>
-                                    <p:cond delay="0"/>
-                                  </p:stCondLst>
-                                  <p:childTnLst>
-                                    <p:set>
-                                      <p:cBhvr>
-                                        <p:cTn id="12" dur="1" fill="hold">
-                                          <p:stCondLst>
-                                            <p:cond delay="0"/>
-                                          </p:stCondLst>
-                                        </p:cTn>
-                                        <p:tgtEl>
-                                          <p:spTgt spid="6"/>
-                                        </p:tgtEl>
-                                        <p:attrNameLst>
-                                          <p:attrName>style.visibility</p:attrName>
-                                        </p:attrNameLst>
-                                      </p:cBhvr>
-                                      <p:to>
-                                        <p:strVal val="visible"/>
-                                      </p:to>
-                                    </p:set>
-                                  </p:childTnLst>
-                                </p:cTn>
-                              </p:par>
-                              <p:par>
-                                <p:cTn id="13" presetID="1" presetClass="entr" presetSubtype="0" fill="hold" nodeType="withEffect">
-                                  <p:stCondLst>
-                                    <p:cond delay="0"/>
-                                  </p:stCondLst>
-                                  <p:childTnLst>
-                                    <p:set>
-                                      <p:cBhvr>
-                                        <p:cTn id="14" dur="1" fill="hold">
-                                          <p:stCondLst>
-                                            <p:cond delay="0"/>
-                                          </p:stCondLst>
-                                        </p:cTn>
-                                        <p:tgtEl>
-                                          <p:spTgt spid="1026"/>
-                                        </p:tgtEl>
-                                        <p:attrNameLst>
-                                          <p:attrName>style.visibility</p:attrName>
-                                        </p:attrNameLst>
-                                      </p:cBhvr>
-                                      <p:to>
-                                        <p:strVal val="visible"/>
-                                      </p:to>
-                                    </p:set>
-                                  </p:childTnLst>
-                                </p:cTn>
-                              </p:par>
-                            </p:childTnLst>
-                          </p:cTn>
-                        </p:par>
-                      </p:childTnLst>
-                    </p:cTn>
-                  </p:par>
-                  <p:par>
-                    <p:cTn id="15" fill="hold">
-                      <p:stCondLst>
-                        <p:cond delay="indefinite"/>
-                      </p:stCondLst>
-                      <p:childTnLst>
-                        <p:par>
-                          <p:cTn id="16" fill="hold">
-                            <p:stCondLst>
-                              <p:cond delay="0"/>
-                            </p:stCondLst>
-                            <p:childTnLst>
-                              <p:par>
-                                <p:cTn id="17" presetID="1" presetClass="entr" presetSubtype="0" fill="hold" grpId="0" nodeType="clickEffect">
-                                  <p:stCondLst>
-                                    <p:cond delay="0"/>
-                                  </p:stCondLst>
-                                  <p:childTnLst>
-                                    <p:set>
-                                      <p:cBhvr>
-                                        <p:cTn id="18" dur="1" fill="hold">
-                                          <p:stCondLst>
-                                            <p:cond delay="0"/>
-                                          </p:stCondLst>
-                                        </p:cTn>
-                                        <p:tgtEl>
-                                          <p:spTgt spid="7">
-                                            <p:txEl>
-                                              <p:pRg st="2" end="2"/>
-                                            </p:txEl>
-                                          </p:spTgt>
-                                        </p:tgtEl>
-                                        <p:attrNameLst>
-                                          <p:attrName>style.visibility</p:attrName>
-                                        </p:attrNameLst>
-                                      </p:cBhvr>
-                                      <p:to>
-                                        <p:strVal val="visible"/>
-                                      </p:to>
-                                    </p:set>
-                                  </p:childTnLst>
-                                </p:cTn>
-                              </p:par>
-                            </p:childTnLst>
-                          </p:cTn>
-                        </p:par>
-                      </p:childTnLst>
-                    </p:cTn>
-                  </p:par>
-                  <p:par>
-                    <p:cTn id="19" fill="hold">
-                      <p:stCondLst>
-                        <p:cond delay="indefinite"/>
-                      </p:stCondLst>
-                      <p:childTnLst>
-                        <p:par>
-                          <p:cTn id="20" fill="hold">
-                            <p:stCondLst>
-                              <p:cond delay="0"/>
-                            </p:stCondLst>
-                            <p:childTnLst>
-                              <p:par>
-                                <p:cTn id="21" presetID="1" presetClass="entr" presetSubtype="0" fill="hold" grpId="0" nodeType="clickEffect">
-                                  <p:stCondLst>
-                                    <p:cond delay="0"/>
-                                  </p:stCondLst>
-                                  <p:childTnLst>
-                                    <p:set>
-                                      <p:cBhvr>
-                                        <p:cTn id="22" dur="1" fill="hold">
-                                          <p:stCondLst>
-                                            <p:cond delay="0"/>
-                                          </p:stCondLst>
-                                        </p:cTn>
-                                        <p:tgtEl>
-                                          <p:spTgt spid="7">
-                                            <p:txEl>
-                                              <p:pRg st="3" end="3"/>
-                                            </p:txEl>
-                                          </p:spTgt>
-                                        </p:tgtEl>
-                                        <p:attrNameLst>
-                                          <p:attrName>style.visibility</p:attrName>
-                                        </p:attrNameLst>
-                                      </p:cBhvr>
-                                      <p:to>
-                                        <p:strVal val="visible"/>
-                                      </p:to>
-                                    </p:set>
-                                  </p:childTnLst>
-                                </p:cTn>
-                              </p:par>
-                            </p:childTnLst>
-                          </p:cTn>
-                        </p:par>
-                      </p:childTnLst>
-                    </p:cTn>
-                  </p:par>
-                </p:childTnLst>
-              </p:cTn>
-              <p:prevCondLst>
-                <p:cond evt="onPrev" delay="0">
-                  <p:tgtEl>
-                    <p:sldTgt/>
-                  </p:tgtEl>
-                </p:cond>
-              </p:prevCondLst>
-              <p:nextCondLst>
-                <p:cond evt="onNext" delay="0">
-                  <p:tgtEl>
-                    <p:sldTgt/>
-                  </p:tgtEl>
-                </p:cond>
-              </p:nextCondLst>
-            </p:seq>
-          </p:childTnLst>
-        </p:cTn>
-      </p:par>
-    </p:tnLst>
-    <p:bldLst>
-      <p:bldP spid="7" grpId="0" uiExpand="1" build="p"/>
-      <p:bldP spid="6" grpId="0"/>
     </p:bldLst>
   </p:timing>
 </p:sld>
@@ -24866,6 +24518,560 @@
         </p:nvSpPr>
         <p:spPr>
           <a:xfrm>
+            <a:off x="429619" y="1244922"/>
+            <a:ext cx="11720967" cy="2288440"/>
+          </a:xfrm>
+        </p:spPr>
+        <p:txBody>
+          <a:bodyPr>
+            <a:normAutofit/>
+          </a:bodyPr>
+          <a:lstStyle/>
+          <a:p>
+            <a:pPr marL="0" indent="0">
+              <a:buNone/>
+            </a:pPr>
+            <a:r>
+              <a:rPr lang="en-GB" dirty="0">
+                <a:ea typeface="Segoe UI" panose="020B0502040204020203" pitchFamily="34" charset="0"/>
+                <a:cs typeface="Segoe UI" panose="020B0502040204020203" pitchFamily="34" charset="0"/>
+              </a:rPr>
+              <a:t>Many </a:t>
+            </a:r>
+            <a:r>
+              <a:rPr lang="en-GB" dirty="0" err="1">
+                <a:ea typeface="Segoe UI" panose="020B0502040204020203" pitchFamily="34" charset="0"/>
+                <a:cs typeface="Segoe UI" panose="020B0502040204020203" pitchFamily="34" charset="0"/>
+              </a:rPr>
+              <a:t>color</a:t>
+            </a:r>
+            <a:r>
+              <a:rPr lang="en-GB" dirty="0">
+                <a:ea typeface="Segoe UI" panose="020B0502040204020203" pitchFamily="34" charset="0"/>
+                <a:cs typeface="Segoe UI" panose="020B0502040204020203" pitchFamily="34" charset="0"/>
+              </a:rPr>
+              <a:t> schemes used in image representation</a:t>
+            </a:r>
+          </a:p>
+          <a:p>
+            <a:r>
+              <a:rPr lang="en-GB" dirty="0">
+                <a:ea typeface="Segoe UI" panose="020B0502040204020203" pitchFamily="34" charset="0"/>
+                <a:cs typeface="Segoe UI" panose="020B0502040204020203" pitchFamily="34" charset="0"/>
+                <a:hlinkClick r:id="rId3"/>
+              </a:rPr>
+              <a:t>Hue, Saturation and Value (HSV) </a:t>
+            </a:r>
+            <a:r>
+              <a:rPr lang="en-GB" dirty="0">
+                <a:ea typeface="Segoe UI" panose="020B0502040204020203" pitchFamily="34" charset="0"/>
+                <a:cs typeface="Segoe UI" panose="020B0502040204020203" pitchFamily="34" charset="0"/>
+              </a:rPr>
+              <a:t>another alternative</a:t>
+            </a:r>
+          </a:p>
+          <a:p>
+            <a:r>
+              <a:rPr lang="en-GB" dirty="0">
+                <a:ea typeface="Segoe UI" panose="020B0502040204020203" pitchFamily="34" charset="0"/>
+                <a:cs typeface="Segoe UI" panose="020B0502040204020203" pitchFamily="34" charset="0"/>
+              </a:rPr>
+              <a:t>Can convert between schemes – </a:t>
+            </a:r>
+            <a:r>
+              <a:rPr lang="en-GB" dirty="0">
+                <a:ea typeface="Segoe UI" panose="020B0502040204020203" pitchFamily="34" charset="0"/>
+                <a:cs typeface="Segoe UI" panose="020B0502040204020203" pitchFamily="34" charset="0"/>
+                <a:hlinkClick r:id="rId4"/>
+              </a:rPr>
+              <a:t>e.g. </a:t>
+            </a:r>
+            <a:r>
+              <a:rPr lang="en-GB" dirty="0" err="1">
+                <a:ea typeface="Segoe UI" panose="020B0502040204020203" pitchFamily="34" charset="0"/>
+                <a:cs typeface="Segoe UI" panose="020B0502040204020203" pitchFamily="34" charset="0"/>
+                <a:hlinkClick r:id="rId4"/>
+              </a:rPr>
+              <a:t>skimage</a:t>
+            </a:r>
+            <a:r>
+              <a:rPr lang="en-GB" dirty="0">
+                <a:ea typeface="Segoe UI" panose="020B0502040204020203" pitchFamily="34" charset="0"/>
+                <a:cs typeface="Segoe UI" panose="020B0502040204020203" pitchFamily="34" charset="0"/>
+                <a:hlinkClick r:id="rId4"/>
+              </a:rPr>
+              <a:t> </a:t>
+            </a:r>
+            <a:endParaRPr lang="en-GB" dirty="0">
+              <a:ea typeface="Segoe UI" panose="020B0502040204020203" pitchFamily="34" charset="0"/>
+              <a:cs typeface="Segoe UI" panose="020B0502040204020203" pitchFamily="34" charset="0"/>
+            </a:endParaRPr>
+          </a:p>
+          <a:p>
+            <a:r>
+              <a:rPr lang="en-GB" dirty="0">
+                <a:ea typeface="Segoe UI" panose="020B0502040204020203" pitchFamily="34" charset="0"/>
+                <a:cs typeface="Segoe UI" panose="020B0502040204020203" pitchFamily="34" charset="0"/>
+              </a:rPr>
+              <a:t>But conversion may not be exact!</a:t>
+            </a:r>
+          </a:p>
+          <a:p>
+            <a:pPr marL="0" indent="0">
+              <a:buNone/>
+            </a:pPr>
+            <a:endParaRPr lang="en-GB" dirty="0">
+              <a:latin typeface="Segoe UI" panose="020B0502040204020203" pitchFamily="34" charset="0"/>
+              <a:ea typeface="Segoe UI" panose="020B0502040204020203" pitchFamily="34" charset="0"/>
+              <a:cs typeface="Segoe UI" panose="020B0502040204020203" pitchFamily="34" charset="0"/>
+            </a:endParaRPr>
+          </a:p>
+        </p:txBody>
+      </p:sp>
+      <p:sp>
+        <p:nvSpPr>
+          <p:cNvPr id="2" name="Title 1"/>
+          <p:cNvSpPr>
+            <a:spLocks noGrp="1"/>
+          </p:cNvSpPr>
+          <p:nvPr>
+            <p:ph type="title"/>
+          </p:nvPr>
+        </p:nvSpPr>
+        <p:spPr>
+          <a:xfrm>
+            <a:off x="429620" y="339142"/>
+            <a:ext cx="11386547" cy="493021"/>
+          </a:xfrm>
+        </p:spPr>
+        <p:txBody>
+          <a:bodyPr>
+            <a:normAutofit fontScale="90000"/>
+          </a:bodyPr>
+          <a:lstStyle/>
+          <a:p>
+            <a:r>
+              <a:rPr lang="en-US" dirty="0">
+                <a:latin typeface="Segoe UI" panose="020B0502040204020203" pitchFamily="34" charset="0"/>
+                <a:cs typeface="Segoe UI" panose="020B0502040204020203" pitchFamily="34" charset="0"/>
+              </a:rPr>
+              <a:t>Working with Image Data</a:t>
+            </a:r>
+            <a:endParaRPr lang="en-US" dirty="0">
+              <a:latin typeface="Segoe"/>
+            </a:endParaRPr>
+          </a:p>
+        </p:txBody>
+      </p:sp>
+      <p:sp>
+        <p:nvSpPr>
+          <p:cNvPr id="6" name="TextBox 5">
+            <a:extLst>
+              <a:ext uri="{FF2B5EF4-FFF2-40B4-BE49-F238E27FC236}">
+                <a16:creationId xmlns:a16="http://schemas.microsoft.com/office/drawing/2014/main" id="{6D4439ED-9C7B-4DAF-8A30-4AA105FBC841}"/>
+              </a:ext>
+            </a:extLst>
+          </p:cNvPr>
+          <p:cNvSpPr txBox="1"/>
+          <p:nvPr/>
+        </p:nvSpPr>
+        <p:spPr>
+          <a:xfrm>
+            <a:off x="7921540" y="6005426"/>
+            <a:ext cx="3938637" cy="369332"/>
+          </a:xfrm>
+          <a:prstGeom prst="rect">
+            <a:avLst/>
+          </a:prstGeom>
+          <a:noFill/>
+        </p:spPr>
+        <p:txBody>
+          <a:bodyPr wrap="square" rtlCol="0">
+            <a:spAutoFit/>
+          </a:bodyPr>
+          <a:lstStyle/>
+          <a:p>
+            <a:pPr algn="ctr"/>
+            <a:r>
+              <a:rPr lang="en-US" dirty="0"/>
+              <a:t>Credit, Wikipedia commons</a:t>
+            </a:r>
+          </a:p>
+        </p:txBody>
+      </p:sp>
+      <p:pic>
+        <p:nvPicPr>
+          <p:cNvPr id="1026" name="Picture 2">
+            <a:extLst>
+              <a:ext uri="{FF2B5EF4-FFF2-40B4-BE49-F238E27FC236}">
+                <a16:creationId xmlns:a16="http://schemas.microsoft.com/office/drawing/2014/main" id="{7D009939-B6EE-4FB4-8BEF-D3FD06E3303D}"/>
+              </a:ext>
+            </a:extLst>
+          </p:cNvPr>
+          <p:cNvPicPr>
+            <a:picLocks noChangeAspect="1" noChangeArrowheads="1"/>
+          </p:cNvPicPr>
+          <p:nvPr/>
+        </p:nvPicPr>
+        <p:blipFill>
+          <a:blip r:embed="rId5">
+            <a:extLst>
+              <a:ext uri="{28A0092B-C50C-407E-A947-70E740481C1C}">
+                <a14:useLocalDpi xmlns:a14="http://schemas.microsoft.com/office/drawing/2010/main" val="0"/>
+              </a:ext>
+            </a:extLst>
+          </a:blip>
+          <a:srcRect/>
+          <a:stretch>
+            <a:fillRect/>
+          </a:stretch>
+        </p:blipFill>
+        <p:spPr bwMode="auto">
+          <a:xfrm>
+            <a:off x="570676" y="3533362"/>
+            <a:ext cx="7991475" cy="3209925"/>
+          </a:xfrm>
+          <a:prstGeom prst="rect">
+            <a:avLst/>
+          </a:prstGeom>
+          <a:noFill/>
+          <a:extLst>
+            <a:ext uri="{909E8E84-426E-40DD-AFC4-6F175D3DCCD1}">
+              <a14:hiddenFill xmlns:a14="http://schemas.microsoft.com/office/drawing/2010/main">
+                <a:solidFill>
+                  <a:srgbClr val="FFFFFF"/>
+                </a:solidFill>
+              </a14:hiddenFill>
+            </a:ext>
+          </a:extLst>
+        </p:spPr>
+      </p:pic>
+    </p:spTree>
+    <p:extLst>
+      <p:ext uri="{BB962C8B-B14F-4D97-AF65-F5344CB8AC3E}">
+        <p14:creationId xmlns:p14="http://schemas.microsoft.com/office/powerpoint/2010/main" val="1099730449"/>
+      </p:ext>
+    </p:extLst>
+  </p:cSld>
+  <p:clrMapOvr>
+    <a:masterClrMapping/>
+  </p:clrMapOvr>
+  <p:timing>
+    <p:tnLst>
+      <p:par>
+        <p:cTn id="1" dur="indefinite" restart="never" nodeType="tmRoot">
+          <p:childTnLst>
+            <p:seq concurrent="1" nextAc="seek">
+              <p:cTn id="2" dur="indefinite" nodeType="mainSeq">
+                <p:childTnLst>
+                  <p:par>
+                    <p:cTn id="3" fill="hold">
+                      <p:stCondLst>
+                        <p:cond delay="indefinite"/>
+                      </p:stCondLst>
+                      <p:childTnLst>
+                        <p:par>
+                          <p:cTn id="4" fill="hold">
+                            <p:stCondLst>
+                              <p:cond delay="0"/>
+                            </p:stCondLst>
+                            <p:childTnLst>
+                              <p:par>
+                                <p:cTn id="5" presetID="1" presetClass="entr" presetSubtype="0" fill="hold" grpId="0" nodeType="clickEffect">
+                                  <p:stCondLst>
+                                    <p:cond delay="0"/>
+                                  </p:stCondLst>
+                                  <p:childTnLst>
+                                    <p:set>
+                                      <p:cBhvr>
+                                        <p:cTn id="6" dur="1" fill="hold">
+                                          <p:stCondLst>
+                                            <p:cond delay="0"/>
+                                          </p:stCondLst>
+                                        </p:cTn>
+                                        <p:tgtEl>
+                                          <p:spTgt spid="7">
+                                            <p:txEl>
+                                              <p:pRg st="0" end="0"/>
+                                            </p:txEl>
+                                          </p:spTgt>
+                                        </p:tgtEl>
+                                        <p:attrNameLst>
+                                          <p:attrName>style.visibility</p:attrName>
+                                        </p:attrNameLst>
+                                      </p:cBhvr>
+                                      <p:to>
+                                        <p:strVal val="visible"/>
+                                      </p:to>
+                                    </p:set>
+                                  </p:childTnLst>
+                                </p:cTn>
+                              </p:par>
+                            </p:childTnLst>
+                          </p:cTn>
+                        </p:par>
+                      </p:childTnLst>
+                    </p:cTn>
+                  </p:par>
+                  <p:par>
+                    <p:cTn id="7" fill="hold">
+                      <p:stCondLst>
+                        <p:cond delay="indefinite"/>
+                      </p:stCondLst>
+                      <p:childTnLst>
+                        <p:par>
+                          <p:cTn id="8" fill="hold">
+                            <p:stCondLst>
+                              <p:cond delay="0"/>
+                            </p:stCondLst>
+                            <p:childTnLst>
+                              <p:par>
+                                <p:cTn id="9" presetID="1" presetClass="entr" presetSubtype="0" fill="hold" grpId="0" nodeType="clickEffect">
+                                  <p:stCondLst>
+                                    <p:cond delay="0"/>
+                                  </p:stCondLst>
+                                  <p:childTnLst>
+                                    <p:set>
+                                      <p:cBhvr>
+                                        <p:cTn id="10" dur="1" fill="hold">
+                                          <p:stCondLst>
+                                            <p:cond delay="0"/>
+                                          </p:stCondLst>
+                                        </p:cTn>
+                                        <p:tgtEl>
+                                          <p:spTgt spid="7">
+                                            <p:txEl>
+                                              <p:pRg st="1" end="1"/>
+                                            </p:txEl>
+                                          </p:spTgt>
+                                        </p:tgtEl>
+                                        <p:attrNameLst>
+                                          <p:attrName>style.visibility</p:attrName>
+                                        </p:attrNameLst>
+                                      </p:cBhvr>
+                                      <p:to>
+                                        <p:strVal val="visible"/>
+                                      </p:to>
+                                    </p:set>
+                                  </p:childTnLst>
+                                </p:cTn>
+                              </p:par>
+                              <p:par>
+                                <p:cTn id="11" presetID="1" presetClass="entr" presetSubtype="0" fill="hold" grpId="0" nodeType="withEffect">
+                                  <p:stCondLst>
+                                    <p:cond delay="0"/>
+                                  </p:stCondLst>
+                                  <p:childTnLst>
+                                    <p:set>
+                                      <p:cBhvr>
+                                        <p:cTn id="12" dur="1" fill="hold">
+                                          <p:stCondLst>
+                                            <p:cond delay="0"/>
+                                          </p:stCondLst>
+                                        </p:cTn>
+                                        <p:tgtEl>
+                                          <p:spTgt spid="6"/>
+                                        </p:tgtEl>
+                                        <p:attrNameLst>
+                                          <p:attrName>style.visibility</p:attrName>
+                                        </p:attrNameLst>
+                                      </p:cBhvr>
+                                      <p:to>
+                                        <p:strVal val="visible"/>
+                                      </p:to>
+                                    </p:set>
+                                  </p:childTnLst>
+                                </p:cTn>
+                              </p:par>
+                              <p:par>
+                                <p:cTn id="13" presetID="1" presetClass="entr" presetSubtype="0" fill="hold" nodeType="withEffect">
+                                  <p:stCondLst>
+                                    <p:cond delay="0"/>
+                                  </p:stCondLst>
+                                  <p:childTnLst>
+                                    <p:set>
+                                      <p:cBhvr>
+                                        <p:cTn id="14" dur="1" fill="hold">
+                                          <p:stCondLst>
+                                            <p:cond delay="0"/>
+                                          </p:stCondLst>
+                                        </p:cTn>
+                                        <p:tgtEl>
+                                          <p:spTgt spid="1026"/>
+                                        </p:tgtEl>
+                                        <p:attrNameLst>
+                                          <p:attrName>style.visibility</p:attrName>
+                                        </p:attrNameLst>
+                                      </p:cBhvr>
+                                      <p:to>
+                                        <p:strVal val="visible"/>
+                                      </p:to>
+                                    </p:set>
+                                  </p:childTnLst>
+                                </p:cTn>
+                              </p:par>
+                            </p:childTnLst>
+                          </p:cTn>
+                        </p:par>
+                      </p:childTnLst>
+                    </p:cTn>
+                  </p:par>
+                  <p:par>
+                    <p:cTn id="15" fill="hold">
+                      <p:stCondLst>
+                        <p:cond delay="indefinite"/>
+                      </p:stCondLst>
+                      <p:childTnLst>
+                        <p:par>
+                          <p:cTn id="16" fill="hold">
+                            <p:stCondLst>
+                              <p:cond delay="0"/>
+                            </p:stCondLst>
+                            <p:childTnLst>
+                              <p:par>
+                                <p:cTn id="17" presetID="1" presetClass="entr" presetSubtype="0" fill="hold" grpId="0" nodeType="clickEffect">
+                                  <p:stCondLst>
+                                    <p:cond delay="0"/>
+                                  </p:stCondLst>
+                                  <p:childTnLst>
+                                    <p:set>
+                                      <p:cBhvr>
+                                        <p:cTn id="18" dur="1" fill="hold">
+                                          <p:stCondLst>
+                                            <p:cond delay="0"/>
+                                          </p:stCondLst>
+                                        </p:cTn>
+                                        <p:tgtEl>
+                                          <p:spTgt spid="7">
+                                            <p:txEl>
+                                              <p:pRg st="2" end="2"/>
+                                            </p:txEl>
+                                          </p:spTgt>
+                                        </p:tgtEl>
+                                        <p:attrNameLst>
+                                          <p:attrName>style.visibility</p:attrName>
+                                        </p:attrNameLst>
+                                      </p:cBhvr>
+                                      <p:to>
+                                        <p:strVal val="visible"/>
+                                      </p:to>
+                                    </p:set>
+                                  </p:childTnLst>
+                                </p:cTn>
+                              </p:par>
+                            </p:childTnLst>
+                          </p:cTn>
+                        </p:par>
+                      </p:childTnLst>
+                    </p:cTn>
+                  </p:par>
+                  <p:par>
+                    <p:cTn id="19" fill="hold">
+                      <p:stCondLst>
+                        <p:cond delay="indefinite"/>
+                      </p:stCondLst>
+                      <p:childTnLst>
+                        <p:par>
+                          <p:cTn id="20" fill="hold">
+                            <p:stCondLst>
+                              <p:cond delay="0"/>
+                            </p:stCondLst>
+                            <p:childTnLst>
+                              <p:par>
+                                <p:cTn id="21" presetID="1" presetClass="entr" presetSubtype="0" fill="hold" grpId="0" nodeType="clickEffect">
+                                  <p:stCondLst>
+                                    <p:cond delay="0"/>
+                                  </p:stCondLst>
+                                  <p:childTnLst>
+                                    <p:set>
+                                      <p:cBhvr>
+                                        <p:cTn id="22" dur="1" fill="hold">
+                                          <p:stCondLst>
+                                            <p:cond delay="0"/>
+                                          </p:stCondLst>
+                                        </p:cTn>
+                                        <p:tgtEl>
+                                          <p:spTgt spid="7">
+                                            <p:txEl>
+                                              <p:pRg st="3" end="3"/>
+                                            </p:txEl>
+                                          </p:spTgt>
+                                        </p:tgtEl>
+                                        <p:attrNameLst>
+                                          <p:attrName>style.visibility</p:attrName>
+                                        </p:attrNameLst>
+                                      </p:cBhvr>
+                                      <p:to>
+                                        <p:strVal val="visible"/>
+                                      </p:to>
+                                    </p:set>
+                                  </p:childTnLst>
+                                </p:cTn>
+                              </p:par>
+                            </p:childTnLst>
+                          </p:cTn>
+                        </p:par>
+                      </p:childTnLst>
+                    </p:cTn>
+                  </p:par>
+                </p:childTnLst>
+              </p:cTn>
+              <p:prevCondLst>
+                <p:cond evt="onPrev" delay="0">
+                  <p:tgtEl>
+                    <p:sldTgt/>
+                  </p:tgtEl>
+                </p:cond>
+              </p:prevCondLst>
+              <p:nextCondLst>
+                <p:cond evt="onNext" delay="0">
+                  <p:tgtEl>
+                    <p:sldTgt/>
+                  </p:tgtEl>
+                </p:cond>
+              </p:nextCondLst>
+            </p:seq>
+          </p:childTnLst>
+        </p:cTn>
+      </p:par>
+    </p:tnLst>
+    <p:bldLst>
+      <p:bldP spid="7" grpId="0" uiExpand="1" build="p"/>
+      <p:bldP spid="6" grpId="0"/>
+    </p:bldLst>
+  </p:timing>
+</p:sld>
+</file>
+
+<file path=ppt/slides/slide31.xml><?xml version="1.0" encoding="utf-8"?>
+<p:sld xmlns:a="http://schemas.openxmlformats.org/drawingml/2006/main" xmlns:r="http://schemas.openxmlformats.org/officeDocument/2006/relationships" xmlns:p="http://schemas.openxmlformats.org/presentationml/2006/main">
+  <p:cSld>
+    <p:spTree>
+      <p:nvGrpSpPr>
+        <p:cNvPr id="1" name=""/>
+        <p:cNvGrpSpPr/>
+        <p:nvPr/>
+      </p:nvGrpSpPr>
+      <p:grpSpPr>
+        <a:xfrm>
+          <a:off x="0" y="0"/>
+          <a:ext cx="0" cy="0"/>
+          <a:chOff x="0" y="0"/>
+          <a:chExt cx="0" cy="0"/>
+        </a:xfrm>
+      </p:grpSpPr>
+      <p:sp>
+        <p:nvSpPr>
+          <p:cNvPr id="7" name="Content Placeholder 6"/>
+          <p:cNvSpPr>
+            <a:spLocks noGrp="1"/>
+          </p:cNvSpPr>
+          <p:nvPr>
+            <p:ph sz="quarter" idx="10"/>
+          </p:nvPr>
+        </p:nvSpPr>
+        <p:spPr>
+          <a:xfrm>
             <a:off x="378595" y="1399631"/>
             <a:ext cx="11525250" cy="4972369"/>
           </a:xfrm>
@@ -25307,7 +25513,7 @@
 </p:sld>
 </file>
 
-<file path=ppt/slides/slide31.xml><?xml version="1.0" encoding="utf-8"?>
+<file path=ppt/slides/slide32.xml><?xml version="1.0" encoding="utf-8"?>
 <p:sld xmlns:a="http://schemas.openxmlformats.org/drawingml/2006/main" xmlns:r="http://schemas.openxmlformats.org/officeDocument/2006/relationships" xmlns:p="http://schemas.openxmlformats.org/presentationml/2006/main">
   <p:cSld>
     <p:spTree>
@@ -28868,7 +29074,7 @@
 </p:sld>
 </file>
 
-<file path=ppt/slides/slide32.xml><?xml version="1.0" encoding="utf-8"?>
+<file path=ppt/slides/slide33.xml><?xml version="1.0" encoding="utf-8"?>
 <p:sld xmlns:a="http://schemas.openxmlformats.org/drawingml/2006/main" xmlns:r="http://schemas.openxmlformats.org/officeDocument/2006/relationships" xmlns:p="http://schemas.openxmlformats.org/presentationml/2006/main">
   <p:cSld>
     <p:spTree>
@@ -28933,7 +29139,7 @@
 </p:sld>
 </file>
 
-<file path=ppt/slides/slide33.xml><?xml version="1.0" encoding="utf-8"?>
+<file path=ppt/slides/slide34.xml><?xml version="1.0" encoding="utf-8"?>
 <p:sld xmlns:a="http://schemas.openxmlformats.org/drawingml/2006/main" xmlns:r="http://schemas.openxmlformats.org/officeDocument/2006/relationships" xmlns:p="http://schemas.openxmlformats.org/presentationml/2006/main">
   <p:cSld>
     <p:spTree>
@@ -29412,7 +29618,7 @@
 </p:sld>
 </file>
 
-<file path=ppt/slides/slide34.xml><?xml version="1.0" encoding="utf-8"?>
+<file path=ppt/slides/slide35.xml><?xml version="1.0" encoding="utf-8"?>
 <p:sld xmlns:a="http://schemas.openxmlformats.org/drawingml/2006/main" xmlns:r="http://schemas.openxmlformats.org/officeDocument/2006/relationships" xmlns:p="http://schemas.openxmlformats.org/presentationml/2006/main">
   <p:cSld>
     <p:spTree>
@@ -29940,7 +30146,7 @@
 </p:sld>
 </file>
 
-<file path=ppt/slides/slide35.xml><?xml version="1.0" encoding="utf-8"?>
+<file path=ppt/slides/slide36.xml><?xml version="1.0" encoding="utf-8"?>
 <p:sld xmlns:a="http://schemas.openxmlformats.org/drawingml/2006/main" xmlns:r="http://schemas.openxmlformats.org/officeDocument/2006/relationships" xmlns:p="http://schemas.openxmlformats.org/presentationml/2006/main">
   <p:cSld>
     <p:spTree>
@@ -30233,7 +30439,7 @@
 </p:sld>
 </file>
 
-<file path=ppt/slides/slide36.xml><?xml version="1.0" encoding="utf-8"?>
+<file path=ppt/slides/slide37.xml><?xml version="1.0" encoding="utf-8"?>
 <p:sld xmlns:a="http://schemas.openxmlformats.org/drawingml/2006/main" xmlns:r="http://schemas.openxmlformats.org/officeDocument/2006/relationships" xmlns:p="http://schemas.openxmlformats.org/presentationml/2006/main">
   <p:cSld>
     <p:spTree>
@@ -30639,7 +30845,7 @@
 </p:sld>
 </file>
 
-<file path=ppt/slides/slide37.xml><?xml version="1.0" encoding="utf-8"?>
+<file path=ppt/slides/slide38.xml><?xml version="1.0" encoding="utf-8"?>
 <p:sld xmlns:a="http://schemas.openxmlformats.org/drawingml/2006/main" xmlns:r="http://schemas.openxmlformats.org/officeDocument/2006/relationships" xmlns:p="http://schemas.openxmlformats.org/presentationml/2006/main">
   <p:cSld>
     <p:spTree>
@@ -30704,7 +30910,7 @@
 </p:sld>
 </file>
 
-<file path=ppt/slides/slide38.xml><?xml version="1.0" encoding="utf-8"?>
+<file path=ppt/slides/slide39.xml><?xml version="1.0" encoding="utf-8"?>
 <p:sld xmlns:a="http://schemas.openxmlformats.org/drawingml/2006/main" xmlns:r="http://schemas.openxmlformats.org/officeDocument/2006/relationships" xmlns:p="http://schemas.openxmlformats.org/presentationml/2006/main">
   <p:cSld>
     <p:spTree>
@@ -31130,580 +31336,6 @@
                                           <p:spTgt spid="7">
                                             <p:txEl>
                                               <p:pRg st="5" end="5"/>
-                                            </p:txEl>
-                                          </p:spTgt>
-                                        </p:tgtEl>
-                                        <p:attrNameLst>
-                                          <p:attrName>style.visibility</p:attrName>
-                                        </p:attrNameLst>
-                                      </p:cBhvr>
-                                      <p:to>
-                                        <p:strVal val="visible"/>
-                                      </p:to>
-                                    </p:set>
-                                  </p:childTnLst>
-                                </p:cTn>
-                              </p:par>
-                            </p:childTnLst>
-                          </p:cTn>
-                        </p:par>
-                      </p:childTnLst>
-                    </p:cTn>
-                  </p:par>
-                </p:childTnLst>
-              </p:cTn>
-              <p:prevCondLst>
-                <p:cond evt="onPrev" delay="0">
-                  <p:tgtEl>
-                    <p:sldTgt/>
-                  </p:tgtEl>
-                </p:cond>
-              </p:prevCondLst>
-              <p:nextCondLst>
-                <p:cond evt="onNext" delay="0">
-                  <p:tgtEl>
-                    <p:sldTgt/>
-                  </p:tgtEl>
-                </p:cond>
-              </p:nextCondLst>
-            </p:seq>
-          </p:childTnLst>
-        </p:cTn>
-      </p:par>
-    </p:tnLst>
-    <p:bldLst>
-      <p:bldP spid="7" grpId="0" uiExpand="1" build="p"/>
-    </p:bldLst>
-  </p:timing>
-</p:sld>
-</file>
-
-<file path=ppt/slides/slide39.xml><?xml version="1.0" encoding="utf-8"?>
-<p:sld xmlns:a="http://schemas.openxmlformats.org/drawingml/2006/main" xmlns:r="http://schemas.openxmlformats.org/officeDocument/2006/relationships" xmlns:p="http://schemas.openxmlformats.org/presentationml/2006/main">
-  <p:cSld>
-    <p:spTree>
-      <p:nvGrpSpPr>
-        <p:cNvPr id="1" name=""/>
-        <p:cNvGrpSpPr/>
-        <p:nvPr/>
-      </p:nvGrpSpPr>
-      <p:grpSpPr>
-        <a:xfrm>
-          <a:off x="0" y="0"/>
-          <a:ext cx="0" cy="0"/>
-          <a:chOff x="0" y="0"/>
-          <a:chExt cx="0" cy="0"/>
-        </a:xfrm>
-      </p:grpSpPr>
-      <p:sp>
-        <p:nvSpPr>
-          <p:cNvPr id="7" name="Content Placeholder 6"/>
-          <p:cNvSpPr>
-            <a:spLocks noGrp="1"/>
-          </p:cNvSpPr>
-          <p:nvPr>
-            <p:ph sz="quarter" idx="10"/>
-          </p:nvPr>
-        </p:nvSpPr>
-        <p:spPr>
-          <a:xfrm>
-            <a:off x="378595" y="1399631"/>
-            <a:ext cx="11525250" cy="4972369"/>
-          </a:xfrm>
-        </p:spPr>
-        <p:txBody>
-          <a:bodyPr>
-            <a:normAutofit/>
-          </a:bodyPr>
-          <a:lstStyle/>
-          <a:p>
-            <a:pPr marL="0" indent="0">
-              <a:buNone/>
-            </a:pPr>
-            <a:r>
-              <a:rPr lang="en-GB" dirty="0">
-                <a:ea typeface="Segoe UI" panose="020B0502040204020203" pitchFamily="34" charset="0"/>
-                <a:cs typeface="Segoe UI" panose="020B0502040204020203" pitchFamily="34" charset="0"/>
-              </a:rPr>
-              <a:t>Resizing algorithms use interpolated values for pixel centres </a:t>
-            </a:r>
-          </a:p>
-          <a:p>
-            <a:r>
-              <a:rPr lang="en-GB" dirty="0">
-                <a:ea typeface="Segoe UI" panose="020B0502040204020203" pitchFamily="34" charset="0"/>
-                <a:cs typeface="Segoe UI" panose="020B0502040204020203" pitchFamily="34" charset="0"/>
-              </a:rPr>
-              <a:t>For even factors of 2 resizing use mean interpolations </a:t>
-            </a:r>
-          </a:p>
-          <a:p>
-            <a:pPr lvl="1"/>
-            <a:r>
-              <a:rPr lang="en-GB" dirty="0">
-                <a:ea typeface="Segoe UI" panose="020B0502040204020203" pitchFamily="34" charset="0"/>
-                <a:cs typeface="Segoe UI" panose="020B0502040204020203" pitchFamily="34" charset="0"/>
-              </a:rPr>
-              <a:t>Use averages of adjacent pixel values </a:t>
-            </a:r>
-          </a:p>
-          <a:p>
-            <a:r>
-              <a:rPr lang="en-GB" dirty="0">
-                <a:ea typeface="Segoe UI" panose="020B0502040204020203" pitchFamily="34" charset="0"/>
-                <a:cs typeface="Segoe UI" panose="020B0502040204020203" pitchFamily="34" charset="0"/>
-              </a:rPr>
-              <a:t>Arbitrary resizing can use </a:t>
-            </a:r>
-            <a:r>
-              <a:rPr lang="en-GB" b="1" dirty="0">
-                <a:ea typeface="Segoe UI" panose="020B0502040204020203" pitchFamily="34" charset="0"/>
-                <a:cs typeface="Segoe UI" panose="020B0502040204020203" pitchFamily="34" charset="0"/>
-              </a:rPr>
-              <a:t>spline interpolation </a:t>
-            </a:r>
-            <a:r>
-              <a:rPr lang="en-GB" dirty="0">
-                <a:ea typeface="Segoe UI" panose="020B0502040204020203" pitchFamily="34" charset="0"/>
-                <a:cs typeface="Segoe UI" panose="020B0502040204020203" pitchFamily="34" charset="0"/>
-              </a:rPr>
-              <a:t>or </a:t>
-            </a:r>
-            <a:r>
-              <a:rPr lang="en-GB" b="1" dirty="0">
-                <a:ea typeface="Segoe UI" panose="020B0502040204020203" pitchFamily="34" charset="0"/>
-                <a:cs typeface="Segoe UI" panose="020B0502040204020203" pitchFamily="34" charset="0"/>
-              </a:rPr>
-              <a:t>bilinear interpolation</a:t>
-            </a:r>
-          </a:p>
-          <a:p>
-            <a:pPr lvl="1"/>
-            <a:r>
-              <a:rPr lang="en-GB" dirty="0">
-                <a:ea typeface="Segoe UI" panose="020B0502040204020203" pitchFamily="34" charset="0"/>
-                <a:cs typeface="Segoe UI" panose="020B0502040204020203" pitchFamily="34" charset="0"/>
-              </a:rPr>
-              <a:t>Interpolate from original image pixel centre values to resized image pixel values </a:t>
-            </a:r>
-          </a:p>
-          <a:p>
-            <a:r>
-              <a:rPr lang="en-GB" dirty="0">
-                <a:ea typeface="Segoe UI" panose="020B0502040204020203" pitchFamily="34" charset="0"/>
-                <a:cs typeface="Segoe UI" panose="020B0502040204020203" pitchFamily="34" charset="0"/>
-              </a:rPr>
-              <a:t>Many other interpolation methods are used</a:t>
-            </a:r>
-          </a:p>
-          <a:p>
-            <a:pPr lvl="1"/>
-            <a:r>
-              <a:rPr lang="en-GB" dirty="0">
-                <a:ea typeface="Segoe UI" panose="020B0502040204020203" pitchFamily="34" charset="0"/>
-                <a:cs typeface="Segoe UI" panose="020B0502040204020203" pitchFamily="34" charset="0"/>
-              </a:rPr>
-              <a:t>PCA/SVD and other generative models</a:t>
-            </a:r>
-          </a:p>
-          <a:p>
-            <a:pPr lvl="1"/>
-            <a:r>
-              <a:rPr lang="en-GB" dirty="0">
-                <a:ea typeface="Segoe UI" panose="020B0502040204020203" pitchFamily="34" charset="0"/>
-                <a:cs typeface="Segoe UI" panose="020B0502040204020203" pitchFamily="34" charset="0"/>
-              </a:rPr>
-              <a:t>Gaussian convolutional filters</a:t>
-            </a:r>
-          </a:p>
-          <a:p>
-            <a:pPr lvl="1"/>
-            <a:r>
-              <a:rPr lang="en-GB" dirty="0">
-                <a:ea typeface="Segoe UI" panose="020B0502040204020203" pitchFamily="34" charset="0"/>
-                <a:cs typeface="Segoe UI" panose="020B0502040204020203" pitchFamily="34" charset="0"/>
-              </a:rPr>
-              <a:t>Super-resolution deep convolutional neural networks </a:t>
-            </a:r>
-          </a:p>
-          <a:p>
-            <a:pPr lvl="1"/>
-            <a:r>
-              <a:rPr lang="en-GB" dirty="0">
-                <a:ea typeface="Segoe UI" panose="020B0502040204020203" pitchFamily="34" charset="0"/>
-                <a:cs typeface="Segoe UI" panose="020B0502040204020203" pitchFamily="34" charset="0"/>
-              </a:rPr>
-              <a:t>More on these later</a:t>
-            </a:r>
-          </a:p>
-        </p:txBody>
-      </p:sp>
-      <p:sp>
-        <p:nvSpPr>
-          <p:cNvPr id="2" name="Title 1"/>
-          <p:cNvSpPr>
-            <a:spLocks noGrp="1"/>
-          </p:cNvSpPr>
-          <p:nvPr>
-            <p:ph type="title"/>
-          </p:nvPr>
-        </p:nvSpPr>
-        <p:spPr>
-          <a:xfrm>
-            <a:off x="378595" y="1"/>
-            <a:ext cx="11525250" cy="1142999"/>
-          </a:xfrm>
-        </p:spPr>
-        <p:txBody>
-          <a:bodyPr>
-            <a:normAutofit/>
-          </a:bodyPr>
-          <a:lstStyle/>
-          <a:p>
-            <a:r>
-              <a:rPr lang="en-US" sz="4000" dirty="0">
-                <a:latin typeface="+mn-lt"/>
-                <a:cs typeface="Segoe UI" panose="020B0502040204020203" pitchFamily="34" charset="0"/>
-              </a:rPr>
-              <a:t>Resizing Images</a:t>
-            </a:r>
-            <a:endParaRPr lang="en-US" sz="4000" dirty="0">
-              <a:latin typeface="+mn-lt"/>
-            </a:endParaRPr>
-          </a:p>
-        </p:txBody>
-      </p:sp>
-    </p:spTree>
-    <p:extLst>
-      <p:ext uri="{BB962C8B-B14F-4D97-AF65-F5344CB8AC3E}">
-        <p14:creationId xmlns:p14="http://schemas.microsoft.com/office/powerpoint/2010/main" val="2099531517"/>
-      </p:ext>
-    </p:extLst>
-  </p:cSld>
-  <p:clrMapOvr>
-    <a:masterClrMapping/>
-  </p:clrMapOvr>
-  <p:timing>
-    <p:tnLst>
-      <p:par>
-        <p:cTn id="1" dur="indefinite" restart="never" nodeType="tmRoot">
-          <p:childTnLst>
-            <p:seq concurrent="1" nextAc="seek">
-              <p:cTn id="2" dur="indefinite" nodeType="mainSeq">
-                <p:childTnLst>
-                  <p:par>
-                    <p:cTn id="3" fill="hold">
-                      <p:stCondLst>
-                        <p:cond delay="indefinite"/>
-                      </p:stCondLst>
-                      <p:childTnLst>
-                        <p:par>
-                          <p:cTn id="4" fill="hold">
-                            <p:stCondLst>
-                              <p:cond delay="0"/>
-                            </p:stCondLst>
-                            <p:childTnLst>
-                              <p:par>
-                                <p:cTn id="5" presetID="1" presetClass="entr" presetSubtype="0" fill="hold" grpId="0" nodeType="clickEffect">
-                                  <p:stCondLst>
-                                    <p:cond delay="0"/>
-                                  </p:stCondLst>
-                                  <p:childTnLst>
-                                    <p:set>
-                                      <p:cBhvr>
-                                        <p:cTn id="6" dur="1" fill="hold">
-                                          <p:stCondLst>
-                                            <p:cond delay="0"/>
-                                          </p:stCondLst>
-                                        </p:cTn>
-                                        <p:tgtEl>
-                                          <p:spTgt spid="7">
-                                            <p:txEl>
-                                              <p:pRg st="1" end="1"/>
-                                            </p:txEl>
-                                          </p:spTgt>
-                                        </p:tgtEl>
-                                        <p:attrNameLst>
-                                          <p:attrName>style.visibility</p:attrName>
-                                        </p:attrNameLst>
-                                      </p:cBhvr>
-                                      <p:to>
-                                        <p:strVal val="visible"/>
-                                      </p:to>
-                                    </p:set>
-                                  </p:childTnLst>
-                                </p:cTn>
-                              </p:par>
-                              <p:par>
-                                <p:cTn id="7" presetID="1" presetClass="entr" presetSubtype="0" fill="hold" grpId="0" nodeType="withEffect">
-                                  <p:stCondLst>
-                                    <p:cond delay="0"/>
-                                  </p:stCondLst>
-                                  <p:childTnLst>
-                                    <p:set>
-                                      <p:cBhvr>
-                                        <p:cTn id="8" dur="1" fill="hold">
-                                          <p:stCondLst>
-                                            <p:cond delay="0"/>
-                                          </p:stCondLst>
-                                        </p:cTn>
-                                        <p:tgtEl>
-                                          <p:spTgt spid="7">
-                                            <p:txEl>
-                                              <p:pRg st="2" end="2"/>
-                                            </p:txEl>
-                                          </p:spTgt>
-                                        </p:tgtEl>
-                                        <p:attrNameLst>
-                                          <p:attrName>style.visibility</p:attrName>
-                                        </p:attrNameLst>
-                                      </p:cBhvr>
-                                      <p:to>
-                                        <p:strVal val="visible"/>
-                                      </p:to>
-                                    </p:set>
-                                  </p:childTnLst>
-                                </p:cTn>
-                              </p:par>
-                            </p:childTnLst>
-                          </p:cTn>
-                        </p:par>
-                      </p:childTnLst>
-                    </p:cTn>
-                  </p:par>
-                  <p:par>
-                    <p:cTn id="9" fill="hold">
-                      <p:stCondLst>
-                        <p:cond delay="indefinite"/>
-                      </p:stCondLst>
-                      <p:childTnLst>
-                        <p:par>
-                          <p:cTn id="10" fill="hold">
-                            <p:stCondLst>
-                              <p:cond delay="0"/>
-                            </p:stCondLst>
-                            <p:childTnLst>
-                              <p:par>
-                                <p:cTn id="11" presetID="1" presetClass="entr" presetSubtype="0" fill="hold" grpId="0" nodeType="clickEffect">
-                                  <p:stCondLst>
-                                    <p:cond delay="0"/>
-                                  </p:stCondLst>
-                                  <p:childTnLst>
-                                    <p:set>
-                                      <p:cBhvr>
-                                        <p:cTn id="12" dur="1" fill="hold">
-                                          <p:stCondLst>
-                                            <p:cond delay="0"/>
-                                          </p:stCondLst>
-                                        </p:cTn>
-                                        <p:tgtEl>
-                                          <p:spTgt spid="7">
-                                            <p:txEl>
-                                              <p:pRg st="3" end="3"/>
-                                            </p:txEl>
-                                          </p:spTgt>
-                                        </p:tgtEl>
-                                        <p:attrNameLst>
-                                          <p:attrName>style.visibility</p:attrName>
-                                        </p:attrNameLst>
-                                      </p:cBhvr>
-                                      <p:to>
-                                        <p:strVal val="visible"/>
-                                      </p:to>
-                                    </p:set>
-                                  </p:childTnLst>
-                                </p:cTn>
-                              </p:par>
-                              <p:par>
-                                <p:cTn id="13" presetID="1" presetClass="entr" presetSubtype="0" fill="hold" grpId="0" nodeType="withEffect">
-                                  <p:stCondLst>
-                                    <p:cond delay="0"/>
-                                  </p:stCondLst>
-                                  <p:childTnLst>
-                                    <p:set>
-                                      <p:cBhvr>
-                                        <p:cTn id="14" dur="1" fill="hold">
-                                          <p:stCondLst>
-                                            <p:cond delay="0"/>
-                                          </p:stCondLst>
-                                        </p:cTn>
-                                        <p:tgtEl>
-                                          <p:spTgt spid="7">
-                                            <p:txEl>
-                                              <p:pRg st="4" end="4"/>
-                                            </p:txEl>
-                                          </p:spTgt>
-                                        </p:tgtEl>
-                                        <p:attrNameLst>
-                                          <p:attrName>style.visibility</p:attrName>
-                                        </p:attrNameLst>
-                                      </p:cBhvr>
-                                      <p:to>
-                                        <p:strVal val="visible"/>
-                                      </p:to>
-                                    </p:set>
-                                  </p:childTnLst>
-                                </p:cTn>
-                              </p:par>
-                            </p:childTnLst>
-                          </p:cTn>
-                        </p:par>
-                      </p:childTnLst>
-                    </p:cTn>
-                  </p:par>
-                  <p:par>
-                    <p:cTn id="15" fill="hold">
-                      <p:stCondLst>
-                        <p:cond delay="indefinite"/>
-                      </p:stCondLst>
-                      <p:childTnLst>
-                        <p:par>
-                          <p:cTn id="16" fill="hold">
-                            <p:stCondLst>
-                              <p:cond delay="0"/>
-                            </p:stCondLst>
-                            <p:childTnLst>
-                              <p:par>
-                                <p:cTn id="17" presetID="1" presetClass="entr" presetSubtype="0" fill="hold" grpId="0" nodeType="clickEffect">
-                                  <p:stCondLst>
-                                    <p:cond delay="0"/>
-                                  </p:stCondLst>
-                                  <p:childTnLst>
-                                    <p:set>
-                                      <p:cBhvr>
-                                        <p:cTn id="18" dur="1" fill="hold">
-                                          <p:stCondLst>
-                                            <p:cond delay="0"/>
-                                          </p:stCondLst>
-                                        </p:cTn>
-                                        <p:tgtEl>
-                                          <p:spTgt spid="7">
-                                            <p:txEl>
-                                              <p:pRg st="5" end="5"/>
-                                            </p:txEl>
-                                          </p:spTgt>
-                                        </p:tgtEl>
-                                        <p:attrNameLst>
-                                          <p:attrName>style.visibility</p:attrName>
-                                        </p:attrNameLst>
-                                      </p:cBhvr>
-                                      <p:to>
-                                        <p:strVal val="visible"/>
-                                      </p:to>
-                                    </p:set>
-                                  </p:childTnLst>
-                                </p:cTn>
-                              </p:par>
-                              <p:par>
-                                <p:cTn id="19" presetID="1" presetClass="entr" presetSubtype="0" fill="hold" grpId="0" nodeType="withEffect">
-                                  <p:stCondLst>
-                                    <p:cond delay="0"/>
-                                  </p:stCondLst>
-                                  <p:childTnLst>
-                                    <p:set>
-                                      <p:cBhvr>
-                                        <p:cTn id="20" dur="1" fill="hold">
-                                          <p:stCondLst>
-                                            <p:cond delay="0"/>
-                                          </p:stCondLst>
-                                        </p:cTn>
-                                        <p:tgtEl>
-                                          <p:spTgt spid="7">
-                                            <p:txEl>
-                                              <p:pRg st="6" end="6"/>
-                                            </p:txEl>
-                                          </p:spTgt>
-                                        </p:tgtEl>
-                                        <p:attrNameLst>
-                                          <p:attrName>style.visibility</p:attrName>
-                                        </p:attrNameLst>
-                                      </p:cBhvr>
-                                      <p:to>
-                                        <p:strVal val="visible"/>
-                                      </p:to>
-                                    </p:set>
-                                  </p:childTnLst>
-                                </p:cTn>
-                              </p:par>
-                              <p:par>
-                                <p:cTn id="21" presetID="1" presetClass="entr" presetSubtype="0" fill="hold" grpId="0" nodeType="withEffect">
-                                  <p:stCondLst>
-                                    <p:cond delay="0"/>
-                                  </p:stCondLst>
-                                  <p:childTnLst>
-                                    <p:set>
-                                      <p:cBhvr>
-                                        <p:cTn id="22" dur="1" fill="hold">
-                                          <p:stCondLst>
-                                            <p:cond delay="0"/>
-                                          </p:stCondLst>
-                                        </p:cTn>
-                                        <p:tgtEl>
-                                          <p:spTgt spid="7">
-                                            <p:txEl>
-                                              <p:pRg st="7" end="7"/>
-                                            </p:txEl>
-                                          </p:spTgt>
-                                        </p:tgtEl>
-                                        <p:attrNameLst>
-                                          <p:attrName>style.visibility</p:attrName>
-                                        </p:attrNameLst>
-                                      </p:cBhvr>
-                                      <p:to>
-                                        <p:strVal val="visible"/>
-                                      </p:to>
-                                    </p:set>
-                                  </p:childTnLst>
-                                </p:cTn>
-                              </p:par>
-                              <p:par>
-                                <p:cTn id="23" presetID="1" presetClass="entr" presetSubtype="0" fill="hold" grpId="0" nodeType="withEffect">
-                                  <p:stCondLst>
-                                    <p:cond delay="0"/>
-                                  </p:stCondLst>
-                                  <p:childTnLst>
-                                    <p:set>
-                                      <p:cBhvr>
-                                        <p:cTn id="24" dur="1" fill="hold">
-                                          <p:stCondLst>
-                                            <p:cond delay="0"/>
-                                          </p:stCondLst>
-                                        </p:cTn>
-                                        <p:tgtEl>
-                                          <p:spTgt spid="7">
-                                            <p:txEl>
-                                              <p:pRg st="8" end="8"/>
-                                            </p:txEl>
-                                          </p:spTgt>
-                                        </p:tgtEl>
-                                        <p:attrNameLst>
-                                          <p:attrName>style.visibility</p:attrName>
-                                        </p:attrNameLst>
-                                      </p:cBhvr>
-                                      <p:to>
-                                        <p:strVal val="visible"/>
-                                      </p:to>
-                                    </p:set>
-                                  </p:childTnLst>
-                                </p:cTn>
-                              </p:par>
-                              <p:par>
-                                <p:cTn id="25" presetID="1" presetClass="entr" presetSubtype="0" fill="hold" grpId="0" nodeType="withEffect">
-                                  <p:stCondLst>
-                                    <p:cond delay="0"/>
-                                  </p:stCondLst>
-                                  <p:childTnLst>
-                                    <p:set>
-                                      <p:cBhvr>
-                                        <p:cTn id="26" dur="1" fill="hold">
-                                          <p:stCondLst>
-                                            <p:cond delay="0"/>
-                                          </p:stCondLst>
-                                        </p:cTn>
-                                        <p:tgtEl>
-                                          <p:spTgt spid="7">
-                                            <p:txEl>
-                                              <p:pRg st="9" end="9"/>
                                             </p:txEl>
                                           </p:spTgt>
                                         </p:tgtEl>
@@ -32436,6 +32068,580 @@
                 <a:ea typeface="Segoe UI" panose="020B0502040204020203" pitchFamily="34" charset="0"/>
                 <a:cs typeface="Segoe UI" panose="020B0502040204020203" pitchFamily="34" charset="0"/>
               </a:rPr>
+              <a:t>Resizing algorithms use interpolated values for pixel centres </a:t>
+            </a:r>
+          </a:p>
+          <a:p>
+            <a:r>
+              <a:rPr lang="en-GB" dirty="0">
+                <a:ea typeface="Segoe UI" panose="020B0502040204020203" pitchFamily="34" charset="0"/>
+                <a:cs typeface="Segoe UI" panose="020B0502040204020203" pitchFamily="34" charset="0"/>
+              </a:rPr>
+              <a:t>For even factors of 2 resizing use mean interpolations </a:t>
+            </a:r>
+          </a:p>
+          <a:p>
+            <a:pPr lvl="1"/>
+            <a:r>
+              <a:rPr lang="en-GB" dirty="0">
+                <a:ea typeface="Segoe UI" panose="020B0502040204020203" pitchFamily="34" charset="0"/>
+                <a:cs typeface="Segoe UI" panose="020B0502040204020203" pitchFamily="34" charset="0"/>
+              </a:rPr>
+              <a:t>Use averages of adjacent pixel values </a:t>
+            </a:r>
+          </a:p>
+          <a:p>
+            <a:r>
+              <a:rPr lang="en-GB" dirty="0">
+                <a:ea typeface="Segoe UI" panose="020B0502040204020203" pitchFamily="34" charset="0"/>
+                <a:cs typeface="Segoe UI" panose="020B0502040204020203" pitchFamily="34" charset="0"/>
+              </a:rPr>
+              <a:t>Arbitrary resizing can use </a:t>
+            </a:r>
+            <a:r>
+              <a:rPr lang="en-GB" b="1" dirty="0">
+                <a:ea typeface="Segoe UI" panose="020B0502040204020203" pitchFamily="34" charset="0"/>
+                <a:cs typeface="Segoe UI" panose="020B0502040204020203" pitchFamily="34" charset="0"/>
+              </a:rPr>
+              <a:t>spline interpolation </a:t>
+            </a:r>
+            <a:r>
+              <a:rPr lang="en-GB" dirty="0">
+                <a:ea typeface="Segoe UI" panose="020B0502040204020203" pitchFamily="34" charset="0"/>
+                <a:cs typeface="Segoe UI" panose="020B0502040204020203" pitchFamily="34" charset="0"/>
+              </a:rPr>
+              <a:t>or </a:t>
+            </a:r>
+            <a:r>
+              <a:rPr lang="en-GB" b="1" dirty="0">
+                <a:ea typeface="Segoe UI" panose="020B0502040204020203" pitchFamily="34" charset="0"/>
+                <a:cs typeface="Segoe UI" panose="020B0502040204020203" pitchFamily="34" charset="0"/>
+              </a:rPr>
+              <a:t>bilinear interpolation</a:t>
+            </a:r>
+          </a:p>
+          <a:p>
+            <a:pPr lvl="1"/>
+            <a:r>
+              <a:rPr lang="en-GB" dirty="0">
+                <a:ea typeface="Segoe UI" panose="020B0502040204020203" pitchFamily="34" charset="0"/>
+                <a:cs typeface="Segoe UI" panose="020B0502040204020203" pitchFamily="34" charset="0"/>
+              </a:rPr>
+              <a:t>Interpolate from original image pixel centre values to resized image pixel values </a:t>
+            </a:r>
+          </a:p>
+          <a:p>
+            <a:r>
+              <a:rPr lang="en-GB" dirty="0">
+                <a:ea typeface="Segoe UI" panose="020B0502040204020203" pitchFamily="34" charset="0"/>
+                <a:cs typeface="Segoe UI" panose="020B0502040204020203" pitchFamily="34" charset="0"/>
+              </a:rPr>
+              <a:t>Many other interpolation methods are used</a:t>
+            </a:r>
+          </a:p>
+          <a:p>
+            <a:pPr lvl="1"/>
+            <a:r>
+              <a:rPr lang="en-GB" dirty="0">
+                <a:ea typeface="Segoe UI" panose="020B0502040204020203" pitchFamily="34" charset="0"/>
+                <a:cs typeface="Segoe UI" panose="020B0502040204020203" pitchFamily="34" charset="0"/>
+              </a:rPr>
+              <a:t>PCA/SVD and other generative models</a:t>
+            </a:r>
+          </a:p>
+          <a:p>
+            <a:pPr lvl="1"/>
+            <a:r>
+              <a:rPr lang="en-GB" dirty="0">
+                <a:ea typeface="Segoe UI" panose="020B0502040204020203" pitchFamily="34" charset="0"/>
+                <a:cs typeface="Segoe UI" panose="020B0502040204020203" pitchFamily="34" charset="0"/>
+              </a:rPr>
+              <a:t>Gaussian convolutional filters</a:t>
+            </a:r>
+          </a:p>
+          <a:p>
+            <a:pPr lvl="1"/>
+            <a:r>
+              <a:rPr lang="en-GB" dirty="0">
+                <a:ea typeface="Segoe UI" panose="020B0502040204020203" pitchFamily="34" charset="0"/>
+                <a:cs typeface="Segoe UI" panose="020B0502040204020203" pitchFamily="34" charset="0"/>
+              </a:rPr>
+              <a:t>Super-resolution deep convolutional neural networks </a:t>
+            </a:r>
+          </a:p>
+          <a:p>
+            <a:pPr lvl="1"/>
+            <a:r>
+              <a:rPr lang="en-GB" dirty="0">
+                <a:ea typeface="Segoe UI" panose="020B0502040204020203" pitchFamily="34" charset="0"/>
+                <a:cs typeface="Segoe UI" panose="020B0502040204020203" pitchFamily="34" charset="0"/>
+              </a:rPr>
+              <a:t>More on these later</a:t>
+            </a:r>
+          </a:p>
+        </p:txBody>
+      </p:sp>
+      <p:sp>
+        <p:nvSpPr>
+          <p:cNvPr id="2" name="Title 1"/>
+          <p:cNvSpPr>
+            <a:spLocks noGrp="1"/>
+          </p:cNvSpPr>
+          <p:nvPr>
+            <p:ph type="title"/>
+          </p:nvPr>
+        </p:nvSpPr>
+        <p:spPr>
+          <a:xfrm>
+            <a:off x="378595" y="1"/>
+            <a:ext cx="11525250" cy="1142999"/>
+          </a:xfrm>
+        </p:spPr>
+        <p:txBody>
+          <a:bodyPr>
+            <a:normAutofit/>
+          </a:bodyPr>
+          <a:lstStyle/>
+          <a:p>
+            <a:r>
+              <a:rPr lang="en-US" sz="4000" dirty="0">
+                <a:latin typeface="+mn-lt"/>
+                <a:cs typeface="Segoe UI" panose="020B0502040204020203" pitchFamily="34" charset="0"/>
+              </a:rPr>
+              <a:t>Resizing Images</a:t>
+            </a:r>
+            <a:endParaRPr lang="en-US" sz="4000" dirty="0">
+              <a:latin typeface="+mn-lt"/>
+            </a:endParaRPr>
+          </a:p>
+        </p:txBody>
+      </p:sp>
+    </p:spTree>
+    <p:extLst>
+      <p:ext uri="{BB962C8B-B14F-4D97-AF65-F5344CB8AC3E}">
+        <p14:creationId xmlns:p14="http://schemas.microsoft.com/office/powerpoint/2010/main" val="2099531517"/>
+      </p:ext>
+    </p:extLst>
+  </p:cSld>
+  <p:clrMapOvr>
+    <a:masterClrMapping/>
+  </p:clrMapOvr>
+  <p:timing>
+    <p:tnLst>
+      <p:par>
+        <p:cTn id="1" dur="indefinite" restart="never" nodeType="tmRoot">
+          <p:childTnLst>
+            <p:seq concurrent="1" nextAc="seek">
+              <p:cTn id="2" dur="indefinite" nodeType="mainSeq">
+                <p:childTnLst>
+                  <p:par>
+                    <p:cTn id="3" fill="hold">
+                      <p:stCondLst>
+                        <p:cond delay="indefinite"/>
+                      </p:stCondLst>
+                      <p:childTnLst>
+                        <p:par>
+                          <p:cTn id="4" fill="hold">
+                            <p:stCondLst>
+                              <p:cond delay="0"/>
+                            </p:stCondLst>
+                            <p:childTnLst>
+                              <p:par>
+                                <p:cTn id="5" presetID="1" presetClass="entr" presetSubtype="0" fill="hold" grpId="0" nodeType="clickEffect">
+                                  <p:stCondLst>
+                                    <p:cond delay="0"/>
+                                  </p:stCondLst>
+                                  <p:childTnLst>
+                                    <p:set>
+                                      <p:cBhvr>
+                                        <p:cTn id="6" dur="1" fill="hold">
+                                          <p:stCondLst>
+                                            <p:cond delay="0"/>
+                                          </p:stCondLst>
+                                        </p:cTn>
+                                        <p:tgtEl>
+                                          <p:spTgt spid="7">
+                                            <p:txEl>
+                                              <p:pRg st="1" end="1"/>
+                                            </p:txEl>
+                                          </p:spTgt>
+                                        </p:tgtEl>
+                                        <p:attrNameLst>
+                                          <p:attrName>style.visibility</p:attrName>
+                                        </p:attrNameLst>
+                                      </p:cBhvr>
+                                      <p:to>
+                                        <p:strVal val="visible"/>
+                                      </p:to>
+                                    </p:set>
+                                  </p:childTnLst>
+                                </p:cTn>
+                              </p:par>
+                              <p:par>
+                                <p:cTn id="7" presetID="1" presetClass="entr" presetSubtype="0" fill="hold" grpId="0" nodeType="withEffect">
+                                  <p:stCondLst>
+                                    <p:cond delay="0"/>
+                                  </p:stCondLst>
+                                  <p:childTnLst>
+                                    <p:set>
+                                      <p:cBhvr>
+                                        <p:cTn id="8" dur="1" fill="hold">
+                                          <p:stCondLst>
+                                            <p:cond delay="0"/>
+                                          </p:stCondLst>
+                                        </p:cTn>
+                                        <p:tgtEl>
+                                          <p:spTgt spid="7">
+                                            <p:txEl>
+                                              <p:pRg st="2" end="2"/>
+                                            </p:txEl>
+                                          </p:spTgt>
+                                        </p:tgtEl>
+                                        <p:attrNameLst>
+                                          <p:attrName>style.visibility</p:attrName>
+                                        </p:attrNameLst>
+                                      </p:cBhvr>
+                                      <p:to>
+                                        <p:strVal val="visible"/>
+                                      </p:to>
+                                    </p:set>
+                                  </p:childTnLst>
+                                </p:cTn>
+                              </p:par>
+                            </p:childTnLst>
+                          </p:cTn>
+                        </p:par>
+                      </p:childTnLst>
+                    </p:cTn>
+                  </p:par>
+                  <p:par>
+                    <p:cTn id="9" fill="hold">
+                      <p:stCondLst>
+                        <p:cond delay="indefinite"/>
+                      </p:stCondLst>
+                      <p:childTnLst>
+                        <p:par>
+                          <p:cTn id="10" fill="hold">
+                            <p:stCondLst>
+                              <p:cond delay="0"/>
+                            </p:stCondLst>
+                            <p:childTnLst>
+                              <p:par>
+                                <p:cTn id="11" presetID="1" presetClass="entr" presetSubtype="0" fill="hold" grpId="0" nodeType="clickEffect">
+                                  <p:stCondLst>
+                                    <p:cond delay="0"/>
+                                  </p:stCondLst>
+                                  <p:childTnLst>
+                                    <p:set>
+                                      <p:cBhvr>
+                                        <p:cTn id="12" dur="1" fill="hold">
+                                          <p:stCondLst>
+                                            <p:cond delay="0"/>
+                                          </p:stCondLst>
+                                        </p:cTn>
+                                        <p:tgtEl>
+                                          <p:spTgt spid="7">
+                                            <p:txEl>
+                                              <p:pRg st="3" end="3"/>
+                                            </p:txEl>
+                                          </p:spTgt>
+                                        </p:tgtEl>
+                                        <p:attrNameLst>
+                                          <p:attrName>style.visibility</p:attrName>
+                                        </p:attrNameLst>
+                                      </p:cBhvr>
+                                      <p:to>
+                                        <p:strVal val="visible"/>
+                                      </p:to>
+                                    </p:set>
+                                  </p:childTnLst>
+                                </p:cTn>
+                              </p:par>
+                              <p:par>
+                                <p:cTn id="13" presetID="1" presetClass="entr" presetSubtype="0" fill="hold" grpId="0" nodeType="withEffect">
+                                  <p:stCondLst>
+                                    <p:cond delay="0"/>
+                                  </p:stCondLst>
+                                  <p:childTnLst>
+                                    <p:set>
+                                      <p:cBhvr>
+                                        <p:cTn id="14" dur="1" fill="hold">
+                                          <p:stCondLst>
+                                            <p:cond delay="0"/>
+                                          </p:stCondLst>
+                                        </p:cTn>
+                                        <p:tgtEl>
+                                          <p:spTgt spid="7">
+                                            <p:txEl>
+                                              <p:pRg st="4" end="4"/>
+                                            </p:txEl>
+                                          </p:spTgt>
+                                        </p:tgtEl>
+                                        <p:attrNameLst>
+                                          <p:attrName>style.visibility</p:attrName>
+                                        </p:attrNameLst>
+                                      </p:cBhvr>
+                                      <p:to>
+                                        <p:strVal val="visible"/>
+                                      </p:to>
+                                    </p:set>
+                                  </p:childTnLst>
+                                </p:cTn>
+                              </p:par>
+                            </p:childTnLst>
+                          </p:cTn>
+                        </p:par>
+                      </p:childTnLst>
+                    </p:cTn>
+                  </p:par>
+                  <p:par>
+                    <p:cTn id="15" fill="hold">
+                      <p:stCondLst>
+                        <p:cond delay="indefinite"/>
+                      </p:stCondLst>
+                      <p:childTnLst>
+                        <p:par>
+                          <p:cTn id="16" fill="hold">
+                            <p:stCondLst>
+                              <p:cond delay="0"/>
+                            </p:stCondLst>
+                            <p:childTnLst>
+                              <p:par>
+                                <p:cTn id="17" presetID="1" presetClass="entr" presetSubtype="0" fill="hold" grpId="0" nodeType="clickEffect">
+                                  <p:stCondLst>
+                                    <p:cond delay="0"/>
+                                  </p:stCondLst>
+                                  <p:childTnLst>
+                                    <p:set>
+                                      <p:cBhvr>
+                                        <p:cTn id="18" dur="1" fill="hold">
+                                          <p:stCondLst>
+                                            <p:cond delay="0"/>
+                                          </p:stCondLst>
+                                        </p:cTn>
+                                        <p:tgtEl>
+                                          <p:spTgt spid="7">
+                                            <p:txEl>
+                                              <p:pRg st="5" end="5"/>
+                                            </p:txEl>
+                                          </p:spTgt>
+                                        </p:tgtEl>
+                                        <p:attrNameLst>
+                                          <p:attrName>style.visibility</p:attrName>
+                                        </p:attrNameLst>
+                                      </p:cBhvr>
+                                      <p:to>
+                                        <p:strVal val="visible"/>
+                                      </p:to>
+                                    </p:set>
+                                  </p:childTnLst>
+                                </p:cTn>
+                              </p:par>
+                              <p:par>
+                                <p:cTn id="19" presetID="1" presetClass="entr" presetSubtype="0" fill="hold" grpId="0" nodeType="withEffect">
+                                  <p:stCondLst>
+                                    <p:cond delay="0"/>
+                                  </p:stCondLst>
+                                  <p:childTnLst>
+                                    <p:set>
+                                      <p:cBhvr>
+                                        <p:cTn id="20" dur="1" fill="hold">
+                                          <p:stCondLst>
+                                            <p:cond delay="0"/>
+                                          </p:stCondLst>
+                                        </p:cTn>
+                                        <p:tgtEl>
+                                          <p:spTgt spid="7">
+                                            <p:txEl>
+                                              <p:pRg st="6" end="6"/>
+                                            </p:txEl>
+                                          </p:spTgt>
+                                        </p:tgtEl>
+                                        <p:attrNameLst>
+                                          <p:attrName>style.visibility</p:attrName>
+                                        </p:attrNameLst>
+                                      </p:cBhvr>
+                                      <p:to>
+                                        <p:strVal val="visible"/>
+                                      </p:to>
+                                    </p:set>
+                                  </p:childTnLst>
+                                </p:cTn>
+                              </p:par>
+                              <p:par>
+                                <p:cTn id="21" presetID="1" presetClass="entr" presetSubtype="0" fill="hold" grpId="0" nodeType="withEffect">
+                                  <p:stCondLst>
+                                    <p:cond delay="0"/>
+                                  </p:stCondLst>
+                                  <p:childTnLst>
+                                    <p:set>
+                                      <p:cBhvr>
+                                        <p:cTn id="22" dur="1" fill="hold">
+                                          <p:stCondLst>
+                                            <p:cond delay="0"/>
+                                          </p:stCondLst>
+                                        </p:cTn>
+                                        <p:tgtEl>
+                                          <p:spTgt spid="7">
+                                            <p:txEl>
+                                              <p:pRg st="7" end="7"/>
+                                            </p:txEl>
+                                          </p:spTgt>
+                                        </p:tgtEl>
+                                        <p:attrNameLst>
+                                          <p:attrName>style.visibility</p:attrName>
+                                        </p:attrNameLst>
+                                      </p:cBhvr>
+                                      <p:to>
+                                        <p:strVal val="visible"/>
+                                      </p:to>
+                                    </p:set>
+                                  </p:childTnLst>
+                                </p:cTn>
+                              </p:par>
+                              <p:par>
+                                <p:cTn id="23" presetID="1" presetClass="entr" presetSubtype="0" fill="hold" grpId="0" nodeType="withEffect">
+                                  <p:stCondLst>
+                                    <p:cond delay="0"/>
+                                  </p:stCondLst>
+                                  <p:childTnLst>
+                                    <p:set>
+                                      <p:cBhvr>
+                                        <p:cTn id="24" dur="1" fill="hold">
+                                          <p:stCondLst>
+                                            <p:cond delay="0"/>
+                                          </p:stCondLst>
+                                        </p:cTn>
+                                        <p:tgtEl>
+                                          <p:spTgt spid="7">
+                                            <p:txEl>
+                                              <p:pRg st="8" end="8"/>
+                                            </p:txEl>
+                                          </p:spTgt>
+                                        </p:tgtEl>
+                                        <p:attrNameLst>
+                                          <p:attrName>style.visibility</p:attrName>
+                                        </p:attrNameLst>
+                                      </p:cBhvr>
+                                      <p:to>
+                                        <p:strVal val="visible"/>
+                                      </p:to>
+                                    </p:set>
+                                  </p:childTnLst>
+                                </p:cTn>
+                              </p:par>
+                              <p:par>
+                                <p:cTn id="25" presetID="1" presetClass="entr" presetSubtype="0" fill="hold" grpId="0" nodeType="withEffect">
+                                  <p:stCondLst>
+                                    <p:cond delay="0"/>
+                                  </p:stCondLst>
+                                  <p:childTnLst>
+                                    <p:set>
+                                      <p:cBhvr>
+                                        <p:cTn id="26" dur="1" fill="hold">
+                                          <p:stCondLst>
+                                            <p:cond delay="0"/>
+                                          </p:stCondLst>
+                                        </p:cTn>
+                                        <p:tgtEl>
+                                          <p:spTgt spid="7">
+                                            <p:txEl>
+                                              <p:pRg st="9" end="9"/>
+                                            </p:txEl>
+                                          </p:spTgt>
+                                        </p:tgtEl>
+                                        <p:attrNameLst>
+                                          <p:attrName>style.visibility</p:attrName>
+                                        </p:attrNameLst>
+                                      </p:cBhvr>
+                                      <p:to>
+                                        <p:strVal val="visible"/>
+                                      </p:to>
+                                    </p:set>
+                                  </p:childTnLst>
+                                </p:cTn>
+                              </p:par>
+                            </p:childTnLst>
+                          </p:cTn>
+                        </p:par>
+                      </p:childTnLst>
+                    </p:cTn>
+                  </p:par>
+                </p:childTnLst>
+              </p:cTn>
+              <p:prevCondLst>
+                <p:cond evt="onPrev" delay="0">
+                  <p:tgtEl>
+                    <p:sldTgt/>
+                  </p:tgtEl>
+                </p:cond>
+              </p:prevCondLst>
+              <p:nextCondLst>
+                <p:cond evt="onNext" delay="0">
+                  <p:tgtEl>
+                    <p:sldTgt/>
+                  </p:tgtEl>
+                </p:cond>
+              </p:nextCondLst>
+            </p:seq>
+          </p:childTnLst>
+        </p:cTn>
+      </p:par>
+    </p:tnLst>
+    <p:bldLst>
+      <p:bldP spid="7" grpId="0" uiExpand="1" build="p"/>
+    </p:bldLst>
+  </p:timing>
+</p:sld>
+</file>
+
+<file path=ppt/slides/slide41.xml><?xml version="1.0" encoding="utf-8"?>
+<p:sld xmlns:a="http://schemas.openxmlformats.org/drawingml/2006/main" xmlns:r="http://schemas.openxmlformats.org/officeDocument/2006/relationships" xmlns:p="http://schemas.openxmlformats.org/presentationml/2006/main">
+  <p:cSld>
+    <p:spTree>
+      <p:nvGrpSpPr>
+        <p:cNvPr id="1" name=""/>
+        <p:cNvGrpSpPr/>
+        <p:nvPr/>
+      </p:nvGrpSpPr>
+      <p:grpSpPr>
+        <a:xfrm>
+          <a:off x="0" y="0"/>
+          <a:ext cx="0" cy="0"/>
+          <a:chOff x="0" y="0"/>
+          <a:chExt cx="0" cy="0"/>
+        </a:xfrm>
+      </p:grpSpPr>
+      <p:sp>
+        <p:nvSpPr>
+          <p:cNvPr id="7" name="Content Placeholder 6"/>
+          <p:cNvSpPr>
+            <a:spLocks noGrp="1"/>
+          </p:cNvSpPr>
+          <p:nvPr>
+            <p:ph sz="quarter" idx="10"/>
+          </p:nvPr>
+        </p:nvSpPr>
+        <p:spPr>
+          <a:xfrm>
+            <a:off x="378595" y="1399631"/>
+            <a:ext cx="11525250" cy="4972369"/>
+          </a:xfrm>
+        </p:spPr>
+        <p:txBody>
+          <a:bodyPr>
+            <a:normAutofit/>
+          </a:bodyPr>
+          <a:lstStyle/>
+          <a:p>
+            <a:pPr marL="0" indent="0">
+              <a:buNone/>
+            </a:pPr>
+            <a:r>
+              <a:rPr lang="en-GB" dirty="0">
+                <a:ea typeface="Segoe UI" panose="020B0502040204020203" pitchFamily="34" charset="0"/>
+                <a:cs typeface="Segoe UI" panose="020B0502040204020203" pitchFamily="34" charset="0"/>
+              </a:rPr>
               <a:t>Performance of computer vision algorithms can never be better than the input image   </a:t>
             </a:r>
           </a:p>
@@ -32787,7 +32993,7 @@
 </p:sld>
 </file>
 
-<file path=ppt/slides/slide41.xml><?xml version="1.0" encoding="utf-8"?>
+<file path=ppt/slides/slide42.xml><?xml version="1.0" encoding="utf-8"?>
 <p:sld xmlns:a="http://schemas.openxmlformats.org/drawingml/2006/main" xmlns:r="http://schemas.openxmlformats.org/officeDocument/2006/relationships" xmlns:p="http://schemas.openxmlformats.org/presentationml/2006/main">
   <p:cSld>
     <p:spTree>
@@ -33426,7 +33632,7 @@
 </p:sld>
 </file>
 
-<file path=ppt/slides/slide42.xml><?xml version="1.0" encoding="utf-8"?>
+<file path=ppt/slides/slide43.xml><?xml version="1.0" encoding="utf-8"?>
 <p:sld xmlns:a="http://schemas.openxmlformats.org/drawingml/2006/main" xmlns:r="http://schemas.openxmlformats.org/officeDocument/2006/relationships" xmlns:p="http://schemas.openxmlformats.org/presentationml/2006/main">
   <p:cSld>
     <p:spTree>
@@ -33772,7 +33978,7 @@
 </p:sld>
 </file>
 
-<file path=ppt/slides/slide43.xml><?xml version="1.0" encoding="utf-8"?>
+<file path=ppt/slides/slide44.xml><?xml version="1.0" encoding="utf-8"?>
 <p:sld xmlns:a="http://schemas.openxmlformats.org/drawingml/2006/main" xmlns:r="http://schemas.openxmlformats.org/officeDocument/2006/relationships" xmlns:p="http://schemas.openxmlformats.org/presentationml/2006/main">
   <p:cSld>
     <p:spTree>
@@ -34047,7 +34253,7 @@
 </p:sld>
 </file>
 
-<file path=ppt/slides/slide44.xml><?xml version="1.0" encoding="utf-8"?>
+<file path=ppt/slides/slide45.xml><?xml version="1.0" encoding="utf-8"?>
 <p:sld xmlns:a="http://schemas.openxmlformats.org/drawingml/2006/main" xmlns:r="http://schemas.openxmlformats.org/officeDocument/2006/relationships" xmlns:p="http://schemas.openxmlformats.org/presentationml/2006/main">
   <p:cSld>
     <p:spTree>
@@ -34617,7 +34823,7 @@
 </p:sld>
 </file>
 
-<file path=ppt/slides/slide45.xml><?xml version="1.0" encoding="utf-8"?>
+<file path=ppt/slides/slide46.xml><?xml version="1.0" encoding="utf-8"?>
 <p:sld xmlns:a="http://schemas.openxmlformats.org/drawingml/2006/main" xmlns:r="http://schemas.openxmlformats.org/officeDocument/2006/relationships" xmlns:p="http://schemas.openxmlformats.org/presentationml/2006/main">
   <p:cSld>
     <p:spTree>
@@ -35094,7 +35300,7 @@
 </p:sld>
 </file>
 
-<file path=ppt/slides/slide46.xml><?xml version="1.0" encoding="utf-8"?>
+<file path=ppt/slides/slide47.xml><?xml version="1.0" encoding="utf-8"?>
 <p:sld xmlns:a="http://schemas.openxmlformats.org/drawingml/2006/main" xmlns:r="http://schemas.openxmlformats.org/officeDocument/2006/relationships" xmlns:p="http://schemas.openxmlformats.org/presentationml/2006/main">
   <p:cSld>
     <p:spTree>
@@ -35594,7 +35800,7 @@
 </p:sld>
 </file>
 
-<file path=ppt/slides/slide47.xml><?xml version="1.0" encoding="utf-8"?>
+<file path=ppt/slides/slide48.xml><?xml version="1.0" encoding="utf-8"?>
 <p:sld xmlns:a="http://schemas.openxmlformats.org/drawingml/2006/main" xmlns:r="http://schemas.openxmlformats.org/officeDocument/2006/relationships" xmlns:p="http://schemas.openxmlformats.org/presentationml/2006/main">
   <p:cSld>
     <p:spTree>
@@ -36009,7 +36215,7 @@
 </p:sld>
 </file>
 
-<file path=ppt/slides/slide48.xml><?xml version="1.0" encoding="utf-8"?>
+<file path=ppt/slides/slide49.xml><?xml version="1.0" encoding="utf-8"?>
 <p:sld xmlns:a="http://schemas.openxmlformats.org/drawingml/2006/main" xmlns:r="http://schemas.openxmlformats.org/officeDocument/2006/relationships" xmlns:p="http://schemas.openxmlformats.org/presentationml/2006/main">
   <p:cSld>
     <p:spTree>
@@ -36423,7 +36629,176 @@
 </p:sld>
 </file>
 
-<file path=ppt/slides/slide49.xml><?xml version="1.0" encoding="utf-8"?>
+<file path=ppt/slides/slide5.xml><?xml version="1.0" encoding="utf-8"?>
+<p:sld xmlns:a="http://schemas.openxmlformats.org/drawingml/2006/main" xmlns:r="http://schemas.openxmlformats.org/officeDocument/2006/relationships" xmlns:p="http://schemas.openxmlformats.org/presentationml/2006/main">
+  <p:cSld>
+    <p:spTree>
+      <p:nvGrpSpPr>
+        <p:cNvPr id="1" name=""/>
+        <p:cNvGrpSpPr/>
+        <p:nvPr/>
+      </p:nvGrpSpPr>
+      <p:grpSpPr>
+        <a:xfrm>
+          <a:off x="0" y="0"/>
+          <a:ext cx="0" cy="0"/>
+          <a:chOff x="0" y="0"/>
+          <a:chExt cx="0" cy="0"/>
+        </a:xfrm>
+      </p:grpSpPr>
+      <p:sp>
+        <p:nvSpPr>
+          <p:cNvPr id="2" name="Title 1">
+            <a:extLst>
+              <a:ext uri="{FF2B5EF4-FFF2-40B4-BE49-F238E27FC236}">
+                <a16:creationId xmlns:a16="http://schemas.microsoft.com/office/drawing/2014/main" id="{FDA802E0-8834-4A3F-B84B-C334800C9753}"/>
+              </a:ext>
+            </a:extLst>
+          </p:cNvPr>
+          <p:cNvSpPr>
+            <a:spLocks noGrp="1"/>
+          </p:cNvSpPr>
+          <p:nvPr>
+            <p:ph type="title"/>
+          </p:nvPr>
+        </p:nvSpPr>
+        <p:spPr>
+          <a:xfrm>
+            <a:off x="838199" y="262439"/>
+            <a:ext cx="10515600" cy="583504"/>
+          </a:xfrm>
+        </p:spPr>
+        <p:txBody>
+          <a:bodyPr>
+            <a:normAutofit fontScale="90000"/>
+          </a:bodyPr>
+          <a:lstStyle/>
+          <a:p>
+            <a:r>
+              <a:rPr lang="en-US" dirty="0">
+                <a:latin typeface="+mn-lt"/>
+              </a:rPr>
+              <a:t>Medical Application of Computer Vision</a:t>
+            </a:r>
+          </a:p>
+        </p:txBody>
+      </p:sp>
+      <p:pic>
+        <p:nvPicPr>
+          <p:cNvPr id="4" name="Picture 3">
+            <a:extLst>
+              <a:ext uri="{FF2B5EF4-FFF2-40B4-BE49-F238E27FC236}">
+                <a16:creationId xmlns:a16="http://schemas.microsoft.com/office/drawing/2014/main" id="{77563C94-51BC-431E-B60F-39D8489899F0}"/>
+              </a:ext>
+            </a:extLst>
+          </p:cNvPr>
+          <p:cNvPicPr>
+            <a:picLocks noChangeAspect="1"/>
+          </p:cNvPicPr>
+          <p:nvPr/>
+        </p:nvPicPr>
+        <p:blipFill>
+          <a:blip r:embed="rId2"/>
+          <a:stretch>
+            <a:fillRect/>
+          </a:stretch>
+        </p:blipFill>
+        <p:spPr>
+          <a:xfrm>
+            <a:off x="1046425" y="962320"/>
+            <a:ext cx="9241797" cy="3927176"/>
+          </a:xfrm>
+          <a:prstGeom prst="rect">
+            <a:avLst/>
+          </a:prstGeom>
+        </p:spPr>
+      </p:pic>
+      <p:sp>
+        <p:nvSpPr>
+          <p:cNvPr id="5" name="TextBox 4">
+            <a:extLst>
+              <a:ext uri="{FF2B5EF4-FFF2-40B4-BE49-F238E27FC236}">
+                <a16:creationId xmlns:a16="http://schemas.microsoft.com/office/drawing/2014/main" id="{6602666B-3A66-442A-8183-0B640B8F2638}"/>
+              </a:ext>
+            </a:extLst>
+          </p:cNvPr>
+          <p:cNvSpPr txBox="1"/>
+          <p:nvPr/>
+        </p:nvSpPr>
+        <p:spPr>
+          <a:xfrm>
+            <a:off x="658498" y="4840940"/>
+            <a:ext cx="10875003" cy="1938992"/>
+          </a:xfrm>
+          <a:prstGeom prst="rect">
+            <a:avLst/>
+          </a:prstGeom>
+          <a:noFill/>
+        </p:spPr>
+        <p:txBody>
+          <a:bodyPr wrap="square" rtlCol="0">
+            <a:spAutoFit/>
+          </a:bodyPr>
+          <a:lstStyle/>
+          <a:p>
+            <a:r>
+              <a:rPr lang="en-US" sz="2800" dirty="0"/>
+              <a:t>Learning to virtually stain histological samples to simplify pathology diagnoses</a:t>
+            </a:r>
+          </a:p>
+          <a:p>
+            <a:endParaRPr lang="en-US" sz="2800" dirty="0"/>
+          </a:p>
+          <a:p>
+            <a:r>
+              <a:rPr lang="en-US" dirty="0" err="1">
+                <a:hlinkClick r:id="rId3"/>
+              </a:rPr>
+              <a:t>Hnna</a:t>
+            </a:r>
+            <a:r>
+              <a:rPr lang="en-US" dirty="0">
+                <a:hlinkClick r:id="rId3"/>
+              </a:rPr>
+              <a:t>,  et. al., </a:t>
+            </a:r>
+            <a:r>
+              <a:rPr lang="en-US" b="0" i="0" dirty="0">
+                <a:solidFill>
+                  <a:srgbClr val="000000"/>
+                </a:solidFill>
+                <a:effectLst/>
+                <a:hlinkClick r:id="rId3"/>
+              </a:rPr>
+              <a:t>Deep learning-based transformation of H&amp;E stained tissues into special stains, Nature</a:t>
+            </a:r>
+            <a:r>
+              <a:rPr lang="en-US" dirty="0">
+                <a:solidFill>
+                  <a:srgbClr val="000000"/>
+                </a:solidFill>
+                <a:hlinkClick r:id="rId3"/>
+              </a:rPr>
+              <a:t> Communications, 2021.</a:t>
+            </a:r>
+            <a:endParaRPr lang="en-US" dirty="0"/>
+          </a:p>
+        </p:txBody>
+      </p:sp>
+    </p:spTree>
+    <p:extLst>
+      <p:ext uri="{BB962C8B-B14F-4D97-AF65-F5344CB8AC3E}">
+        <p14:creationId xmlns:p14="http://schemas.microsoft.com/office/powerpoint/2010/main" val="2643378001"/>
+      </p:ext>
+    </p:extLst>
+  </p:cSld>
+  <p:clrMapOvr>
+    <a:masterClrMapping/>
+  </p:clrMapOvr>
+</p:sld>
+</file>
+
+<file path=ppt/slides/slide50.xml><?xml version="1.0" encoding="utf-8"?>
 <p:sld xmlns:a="http://schemas.openxmlformats.org/drawingml/2006/main" xmlns:r="http://schemas.openxmlformats.org/officeDocument/2006/relationships" xmlns:p="http://schemas.openxmlformats.org/presentationml/2006/main">
   <p:cSld>
     <p:spTree>
@@ -36919,176 +37294,7 @@
 </p:sld>
 </file>
 
-<file path=ppt/slides/slide5.xml><?xml version="1.0" encoding="utf-8"?>
-<p:sld xmlns:a="http://schemas.openxmlformats.org/drawingml/2006/main" xmlns:r="http://schemas.openxmlformats.org/officeDocument/2006/relationships" xmlns:p="http://schemas.openxmlformats.org/presentationml/2006/main">
-  <p:cSld>
-    <p:spTree>
-      <p:nvGrpSpPr>
-        <p:cNvPr id="1" name=""/>
-        <p:cNvGrpSpPr/>
-        <p:nvPr/>
-      </p:nvGrpSpPr>
-      <p:grpSpPr>
-        <a:xfrm>
-          <a:off x="0" y="0"/>
-          <a:ext cx="0" cy="0"/>
-          <a:chOff x="0" y="0"/>
-          <a:chExt cx="0" cy="0"/>
-        </a:xfrm>
-      </p:grpSpPr>
-      <p:sp>
-        <p:nvSpPr>
-          <p:cNvPr id="2" name="Title 1">
-            <a:extLst>
-              <a:ext uri="{FF2B5EF4-FFF2-40B4-BE49-F238E27FC236}">
-                <a16:creationId xmlns:a16="http://schemas.microsoft.com/office/drawing/2014/main" id="{FDA802E0-8834-4A3F-B84B-C334800C9753}"/>
-              </a:ext>
-            </a:extLst>
-          </p:cNvPr>
-          <p:cNvSpPr>
-            <a:spLocks noGrp="1"/>
-          </p:cNvSpPr>
-          <p:nvPr>
-            <p:ph type="title"/>
-          </p:nvPr>
-        </p:nvSpPr>
-        <p:spPr>
-          <a:xfrm>
-            <a:off x="838199" y="262439"/>
-            <a:ext cx="10515600" cy="583504"/>
-          </a:xfrm>
-        </p:spPr>
-        <p:txBody>
-          <a:bodyPr>
-            <a:normAutofit fontScale="90000"/>
-          </a:bodyPr>
-          <a:lstStyle/>
-          <a:p>
-            <a:r>
-              <a:rPr lang="en-US" dirty="0">
-                <a:latin typeface="+mn-lt"/>
-              </a:rPr>
-              <a:t>Medical Application of Computer Vision</a:t>
-            </a:r>
-          </a:p>
-        </p:txBody>
-      </p:sp>
-      <p:pic>
-        <p:nvPicPr>
-          <p:cNvPr id="4" name="Picture 3">
-            <a:extLst>
-              <a:ext uri="{FF2B5EF4-FFF2-40B4-BE49-F238E27FC236}">
-                <a16:creationId xmlns:a16="http://schemas.microsoft.com/office/drawing/2014/main" id="{77563C94-51BC-431E-B60F-39D8489899F0}"/>
-              </a:ext>
-            </a:extLst>
-          </p:cNvPr>
-          <p:cNvPicPr>
-            <a:picLocks noChangeAspect="1"/>
-          </p:cNvPicPr>
-          <p:nvPr/>
-        </p:nvPicPr>
-        <p:blipFill>
-          <a:blip r:embed="rId2"/>
-          <a:stretch>
-            <a:fillRect/>
-          </a:stretch>
-        </p:blipFill>
-        <p:spPr>
-          <a:xfrm>
-            <a:off x="1046425" y="962320"/>
-            <a:ext cx="9241797" cy="3927176"/>
-          </a:xfrm>
-          <a:prstGeom prst="rect">
-            <a:avLst/>
-          </a:prstGeom>
-        </p:spPr>
-      </p:pic>
-      <p:sp>
-        <p:nvSpPr>
-          <p:cNvPr id="5" name="TextBox 4">
-            <a:extLst>
-              <a:ext uri="{FF2B5EF4-FFF2-40B4-BE49-F238E27FC236}">
-                <a16:creationId xmlns:a16="http://schemas.microsoft.com/office/drawing/2014/main" id="{6602666B-3A66-442A-8183-0B640B8F2638}"/>
-              </a:ext>
-            </a:extLst>
-          </p:cNvPr>
-          <p:cNvSpPr txBox="1"/>
-          <p:nvPr/>
-        </p:nvSpPr>
-        <p:spPr>
-          <a:xfrm>
-            <a:off x="658498" y="4840940"/>
-            <a:ext cx="10875003" cy="1938992"/>
-          </a:xfrm>
-          <a:prstGeom prst="rect">
-            <a:avLst/>
-          </a:prstGeom>
-          <a:noFill/>
-        </p:spPr>
-        <p:txBody>
-          <a:bodyPr wrap="square" rtlCol="0">
-            <a:spAutoFit/>
-          </a:bodyPr>
-          <a:lstStyle/>
-          <a:p>
-            <a:r>
-              <a:rPr lang="en-US" sz="2800" dirty="0"/>
-              <a:t>Learning to virtually stain histological samples to simplify pathology diagnoses</a:t>
-            </a:r>
-          </a:p>
-          <a:p>
-            <a:endParaRPr lang="en-US" sz="2800" dirty="0"/>
-          </a:p>
-          <a:p>
-            <a:r>
-              <a:rPr lang="en-US" dirty="0" err="1">
-                <a:hlinkClick r:id="rId3"/>
-              </a:rPr>
-              <a:t>Hnna</a:t>
-            </a:r>
-            <a:r>
-              <a:rPr lang="en-US" dirty="0">
-                <a:hlinkClick r:id="rId3"/>
-              </a:rPr>
-              <a:t>,  et. al., </a:t>
-            </a:r>
-            <a:r>
-              <a:rPr lang="en-US" b="0" i="0" dirty="0">
-                <a:solidFill>
-                  <a:srgbClr val="000000"/>
-                </a:solidFill>
-                <a:effectLst/>
-                <a:hlinkClick r:id="rId3"/>
-              </a:rPr>
-              <a:t>Deep learning-based transformation of H&amp;E stained tissues into special stains, Nature</a:t>
-            </a:r>
-            <a:r>
-              <a:rPr lang="en-US" dirty="0">
-                <a:solidFill>
-                  <a:srgbClr val="000000"/>
-                </a:solidFill>
-                <a:hlinkClick r:id="rId3"/>
-              </a:rPr>
-              <a:t> Communications, 2021.</a:t>
-            </a:r>
-            <a:endParaRPr lang="en-US" dirty="0"/>
-          </a:p>
-        </p:txBody>
-      </p:sp>
-    </p:spTree>
-    <p:extLst>
-      <p:ext uri="{BB962C8B-B14F-4D97-AF65-F5344CB8AC3E}">
-        <p14:creationId xmlns:p14="http://schemas.microsoft.com/office/powerpoint/2010/main" val="2643378001"/>
-      </p:ext>
-    </p:extLst>
-  </p:cSld>
-  <p:clrMapOvr>
-    <a:masterClrMapping/>
-  </p:clrMapOvr>
-</p:sld>
-</file>
-
-<file path=ppt/slides/slide50.xml><?xml version="1.0" encoding="utf-8"?>
+<file path=ppt/slides/slide51.xml><?xml version="1.0" encoding="utf-8"?>
 <p:sld xmlns:a="http://schemas.openxmlformats.org/drawingml/2006/main" xmlns:r="http://schemas.openxmlformats.org/officeDocument/2006/relationships" xmlns:p="http://schemas.openxmlformats.org/presentationml/2006/main">
   <p:cSld>
     <p:spTree>

</xml_diff>